<commit_message>
RIC-164: Documented Content Assist
</commit_message>
<xml_diff>
--- a/illustrations.pptx
+++ b/illustrations.pptx
@@ -5,7 +5,7 @@
     <p:sldMasterId id="2147483648" r:id="rId1"/>
   </p:sldMasterIdLst>
   <p:notesMasterIdLst>
-    <p:notesMasterId r:id="rId22"/>
+    <p:notesMasterId r:id="rId23"/>
   </p:notesMasterIdLst>
   <p:sldIdLst>
     <p:sldId id="256" r:id="rId2"/>
@@ -28,6 +28,7 @@
     <p:sldId id="272" r:id="rId19"/>
     <p:sldId id="273" r:id="rId20"/>
     <p:sldId id="274" r:id="rId21"/>
+    <p:sldId id="276" r:id="rId22"/>
   </p:sldIdLst>
   <p:sldSz cx="12192000" cy="6858000"/>
   <p:notesSz cx="6858000" cy="9144000"/>
@@ -9414,6 +9415,471 @@
 </p:sld>
 </file>
 
+<file path=ppt/slides/slide21.xml><?xml version="1.0" encoding="utf-8"?>
+<p:sld xmlns:a="http://schemas.openxmlformats.org/drawingml/2006/main" xmlns:r="http://schemas.openxmlformats.org/officeDocument/2006/relationships" xmlns:p="http://schemas.openxmlformats.org/presentationml/2006/main">
+  <p:cSld>
+    <p:spTree>
+      <p:nvGrpSpPr>
+        <p:cNvPr id="1" name=""/>
+        <p:cNvGrpSpPr/>
+        <p:nvPr/>
+      </p:nvGrpSpPr>
+      <p:grpSpPr>
+        <a:xfrm>
+          <a:off x="0" y="0"/>
+          <a:ext cx="0" cy="0"/>
+          <a:chOff x="0" y="0"/>
+          <a:chExt cx="0" cy="0"/>
+        </a:xfrm>
+      </p:grpSpPr>
+      <p:pic>
+        <p:nvPicPr>
+          <p:cNvPr id="12" name="Picture 11">
+            <a:extLst>
+              <a:ext uri="{FF2B5EF4-FFF2-40B4-BE49-F238E27FC236}">
+                <a16:creationId xmlns:a16="http://schemas.microsoft.com/office/drawing/2014/main" id="{3499B687-2DB6-C5F5-6869-391885B70A52}"/>
+              </a:ext>
+            </a:extLst>
+          </p:cNvPr>
+          <p:cNvPicPr>
+            <a:picLocks noChangeAspect="1"/>
+          </p:cNvPicPr>
+          <p:nvPr/>
+        </p:nvPicPr>
+        <p:blipFill>
+          <a:blip r:embed="rId2"/>
+          <a:stretch>
+            <a:fillRect/>
+          </a:stretch>
+        </p:blipFill>
+        <p:spPr>
+          <a:xfrm>
+            <a:off x="1877998" y="2385924"/>
+            <a:ext cx="5087060" cy="2743583"/>
+          </a:xfrm>
+          <a:prstGeom prst="rect">
+            <a:avLst/>
+          </a:prstGeom>
+        </p:spPr>
+      </p:pic>
+      <p:sp>
+        <p:nvSpPr>
+          <p:cNvPr id="2" name="Title 1">
+            <a:extLst>
+              <a:ext uri="{FF2B5EF4-FFF2-40B4-BE49-F238E27FC236}">
+                <a16:creationId xmlns:a16="http://schemas.microsoft.com/office/drawing/2014/main" id="{0753C408-FFC8-A4B5-F7F0-78CBB1D01076}"/>
+              </a:ext>
+            </a:extLst>
+          </p:cNvPr>
+          <p:cNvSpPr>
+            <a:spLocks noGrp="1"/>
+          </p:cNvSpPr>
+          <p:nvPr>
+            <p:ph type="title"/>
+          </p:nvPr>
+        </p:nvSpPr>
+        <p:spPr/>
+        <p:txBody>
+          <a:bodyPr/>
+          <a:lstStyle/>
+          <a:p>
+            <a:r>
+              <a:rPr lang="sv-SE" dirty="0"/>
+              <a:t>Art Editor</a:t>
+            </a:r>
+            <a:endParaRPr lang="en-SE" dirty="0"/>
+          </a:p>
+        </p:txBody>
+      </p:sp>
+      <p:sp>
+        <p:nvSpPr>
+          <p:cNvPr id="6" name="Right Brace 5">
+            <a:extLst>
+              <a:ext uri="{FF2B5EF4-FFF2-40B4-BE49-F238E27FC236}">
+                <a16:creationId xmlns:a16="http://schemas.microsoft.com/office/drawing/2014/main" id="{434898F7-5533-E639-9CF7-853C0ADA06FB}"/>
+              </a:ext>
+            </a:extLst>
+          </p:cNvPr>
+          <p:cNvSpPr/>
+          <p:nvPr/>
+        </p:nvSpPr>
+        <p:spPr>
+          <a:xfrm>
+            <a:off x="4421528" y="2500131"/>
+            <a:ext cx="320231" cy="928870"/>
+          </a:xfrm>
+          <a:prstGeom prst="rightBrace">
+            <a:avLst/>
+          </a:prstGeom>
+        </p:spPr>
+        <p:style>
+          <a:lnRef idx="1">
+            <a:schemeClr val="accent4"/>
+          </a:lnRef>
+          <a:fillRef idx="0">
+            <a:schemeClr val="accent4"/>
+          </a:fillRef>
+          <a:effectRef idx="0">
+            <a:schemeClr val="accent4"/>
+          </a:effectRef>
+          <a:fontRef idx="minor">
+            <a:schemeClr val="tx1"/>
+          </a:fontRef>
+        </p:style>
+        <p:txBody>
+          <a:bodyPr rtlCol="0" anchor="ctr"/>
+          <a:lstStyle/>
+          <a:p>
+            <a:pPr algn="ctr"/>
+            <a:endParaRPr lang="en-SE"/>
+          </a:p>
+        </p:txBody>
+      </p:sp>
+      <p:sp>
+        <p:nvSpPr>
+          <p:cNvPr id="7" name="TextBox 6">
+            <a:extLst>
+              <a:ext uri="{FF2B5EF4-FFF2-40B4-BE49-F238E27FC236}">
+                <a16:creationId xmlns:a16="http://schemas.microsoft.com/office/drawing/2014/main" id="{0AE7620F-0188-F80A-CAE0-9025B8008728}"/>
+              </a:ext>
+            </a:extLst>
+          </p:cNvPr>
+          <p:cNvSpPr txBox="1"/>
+          <p:nvPr/>
+        </p:nvSpPr>
+        <p:spPr>
+          <a:xfrm>
+            <a:off x="4795774" y="2779900"/>
+            <a:ext cx="1674369" cy="369332"/>
+          </a:xfrm>
+          <a:prstGeom prst="rect">
+            <a:avLst/>
+          </a:prstGeom>
+          <a:noFill/>
+        </p:spPr>
+        <p:txBody>
+          <a:bodyPr wrap="none" rtlCol="0">
+            <a:spAutoFit/>
+          </a:bodyPr>
+          <a:lstStyle/>
+          <a:p>
+            <a:r>
+              <a:rPr lang="sv-SE" dirty="0">
+                <a:solidFill>
+                  <a:schemeClr val="accent4">
+                    <a:lumMod val="60000"/>
+                    <a:lumOff val="40000"/>
+                  </a:schemeClr>
+                </a:solidFill>
+              </a:rPr>
+              <a:t>Code Templates</a:t>
+            </a:r>
+            <a:endParaRPr lang="en-SE" dirty="0">
+              <a:solidFill>
+                <a:schemeClr val="accent4">
+                  <a:lumMod val="60000"/>
+                  <a:lumOff val="40000"/>
+                </a:schemeClr>
+              </a:solidFill>
+            </a:endParaRPr>
+          </a:p>
+        </p:txBody>
+      </p:sp>
+      <p:sp>
+        <p:nvSpPr>
+          <p:cNvPr id="8" name="Right Brace 7">
+            <a:extLst>
+              <a:ext uri="{FF2B5EF4-FFF2-40B4-BE49-F238E27FC236}">
+                <a16:creationId xmlns:a16="http://schemas.microsoft.com/office/drawing/2014/main" id="{E4CF1396-6BE5-6423-ED31-7DF745C059B5}"/>
+              </a:ext>
+            </a:extLst>
+          </p:cNvPr>
+          <p:cNvSpPr/>
+          <p:nvPr/>
+        </p:nvSpPr>
+        <p:spPr>
+          <a:xfrm>
+            <a:off x="4419598" y="4247908"/>
+            <a:ext cx="324091" cy="821803"/>
+          </a:xfrm>
+          <a:prstGeom prst="rightBrace">
+            <a:avLst/>
+          </a:prstGeom>
+        </p:spPr>
+        <p:style>
+          <a:lnRef idx="1">
+            <a:schemeClr val="accent4"/>
+          </a:lnRef>
+          <a:fillRef idx="0">
+            <a:schemeClr val="accent4"/>
+          </a:fillRef>
+          <a:effectRef idx="0">
+            <a:schemeClr val="accent4"/>
+          </a:effectRef>
+          <a:fontRef idx="minor">
+            <a:schemeClr val="tx1"/>
+          </a:fontRef>
+        </p:style>
+        <p:txBody>
+          <a:bodyPr rtlCol="0" anchor="ctr"/>
+          <a:lstStyle/>
+          <a:p>
+            <a:pPr algn="ctr"/>
+            <a:endParaRPr lang="en-SE"/>
+          </a:p>
+        </p:txBody>
+      </p:sp>
+      <p:sp>
+        <p:nvSpPr>
+          <p:cNvPr id="9" name="TextBox 8">
+            <a:extLst>
+              <a:ext uri="{FF2B5EF4-FFF2-40B4-BE49-F238E27FC236}">
+                <a16:creationId xmlns:a16="http://schemas.microsoft.com/office/drawing/2014/main" id="{417D8E00-E8F7-54B4-846E-56463823A60C}"/>
+              </a:ext>
+            </a:extLst>
+          </p:cNvPr>
+          <p:cNvSpPr txBox="1"/>
+          <p:nvPr/>
+        </p:nvSpPr>
+        <p:spPr>
+          <a:xfrm>
+            <a:off x="4797703" y="4332841"/>
+            <a:ext cx="1093184" cy="369332"/>
+          </a:xfrm>
+          <a:prstGeom prst="rect">
+            <a:avLst/>
+          </a:prstGeom>
+          <a:noFill/>
+        </p:spPr>
+        <p:txBody>
+          <a:bodyPr wrap="none" rtlCol="0">
+            <a:spAutoFit/>
+          </a:bodyPr>
+          <a:lstStyle/>
+          <a:p>
+            <a:r>
+              <a:rPr lang="sv-SE" dirty="0">
+                <a:solidFill>
+                  <a:schemeClr val="accent4">
+                    <a:lumMod val="60000"/>
+                    <a:lumOff val="40000"/>
+                  </a:schemeClr>
+                </a:solidFill>
+              </a:rPr>
+              <a:t>Keywords</a:t>
+            </a:r>
+            <a:endParaRPr lang="en-SE" dirty="0">
+              <a:solidFill>
+                <a:schemeClr val="accent4">
+                  <a:lumMod val="60000"/>
+                  <a:lumOff val="40000"/>
+                </a:schemeClr>
+              </a:solidFill>
+            </a:endParaRPr>
+          </a:p>
+        </p:txBody>
+      </p:sp>
+      <p:sp>
+        <p:nvSpPr>
+          <p:cNvPr id="10" name="TextBox 9">
+            <a:extLst>
+              <a:ext uri="{FF2B5EF4-FFF2-40B4-BE49-F238E27FC236}">
+                <a16:creationId xmlns:a16="http://schemas.microsoft.com/office/drawing/2014/main" id="{6CAA6BAA-DD7F-CDF3-4507-51D947A6B75C}"/>
+              </a:ext>
+            </a:extLst>
+          </p:cNvPr>
+          <p:cNvSpPr txBox="1"/>
+          <p:nvPr/>
+        </p:nvSpPr>
+        <p:spPr>
+          <a:xfrm>
+            <a:off x="4822155" y="3492025"/>
+            <a:ext cx="1216551" cy="369332"/>
+          </a:xfrm>
+          <a:prstGeom prst="rect">
+            <a:avLst/>
+          </a:prstGeom>
+          <a:noFill/>
+        </p:spPr>
+        <p:txBody>
+          <a:bodyPr wrap="none" rtlCol="0">
+            <a:spAutoFit/>
+          </a:bodyPr>
+          <a:lstStyle/>
+          <a:p>
+            <a:r>
+              <a:rPr lang="sv-SE" dirty="0">
+                <a:solidFill>
+                  <a:schemeClr val="accent4">
+                    <a:lumMod val="60000"/>
+                    <a:lumOff val="40000"/>
+                  </a:schemeClr>
+                </a:solidFill>
+              </a:rPr>
+              <a:t>References</a:t>
+            </a:r>
+            <a:endParaRPr lang="en-SE" dirty="0">
+              <a:solidFill>
+                <a:schemeClr val="accent4">
+                  <a:lumMod val="60000"/>
+                  <a:lumOff val="40000"/>
+                </a:schemeClr>
+              </a:solidFill>
+            </a:endParaRPr>
+          </a:p>
+        </p:txBody>
+      </p:sp>
+      <p:sp>
+        <p:nvSpPr>
+          <p:cNvPr id="13" name="Right Brace 12">
+            <a:extLst>
+              <a:ext uri="{FF2B5EF4-FFF2-40B4-BE49-F238E27FC236}">
+                <a16:creationId xmlns:a16="http://schemas.microsoft.com/office/drawing/2014/main" id="{FD1806C1-8C51-A787-5569-DC2E31B5806C}"/>
+              </a:ext>
+            </a:extLst>
+          </p:cNvPr>
+          <p:cNvSpPr/>
+          <p:nvPr/>
+        </p:nvSpPr>
+        <p:spPr>
+          <a:xfrm>
+            <a:off x="4421528" y="3476264"/>
+            <a:ext cx="324091" cy="385093"/>
+          </a:xfrm>
+          <a:prstGeom prst="rightBrace">
+            <a:avLst/>
+          </a:prstGeom>
+        </p:spPr>
+        <p:style>
+          <a:lnRef idx="1">
+            <a:schemeClr val="accent4"/>
+          </a:lnRef>
+          <a:fillRef idx="0">
+            <a:schemeClr val="accent4"/>
+          </a:fillRef>
+          <a:effectRef idx="0">
+            <a:schemeClr val="accent4"/>
+          </a:effectRef>
+          <a:fontRef idx="minor">
+            <a:schemeClr val="tx1"/>
+          </a:fontRef>
+        </p:style>
+        <p:txBody>
+          <a:bodyPr rtlCol="0" anchor="ctr"/>
+          <a:lstStyle/>
+          <a:p>
+            <a:pPr algn="ctr"/>
+            <a:endParaRPr lang="en-SE"/>
+          </a:p>
+        </p:txBody>
+      </p:sp>
+      <p:sp>
+        <p:nvSpPr>
+          <p:cNvPr id="14" name="Right Brace 13">
+            <a:extLst>
+              <a:ext uri="{FF2B5EF4-FFF2-40B4-BE49-F238E27FC236}">
+                <a16:creationId xmlns:a16="http://schemas.microsoft.com/office/drawing/2014/main" id="{1B5B94CC-D5BB-9272-1E98-35BE32F23168}"/>
+              </a:ext>
+            </a:extLst>
+          </p:cNvPr>
+          <p:cNvSpPr/>
+          <p:nvPr/>
+        </p:nvSpPr>
+        <p:spPr>
+          <a:xfrm>
+            <a:off x="4423455" y="3908621"/>
+            <a:ext cx="324091" cy="279492"/>
+          </a:xfrm>
+          <a:prstGeom prst="rightBrace">
+            <a:avLst/>
+          </a:prstGeom>
+        </p:spPr>
+        <p:style>
+          <a:lnRef idx="1">
+            <a:schemeClr val="accent4"/>
+          </a:lnRef>
+          <a:fillRef idx="0">
+            <a:schemeClr val="accent4"/>
+          </a:fillRef>
+          <a:effectRef idx="0">
+            <a:schemeClr val="accent4"/>
+          </a:effectRef>
+          <a:fontRef idx="minor">
+            <a:schemeClr val="tx1"/>
+          </a:fontRef>
+        </p:style>
+        <p:txBody>
+          <a:bodyPr rtlCol="0" anchor="ctr"/>
+          <a:lstStyle/>
+          <a:p>
+            <a:pPr algn="ctr"/>
+            <a:endParaRPr lang="en-SE"/>
+          </a:p>
+        </p:txBody>
+      </p:sp>
+      <p:sp>
+        <p:nvSpPr>
+          <p:cNvPr id="15" name="TextBox 14">
+            <a:extLst>
+              <a:ext uri="{FF2B5EF4-FFF2-40B4-BE49-F238E27FC236}">
+                <a16:creationId xmlns:a16="http://schemas.microsoft.com/office/drawing/2014/main" id="{84CB3BE6-BEDD-A32A-C71F-2F509AB01F86}"/>
+              </a:ext>
+            </a:extLst>
+          </p:cNvPr>
+          <p:cNvSpPr txBox="1"/>
+          <p:nvPr/>
+        </p:nvSpPr>
+        <p:spPr>
+          <a:xfrm>
+            <a:off x="4816364" y="3864959"/>
+            <a:ext cx="744114" cy="369332"/>
+          </a:xfrm>
+          <a:prstGeom prst="rect">
+            <a:avLst/>
+          </a:prstGeom>
+          <a:noFill/>
+        </p:spPr>
+        <p:txBody>
+          <a:bodyPr wrap="none" rtlCol="0">
+            <a:spAutoFit/>
+          </a:bodyPr>
+          <a:lstStyle/>
+          <a:p>
+            <a:r>
+              <a:rPr lang="sv-SE" dirty="0">
+                <a:solidFill>
+                  <a:schemeClr val="accent4">
+                    <a:lumMod val="60000"/>
+                    <a:lumOff val="40000"/>
+                  </a:schemeClr>
+                </a:solidFill>
+              </a:rPr>
+              <a:t>Name</a:t>
+            </a:r>
+            <a:endParaRPr lang="en-SE" dirty="0">
+              <a:solidFill>
+                <a:schemeClr val="accent4">
+                  <a:lumMod val="60000"/>
+                  <a:lumOff val="40000"/>
+                </a:schemeClr>
+              </a:solidFill>
+            </a:endParaRPr>
+          </a:p>
+        </p:txBody>
+      </p:sp>
+    </p:spTree>
+    <p:extLst>
+      <p:ext uri="{BB962C8B-B14F-4D97-AF65-F5344CB8AC3E}">
+        <p14:creationId xmlns:p14="http://schemas.microsoft.com/office/powerpoint/2010/main" val="1628829252"/>
+      </p:ext>
+    </p:extLst>
+  </p:cSld>
+  <p:clrMapOvr>
+    <a:masterClrMapping/>
+  </p:clrMapOvr>
+</p:sld>
+</file>
+
 <file path=ppt/slides/slide3.xml><?xml version="1.0" encoding="utf-8"?>
 <p:sld xmlns:a="http://schemas.openxmlformats.org/drawingml/2006/main" xmlns:r="http://schemas.openxmlformats.org/officeDocument/2006/relationships" xmlns:p="http://schemas.openxmlformats.org/presentationml/2006/main">
   <p:cSld>

</xml_diff>

<commit_message>
Doc updates for 0.0.4
</commit_message>
<xml_diff>
--- a/illustrations.pptx
+++ b/illustrations.pptx
@@ -217,7 +217,7 @@
           <a:p>
             <a:fld id="{62B5D429-15EF-4A8F-AA09-BECBB0A557A5}" type="datetimeFigureOut">
               <a:rPr lang="en-IN" smtClean="0"/>
-              <a:t>16-11-2022</a:t>
+              <a:t>13-12-2022</a:t>
             </a:fld>
             <a:endParaRPr lang="en-IN"/>
           </a:p>
@@ -1613,97 +1613,257 @@
           <a:lstStyle/>
           <a:p>
             <a:r>
-              <a:rPr lang="fr-FR" sz="1200" b="0" kern="1200" dirty="0">
-                <a:solidFill>
-                  <a:schemeClr val="tx1"/>
-                </a:solidFill>
-                <a:effectLst/>
-                <a:latin typeface="+mn-lt"/>
-                <a:ea typeface="+mn-ea"/>
-                <a:cs typeface="+mn-cs"/>
-              </a:rPr>
-              <a:t>capsule Server {</a:t>
-            </a:r>
-          </a:p>
-          <a:p>
-            <a:r>
-              <a:rPr lang="fr-FR" sz="1200" b="0" kern="1200" dirty="0">
-                <a:solidFill>
-                  <a:schemeClr val="tx1"/>
-                </a:solidFill>
-                <a:effectLst/>
-                <a:latin typeface="+mn-lt"/>
-                <a:ea typeface="+mn-ea"/>
-                <a:cs typeface="+mn-cs"/>
-              </a:rPr>
-              <a:t>    service port clients : </a:t>
-            </a:r>
-            <a:r>
-              <a:rPr lang="fr-FR" sz="1200" b="0" kern="1200" dirty="0" err="1">
-                <a:solidFill>
-                  <a:schemeClr val="tx1"/>
-                </a:solidFill>
-                <a:effectLst/>
-                <a:latin typeface="+mn-lt"/>
-                <a:ea typeface="+mn-ea"/>
-                <a:cs typeface="+mn-cs"/>
+              <a:rPr lang="en-US" b="0" dirty="0">
+                <a:solidFill>
+                  <a:srgbClr val="C586C0"/>
+                </a:solidFill>
+                <a:effectLst/>
+                <a:latin typeface="Consolas" panose="020B0609020204030204" pitchFamily="49" charset="0"/>
+              </a:rPr>
+              <a:t>protocol</a:t>
+            </a:r>
+            <a:r>
+              <a:rPr lang="en-US" b="0" dirty="0">
+                <a:solidFill>
+                  <a:srgbClr val="D4D4D4"/>
+                </a:solidFill>
+                <a:effectLst/>
+                <a:latin typeface="Consolas" panose="020B0609020204030204" pitchFamily="49" charset="0"/>
+              </a:rPr>
+              <a:t> </a:t>
+            </a:r>
+            <a:r>
+              <a:rPr lang="en-US" b="0" dirty="0" err="1">
+                <a:solidFill>
+                  <a:srgbClr val="D4D4D4"/>
+                </a:solidFill>
+                <a:effectLst/>
+                <a:latin typeface="Consolas" panose="020B0609020204030204" pitchFamily="49" charset="0"/>
               </a:rPr>
               <a:t>ComEvents</a:t>
             </a:r>
             <a:r>
-              <a:rPr lang="fr-FR" sz="1200" b="0" kern="1200" dirty="0">
-                <a:solidFill>
-                  <a:schemeClr val="tx1"/>
-                </a:solidFill>
-                <a:effectLst/>
-                <a:latin typeface="+mn-lt"/>
-                <a:ea typeface="+mn-ea"/>
-                <a:cs typeface="+mn-cs"/>
+              <a:rPr lang="en-US" b="0" dirty="0">
+                <a:solidFill>
+                  <a:srgbClr val="D4D4D4"/>
+                </a:solidFill>
+                <a:effectLst/>
+                <a:latin typeface="Consolas" panose="020B0609020204030204" pitchFamily="49" charset="0"/>
+              </a:rPr>
+              <a:t> {</a:t>
+            </a:r>
+          </a:p>
+          <a:p>
+            <a:r>
+              <a:rPr lang="en-US" b="0" dirty="0">
+                <a:solidFill>
+                  <a:srgbClr val="D4D4D4"/>
+                </a:solidFill>
+                <a:effectLst/>
+                <a:latin typeface="Consolas" panose="020B0609020204030204" pitchFamily="49" charset="0"/>
+              </a:rPr>
+              <a:t>    </a:t>
+            </a:r>
+            <a:r>
+              <a:rPr lang="en-US" b="0" dirty="0">
+                <a:solidFill>
+                  <a:srgbClr val="6A9955"/>
+                </a:solidFill>
+                <a:effectLst/>
+                <a:latin typeface="Consolas" panose="020B0609020204030204" pitchFamily="49" charset="0"/>
+              </a:rPr>
+              <a:t>/* In Events */</a:t>
+            </a:r>
+            <a:endParaRPr lang="en-US" b="0" dirty="0">
+              <a:solidFill>
+                <a:srgbClr val="D4D4D4"/>
+              </a:solidFill>
+              <a:effectLst/>
+              <a:latin typeface="Consolas" panose="020B0609020204030204" pitchFamily="49" charset="0"/>
+            </a:endParaRPr>
+          </a:p>
+          <a:p>
+            <a:r>
+              <a:rPr lang="en-US" b="0" dirty="0">
+                <a:solidFill>
+                  <a:srgbClr val="D4D4D4"/>
+                </a:solidFill>
+                <a:effectLst/>
+                <a:latin typeface="Consolas" panose="020B0609020204030204" pitchFamily="49" charset="0"/>
+              </a:rPr>
+              <a:t>    </a:t>
+            </a:r>
+            <a:r>
+              <a:rPr lang="en-US" b="0" dirty="0">
+                <a:solidFill>
+                  <a:srgbClr val="6A9955"/>
+                </a:solidFill>
+                <a:effectLst/>
+                <a:latin typeface="Consolas" panose="020B0609020204030204" pitchFamily="49" charset="0"/>
+              </a:rPr>
+              <a:t>/* Out Events */</a:t>
+            </a:r>
+            <a:endParaRPr lang="en-US" b="0" dirty="0">
+              <a:solidFill>
+                <a:srgbClr val="D4D4D4"/>
+              </a:solidFill>
+              <a:effectLst/>
+              <a:latin typeface="Consolas" panose="020B0609020204030204" pitchFamily="49" charset="0"/>
+            </a:endParaRPr>
+          </a:p>
+          <a:p>
+            <a:r>
+              <a:rPr lang="en-US" b="0" dirty="0">
+                <a:solidFill>
+                  <a:srgbClr val="D4D4D4"/>
+                </a:solidFill>
+                <a:effectLst/>
+                <a:latin typeface="Consolas" panose="020B0609020204030204" pitchFamily="49" charset="0"/>
+              </a:rPr>
+              <a:t>};</a:t>
+            </a:r>
+          </a:p>
+          <a:p>
+            <a:br>
+              <a:rPr lang="en-US" b="0" dirty="0">
+                <a:solidFill>
+                  <a:srgbClr val="D4D4D4"/>
+                </a:solidFill>
+                <a:effectLst/>
+                <a:latin typeface="Consolas" panose="020B0609020204030204" pitchFamily="49" charset="0"/>
+              </a:rPr>
+            </a:br>
+            <a:r>
+              <a:rPr lang="en-US" b="0" dirty="0">
+                <a:solidFill>
+                  <a:srgbClr val="C586C0"/>
+                </a:solidFill>
+                <a:effectLst/>
+                <a:latin typeface="Consolas" panose="020B0609020204030204" pitchFamily="49" charset="0"/>
+              </a:rPr>
+              <a:t>capsule</a:t>
+            </a:r>
+            <a:r>
+              <a:rPr lang="en-US" b="0" dirty="0">
+                <a:solidFill>
+                  <a:srgbClr val="D4D4D4"/>
+                </a:solidFill>
+                <a:effectLst/>
+                <a:latin typeface="Consolas" panose="020B0609020204030204" pitchFamily="49" charset="0"/>
+              </a:rPr>
+              <a:t> Server {</a:t>
+            </a:r>
+          </a:p>
+          <a:p>
+            <a:r>
+              <a:rPr lang="en-US" b="0" dirty="0">
+                <a:solidFill>
+                  <a:srgbClr val="C586C0"/>
+                </a:solidFill>
+                <a:effectLst/>
+                <a:latin typeface="Consolas" panose="020B0609020204030204" pitchFamily="49" charset="0"/>
+              </a:rPr>
+              <a:t>service</a:t>
+            </a:r>
+            <a:r>
+              <a:rPr lang="en-US" b="0" dirty="0">
+                <a:solidFill>
+                  <a:srgbClr val="D4D4D4"/>
+                </a:solidFill>
+                <a:effectLst/>
+                <a:latin typeface="Consolas" panose="020B0609020204030204" pitchFamily="49" charset="0"/>
+              </a:rPr>
+              <a:t> </a:t>
+            </a:r>
+            <a:r>
+              <a:rPr lang="en-US" b="0" dirty="0">
+                <a:solidFill>
+                  <a:srgbClr val="C586C0"/>
+                </a:solidFill>
+                <a:effectLst/>
+                <a:latin typeface="Consolas" panose="020B0609020204030204" pitchFamily="49" charset="0"/>
+              </a:rPr>
+              <a:t>port</a:t>
+            </a:r>
+            <a:r>
+              <a:rPr lang="en-US" b="0" dirty="0">
+                <a:solidFill>
+                  <a:srgbClr val="D4D4D4"/>
+                </a:solidFill>
+                <a:effectLst/>
+                <a:latin typeface="Consolas" panose="020B0609020204030204" pitchFamily="49" charset="0"/>
+              </a:rPr>
+              <a:t> clients : </a:t>
+            </a:r>
+            <a:r>
+              <a:rPr lang="en-US" b="0" dirty="0" err="1">
+                <a:solidFill>
+                  <a:srgbClr val="D4D4D4"/>
+                </a:solidFill>
+                <a:effectLst/>
+                <a:latin typeface="Consolas" panose="020B0609020204030204" pitchFamily="49" charset="0"/>
+              </a:rPr>
+              <a:t>ComEvents</a:t>
+            </a:r>
+            <a:r>
+              <a:rPr lang="en-US" b="0" dirty="0">
+                <a:solidFill>
+                  <a:srgbClr val="D4D4D4"/>
+                </a:solidFill>
+                <a:effectLst/>
+                <a:latin typeface="Consolas" panose="020B0609020204030204" pitchFamily="49" charset="0"/>
               </a:rPr>
               <a:t>[100];</a:t>
             </a:r>
           </a:p>
           <a:p>
+            <a:r>
+              <a:rPr lang="en-US" b="0" dirty="0">
+                <a:solidFill>
+                  <a:srgbClr val="6A9955"/>
+                </a:solidFill>
+                <a:effectLst/>
+                <a:latin typeface="Consolas" panose="020B0609020204030204" pitchFamily="49" charset="0"/>
+              </a:rPr>
+              <a:t>// ...</a:t>
+            </a:r>
+            <a:endParaRPr lang="en-US" b="0" dirty="0">
+              <a:solidFill>
+                <a:srgbClr val="D4D4D4"/>
+              </a:solidFill>
+              <a:effectLst/>
+              <a:latin typeface="Consolas" panose="020B0609020204030204" pitchFamily="49" charset="0"/>
+            </a:endParaRPr>
+          </a:p>
+          <a:p>
+            <a:r>
+              <a:rPr lang="en-US" b="0" dirty="0">
+                <a:solidFill>
+                  <a:srgbClr val="D4D4D4"/>
+                </a:solidFill>
+                <a:effectLst/>
+                <a:latin typeface="Consolas" panose="020B0609020204030204" pitchFamily="49" charset="0"/>
+              </a:rPr>
+              <a:t>};</a:t>
+            </a:r>
+          </a:p>
+          <a:p>
             <a:br>
-              <a:rPr lang="fr-FR" sz="1200" b="0" kern="1200" dirty="0">
-                <a:solidFill>
-                  <a:schemeClr val="tx1"/>
-                </a:solidFill>
-                <a:effectLst/>
-                <a:latin typeface="+mn-lt"/>
-                <a:ea typeface="+mn-ea"/>
-                <a:cs typeface="+mn-cs"/>
+              <a:rPr lang="en-US" b="0">
+                <a:solidFill>
+                  <a:srgbClr val="D4D4D4"/>
+                </a:solidFill>
+                <a:effectLst/>
+                <a:latin typeface="Consolas" panose="020B0609020204030204" pitchFamily="49" charset="0"/>
               </a:rPr>
             </a:br>
-            <a:r>
-              <a:rPr lang="fr-FR" sz="1200" b="0" kern="1200" dirty="0">
-                <a:solidFill>
-                  <a:schemeClr val="tx1"/>
-                </a:solidFill>
-                <a:effectLst/>
-                <a:latin typeface="+mn-lt"/>
-                <a:ea typeface="+mn-ea"/>
-                <a:cs typeface="+mn-cs"/>
-              </a:rPr>
-              <a:t>    // ...</a:t>
-            </a:r>
-          </a:p>
-          <a:p>
-            <a:r>
-              <a:rPr lang="fr-FR" sz="1200" b="0" kern="1200" dirty="0">
-                <a:solidFill>
-                  <a:schemeClr val="tx1"/>
-                </a:solidFill>
-                <a:effectLst/>
-                <a:latin typeface="+mn-lt"/>
-                <a:ea typeface="+mn-ea"/>
-                <a:cs typeface="+mn-cs"/>
-              </a:rPr>
-              <a:t>};</a:t>
-            </a:r>
-          </a:p>
-          <a:p>
-            <a:endParaRPr lang="en-IN" dirty="0"/>
+            <a:endParaRPr lang="en-US" b="0">
+              <a:solidFill>
+                <a:srgbClr val="D4D4D4"/>
+              </a:solidFill>
+              <a:effectLst/>
+              <a:latin typeface="Consolas" panose="020B0609020204030204" pitchFamily="49" charset="0"/>
+            </a:endParaRPr>
           </a:p>
         </p:txBody>
       </p:sp>
@@ -5129,7 +5289,7 @@
           <a:p>
             <a:fld id="{35051988-DCA8-486F-804A-657BF6D379C2}" type="datetimeFigureOut">
               <a:rPr lang="en-IN" smtClean="0"/>
-              <a:t>16-11-2022</a:t>
+              <a:t>13-12-2022</a:t>
             </a:fld>
             <a:endParaRPr lang="en-IN"/>
           </a:p>
@@ -5329,7 +5489,7 @@
           <a:p>
             <a:fld id="{35051988-DCA8-486F-804A-657BF6D379C2}" type="datetimeFigureOut">
               <a:rPr lang="en-IN" smtClean="0"/>
-              <a:t>16-11-2022</a:t>
+              <a:t>13-12-2022</a:t>
             </a:fld>
             <a:endParaRPr lang="en-IN"/>
           </a:p>
@@ -5539,7 +5699,7 @@
           <a:p>
             <a:fld id="{35051988-DCA8-486F-804A-657BF6D379C2}" type="datetimeFigureOut">
               <a:rPr lang="en-IN" smtClean="0"/>
-              <a:t>16-11-2022</a:t>
+              <a:t>13-12-2022</a:t>
             </a:fld>
             <a:endParaRPr lang="en-IN"/>
           </a:p>
@@ -5739,7 +5899,7 @@
           <a:p>
             <a:fld id="{35051988-DCA8-486F-804A-657BF6D379C2}" type="datetimeFigureOut">
               <a:rPr lang="en-IN" smtClean="0"/>
-              <a:t>16-11-2022</a:t>
+              <a:t>13-12-2022</a:t>
             </a:fld>
             <a:endParaRPr lang="en-IN"/>
           </a:p>
@@ -6015,7 +6175,7 @@
           <a:p>
             <a:fld id="{35051988-DCA8-486F-804A-657BF6D379C2}" type="datetimeFigureOut">
               <a:rPr lang="en-IN" smtClean="0"/>
-              <a:t>16-11-2022</a:t>
+              <a:t>13-12-2022</a:t>
             </a:fld>
             <a:endParaRPr lang="en-IN"/>
           </a:p>
@@ -6283,7 +6443,7 @@
           <a:p>
             <a:fld id="{35051988-DCA8-486F-804A-657BF6D379C2}" type="datetimeFigureOut">
               <a:rPr lang="en-IN" smtClean="0"/>
-              <a:t>16-11-2022</a:t>
+              <a:t>13-12-2022</a:t>
             </a:fld>
             <a:endParaRPr lang="en-IN"/>
           </a:p>
@@ -6698,7 +6858,7 @@
           <a:p>
             <a:fld id="{35051988-DCA8-486F-804A-657BF6D379C2}" type="datetimeFigureOut">
               <a:rPr lang="en-IN" smtClean="0"/>
-              <a:t>16-11-2022</a:t>
+              <a:t>13-12-2022</a:t>
             </a:fld>
             <a:endParaRPr lang="en-IN"/>
           </a:p>
@@ -6840,7 +7000,7 @@
           <a:p>
             <a:fld id="{35051988-DCA8-486F-804A-657BF6D379C2}" type="datetimeFigureOut">
               <a:rPr lang="en-IN" smtClean="0"/>
-              <a:t>16-11-2022</a:t>
+              <a:t>13-12-2022</a:t>
             </a:fld>
             <a:endParaRPr lang="en-IN"/>
           </a:p>
@@ -6953,7 +7113,7 @@
           <a:p>
             <a:fld id="{35051988-DCA8-486F-804A-657BF6D379C2}" type="datetimeFigureOut">
               <a:rPr lang="en-IN" smtClean="0"/>
-              <a:t>16-11-2022</a:t>
+              <a:t>13-12-2022</a:t>
             </a:fld>
             <a:endParaRPr lang="en-IN"/>
           </a:p>
@@ -7266,7 +7426,7 @@
           <a:p>
             <a:fld id="{35051988-DCA8-486F-804A-657BF6D379C2}" type="datetimeFigureOut">
               <a:rPr lang="en-IN" smtClean="0"/>
-              <a:t>16-11-2022</a:t>
+              <a:t>13-12-2022</a:t>
             </a:fld>
             <a:endParaRPr lang="en-IN"/>
           </a:p>
@@ -7555,7 +7715,7 @@
           <a:p>
             <a:fld id="{35051988-DCA8-486F-804A-657BF6D379C2}" type="datetimeFigureOut">
               <a:rPr lang="en-IN" smtClean="0"/>
-              <a:t>16-11-2022</a:t>
+              <a:t>13-12-2022</a:t>
             </a:fld>
             <a:endParaRPr lang="en-IN"/>
           </a:p>
@@ -7798,7 +7958,7 @@
           <a:p>
             <a:fld id="{35051988-DCA8-486F-804A-657BF6D379C2}" type="datetimeFigureOut">
               <a:rPr lang="en-IN" smtClean="0"/>
-              <a:t>16-11-2022</a:t>
+              <a:t>13-12-2022</a:t>
             </a:fld>
             <a:endParaRPr lang="en-IN"/>
           </a:p>
@@ -10893,7 +11053,7 @@
         <p:spPr>
           <a:xfrm>
             <a:off x="933254" y="659876"/>
-            <a:ext cx="10850471" cy="39980175"/>
+            <a:ext cx="10850471" cy="38595181"/>
           </a:xfrm>
           <a:prstGeom prst="rect">
             <a:avLst/>
@@ -10922,29 +11082,1126 @@
           <a:p>
             <a:r>
               <a:rPr lang="en-IN" dirty="0"/>
-              <a:t>      </a:t>
-            </a:r>
-            <a:r>
-              <a:rPr lang="en-IN" i="1" dirty="0"/>
-              <a:t>/* In Events */</a:t>
+              <a:t>      /* In Events */</a:t>
+            </a:r>
+          </a:p>
+          <a:p>
+            <a:r>
+              <a:rPr lang="en-IN" dirty="0"/>
+              <a:t>      /* Out Events */</a:t>
+            </a:r>
+          </a:p>
+          <a:p>
+            <a:r>
+              <a:rPr lang="en-IN" dirty="0"/>
+              <a:t>      out red(), green(), yellow();</a:t>
+            </a:r>
+          </a:p>
+          <a:p>
+            <a:r>
+              <a:rPr lang="en-IN" dirty="0"/>
+              <a:t>};</a:t>
+            </a:r>
+          </a:p>
+          <a:p>
+            <a:r>
+              <a:rPr lang="en-IN" dirty="0"/>
+              <a:t>protocol </a:t>
+            </a:r>
+            <a:r>
+              <a:rPr lang="en-IN" dirty="0" err="1"/>
+              <a:t>TrafficLightControl</a:t>
+            </a:r>
+            <a:r>
+              <a:rPr lang="en-IN" dirty="0"/>
+              <a:t> {</a:t>
+            </a:r>
+          </a:p>
+          <a:p>
+            <a:r>
+              <a:rPr lang="en-IN" dirty="0"/>
+              <a:t>      /* In Events */</a:t>
+            </a:r>
+          </a:p>
+          <a:p>
+            <a:r>
+              <a:rPr lang="en-IN" dirty="0"/>
+              <a:t>      in pedestrian();</a:t>
+            </a:r>
+          </a:p>
+          <a:p>
+            <a:r>
+              <a:rPr lang="en-IN" dirty="0"/>
+              <a:t>      /* Out Events */</a:t>
+            </a:r>
+          </a:p>
+          <a:p>
+            <a:r>
+              <a:rPr lang="en-IN" dirty="0"/>
+              <a:t>};</a:t>
+            </a:r>
+          </a:p>
+          <a:p>
+            <a:r>
+              <a:rPr lang="en-IN" dirty="0"/>
+              <a:t>protocol </a:t>
+            </a:r>
+            <a:r>
+              <a:rPr lang="en-IN" dirty="0" err="1"/>
+              <a:t>PedLightControl</a:t>
+            </a:r>
+            <a:r>
+              <a:rPr lang="en-IN" dirty="0"/>
+              <a:t> {</a:t>
+            </a:r>
+          </a:p>
+          <a:p>
+            <a:r>
+              <a:rPr lang="en-IN" dirty="0"/>
+              <a:t>      /* In Events */      </a:t>
+            </a:r>
+          </a:p>
+          <a:p>
+            <a:r>
+              <a:rPr lang="en-IN" dirty="0"/>
+              <a:t>      in stop();</a:t>
+            </a:r>
+          </a:p>
+          <a:p>
+            <a:r>
+              <a:rPr lang="en-IN" dirty="0"/>
+              <a:t>      in walk();</a:t>
+            </a:r>
+          </a:p>
+          <a:p>
+            <a:r>
+              <a:rPr lang="en-IN" dirty="0"/>
+              <a:t>      /* Out Events */</a:t>
+            </a:r>
+          </a:p>
+          <a:p>
+            <a:r>
+              <a:rPr lang="en-IN" dirty="0"/>
+              <a:t>};</a:t>
+            </a:r>
+          </a:p>
+          <a:p>
+            <a:r>
+              <a:rPr lang="en-IN" dirty="0"/>
+              <a:t>capsule </a:t>
+            </a:r>
+            <a:r>
+              <a:rPr lang="en-IN" dirty="0" err="1"/>
+              <a:t>TrafficLight</a:t>
+            </a:r>
+            <a:r>
+              <a:rPr lang="en-IN" dirty="0"/>
+              <a:t> {</a:t>
+            </a:r>
+          </a:p>
+          <a:p>
+            <a:r>
+              <a:rPr lang="en-IN" dirty="0"/>
+              <a:t>      [[rt::</a:t>
+            </a:r>
+            <a:r>
+              <a:rPr lang="en-IN" dirty="0" err="1"/>
+              <a:t>decl</a:t>
+            </a:r>
+            <a:r>
+              <a:rPr lang="en-IN" dirty="0"/>
+              <a:t>]]</a:t>
+            </a:r>
+          </a:p>
+          <a:p>
+            <a:r>
+              <a:rPr lang="en-IN" dirty="0"/>
+              <a:t>      `</a:t>
+            </a:r>
+          </a:p>
+          <a:p>
+            <a:r>
+              <a:rPr lang="en-IN" dirty="0"/>
+              <a:t>          private: </a:t>
+            </a:r>
+            <a:r>
+              <a:rPr lang="en-IN" dirty="0" err="1"/>
+              <a:t>RTTimerId</a:t>
+            </a:r>
+            <a:r>
+              <a:rPr lang="en-IN" dirty="0"/>
+              <a:t> </a:t>
+            </a:r>
+            <a:r>
+              <a:rPr lang="en-IN" dirty="0" err="1"/>
+              <a:t>cycleTimer</a:t>
+            </a:r>
+            <a:r>
+              <a:rPr lang="en-IN" dirty="0"/>
+              <a:t>;</a:t>
+            </a:r>
+          </a:p>
+          <a:p>
+            <a:r>
+              <a:rPr lang="en-IN" dirty="0"/>
+              <a:t>      `</a:t>
+            </a:r>
+          </a:p>
+          <a:p>
+            <a:r>
+              <a:rPr lang="en-IN" dirty="0"/>
+              <a:t>      /* Ports */</a:t>
+            </a:r>
+          </a:p>
+          <a:p>
+            <a:r>
+              <a:rPr lang="en-IN" dirty="0"/>
+              <a:t>      service </a:t>
+            </a:r>
+            <a:r>
+              <a:rPr lang="en-IN" dirty="0" err="1"/>
+              <a:t>behavior</a:t>
+            </a:r>
+            <a:r>
+              <a:rPr lang="en-IN" dirty="0"/>
+              <a:t> port server : </a:t>
+            </a:r>
+            <a:r>
+              <a:rPr lang="en-IN" dirty="0" err="1"/>
+              <a:t>TrafficLightSignals</a:t>
+            </a:r>
+            <a:r>
+              <a:rPr lang="en-IN" dirty="0"/>
+              <a:t>;</a:t>
+            </a:r>
+          </a:p>
+          <a:p>
+            <a:r>
+              <a:rPr lang="en-IN" dirty="0"/>
+              <a:t>      service </a:t>
+            </a:r>
+            <a:r>
+              <a:rPr lang="en-IN" dirty="0" err="1"/>
+              <a:t>behavior</a:t>
+            </a:r>
+            <a:r>
+              <a:rPr lang="en-IN" dirty="0"/>
+              <a:t> port control : </a:t>
+            </a:r>
+            <a:r>
+              <a:rPr lang="en-IN" dirty="0" err="1"/>
+              <a:t>TrafficLightControl</a:t>
+            </a:r>
+            <a:r>
+              <a:rPr lang="en-IN" dirty="0"/>
+              <a:t>;</a:t>
+            </a:r>
+          </a:p>
+          <a:p>
+            <a:r>
+              <a:rPr lang="en-IN" dirty="0"/>
+              <a:t>      service </a:t>
+            </a:r>
+            <a:r>
+              <a:rPr lang="en-IN" dirty="0" err="1"/>
+              <a:t>behavior</a:t>
+            </a:r>
+            <a:r>
+              <a:rPr lang="en-IN" dirty="0"/>
+              <a:t> port </a:t>
+            </a:r>
+            <a:r>
+              <a:rPr lang="en-IN" dirty="0" err="1"/>
+              <a:t>pedLightControl</a:t>
+            </a:r>
+            <a:r>
+              <a:rPr lang="en-IN" dirty="0"/>
+              <a:t>~ : </a:t>
+            </a:r>
+            <a:r>
+              <a:rPr lang="en-IN" dirty="0" err="1"/>
+              <a:t>PedLightControl</a:t>
+            </a:r>
+            <a:r>
+              <a:rPr lang="en-IN" dirty="0"/>
+              <a:t>;</a:t>
+            </a:r>
+          </a:p>
+          <a:p>
+            <a:r>
+              <a:rPr lang="en-IN" dirty="0"/>
+              <a:t>      </a:t>
+            </a:r>
+            <a:r>
+              <a:rPr lang="en-IN" dirty="0" err="1"/>
+              <a:t>behavior</a:t>
+            </a:r>
+            <a:r>
+              <a:rPr lang="en-IN" dirty="0"/>
+              <a:t> port timer : Timing;</a:t>
+            </a:r>
+          </a:p>
+          <a:p>
+            <a:r>
+              <a:rPr lang="en-IN" dirty="0"/>
+              <a:t>      </a:t>
+            </a:r>
+            <a:r>
+              <a:rPr lang="en-IN" dirty="0" err="1"/>
+              <a:t>behavior</a:t>
+            </a:r>
+            <a:r>
+              <a:rPr lang="en-IN" dirty="0"/>
+              <a:t> port </a:t>
+            </a:r>
+            <a:r>
+              <a:rPr lang="en-IN" dirty="0" err="1"/>
+              <a:t>pedTimer</a:t>
+            </a:r>
+            <a:r>
+              <a:rPr lang="en-IN" dirty="0"/>
+              <a:t> : Timing;</a:t>
+            </a:r>
+          </a:p>
+          <a:p>
+            <a:r>
+              <a:rPr lang="en-IN" dirty="0"/>
+              <a:t>      /* Parts */</a:t>
+            </a:r>
+          </a:p>
+          <a:p>
+            <a:r>
+              <a:rPr lang="en-IN" dirty="0"/>
+              <a:t>      /* Connectors */</a:t>
+            </a:r>
+          </a:p>
+          <a:p>
+            <a:r>
+              <a:rPr lang="en-IN" dirty="0"/>
+              <a:t>      /* State Machine */</a:t>
+            </a:r>
+          </a:p>
+          <a:p>
+            <a:r>
+              <a:rPr lang="en-IN" dirty="0"/>
+              <a:t>      </a:t>
+            </a:r>
+            <a:r>
+              <a:rPr lang="en-IN" dirty="0" err="1"/>
+              <a:t>statemachine</a:t>
+            </a:r>
+            <a:r>
+              <a:rPr lang="en-IN" dirty="0"/>
+              <a:t> {</a:t>
+            </a:r>
+          </a:p>
+          <a:p>
+            <a:r>
+              <a:rPr lang="en-IN" dirty="0"/>
+              <a:t>            state </a:t>
+            </a:r>
+            <a:r>
+              <a:rPr lang="en-IN" dirty="0" err="1"/>
+              <a:t>WaitUntilServerReady</a:t>
+            </a:r>
+            <a:r>
+              <a:rPr lang="en-IN" dirty="0"/>
+              <a:t>;</a:t>
+            </a:r>
+          </a:p>
+          <a:p>
+            <a:r>
+              <a:rPr lang="en-IN" dirty="0"/>
+              <a:t>            state </a:t>
+            </a:r>
+            <a:r>
+              <a:rPr lang="en-IN" dirty="0" err="1"/>
+              <a:t>CycleLight</a:t>
+            </a:r>
+            <a:r>
+              <a:rPr lang="en-IN" dirty="0"/>
+              <a:t> {</a:t>
+            </a:r>
+          </a:p>
+          <a:p>
+            <a:r>
+              <a:rPr lang="en-IN" dirty="0"/>
+              <a:t>                  </a:t>
+            </a:r>
+            <a:r>
+              <a:rPr lang="en-IN" dirty="0" err="1"/>
+              <a:t>entrypoint</a:t>
+            </a:r>
+            <a:r>
+              <a:rPr lang="en-IN" dirty="0"/>
+              <a:t> </a:t>
+            </a:r>
+            <a:r>
+              <a:rPr lang="en-IN" dirty="0" err="1"/>
+              <a:t>init</a:t>
+            </a:r>
+            <a:r>
+              <a:rPr lang="en-IN" dirty="0"/>
+              <a:t>;</a:t>
+            </a:r>
+          </a:p>
+          <a:p>
+            <a:r>
+              <a:rPr lang="en-IN" dirty="0"/>
+              <a:t>                  state Red;</a:t>
+            </a:r>
+          </a:p>
+          <a:p>
+            <a:r>
+              <a:rPr lang="en-IN" dirty="0"/>
+              <a:t>                  state Green;</a:t>
+            </a:r>
+          </a:p>
+          <a:p>
+            <a:r>
+              <a:rPr lang="en-IN" dirty="0"/>
+              <a:t>                  state Yellow;</a:t>
+            </a:r>
+          </a:p>
+          <a:p>
+            <a:r>
+              <a:rPr lang="en-IN" dirty="0"/>
+              <a:t>                  </a:t>
+            </a:r>
+            <a:r>
+              <a:rPr lang="en-IN" dirty="0" err="1"/>
+              <a:t>init</a:t>
+            </a:r>
+            <a:r>
+              <a:rPr lang="en-IN" dirty="0"/>
+              <a:t> -&gt; Red;</a:t>
+            </a:r>
+          </a:p>
+          <a:p>
+            <a:r>
+              <a:rPr lang="en-IN" dirty="0"/>
+              <a:t>                  </a:t>
+            </a:r>
+            <a:r>
+              <a:rPr lang="en-IN" dirty="0" err="1"/>
+              <a:t>red_to_green</a:t>
+            </a:r>
+            <a:r>
+              <a:rPr lang="en-IN" dirty="0"/>
+              <a:t>: Red -&gt; Green on </a:t>
+            </a:r>
+            <a:r>
+              <a:rPr lang="en-IN" dirty="0" err="1"/>
+              <a:t>timer.timeout</a:t>
             </a:r>
             <a:endParaRPr lang="en-IN" dirty="0"/>
           </a:p>
           <a:p>
             <a:r>
               <a:rPr lang="en-IN" dirty="0"/>
-              <a:t>      </a:t>
-            </a:r>
-            <a:r>
-              <a:rPr lang="en-IN" i="1" dirty="0"/>
-              <a:t>/* Out Events */</a:t>
+              <a:t>                  `</a:t>
+            </a:r>
+          </a:p>
+          <a:p>
+            <a:r>
+              <a:rPr lang="en-IN" dirty="0"/>
+              <a:t>                        log.log("Red -&gt; Green");</a:t>
+            </a:r>
+          </a:p>
+          <a:p>
+            <a:r>
+              <a:rPr lang="en-IN" dirty="0"/>
+              <a:t>                        </a:t>
+            </a:r>
+            <a:r>
+              <a:rPr lang="en-IN" dirty="0" err="1"/>
+              <a:t>log.commit</a:t>
+            </a:r>
+            <a:r>
+              <a:rPr lang="en-IN" dirty="0"/>
+              <a:t>();</a:t>
+            </a:r>
+          </a:p>
+          <a:p>
+            <a:r>
+              <a:rPr lang="en-IN" dirty="0"/>
+              <a:t>                  `;</a:t>
+            </a:r>
+          </a:p>
+          <a:p>
+            <a:r>
+              <a:rPr lang="en-IN" dirty="0"/>
+              <a:t>                  </a:t>
+            </a:r>
+            <a:r>
+              <a:rPr lang="en-IN" dirty="0" err="1"/>
+              <a:t>green_to_yellow</a:t>
+            </a:r>
+            <a:r>
+              <a:rPr lang="en-IN" dirty="0"/>
+              <a:t>: Green -&gt; Yellow on </a:t>
+            </a:r>
+            <a:r>
+              <a:rPr lang="en-IN" dirty="0" err="1"/>
+              <a:t>timer.timeout</a:t>
             </a:r>
             <a:endParaRPr lang="en-IN" dirty="0"/>
           </a:p>
           <a:p>
             <a:r>
               <a:rPr lang="en-IN" dirty="0"/>
-              <a:t>      out red(), green(), yellow();</a:t>
+              <a:t>                  `</a:t>
+            </a:r>
+          </a:p>
+          <a:p>
+            <a:r>
+              <a:rPr lang="en-IN" dirty="0"/>
+              <a:t>                        log.log("Green -&gt; Yellow");</a:t>
+            </a:r>
+          </a:p>
+          <a:p>
+            <a:r>
+              <a:rPr lang="en-IN" dirty="0"/>
+              <a:t>                        </a:t>
+            </a:r>
+            <a:r>
+              <a:rPr lang="en-IN" dirty="0" err="1"/>
+              <a:t>log.commit</a:t>
+            </a:r>
+            <a:r>
+              <a:rPr lang="en-IN" dirty="0"/>
+              <a:t>();</a:t>
+            </a:r>
+          </a:p>
+          <a:p>
+            <a:r>
+              <a:rPr lang="en-IN" dirty="0"/>
+              <a:t>                  `;</a:t>
+            </a:r>
+          </a:p>
+          <a:p>
+            <a:r>
+              <a:rPr lang="en-IN" dirty="0"/>
+              <a:t>                  </a:t>
+            </a:r>
+            <a:r>
+              <a:rPr lang="en-IN" dirty="0" err="1"/>
+              <a:t>yellow_to_red</a:t>
+            </a:r>
+            <a:r>
+              <a:rPr lang="en-IN" dirty="0"/>
+              <a:t>: Yellow -&gt; Red on </a:t>
+            </a:r>
+            <a:r>
+              <a:rPr lang="en-IN" dirty="0" err="1"/>
+              <a:t>timer.timeout</a:t>
+            </a:r>
+            <a:endParaRPr lang="en-IN" dirty="0"/>
+          </a:p>
+          <a:p>
+            <a:r>
+              <a:rPr lang="en-IN" dirty="0"/>
+              <a:t>                  `</a:t>
+            </a:r>
+          </a:p>
+          <a:p>
+            <a:r>
+              <a:rPr lang="en-IN" dirty="0"/>
+              <a:t>                        log.log("Yellow -&gt; Red");</a:t>
+            </a:r>
+          </a:p>
+          <a:p>
+            <a:r>
+              <a:rPr lang="en-IN" dirty="0"/>
+              <a:t>                        </a:t>
+            </a:r>
+            <a:r>
+              <a:rPr lang="en-IN" dirty="0" err="1"/>
+              <a:t>log.commit</a:t>
+            </a:r>
+            <a:r>
+              <a:rPr lang="en-IN" dirty="0"/>
+              <a:t>();</a:t>
+            </a:r>
+          </a:p>
+          <a:p>
+            <a:r>
+              <a:rPr lang="en-IN" dirty="0"/>
+              <a:t>                  `;</a:t>
+            </a:r>
+          </a:p>
+          <a:p>
+            <a:r>
+              <a:rPr lang="en-IN" dirty="0"/>
+              <a:t>            };</a:t>
+            </a:r>
+          </a:p>
+          <a:p>
+            <a:r>
+              <a:rPr lang="en-IN" dirty="0"/>
+              <a:t>            state </a:t>
+            </a:r>
+            <a:r>
+              <a:rPr lang="en-IN" dirty="0" err="1"/>
+              <a:t>PedestriansCrossing</a:t>
+            </a:r>
+            <a:r>
+              <a:rPr lang="en-IN" dirty="0"/>
+              <a:t> {</a:t>
+            </a:r>
+          </a:p>
+          <a:p>
+            <a:r>
+              <a:rPr lang="en-IN" dirty="0"/>
+              <a:t>                  </a:t>
+            </a:r>
+            <a:r>
+              <a:rPr lang="en-IN" dirty="0" err="1"/>
+              <a:t>updatePedLight</a:t>
+            </a:r>
+            <a:r>
+              <a:rPr lang="en-IN" dirty="0"/>
+              <a:t>: on </a:t>
+            </a:r>
+            <a:r>
+              <a:rPr lang="en-IN" dirty="0" err="1"/>
+              <a:t>pedTimer.timeout</a:t>
+            </a:r>
+            <a:endParaRPr lang="en-IN" dirty="0"/>
+          </a:p>
+          <a:p>
+            <a:r>
+              <a:rPr lang="en-IN" dirty="0"/>
+              <a:t>                  `</a:t>
+            </a:r>
+          </a:p>
+          <a:p>
+            <a:r>
+              <a:rPr lang="en-IN" dirty="0"/>
+              <a:t>                        if (*((bool*) </a:t>
+            </a:r>
+            <a:r>
+              <a:rPr lang="en-IN" dirty="0" err="1"/>
+              <a:t>rtdata</a:t>
+            </a:r>
+            <a:r>
+              <a:rPr lang="en-IN" dirty="0"/>
+              <a:t>) == true) {</a:t>
+            </a:r>
+          </a:p>
+          <a:p>
+            <a:r>
+              <a:rPr lang="en-IN" dirty="0"/>
+              <a:t>                              </a:t>
+            </a:r>
+            <a:r>
+              <a:rPr lang="en-IN" dirty="0" err="1"/>
+              <a:t>pedLightControl.walk</a:t>
+            </a:r>
+            <a:r>
+              <a:rPr lang="en-IN" dirty="0"/>
+              <a:t>().send();</a:t>
+            </a:r>
+          </a:p>
+          <a:p>
+            <a:r>
+              <a:rPr lang="en-IN" dirty="0"/>
+              <a:t>                              bool </a:t>
+            </a:r>
+            <a:r>
+              <a:rPr lang="en-IN" dirty="0" err="1"/>
+              <a:t>waitForWalk</a:t>
+            </a:r>
+            <a:r>
+              <a:rPr lang="en-IN" dirty="0"/>
+              <a:t> = false;</a:t>
+            </a:r>
+          </a:p>
+          <a:p>
+            <a:r>
+              <a:rPr lang="en-IN" dirty="0"/>
+              <a:t>                              </a:t>
+            </a:r>
+            <a:r>
+              <a:rPr lang="en-IN" dirty="0" err="1"/>
+              <a:t>pedTimer.informIn</a:t>
+            </a:r>
+            <a:r>
+              <a:rPr lang="en-IN" dirty="0"/>
+              <a:t>(</a:t>
+            </a:r>
+            <a:r>
+              <a:rPr lang="en-IN" dirty="0" err="1"/>
+              <a:t>RTTimespec</a:t>
+            </a:r>
+            <a:r>
+              <a:rPr lang="en-IN" dirty="0"/>
+              <a:t>(4,0), &amp;</a:t>
+            </a:r>
+            <a:r>
+              <a:rPr lang="en-IN" dirty="0" err="1"/>
+              <a:t>waitForWalk</a:t>
+            </a:r>
+            <a:r>
+              <a:rPr lang="en-IN" dirty="0"/>
+              <a:t>, &amp;</a:t>
+            </a:r>
+            <a:r>
+              <a:rPr lang="en-IN" dirty="0" err="1"/>
+              <a:t>RTType_bool</a:t>
+            </a:r>
+            <a:r>
+              <a:rPr lang="en-IN" dirty="0"/>
+              <a:t>);</a:t>
+            </a:r>
+          </a:p>
+          <a:p>
+            <a:r>
+              <a:rPr lang="en-IN" dirty="0"/>
+              <a:t>                              // Time for pedestrians to cross</a:t>
+            </a:r>
+          </a:p>
+          <a:p>
+            <a:r>
+              <a:rPr lang="en-IN" dirty="0"/>
+              <a:t>                        }</a:t>
+            </a:r>
+          </a:p>
+          <a:p>
+            <a:r>
+              <a:rPr lang="en-IN" dirty="0"/>
+              <a:t>                        else {</a:t>
+            </a:r>
+          </a:p>
+          <a:p>
+            <a:r>
+              <a:rPr lang="en-IN" dirty="0"/>
+              <a:t>                              </a:t>
+            </a:r>
+            <a:r>
+              <a:rPr lang="en-IN" dirty="0" err="1"/>
+              <a:t>pedLightControl.stop</a:t>
+            </a:r>
+            <a:r>
+              <a:rPr lang="en-IN" dirty="0"/>
+              <a:t>().send();</a:t>
+            </a:r>
+          </a:p>
+          <a:p>
+            <a:r>
+              <a:rPr lang="en-IN" dirty="0"/>
+              <a:t>                              </a:t>
+            </a:r>
+            <a:r>
+              <a:rPr lang="en-IN" dirty="0" err="1"/>
+              <a:t>timer.informIn</a:t>
+            </a:r>
+            <a:r>
+              <a:rPr lang="en-IN" dirty="0"/>
+              <a:t>(</a:t>
+            </a:r>
+            <a:r>
+              <a:rPr lang="en-IN" dirty="0" err="1"/>
+              <a:t>RTTimespec</a:t>
+            </a:r>
+            <a:r>
+              <a:rPr lang="en-IN" dirty="0"/>
+              <a:t>(2,0));</a:t>
+            </a:r>
+          </a:p>
+          <a:p>
+            <a:r>
+              <a:rPr lang="en-IN" dirty="0"/>
+              <a:t>                        }</a:t>
+            </a:r>
+          </a:p>
+          <a:p>
+            <a:r>
+              <a:rPr lang="en-IN" dirty="0"/>
+              <a:t>                  `;</a:t>
+            </a:r>
+          </a:p>
+          <a:p>
+            <a:r>
+              <a:rPr lang="en-IN" dirty="0"/>
+              <a:t>                  </a:t>
+            </a:r>
+            <a:r>
+              <a:rPr lang="en-IN" dirty="0" err="1"/>
+              <a:t>pedRequest_ignored</a:t>
+            </a:r>
+            <a:r>
+              <a:rPr lang="en-IN" dirty="0"/>
+              <a:t>: on </a:t>
+            </a:r>
+            <a:r>
+              <a:rPr lang="en-IN" dirty="0" err="1"/>
+              <a:t>control.pedestrian</a:t>
+            </a:r>
+            <a:endParaRPr lang="en-IN" dirty="0"/>
+          </a:p>
+          <a:p>
+            <a:r>
+              <a:rPr lang="en-IN" dirty="0"/>
+              <a:t>                  `</a:t>
+            </a:r>
+          </a:p>
+          <a:p>
+            <a:r>
+              <a:rPr lang="en-IN" dirty="0"/>
+              <a:t>                        // Ignore additional requests from pedestrians since we already are in the </a:t>
+            </a:r>
+            <a:r>
+              <a:rPr lang="en-IN" dirty="0" err="1"/>
+              <a:t>PedestriansCrossing</a:t>
+            </a:r>
+            <a:r>
+              <a:rPr lang="en-IN" dirty="0"/>
+              <a:t> state.</a:t>
+            </a:r>
+          </a:p>
+          <a:p>
+            <a:r>
+              <a:rPr lang="en-IN" dirty="0"/>
+              <a:t>                  `;</a:t>
+            </a:r>
+          </a:p>
+          <a:p>
+            <a:r>
+              <a:rPr lang="en-IN" dirty="0"/>
+              <a:t>            };</a:t>
+            </a:r>
+          </a:p>
+          <a:p>
+            <a:r>
+              <a:rPr lang="en-IN" dirty="0"/>
+              <a:t>            initial -&gt; </a:t>
+            </a:r>
+            <a:r>
+              <a:rPr lang="en-IN" dirty="0" err="1"/>
+              <a:t>WaitUntilServerReady</a:t>
+            </a:r>
+            <a:r>
+              <a:rPr lang="en-IN" dirty="0"/>
+              <a:t>;</a:t>
+            </a:r>
+          </a:p>
+          <a:p>
+            <a:r>
+              <a:rPr lang="en-IN" dirty="0"/>
+              <a:t>            </a:t>
+            </a:r>
+            <a:r>
+              <a:rPr lang="en-IN" dirty="0" err="1"/>
+              <a:t>serverReady</a:t>
+            </a:r>
+            <a:r>
+              <a:rPr lang="en-IN" dirty="0"/>
+              <a:t>: </a:t>
+            </a:r>
+            <a:r>
+              <a:rPr lang="en-IN" dirty="0" err="1"/>
+              <a:t>WaitUntilServerReady</a:t>
+            </a:r>
+            <a:r>
+              <a:rPr lang="en-IN" dirty="0"/>
+              <a:t> -&gt; </a:t>
+            </a:r>
+            <a:r>
+              <a:rPr lang="en-IN" dirty="0" err="1"/>
+              <a:t>CycleLight.init</a:t>
+            </a:r>
+            <a:r>
+              <a:rPr lang="en-IN" dirty="0"/>
+              <a:t> on </a:t>
+            </a:r>
+            <a:r>
+              <a:rPr lang="en-IN" dirty="0" err="1"/>
+              <a:t>server.rtBound</a:t>
+            </a:r>
+            <a:endParaRPr lang="en-IN" dirty="0"/>
+          </a:p>
+          <a:p>
+            <a:r>
+              <a:rPr lang="en-IN" dirty="0"/>
+              <a:t>            `</a:t>
+            </a:r>
+          </a:p>
+          <a:p>
+            <a:r>
+              <a:rPr lang="en-IN" dirty="0"/>
+              <a:t>                  log.log("</a:t>
+            </a:r>
+            <a:r>
+              <a:rPr lang="en-IN" dirty="0" err="1"/>
+              <a:t>TrafficLight</a:t>
+            </a:r>
+            <a:r>
+              <a:rPr lang="en-IN" dirty="0"/>
+              <a:t> starts up");</a:t>
+            </a:r>
+          </a:p>
+          <a:p>
+            <a:r>
+              <a:rPr lang="en-IN" dirty="0"/>
+              <a:t>                  </a:t>
+            </a:r>
+            <a:r>
+              <a:rPr lang="en-IN" dirty="0" err="1"/>
+              <a:t>log.commit</a:t>
+            </a:r>
+            <a:r>
+              <a:rPr lang="en-IN" dirty="0"/>
+              <a:t>();</a:t>
+            </a:r>
+          </a:p>
+          <a:p>
+            <a:r>
+              <a:rPr lang="en-IN" dirty="0"/>
+              <a:t>                  </a:t>
+            </a:r>
+            <a:r>
+              <a:rPr lang="en-IN" dirty="0" err="1"/>
+              <a:t>cycleTimer</a:t>
+            </a:r>
+            <a:r>
+              <a:rPr lang="en-IN" dirty="0"/>
+              <a:t> = </a:t>
+            </a:r>
+            <a:r>
+              <a:rPr lang="en-IN" dirty="0" err="1"/>
+              <a:t>timer.informEvery</a:t>
+            </a:r>
+            <a:r>
+              <a:rPr lang="en-IN" dirty="0"/>
+              <a:t>(</a:t>
+            </a:r>
+            <a:r>
+              <a:rPr lang="en-IN" dirty="0" err="1"/>
+              <a:t>RTTimespec</a:t>
+            </a:r>
+            <a:r>
+              <a:rPr lang="en-IN" dirty="0"/>
+              <a:t>(2,0));</a:t>
+            </a:r>
+          </a:p>
+          <a:p>
+            <a:r>
+              <a:rPr lang="en-IN" dirty="0"/>
+              <a:t>            `;</a:t>
+            </a:r>
+          </a:p>
+          <a:p>
+            <a:r>
+              <a:rPr lang="en-IN" dirty="0"/>
+              <a:t>            </a:t>
+            </a:r>
+            <a:r>
+              <a:rPr lang="en-IN" dirty="0" err="1"/>
+              <a:t>pedRequest</a:t>
+            </a:r>
+            <a:r>
+              <a:rPr lang="en-IN" dirty="0"/>
+              <a:t>: </a:t>
+            </a:r>
+            <a:r>
+              <a:rPr lang="en-IN" dirty="0" err="1"/>
+              <a:t>CycleLight</a:t>
+            </a:r>
+            <a:r>
+              <a:rPr lang="en-IN" dirty="0"/>
+              <a:t> -&gt; </a:t>
+            </a:r>
+            <a:r>
+              <a:rPr lang="en-IN" dirty="0" err="1"/>
+              <a:t>PedestriansCrossing</a:t>
+            </a:r>
+            <a:r>
+              <a:rPr lang="en-IN" dirty="0"/>
+              <a:t> on </a:t>
+            </a:r>
+            <a:r>
+              <a:rPr lang="en-IN" dirty="0" err="1"/>
+              <a:t>control.pedestrian</a:t>
+            </a:r>
+            <a:r>
+              <a:rPr lang="en-IN" dirty="0"/>
+              <a:t> when</a:t>
+            </a:r>
+          </a:p>
+          <a:p>
+            <a:r>
+              <a:rPr lang="en-IN" dirty="0"/>
+              <a:t>            `</a:t>
+            </a:r>
+          </a:p>
+          <a:p>
+            <a:r>
+              <a:rPr lang="en-IN" dirty="0"/>
+              <a:t>                return true;</a:t>
+            </a:r>
+          </a:p>
+          <a:p>
+            <a:r>
+              <a:rPr lang="en-IN" dirty="0"/>
+              <a:t>            `</a:t>
+            </a:r>
+          </a:p>
+          <a:p>
+            <a:r>
+              <a:rPr lang="en-IN" dirty="0"/>
+              <a:t>            `</a:t>
+            </a:r>
+          </a:p>
+          <a:p>
+            <a:r>
+              <a:rPr lang="en-IN" dirty="0"/>
+              <a:t>                  log.log("Pedestrian requests to cross");</a:t>
+            </a:r>
+          </a:p>
+          <a:p>
+            <a:r>
+              <a:rPr lang="en-IN" dirty="0"/>
+              <a:t>                  </a:t>
+            </a:r>
+            <a:r>
+              <a:rPr lang="en-IN" dirty="0" err="1"/>
+              <a:t>log.commit</a:t>
+            </a:r>
+            <a:r>
+              <a:rPr lang="en-IN" dirty="0"/>
+              <a:t>();</a:t>
+            </a:r>
+          </a:p>
+          <a:p>
+            <a:r>
+              <a:rPr lang="en-IN" dirty="0"/>
+              <a:t>                  </a:t>
+            </a:r>
+            <a:r>
+              <a:rPr lang="en-IN" dirty="0" err="1"/>
+              <a:t>timer.cancelTimer</a:t>
+            </a:r>
+            <a:r>
+              <a:rPr lang="en-IN" dirty="0"/>
+              <a:t>(</a:t>
+            </a:r>
+            <a:r>
+              <a:rPr lang="en-IN" dirty="0" err="1"/>
+              <a:t>cycleTimer</a:t>
+            </a:r>
+            <a:r>
+              <a:rPr lang="en-IN" dirty="0"/>
+              <a:t>);</a:t>
+            </a:r>
+          </a:p>
+          <a:p>
+            <a:r>
+              <a:rPr lang="en-IN" dirty="0"/>
+              <a:t>            `;</a:t>
+            </a:r>
+          </a:p>
+          <a:p>
+            <a:r>
+              <a:rPr lang="en-IN" dirty="0"/>
+              <a:t>            </a:t>
+            </a:r>
+            <a:r>
+              <a:rPr lang="en-IN" dirty="0" err="1"/>
+              <a:t>pedReady</a:t>
+            </a:r>
+            <a:r>
+              <a:rPr lang="en-IN" dirty="0"/>
+              <a:t>: </a:t>
+            </a:r>
+            <a:r>
+              <a:rPr lang="en-IN" dirty="0" err="1"/>
+              <a:t>PedestriansCrossing</a:t>
+            </a:r>
+            <a:r>
+              <a:rPr lang="en-IN" dirty="0"/>
+              <a:t> -&gt; </a:t>
+            </a:r>
+            <a:r>
+              <a:rPr lang="en-IN" dirty="0" err="1"/>
+              <a:t>CycleLight.init</a:t>
+            </a:r>
+            <a:r>
+              <a:rPr lang="en-IN" dirty="0"/>
+              <a:t> on </a:t>
+            </a:r>
+            <a:r>
+              <a:rPr lang="en-IN" dirty="0" err="1"/>
+              <a:t>timer.timeout</a:t>
+            </a:r>
+            <a:endParaRPr lang="en-IN" dirty="0"/>
+          </a:p>
+          <a:p>
+            <a:r>
+              <a:rPr lang="en-IN" dirty="0"/>
+              <a:t>            `  </a:t>
+            </a:r>
+          </a:p>
+          <a:p>
+            <a:r>
+              <a:rPr lang="en-IN" dirty="0"/>
+              <a:t>                  log.log("Pedestrians ready");</a:t>
+            </a:r>
+          </a:p>
+          <a:p>
+            <a:r>
+              <a:rPr lang="en-IN" dirty="0"/>
+              <a:t>                  </a:t>
+            </a:r>
+            <a:r>
+              <a:rPr lang="en-IN" dirty="0" err="1"/>
+              <a:t>log.commit</a:t>
+            </a:r>
+            <a:r>
+              <a:rPr lang="en-IN" dirty="0"/>
+              <a:t>();</a:t>
+            </a:r>
+          </a:p>
+          <a:p>
+            <a:r>
+              <a:rPr lang="en-IN" dirty="0"/>
+              <a:t>                  </a:t>
+            </a:r>
+            <a:r>
+              <a:rPr lang="en-IN" dirty="0" err="1"/>
+              <a:t>cycleTimer</a:t>
+            </a:r>
+            <a:r>
+              <a:rPr lang="en-IN" dirty="0"/>
+              <a:t> = </a:t>
+            </a:r>
+            <a:r>
+              <a:rPr lang="en-IN" dirty="0" err="1"/>
+              <a:t>timer.informEvery</a:t>
+            </a:r>
+            <a:r>
+              <a:rPr lang="en-IN" dirty="0"/>
+              <a:t>(</a:t>
+            </a:r>
+            <a:r>
+              <a:rPr lang="en-IN" dirty="0" err="1"/>
+              <a:t>RTTimespec</a:t>
+            </a:r>
+            <a:r>
+              <a:rPr lang="en-IN" dirty="0"/>
+              <a:t>(2,0));</a:t>
+            </a:r>
+          </a:p>
+          <a:p>
+            <a:r>
+              <a:rPr lang="en-IN" dirty="0"/>
+              <a:t>            `;</a:t>
+            </a:r>
+          </a:p>
+          <a:p>
+            <a:r>
+              <a:rPr lang="en-IN" dirty="0"/>
+              <a:t>      };</a:t>
             </a:r>
           </a:p>
           <a:p>
@@ -10954,16 +12211,13 @@
             </a:r>
           </a:p>
           <a:p>
-            <a:br>
-              <a:rPr lang="en-IN" dirty="0"/>
-            </a:br>
-            <a:r>
-              <a:rPr lang="en-IN" dirty="0"/>
-              <a:t>protocol </a:t>
-            </a:r>
-            <a:r>
-              <a:rPr lang="en-IN" dirty="0" err="1"/>
-              <a:t>TrafficLightControl</a:t>
+            <a:r>
+              <a:rPr lang="en-IN" dirty="0"/>
+              <a:t>capsule </a:t>
+            </a:r>
+            <a:r>
+              <a:rPr lang="en-IN" dirty="0" err="1"/>
+              <a:t>PedLight</a:t>
             </a:r>
             <a:r>
               <a:rPr lang="en-IN" dirty="0"/>
@@ -10973,1649 +12227,447 @@
           <a:p>
             <a:r>
               <a:rPr lang="en-IN" dirty="0"/>
-              <a:t>      </a:t>
-            </a:r>
-            <a:r>
-              <a:rPr lang="en-IN" i="1" dirty="0"/>
-              <a:t>/* In Events */</a:t>
-            </a:r>
+              <a:t>    /* Ports */</a:t>
+            </a:r>
+          </a:p>
+          <a:p>
+            <a:r>
+              <a:rPr lang="en-IN" dirty="0"/>
+              <a:t>    service </a:t>
+            </a:r>
+            <a:r>
+              <a:rPr lang="en-IN" dirty="0" err="1"/>
+              <a:t>behavior</a:t>
+            </a:r>
+            <a:r>
+              <a:rPr lang="en-IN" dirty="0"/>
+              <a:t> port </a:t>
+            </a:r>
+            <a:r>
+              <a:rPr lang="en-IN" dirty="0" err="1"/>
+              <a:t>pedControl</a:t>
+            </a:r>
+            <a:r>
+              <a:rPr lang="en-IN" dirty="0"/>
+              <a:t> : </a:t>
+            </a:r>
+            <a:r>
+              <a:rPr lang="en-IN" dirty="0" err="1"/>
+              <a:t>PedLightControl</a:t>
+            </a:r>
+            <a:r>
+              <a:rPr lang="en-IN" dirty="0"/>
+              <a:t>;</a:t>
+            </a:r>
+          </a:p>
+          <a:p>
+            <a:r>
+              <a:rPr lang="en-IN" dirty="0"/>
+              <a:t>    service </a:t>
+            </a:r>
+            <a:r>
+              <a:rPr lang="en-IN" dirty="0" err="1"/>
+              <a:t>behavior</a:t>
+            </a:r>
+            <a:r>
+              <a:rPr lang="en-IN" dirty="0"/>
+              <a:t> notify port server~ : </a:t>
+            </a:r>
+            <a:r>
+              <a:rPr lang="en-IN" dirty="0" err="1"/>
+              <a:t>PedLightControl</a:t>
+            </a:r>
+            <a:r>
+              <a:rPr lang="en-IN" dirty="0"/>
+              <a:t>;</a:t>
+            </a:r>
+          </a:p>
+          <a:p>
+            <a:r>
+              <a:rPr lang="en-IN" dirty="0"/>
+              <a:t>    /* Parts */</a:t>
+            </a:r>
+          </a:p>
+          <a:p>
+            <a:r>
+              <a:rPr lang="en-IN" dirty="0"/>
+              <a:t>    /* Connectors */</a:t>
+            </a:r>
+          </a:p>
+          <a:p>
+            <a:r>
+              <a:rPr lang="en-IN" dirty="0"/>
+              <a:t>    /* State Machine */</a:t>
+            </a:r>
+          </a:p>
+          <a:p>
+            <a:r>
+              <a:rPr lang="en-IN" dirty="0"/>
+              <a:t>    </a:t>
+            </a:r>
+            <a:r>
+              <a:rPr lang="en-IN" dirty="0" err="1"/>
+              <a:t>statemachine</a:t>
+            </a:r>
+            <a:r>
+              <a:rPr lang="en-IN" dirty="0"/>
+              <a:t> {</a:t>
+            </a:r>
+          </a:p>
+          <a:p>
+            <a:r>
+              <a:rPr lang="en-IN" dirty="0"/>
+              <a:t>        state </a:t>
+            </a:r>
+            <a:r>
+              <a:rPr lang="en-IN" dirty="0" err="1"/>
+              <a:t>WaitUntiServerReady</a:t>
+            </a:r>
+            <a:r>
+              <a:rPr lang="en-IN" dirty="0"/>
+              <a:t>;</a:t>
+            </a:r>
+          </a:p>
+          <a:p>
+            <a:r>
+              <a:rPr lang="en-IN" dirty="0"/>
+              <a:t>        state </a:t>
+            </a:r>
+            <a:r>
+              <a:rPr lang="en-IN" dirty="0" err="1"/>
+              <a:t>DoNotWalk</a:t>
+            </a:r>
+            <a:r>
+              <a:rPr lang="en-IN" dirty="0"/>
+              <a:t> {</a:t>
+            </a:r>
+          </a:p>
+          <a:p>
+            <a:r>
+              <a:rPr lang="en-IN" dirty="0"/>
+              <a:t>              entry</a:t>
+            </a:r>
+          </a:p>
+          <a:p>
+            <a:r>
+              <a:rPr lang="en-IN" dirty="0"/>
+              <a:t>              `</a:t>
+            </a:r>
+          </a:p>
+          <a:p>
+            <a:r>
+              <a:rPr lang="en-IN" dirty="0"/>
+              <a:t>                  </a:t>
+            </a:r>
+            <a:r>
+              <a:rPr lang="en-IN" dirty="0" err="1"/>
+              <a:t>server.stop</a:t>
+            </a:r>
+            <a:r>
+              <a:rPr lang="en-IN" dirty="0"/>
+              <a:t>().send();</a:t>
+            </a:r>
+          </a:p>
+          <a:p>
+            <a:r>
+              <a:rPr lang="en-IN" dirty="0"/>
+              <a:t>              `;</a:t>
+            </a:r>
+          </a:p>
+          <a:p>
+            <a:r>
+              <a:rPr lang="en-IN" dirty="0"/>
+              <a:t>        };</a:t>
+            </a:r>
+          </a:p>
+          <a:p>
+            <a:r>
+              <a:rPr lang="en-IN" dirty="0"/>
+              <a:t>        state Walk {</a:t>
+            </a:r>
+          </a:p>
+          <a:p>
+            <a:r>
+              <a:rPr lang="en-IN" dirty="0"/>
+              <a:t>              entry</a:t>
+            </a:r>
+          </a:p>
+          <a:p>
+            <a:r>
+              <a:rPr lang="en-IN" dirty="0"/>
+              <a:t>              `</a:t>
+            </a:r>
+          </a:p>
+          <a:p>
+            <a:r>
+              <a:rPr lang="en-IN" dirty="0"/>
+              <a:t>                  </a:t>
+            </a:r>
+            <a:r>
+              <a:rPr lang="en-IN" dirty="0" err="1"/>
+              <a:t>server.walk</a:t>
+            </a:r>
+            <a:r>
+              <a:rPr lang="en-IN" dirty="0"/>
+              <a:t>().send();</a:t>
+            </a:r>
+          </a:p>
+          <a:p>
+            <a:r>
+              <a:rPr lang="en-IN" dirty="0"/>
+              <a:t>              `;</a:t>
+            </a:r>
+          </a:p>
+          <a:p>
+            <a:r>
+              <a:rPr lang="en-IN" dirty="0"/>
+              <a:t>        };</a:t>
+            </a:r>
+          </a:p>
+          <a:p>
+            <a:r>
+              <a:rPr lang="en-IN" dirty="0"/>
+              <a:t>        initial -&gt; </a:t>
+            </a:r>
+            <a:r>
+              <a:rPr lang="en-IN" dirty="0" err="1"/>
+              <a:t>WaitUntiServerReady</a:t>
+            </a:r>
+            <a:r>
+              <a:rPr lang="en-IN" dirty="0"/>
+              <a:t>;</a:t>
+            </a:r>
+          </a:p>
+          <a:p>
+            <a:r>
+              <a:rPr lang="en-IN" dirty="0"/>
+              <a:t>        </a:t>
+            </a:r>
+            <a:r>
+              <a:rPr lang="en-IN" dirty="0" err="1"/>
+              <a:t>serverReady</a:t>
+            </a:r>
+            <a:r>
+              <a:rPr lang="en-IN" dirty="0"/>
+              <a:t>: </a:t>
+            </a:r>
+            <a:r>
+              <a:rPr lang="en-IN" dirty="0" err="1"/>
+              <a:t>WaitUntiServerReady</a:t>
+            </a:r>
+            <a:r>
+              <a:rPr lang="en-IN" dirty="0"/>
+              <a:t> -&gt; </a:t>
+            </a:r>
+            <a:r>
+              <a:rPr lang="en-IN" dirty="0" err="1"/>
+              <a:t>DoNotWalk</a:t>
+            </a:r>
+            <a:r>
+              <a:rPr lang="en-IN" dirty="0"/>
+              <a:t> on </a:t>
+            </a:r>
+            <a:r>
+              <a:rPr lang="en-IN" dirty="0" err="1"/>
+              <a:t>server.rtBound</a:t>
+            </a:r>
+            <a:r>
+              <a:rPr lang="en-IN" dirty="0"/>
+              <a:t>;</a:t>
+            </a:r>
+          </a:p>
+          <a:p>
+            <a:r>
+              <a:rPr lang="en-IN" dirty="0"/>
+              <a:t>        walk: </a:t>
+            </a:r>
+            <a:r>
+              <a:rPr lang="en-IN" dirty="0" err="1"/>
+              <a:t>DoNotWalk</a:t>
+            </a:r>
+            <a:r>
+              <a:rPr lang="en-IN" dirty="0"/>
+              <a:t> -&gt; Walk;</a:t>
+            </a:r>
+          </a:p>
+          <a:p>
+            <a:r>
+              <a:rPr lang="en-IN" dirty="0"/>
+              <a:t>        stop: Walk -&gt; </a:t>
+            </a:r>
+            <a:r>
+              <a:rPr lang="en-IN" dirty="0" err="1"/>
+              <a:t>DoNotWalk</a:t>
+            </a:r>
+            <a:r>
+              <a:rPr lang="en-IN" dirty="0"/>
+              <a:t>;</a:t>
+            </a:r>
+          </a:p>
+          <a:p>
+            <a:r>
+              <a:rPr lang="en-IN" dirty="0"/>
+              <a:t>    };</a:t>
+            </a:r>
+          </a:p>
+          <a:p>
+            <a:r>
+              <a:rPr lang="en-IN" dirty="0"/>
+              <a:t>};</a:t>
+            </a:r>
+          </a:p>
+          <a:p>
+            <a:r>
+              <a:rPr lang="en-IN" dirty="0"/>
+              <a:t>capsule </a:t>
+            </a:r>
+            <a:r>
+              <a:rPr lang="en-IN" dirty="0" err="1"/>
+              <a:t>TLSystem</a:t>
+            </a:r>
+            <a:r>
+              <a:rPr lang="en-IN" dirty="0"/>
+              <a:t> {</a:t>
+            </a:r>
+          </a:p>
+          <a:p>
+            <a:r>
+              <a:rPr lang="en-IN" dirty="0"/>
+              <a:t>    /* Ports */</a:t>
+            </a:r>
+          </a:p>
+          <a:p>
+            <a:r>
+              <a:rPr lang="en-IN" dirty="0"/>
+              <a:t>    /* Parts */</a:t>
+            </a:r>
+          </a:p>
+          <a:p>
+            <a:r>
+              <a:rPr lang="en-IN" dirty="0"/>
+              <a:t>    part </a:t>
+            </a:r>
+            <a:r>
+              <a:rPr lang="en-IN" dirty="0" err="1"/>
+              <a:t>trafficLight</a:t>
+            </a:r>
+            <a:r>
+              <a:rPr lang="en-IN" dirty="0"/>
+              <a:t> : </a:t>
+            </a:r>
+            <a:r>
+              <a:rPr lang="en-IN" dirty="0" err="1"/>
+              <a:t>TrafficLight</a:t>
+            </a:r>
+            <a:r>
+              <a:rPr lang="en-IN" dirty="0"/>
+              <a:t>;</a:t>
+            </a:r>
+          </a:p>
+          <a:p>
+            <a:r>
+              <a:rPr lang="en-IN" dirty="0"/>
+              <a:t>    part </a:t>
+            </a:r>
+            <a:r>
+              <a:rPr lang="en-IN" dirty="0" err="1"/>
+              <a:t>pedLight</a:t>
+            </a:r>
+            <a:r>
+              <a:rPr lang="en-IN" dirty="0"/>
+              <a:t> : </a:t>
+            </a:r>
+            <a:r>
+              <a:rPr lang="en-IN" dirty="0" err="1"/>
+              <a:t>PedLight</a:t>
+            </a:r>
+            <a:r>
+              <a:rPr lang="en-IN" dirty="0"/>
+              <a:t>;</a:t>
+            </a:r>
+          </a:p>
+          <a:p>
+            <a:r>
+              <a:rPr lang="en-IN" dirty="0"/>
+              <a:t>    /* Connectors */</a:t>
+            </a:r>
+          </a:p>
+          <a:p>
+            <a:r>
+              <a:rPr lang="en-IN" dirty="0"/>
+              <a:t>    connect </a:t>
+            </a:r>
+            <a:r>
+              <a:rPr lang="en-IN" dirty="0" err="1"/>
+              <a:t>pedLight.pedControl</a:t>
+            </a:r>
+            <a:r>
+              <a:rPr lang="en-IN" dirty="0"/>
+              <a:t> with </a:t>
+            </a:r>
+            <a:r>
+              <a:rPr lang="en-IN" dirty="0" err="1"/>
+              <a:t>trafficLight.pedLightControl</a:t>
+            </a:r>
+            <a:r>
+              <a:rPr lang="en-IN" dirty="0"/>
+              <a:t>;</a:t>
+            </a:r>
+          </a:p>
+          <a:p>
+            <a:r>
+              <a:rPr lang="en-IN" dirty="0"/>
+              <a:t>    /* State Machine */</a:t>
+            </a:r>
+          </a:p>
+          <a:p>
+            <a:r>
+              <a:rPr lang="en-IN" dirty="0"/>
+              <a:t>    </a:t>
+            </a:r>
+            <a:r>
+              <a:rPr lang="en-IN" dirty="0" err="1"/>
+              <a:t>statemachine</a:t>
+            </a:r>
+            <a:r>
+              <a:rPr lang="en-IN" dirty="0"/>
+              <a:t> {</a:t>
+            </a:r>
+          </a:p>
+          <a:p>
+            <a:r>
+              <a:rPr lang="en-IN" dirty="0"/>
+              <a:t>        state </a:t>
+            </a:r>
+            <a:r>
+              <a:rPr lang="en-IN" dirty="0" err="1"/>
+              <a:t>State</a:t>
+            </a:r>
+            <a:r>
+              <a:rPr lang="en-IN" dirty="0"/>
+              <a:t>;</a:t>
+            </a:r>
+          </a:p>
+          <a:p>
+            <a:r>
+              <a:rPr lang="en-IN" dirty="0"/>
+              <a:t>        initial -&gt; State;</a:t>
+            </a:r>
+          </a:p>
+          <a:p>
+            <a:r>
+              <a:rPr lang="en-IN" dirty="0"/>
+              <a:t>    };</a:t>
+            </a:r>
+          </a:p>
+          <a:p>
+            <a:r>
+              <a:rPr lang="en-IN" dirty="0"/>
+              <a:t>};</a:t>
+            </a:r>
+          </a:p>
+          <a:p>
             <a:endParaRPr lang="en-IN" dirty="0"/>
-          </a:p>
-          <a:p>
-            <a:r>
-              <a:rPr lang="en-IN" dirty="0"/>
-              <a:t>      in pedestrian();</a:t>
-            </a:r>
-          </a:p>
-          <a:p>
-            <a:r>
-              <a:rPr lang="en-IN" dirty="0"/>
-              <a:t>      </a:t>
-            </a:r>
-            <a:r>
-              <a:rPr lang="en-IN" i="1" dirty="0"/>
-              <a:t>/* Out Events */</a:t>
-            </a:r>
-            <a:endParaRPr lang="en-IN" dirty="0"/>
-          </a:p>
-          <a:p>
-            <a:r>
-              <a:rPr lang="en-IN" dirty="0"/>
-              <a:t>};</a:t>
-            </a:r>
-          </a:p>
-          <a:p>
-            <a:br>
-              <a:rPr lang="en-IN" dirty="0"/>
-            </a:br>
-            <a:r>
-              <a:rPr lang="en-IN" dirty="0"/>
-              <a:t>protocol </a:t>
-            </a:r>
-            <a:r>
-              <a:rPr lang="en-IN" dirty="0" err="1"/>
-              <a:t>PedLightControl</a:t>
-            </a:r>
-            <a:r>
-              <a:rPr lang="en-IN" dirty="0"/>
-              <a:t> {</a:t>
-            </a:r>
-          </a:p>
-          <a:p>
-            <a:r>
-              <a:rPr lang="en-IN" dirty="0"/>
-              <a:t>      </a:t>
-            </a:r>
-            <a:r>
-              <a:rPr lang="en-IN" i="1" dirty="0"/>
-              <a:t>/* In Events */</a:t>
-            </a:r>
-            <a:r>
-              <a:rPr lang="en-IN" dirty="0"/>
-              <a:t>      </a:t>
-            </a:r>
-          </a:p>
-          <a:p>
-            <a:r>
-              <a:rPr lang="en-IN" dirty="0"/>
-              <a:t>      in stop();</a:t>
-            </a:r>
-          </a:p>
-          <a:p>
-            <a:r>
-              <a:rPr lang="en-IN" dirty="0"/>
-              <a:t>      in walk();</a:t>
-            </a:r>
-          </a:p>
-          <a:p>
-            <a:r>
-              <a:rPr lang="en-IN" dirty="0"/>
-              <a:t>      </a:t>
-            </a:r>
-            <a:r>
-              <a:rPr lang="en-IN" i="1" dirty="0"/>
-              <a:t>/* Out Events */</a:t>
-            </a:r>
-            <a:endParaRPr lang="en-IN" dirty="0"/>
-          </a:p>
-          <a:p>
-            <a:r>
-              <a:rPr lang="en-IN" dirty="0"/>
-              <a:t>};</a:t>
-            </a:r>
-          </a:p>
-          <a:p>
-            <a:br>
-              <a:rPr lang="en-IN" dirty="0"/>
-            </a:br>
-            <a:r>
-              <a:rPr lang="en-IN" dirty="0"/>
-              <a:t>capsule </a:t>
-            </a:r>
-            <a:r>
-              <a:rPr lang="en-IN" dirty="0" err="1"/>
-              <a:t>TrafficLight</a:t>
-            </a:r>
-            <a:r>
-              <a:rPr lang="en-IN" dirty="0"/>
-              <a:t> {</a:t>
-            </a:r>
-          </a:p>
-          <a:p>
-            <a:r>
-              <a:rPr lang="en-IN" dirty="0"/>
-              <a:t>      [[rt::</a:t>
-            </a:r>
-            <a:r>
-              <a:rPr lang="en-IN" dirty="0" err="1"/>
-              <a:t>decl</a:t>
-            </a:r>
-            <a:r>
-              <a:rPr lang="en-IN" dirty="0"/>
-              <a:t>]]</a:t>
-            </a:r>
-          </a:p>
-          <a:p>
-            <a:r>
-              <a:rPr lang="en-IN" dirty="0"/>
-              <a:t>      `</a:t>
-            </a:r>
-          </a:p>
-          <a:p>
-            <a:r>
-              <a:rPr lang="en-IN" dirty="0"/>
-              <a:t>          private: </a:t>
-            </a:r>
-            <a:r>
-              <a:rPr lang="en-IN" dirty="0" err="1"/>
-              <a:t>RTTimerId</a:t>
-            </a:r>
-            <a:r>
-              <a:rPr lang="en-IN" dirty="0"/>
-              <a:t> </a:t>
-            </a:r>
-            <a:r>
-              <a:rPr lang="en-IN" dirty="0" err="1"/>
-              <a:t>cycleTimer</a:t>
-            </a:r>
-            <a:r>
-              <a:rPr lang="en-IN" dirty="0"/>
-              <a:t>;</a:t>
-            </a:r>
-          </a:p>
-          <a:p>
-            <a:r>
-              <a:rPr lang="en-IN" dirty="0"/>
-              <a:t>      `</a:t>
-            </a:r>
-          </a:p>
-          <a:p>
-            <a:r>
-              <a:rPr lang="en-IN" dirty="0"/>
-              <a:t>      </a:t>
-            </a:r>
-            <a:r>
-              <a:rPr lang="en-IN" i="1" dirty="0"/>
-              <a:t>/* Ports */</a:t>
-            </a:r>
-            <a:endParaRPr lang="en-IN" dirty="0"/>
-          </a:p>
-          <a:p>
-            <a:r>
-              <a:rPr lang="en-IN" dirty="0"/>
-              <a:t>      service </a:t>
-            </a:r>
-            <a:r>
-              <a:rPr lang="en-IN" dirty="0" err="1"/>
-              <a:t>behavior</a:t>
-            </a:r>
-            <a:r>
-              <a:rPr lang="en-IN" dirty="0"/>
-              <a:t> port server : </a:t>
-            </a:r>
-            <a:r>
-              <a:rPr lang="en-IN" dirty="0" err="1"/>
-              <a:t>TrafficLightSignals</a:t>
-            </a:r>
-            <a:r>
-              <a:rPr lang="en-IN" dirty="0"/>
-              <a:t>;</a:t>
-            </a:r>
-          </a:p>
-          <a:p>
-            <a:r>
-              <a:rPr lang="en-IN" dirty="0"/>
-              <a:t>      service </a:t>
-            </a:r>
-            <a:r>
-              <a:rPr lang="en-IN" dirty="0" err="1"/>
-              <a:t>behavior</a:t>
-            </a:r>
-            <a:r>
-              <a:rPr lang="en-IN" dirty="0"/>
-              <a:t> port control : </a:t>
-            </a:r>
-            <a:r>
-              <a:rPr lang="en-IN" dirty="0" err="1"/>
-              <a:t>TrafficLightControl</a:t>
-            </a:r>
-            <a:r>
-              <a:rPr lang="en-IN" dirty="0"/>
-              <a:t>;</a:t>
-            </a:r>
-          </a:p>
-          <a:p>
-            <a:r>
-              <a:rPr lang="en-IN" dirty="0"/>
-              <a:t>      service </a:t>
-            </a:r>
-            <a:r>
-              <a:rPr lang="en-IN" dirty="0" err="1"/>
-              <a:t>behavior</a:t>
-            </a:r>
-            <a:r>
-              <a:rPr lang="en-IN" dirty="0"/>
-              <a:t> port </a:t>
-            </a:r>
-            <a:r>
-              <a:rPr lang="en-IN" dirty="0" err="1"/>
-              <a:t>pedLightControl</a:t>
-            </a:r>
-            <a:r>
-              <a:rPr lang="en-IN" dirty="0"/>
-              <a:t>~ : </a:t>
-            </a:r>
-            <a:r>
-              <a:rPr lang="en-IN" dirty="0" err="1"/>
-              <a:t>PedLightControl</a:t>
-            </a:r>
-            <a:r>
-              <a:rPr lang="en-IN" dirty="0"/>
-              <a:t>;</a:t>
-            </a:r>
-          </a:p>
-          <a:p>
-            <a:r>
-              <a:rPr lang="en-IN" dirty="0"/>
-              <a:t>      </a:t>
-            </a:r>
-            <a:r>
-              <a:rPr lang="en-IN" dirty="0" err="1"/>
-              <a:t>behavior</a:t>
-            </a:r>
-            <a:r>
-              <a:rPr lang="en-IN" dirty="0"/>
-              <a:t> port timer : Timing;</a:t>
-            </a:r>
-          </a:p>
-          <a:p>
-            <a:r>
-              <a:rPr lang="en-IN" dirty="0"/>
-              <a:t>      </a:t>
-            </a:r>
-            <a:r>
-              <a:rPr lang="en-IN" dirty="0" err="1"/>
-              <a:t>behavior</a:t>
-            </a:r>
-            <a:r>
-              <a:rPr lang="en-IN" dirty="0"/>
-              <a:t> port </a:t>
-            </a:r>
-            <a:r>
-              <a:rPr lang="en-IN" dirty="0" err="1"/>
-              <a:t>pedTimer</a:t>
-            </a:r>
-            <a:r>
-              <a:rPr lang="en-IN" dirty="0"/>
-              <a:t> : Timing;</a:t>
-            </a:r>
-          </a:p>
-          <a:p>
-            <a:r>
-              <a:rPr lang="en-IN" dirty="0"/>
-              <a:t>      </a:t>
-            </a:r>
-            <a:r>
-              <a:rPr lang="en-IN" i="1" dirty="0"/>
-              <a:t>/* Parts */</a:t>
-            </a:r>
-            <a:endParaRPr lang="en-IN" dirty="0"/>
-          </a:p>
-          <a:p>
-            <a:r>
-              <a:rPr lang="en-IN" dirty="0"/>
-              <a:t>      </a:t>
-            </a:r>
-            <a:r>
-              <a:rPr lang="en-IN" i="1" dirty="0"/>
-              <a:t>/* Connectors */</a:t>
-            </a:r>
-            <a:endParaRPr lang="en-IN" dirty="0"/>
-          </a:p>
-          <a:p>
-            <a:r>
-              <a:rPr lang="en-IN" dirty="0"/>
-              <a:t>      </a:t>
-            </a:r>
-            <a:r>
-              <a:rPr lang="en-IN" i="1" dirty="0"/>
-              <a:t>/* State Machine */</a:t>
-            </a:r>
-            <a:endParaRPr lang="en-IN" dirty="0"/>
-          </a:p>
-          <a:p>
-            <a:r>
-              <a:rPr lang="en-IN" dirty="0"/>
-              <a:t>      </a:t>
-            </a:r>
-            <a:r>
-              <a:rPr lang="en-IN" dirty="0" err="1"/>
-              <a:t>statemachine</a:t>
-            </a:r>
-            <a:r>
-              <a:rPr lang="en-IN" dirty="0"/>
-              <a:t> {</a:t>
-            </a:r>
-          </a:p>
-          <a:p>
-            <a:r>
-              <a:rPr lang="en-IN" dirty="0"/>
-              <a:t>            state </a:t>
-            </a:r>
-            <a:r>
-              <a:rPr lang="en-IN" dirty="0" err="1"/>
-              <a:t>WaitUntilServerReady</a:t>
-            </a:r>
-            <a:r>
-              <a:rPr lang="en-IN" dirty="0"/>
-              <a:t>;</a:t>
-            </a:r>
-          </a:p>
-          <a:p>
-            <a:r>
-              <a:rPr lang="en-IN" dirty="0"/>
-              <a:t>            state </a:t>
-            </a:r>
-            <a:r>
-              <a:rPr lang="en-IN" dirty="0" err="1"/>
-              <a:t>CycleLight</a:t>
-            </a:r>
-            <a:r>
-              <a:rPr lang="en-IN" dirty="0"/>
-              <a:t> {</a:t>
-            </a:r>
-          </a:p>
-          <a:p>
-            <a:r>
-              <a:rPr lang="en-IN" dirty="0"/>
-              <a:t>                  </a:t>
-            </a:r>
-            <a:r>
-              <a:rPr lang="en-IN" dirty="0" err="1"/>
-              <a:t>entrypoint</a:t>
-            </a:r>
-            <a:r>
-              <a:rPr lang="en-IN" dirty="0"/>
-              <a:t> </a:t>
-            </a:r>
-            <a:r>
-              <a:rPr lang="en-IN" dirty="0" err="1"/>
-              <a:t>init</a:t>
-            </a:r>
-            <a:r>
-              <a:rPr lang="en-IN" dirty="0"/>
-              <a:t>;</a:t>
-            </a:r>
-          </a:p>
-          <a:p>
-            <a:r>
-              <a:rPr lang="en-IN" dirty="0"/>
-              <a:t>                  state Red;</a:t>
-            </a:r>
-          </a:p>
-          <a:p>
-            <a:r>
-              <a:rPr lang="en-IN" dirty="0"/>
-              <a:t>                  state Green;</a:t>
-            </a:r>
-          </a:p>
-          <a:p>
-            <a:r>
-              <a:rPr lang="en-IN" dirty="0"/>
-              <a:t>                  state Yellow;</a:t>
-            </a:r>
-          </a:p>
-          <a:p>
-            <a:r>
-              <a:rPr lang="en-IN" dirty="0"/>
-              <a:t>                  </a:t>
-            </a:r>
-            <a:r>
-              <a:rPr lang="en-IN" dirty="0" err="1"/>
-              <a:t>init</a:t>
-            </a:r>
-            <a:r>
-              <a:rPr lang="en-IN" dirty="0"/>
-              <a:t> -&gt; Red;</a:t>
-            </a:r>
-          </a:p>
-          <a:p>
-            <a:r>
-              <a:rPr lang="en-IN" dirty="0"/>
-              <a:t>                  </a:t>
-            </a:r>
-            <a:r>
-              <a:rPr lang="en-IN" dirty="0" err="1"/>
-              <a:t>red_to_green</a:t>
-            </a:r>
-            <a:r>
-              <a:rPr lang="en-IN" dirty="0"/>
-              <a:t>: Red -&gt; Green on </a:t>
-            </a:r>
-            <a:r>
-              <a:rPr lang="en-IN" dirty="0" err="1"/>
-              <a:t>timer.timeout</a:t>
-            </a:r>
-            <a:endParaRPr lang="en-IN" dirty="0"/>
-          </a:p>
-          <a:p>
-            <a:r>
-              <a:rPr lang="en-IN" dirty="0"/>
-              <a:t>                  `</a:t>
-            </a:r>
-          </a:p>
-          <a:p>
-            <a:r>
-              <a:rPr lang="en-IN" dirty="0"/>
-              <a:t>                        log.log("Red -&gt; Green");</a:t>
-            </a:r>
-          </a:p>
-          <a:p>
-            <a:r>
-              <a:rPr lang="en-IN" dirty="0"/>
-              <a:t>                        </a:t>
-            </a:r>
-            <a:r>
-              <a:rPr lang="en-IN" dirty="0" err="1"/>
-              <a:t>log.commit</a:t>
-            </a:r>
-            <a:r>
-              <a:rPr lang="en-IN" dirty="0"/>
-              <a:t>();</a:t>
-            </a:r>
-          </a:p>
-          <a:p>
-            <a:r>
-              <a:rPr lang="en-IN" dirty="0"/>
-              <a:t>                  `;</a:t>
-            </a:r>
-          </a:p>
-          <a:p>
-            <a:r>
-              <a:rPr lang="en-IN" dirty="0"/>
-              <a:t>                  </a:t>
-            </a:r>
-            <a:r>
-              <a:rPr lang="en-IN" dirty="0" err="1"/>
-              <a:t>green_to_yellow</a:t>
-            </a:r>
-            <a:r>
-              <a:rPr lang="en-IN" dirty="0"/>
-              <a:t>: Green -&gt; Yellow on </a:t>
-            </a:r>
-            <a:r>
-              <a:rPr lang="en-IN" dirty="0" err="1"/>
-              <a:t>timer.timeout</a:t>
-            </a:r>
-            <a:endParaRPr lang="en-IN" dirty="0"/>
-          </a:p>
-          <a:p>
-            <a:r>
-              <a:rPr lang="en-IN" dirty="0"/>
-              <a:t>                  `</a:t>
-            </a:r>
-          </a:p>
-          <a:p>
-            <a:r>
-              <a:rPr lang="en-IN" dirty="0"/>
-              <a:t>                        log.log("Green -&gt; Yellow");</a:t>
-            </a:r>
-          </a:p>
-          <a:p>
-            <a:r>
-              <a:rPr lang="en-IN" dirty="0"/>
-              <a:t>                        </a:t>
-            </a:r>
-            <a:r>
-              <a:rPr lang="en-IN" dirty="0" err="1"/>
-              <a:t>log.commit</a:t>
-            </a:r>
-            <a:r>
-              <a:rPr lang="en-IN" dirty="0"/>
-              <a:t>();</a:t>
-            </a:r>
-          </a:p>
-          <a:p>
-            <a:r>
-              <a:rPr lang="en-IN" dirty="0"/>
-              <a:t>                  `;</a:t>
-            </a:r>
-          </a:p>
-          <a:p>
-            <a:r>
-              <a:rPr lang="en-IN" dirty="0"/>
-              <a:t>                  </a:t>
-            </a:r>
-            <a:r>
-              <a:rPr lang="en-IN" dirty="0" err="1"/>
-              <a:t>yellow_to_red</a:t>
-            </a:r>
-            <a:r>
-              <a:rPr lang="en-IN" dirty="0"/>
-              <a:t>: Yellow -&gt; Red on </a:t>
-            </a:r>
-            <a:r>
-              <a:rPr lang="en-IN" dirty="0" err="1"/>
-              <a:t>timer.timeout</a:t>
-            </a:r>
-            <a:endParaRPr lang="en-IN" dirty="0"/>
-          </a:p>
-          <a:p>
-            <a:r>
-              <a:rPr lang="en-IN" dirty="0"/>
-              <a:t>                  `</a:t>
-            </a:r>
-          </a:p>
-          <a:p>
-            <a:r>
-              <a:rPr lang="en-IN" dirty="0"/>
-              <a:t>                        log.log("Yellow -&gt; Red");</a:t>
-            </a:r>
-          </a:p>
-          <a:p>
-            <a:r>
-              <a:rPr lang="en-IN" dirty="0"/>
-              <a:t>                        </a:t>
-            </a:r>
-            <a:r>
-              <a:rPr lang="en-IN" dirty="0" err="1"/>
-              <a:t>log.commit</a:t>
-            </a:r>
-            <a:r>
-              <a:rPr lang="en-IN" dirty="0"/>
-              <a:t>();</a:t>
-            </a:r>
-          </a:p>
-          <a:p>
-            <a:r>
-              <a:rPr lang="en-IN" dirty="0"/>
-              <a:t>                  `;</a:t>
-            </a:r>
-          </a:p>
-          <a:p>
-            <a:r>
-              <a:rPr lang="en-IN" dirty="0"/>
-              <a:t>            };</a:t>
-            </a:r>
-          </a:p>
-          <a:p>
-            <a:r>
-              <a:rPr lang="en-IN" dirty="0"/>
-              <a:t>            state </a:t>
-            </a:r>
-            <a:r>
-              <a:rPr lang="en-IN" dirty="0" err="1"/>
-              <a:t>PedestriansCrossing</a:t>
-            </a:r>
-            <a:r>
-              <a:rPr lang="en-IN" dirty="0"/>
-              <a:t> {</a:t>
-            </a:r>
-          </a:p>
-          <a:p>
-            <a:r>
-              <a:rPr lang="en-IN" dirty="0"/>
-              <a:t>                  </a:t>
-            </a:r>
-            <a:r>
-              <a:rPr lang="en-IN" dirty="0" err="1"/>
-              <a:t>updatePedLight</a:t>
-            </a:r>
-            <a:r>
-              <a:rPr lang="en-IN" dirty="0"/>
-              <a:t>: on </a:t>
-            </a:r>
-            <a:r>
-              <a:rPr lang="en-IN" dirty="0" err="1"/>
-              <a:t>pedTimer.timeout</a:t>
-            </a:r>
-            <a:endParaRPr lang="en-IN" dirty="0"/>
-          </a:p>
-          <a:p>
-            <a:r>
-              <a:rPr lang="en-IN" dirty="0"/>
-              <a:t>                  `</a:t>
-            </a:r>
-          </a:p>
-          <a:p>
-            <a:r>
-              <a:rPr lang="en-IN" dirty="0"/>
-              <a:t>                        if (*((bool*) </a:t>
-            </a:r>
-            <a:r>
-              <a:rPr lang="en-IN" dirty="0" err="1"/>
-              <a:t>rtdata</a:t>
-            </a:r>
-            <a:r>
-              <a:rPr lang="en-IN" dirty="0"/>
-              <a:t>) == true) {</a:t>
-            </a:r>
-          </a:p>
-          <a:p>
-            <a:r>
-              <a:rPr lang="en-IN" dirty="0"/>
-              <a:t>                              </a:t>
-            </a:r>
-            <a:r>
-              <a:rPr lang="en-IN" dirty="0" err="1"/>
-              <a:t>pedLightControl.walk</a:t>
-            </a:r>
-            <a:r>
-              <a:rPr lang="en-IN" dirty="0"/>
-              <a:t>().send();</a:t>
-            </a:r>
-          </a:p>
-          <a:p>
-            <a:r>
-              <a:rPr lang="en-IN" dirty="0"/>
-              <a:t>                              bool </a:t>
-            </a:r>
-            <a:r>
-              <a:rPr lang="en-IN" dirty="0" err="1"/>
-              <a:t>waitForWalk</a:t>
-            </a:r>
-            <a:r>
-              <a:rPr lang="en-IN" dirty="0"/>
-              <a:t> = false;</a:t>
-            </a:r>
-          </a:p>
-          <a:p>
-            <a:r>
-              <a:rPr lang="en-IN" dirty="0"/>
-              <a:t>                              </a:t>
-            </a:r>
-            <a:r>
-              <a:rPr lang="en-IN" dirty="0" err="1"/>
-              <a:t>pedTimer.informIn</a:t>
-            </a:r>
-            <a:r>
-              <a:rPr lang="en-IN" dirty="0"/>
-              <a:t>(</a:t>
-            </a:r>
-            <a:r>
-              <a:rPr lang="en-IN" dirty="0" err="1"/>
-              <a:t>RTTimespec</a:t>
-            </a:r>
-            <a:r>
-              <a:rPr lang="en-IN" dirty="0"/>
-              <a:t>(4,0), &amp;</a:t>
-            </a:r>
-            <a:r>
-              <a:rPr lang="en-IN" dirty="0" err="1"/>
-              <a:t>waitForWalk</a:t>
-            </a:r>
-            <a:r>
-              <a:rPr lang="en-IN" dirty="0"/>
-              <a:t>, &amp;</a:t>
-            </a:r>
-            <a:r>
-              <a:rPr lang="en-IN" dirty="0" err="1"/>
-              <a:t>RTType_bool</a:t>
-            </a:r>
-            <a:r>
-              <a:rPr lang="en-IN" dirty="0"/>
-              <a:t>);</a:t>
-            </a:r>
-          </a:p>
-          <a:p>
-            <a:r>
-              <a:rPr lang="en-IN" dirty="0"/>
-              <a:t>                              // Time for pedestrians to cross</a:t>
-            </a:r>
-          </a:p>
-          <a:p>
-            <a:r>
-              <a:rPr lang="en-IN" dirty="0"/>
-              <a:t>                        }</a:t>
-            </a:r>
-          </a:p>
-          <a:p>
-            <a:r>
-              <a:rPr lang="en-IN" dirty="0"/>
-              <a:t>                        else {</a:t>
-            </a:r>
-          </a:p>
-          <a:p>
-            <a:r>
-              <a:rPr lang="en-IN" dirty="0"/>
-              <a:t>                              </a:t>
-            </a:r>
-            <a:r>
-              <a:rPr lang="en-IN" dirty="0" err="1"/>
-              <a:t>pedLightControl.stop</a:t>
-            </a:r>
-            <a:r>
-              <a:rPr lang="en-IN" dirty="0"/>
-              <a:t>().send();</a:t>
-            </a:r>
-          </a:p>
-          <a:p>
-            <a:r>
-              <a:rPr lang="en-IN" dirty="0"/>
-              <a:t>                              </a:t>
-            </a:r>
-            <a:r>
-              <a:rPr lang="en-IN" dirty="0" err="1"/>
-              <a:t>timer.informIn</a:t>
-            </a:r>
-            <a:r>
-              <a:rPr lang="en-IN" dirty="0"/>
-              <a:t>(</a:t>
-            </a:r>
-            <a:r>
-              <a:rPr lang="en-IN" dirty="0" err="1"/>
-              <a:t>RTTimespec</a:t>
-            </a:r>
-            <a:r>
-              <a:rPr lang="en-IN" dirty="0"/>
-              <a:t>(2,0));</a:t>
-            </a:r>
-          </a:p>
-          <a:p>
-            <a:r>
-              <a:rPr lang="en-IN" dirty="0"/>
-              <a:t>                        }</a:t>
-            </a:r>
-          </a:p>
-          <a:p>
-            <a:r>
-              <a:rPr lang="en-IN" dirty="0"/>
-              <a:t>                  `;</a:t>
-            </a:r>
-          </a:p>
-          <a:p>
-            <a:r>
-              <a:rPr lang="en-IN" dirty="0"/>
-              <a:t>                  </a:t>
-            </a:r>
-            <a:r>
-              <a:rPr lang="en-IN" dirty="0" err="1"/>
-              <a:t>pedRequest_ignored</a:t>
-            </a:r>
-            <a:r>
-              <a:rPr lang="en-IN" dirty="0"/>
-              <a:t>: on </a:t>
-            </a:r>
-            <a:r>
-              <a:rPr lang="en-IN" dirty="0" err="1"/>
-              <a:t>control.pedestrian</a:t>
-            </a:r>
-            <a:endParaRPr lang="en-IN" dirty="0"/>
-          </a:p>
-          <a:p>
-            <a:r>
-              <a:rPr lang="en-IN" dirty="0"/>
-              <a:t>                  `</a:t>
-            </a:r>
-          </a:p>
-          <a:p>
-            <a:r>
-              <a:rPr lang="en-IN" dirty="0"/>
-              <a:t>                        // Ignore additional requests from pedestrians since we already are in the </a:t>
-            </a:r>
-            <a:r>
-              <a:rPr lang="en-IN" dirty="0" err="1"/>
-              <a:t>PedestriansCrossing</a:t>
-            </a:r>
-            <a:r>
-              <a:rPr lang="en-IN" dirty="0"/>
-              <a:t> state.</a:t>
-            </a:r>
-          </a:p>
-          <a:p>
-            <a:r>
-              <a:rPr lang="en-IN" dirty="0"/>
-              <a:t>                  `;</a:t>
-            </a:r>
-          </a:p>
-          <a:p>
-            <a:r>
-              <a:rPr lang="en-IN" dirty="0"/>
-              <a:t>            };</a:t>
-            </a:r>
-          </a:p>
-          <a:p>
-            <a:r>
-              <a:rPr lang="en-IN" dirty="0"/>
-              <a:t>            initial -&gt; </a:t>
-            </a:r>
-            <a:r>
-              <a:rPr lang="en-IN" dirty="0" err="1"/>
-              <a:t>WaitUntilServerReady</a:t>
-            </a:r>
-            <a:r>
-              <a:rPr lang="en-IN" dirty="0"/>
-              <a:t>;</a:t>
-            </a:r>
-          </a:p>
-          <a:p>
-            <a:r>
-              <a:rPr lang="en-IN" dirty="0"/>
-              <a:t>            </a:t>
-            </a:r>
-            <a:r>
-              <a:rPr lang="en-IN" dirty="0" err="1"/>
-              <a:t>serverReady</a:t>
-            </a:r>
-            <a:r>
-              <a:rPr lang="en-IN" dirty="0"/>
-              <a:t>: </a:t>
-            </a:r>
-            <a:r>
-              <a:rPr lang="en-IN" dirty="0" err="1"/>
-              <a:t>WaitUntilServerReady</a:t>
-            </a:r>
-            <a:r>
-              <a:rPr lang="en-IN" dirty="0"/>
-              <a:t> -&gt; </a:t>
-            </a:r>
-            <a:r>
-              <a:rPr lang="en-IN" dirty="0" err="1"/>
-              <a:t>CycleLight.init</a:t>
-            </a:r>
-            <a:r>
-              <a:rPr lang="en-IN" dirty="0"/>
-              <a:t> on </a:t>
-            </a:r>
-            <a:r>
-              <a:rPr lang="en-IN" dirty="0" err="1"/>
-              <a:t>server.rtBound</a:t>
-            </a:r>
-            <a:endParaRPr lang="en-IN" dirty="0"/>
-          </a:p>
-          <a:p>
-            <a:r>
-              <a:rPr lang="en-IN" dirty="0"/>
-              <a:t>            `</a:t>
-            </a:r>
-          </a:p>
-          <a:p>
-            <a:r>
-              <a:rPr lang="en-IN" dirty="0"/>
-              <a:t>                  log.log("</a:t>
-            </a:r>
-            <a:r>
-              <a:rPr lang="en-IN" dirty="0" err="1"/>
-              <a:t>TrafficLight</a:t>
-            </a:r>
-            <a:r>
-              <a:rPr lang="en-IN" dirty="0"/>
-              <a:t> starts up");</a:t>
-            </a:r>
-          </a:p>
-          <a:p>
-            <a:r>
-              <a:rPr lang="en-IN" dirty="0"/>
-              <a:t>                  </a:t>
-            </a:r>
-            <a:r>
-              <a:rPr lang="en-IN" dirty="0" err="1"/>
-              <a:t>log.commit</a:t>
-            </a:r>
-            <a:r>
-              <a:rPr lang="en-IN" dirty="0"/>
-              <a:t>();</a:t>
-            </a:r>
-          </a:p>
-          <a:p>
-            <a:r>
-              <a:rPr lang="en-IN" dirty="0"/>
-              <a:t>                  </a:t>
-            </a:r>
-            <a:r>
-              <a:rPr lang="en-IN" dirty="0" err="1"/>
-              <a:t>cycleTimer</a:t>
-            </a:r>
-            <a:r>
-              <a:rPr lang="en-IN" dirty="0"/>
-              <a:t> = </a:t>
-            </a:r>
-            <a:r>
-              <a:rPr lang="en-IN" dirty="0" err="1"/>
-              <a:t>timer.informEvery</a:t>
-            </a:r>
-            <a:r>
-              <a:rPr lang="en-IN" dirty="0"/>
-              <a:t>(</a:t>
-            </a:r>
-            <a:r>
-              <a:rPr lang="en-IN" dirty="0" err="1"/>
-              <a:t>RTTimespec</a:t>
-            </a:r>
-            <a:r>
-              <a:rPr lang="en-IN" dirty="0"/>
-              <a:t>(2,0));</a:t>
-            </a:r>
-          </a:p>
-          <a:p>
-            <a:r>
-              <a:rPr lang="en-IN" dirty="0"/>
-              <a:t>            `;</a:t>
-            </a:r>
-          </a:p>
-          <a:p>
-            <a:r>
-              <a:rPr lang="en-IN" dirty="0"/>
-              <a:t>            </a:t>
-            </a:r>
-            <a:r>
-              <a:rPr lang="en-IN" dirty="0" err="1"/>
-              <a:t>pedRequest</a:t>
-            </a:r>
-            <a:r>
-              <a:rPr lang="en-IN" dirty="0"/>
-              <a:t>: </a:t>
-            </a:r>
-            <a:r>
-              <a:rPr lang="en-IN" dirty="0" err="1"/>
-              <a:t>CycleLight</a:t>
-            </a:r>
-            <a:r>
-              <a:rPr lang="en-IN" dirty="0"/>
-              <a:t> -&gt; </a:t>
-            </a:r>
-            <a:r>
-              <a:rPr lang="en-IN" dirty="0" err="1"/>
-              <a:t>PedestriansCrossing</a:t>
-            </a:r>
-            <a:r>
-              <a:rPr lang="en-IN" dirty="0"/>
-              <a:t> on </a:t>
-            </a:r>
-            <a:r>
-              <a:rPr lang="en-IN" dirty="0" err="1"/>
-              <a:t>control.pedestrian</a:t>
-            </a:r>
-            <a:r>
-              <a:rPr lang="en-IN" dirty="0"/>
-              <a:t> when</a:t>
-            </a:r>
-          </a:p>
-          <a:p>
-            <a:r>
-              <a:rPr lang="en-IN" dirty="0"/>
-              <a:t>            `</a:t>
-            </a:r>
-          </a:p>
-          <a:p>
-            <a:r>
-              <a:rPr lang="en-IN" dirty="0"/>
-              <a:t>                return true;</a:t>
-            </a:r>
-          </a:p>
-          <a:p>
-            <a:r>
-              <a:rPr lang="en-IN" dirty="0"/>
-              <a:t>            `</a:t>
-            </a:r>
-          </a:p>
-          <a:p>
-            <a:r>
-              <a:rPr lang="en-IN" dirty="0"/>
-              <a:t>            `</a:t>
-            </a:r>
-          </a:p>
-          <a:p>
-            <a:r>
-              <a:rPr lang="en-IN" dirty="0"/>
-              <a:t>                  log.log("Pedestrian requests to cross");</a:t>
-            </a:r>
-          </a:p>
-          <a:p>
-            <a:r>
-              <a:rPr lang="en-IN" dirty="0"/>
-              <a:t>                  </a:t>
-            </a:r>
-            <a:r>
-              <a:rPr lang="en-IN" dirty="0" err="1"/>
-              <a:t>log.commit</a:t>
-            </a:r>
-            <a:r>
-              <a:rPr lang="en-IN" dirty="0"/>
-              <a:t>();</a:t>
-            </a:r>
-          </a:p>
-          <a:p>
-            <a:r>
-              <a:rPr lang="en-IN" dirty="0"/>
-              <a:t>                  </a:t>
-            </a:r>
-            <a:r>
-              <a:rPr lang="en-IN" dirty="0" err="1"/>
-              <a:t>timer.cancelTimer</a:t>
-            </a:r>
-            <a:r>
-              <a:rPr lang="en-IN" dirty="0"/>
-              <a:t>(</a:t>
-            </a:r>
-            <a:r>
-              <a:rPr lang="en-IN" dirty="0" err="1"/>
-              <a:t>cycleTimer</a:t>
-            </a:r>
-            <a:r>
-              <a:rPr lang="en-IN" dirty="0"/>
-              <a:t>);</a:t>
-            </a:r>
-          </a:p>
-          <a:p>
-            <a:r>
-              <a:rPr lang="en-IN" dirty="0"/>
-              <a:t>            `;</a:t>
-            </a:r>
-          </a:p>
-          <a:p>
-            <a:r>
-              <a:rPr lang="en-IN" dirty="0"/>
-              <a:t>            </a:t>
-            </a:r>
-            <a:r>
-              <a:rPr lang="en-IN" dirty="0" err="1"/>
-              <a:t>pedReady</a:t>
-            </a:r>
-            <a:r>
-              <a:rPr lang="en-IN" dirty="0"/>
-              <a:t>: </a:t>
-            </a:r>
-            <a:r>
-              <a:rPr lang="en-IN" dirty="0" err="1"/>
-              <a:t>PedestriansCrossing</a:t>
-            </a:r>
-            <a:r>
-              <a:rPr lang="en-IN" dirty="0"/>
-              <a:t> -&gt; </a:t>
-            </a:r>
-            <a:r>
-              <a:rPr lang="en-IN" dirty="0" err="1"/>
-              <a:t>CycleLight.init</a:t>
-            </a:r>
-            <a:r>
-              <a:rPr lang="en-IN" dirty="0"/>
-              <a:t> on </a:t>
-            </a:r>
-            <a:r>
-              <a:rPr lang="en-IN" dirty="0" err="1"/>
-              <a:t>timer.timeout</a:t>
-            </a:r>
-            <a:endParaRPr lang="en-IN" dirty="0"/>
-          </a:p>
-          <a:p>
-            <a:r>
-              <a:rPr lang="en-IN" dirty="0"/>
-              <a:t>            `  </a:t>
-            </a:r>
-          </a:p>
-          <a:p>
-            <a:r>
-              <a:rPr lang="en-IN" dirty="0"/>
-              <a:t>                  log.log("Pedestrians ready");</a:t>
-            </a:r>
-          </a:p>
-          <a:p>
-            <a:r>
-              <a:rPr lang="en-IN" dirty="0"/>
-              <a:t>                  </a:t>
-            </a:r>
-            <a:r>
-              <a:rPr lang="en-IN" dirty="0" err="1"/>
-              <a:t>log.commit</a:t>
-            </a:r>
-            <a:r>
-              <a:rPr lang="en-IN" dirty="0"/>
-              <a:t>();</a:t>
-            </a:r>
-          </a:p>
-          <a:p>
-            <a:r>
-              <a:rPr lang="en-IN" dirty="0"/>
-              <a:t>                  </a:t>
-            </a:r>
-            <a:r>
-              <a:rPr lang="en-IN" dirty="0" err="1"/>
-              <a:t>cycleTimer</a:t>
-            </a:r>
-            <a:r>
-              <a:rPr lang="en-IN" dirty="0"/>
-              <a:t> = </a:t>
-            </a:r>
-            <a:r>
-              <a:rPr lang="en-IN" dirty="0" err="1"/>
-              <a:t>timer.informEvery</a:t>
-            </a:r>
-            <a:r>
-              <a:rPr lang="en-IN" dirty="0"/>
-              <a:t>(</a:t>
-            </a:r>
-            <a:r>
-              <a:rPr lang="en-IN" dirty="0" err="1"/>
-              <a:t>RTTimespec</a:t>
-            </a:r>
-            <a:r>
-              <a:rPr lang="en-IN" dirty="0"/>
-              <a:t>(2,0));</a:t>
-            </a:r>
-          </a:p>
-          <a:p>
-            <a:r>
-              <a:rPr lang="en-IN" dirty="0"/>
-              <a:t>            `;</a:t>
-            </a:r>
-          </a:p>
-          <a:p>
-            <a:r>
-              <a:rPr lang="en-IN" dirty="0"/>
-              <a:t>      };</a:t>
-            </a:r>
-          </a:p>
-          <a:p>
-            <a:r>
-              <a:rPr lang="en-IN" dirty="0"/>
-              <a:t>};</a:t>
-            </a:r>
-          </a:p>
-          <a:p>
-            <a:br>
-              <a:rPr lang="en-IN" dirty="0"/>
-            </a:br>
-            <a:r>
-              <a:rPr lang="en-IN" dirty="0"/>
-              <a:t>capsule </a:t>
-            </a:r>
-            <a:r>
-              <a:rPr lang="en-IN" dirty="0" err="1"/>
-              <a:t>PedLight</a:t>
-            </a:r>
-            <a:r>
-              <a:rPr lang="en-IN" dirty="0"/>
-              <a:t> {</a:t>
-            </a:r>
-          </a:p>
-          <a:p>
-            <a:r>
-              <a:rPr lang="en-IN" dirty="0"/>
-              <a:t>    </a:t>
-            </a:r>
-            <a:r>
-              <a:rPr lang="en-IN" i="1" dirty="0"/>
-              <a:t>/* Ports */</a:t>
-            </a:r>
-            <a:endParaRPr lang="en-IN" dirty="0"/>
-          </a:p>
-          <a:p>
-            <a:r>
-              <a:rPr lang="en-IN" dirty="0"/>
-              <a:t>    service </a:t>
-            </a:r>
-            <a:r>
-              <a:rPr lang="en-IN" dirty="0" err="1"/>
-              <a:t>behavior</a:t>
-            </a:r>
-            <a:r>
-              <a:rPr lang="en-IN" dirty="0"/>
-              <a:t> port </a:t>
-            </a:r>
-            <a:r>
-              <a:rPr lang="en-IN" dirty="0" err="1"/>
-              <a:t>pedControl</a:t>
-            </a:r>
-            <a:r>
-              <a:rPr lang="en-IN" dirty="0"/>
-              <a:t> : </a:t>
-            </a:r>
-            <a:r>
-              <a:rPr lang="en-IN" dirty="0" err="1"/>
-              <a:t>PedLightControl</a:t>
-            </a:r>
-            <a:r>
-              <a:rPr lang="en-IN" dirty="0"/>
-              <a:t>;</a:t>
-            </a:r>
-          </a:p>
-          <a:p>
-            <a:r>
-              <a:rPr lang="en-IN" dirty="0"/>
-              <a:t>    service </a:t>
-            </a:r>
-            <a:r>
-              <a:rPr lang="en-IN" dirty="0" err="1"/>
-              <a:t>behavior</a:t>
-            </a:r>
-            <a:r>
-              <a:rPr lang="en-IN" dirty="0"/>
-              <a:t> notify port server~ : </a:t>
-            </a:r>
-            <a:r>
-              <a:rPr lang="en-IN" dirty="0" err="1"/>
-              <a:t>PedLightControl</a:t>
-            </a:r>
-            <a:r>
-              <a:rPr lang="en-IN" dirty="0"/>
-              <a:t>;</a:t>
-            </a:r>
-          </a:p>
-          <a:p>
-            <a:r>
-              <a:rPr lang="en-IN" dirty="0"/>
-              <a:t>    </a:t>
-            </a:r>
-            <a:r>
-              <a:rPr lang="en-IN" i="1" dirty="0"/>
-              <a:t>/* Parts */</a:t>
-            </a:r>
-            <a:endParaRPr lang="en-IN" dirty="0"/>
-          </a:p>
-          <a:p>
-            <a:r>
-              <a:rPr lang="en-IN" dirty="0"/>
-              <a:t>    </a:t>
-            </a:r>
-            <a:r>
-              <a:rPr lang="en-IN" i="1" dirty="0"/>
-              <a:t>/* Connectors */</a:t>
-            </a:r>
-            <a:endParaRPr lang="en-IN" dirty="0"/>
-          </a:p>
-          <a:p>
-            <a:r>
-              <a:rPr lang="en-IN" dirty="0"/>
-              <a:t>    </a:t>
-            </a:r>
-            <a:r>
-              <a:rPr lang="en-IN" i="1" dirty="0"/>
-              <a:t>/* State Machine */</a:t>
-            </a:r>
-            <a:endParaRPr lang="en-IN" dirty="0"/>
-          </a:p>
-          <a:p>
-            <a:r>
-              <a:rPr lang="en-IN" dirty="0"/>
-              <a:t>    </a:t>
-            </a:r>
-            <a:r>
-              <a:rPr lang="en-IN" dirty="0" err="1"/>
-              <a:t>statemachine</a:t>
-            </a:r>
-            <a:r>
-              <a:rPr lang="en-IN" dirty="0"/>
-              <a:t> {</a:t>
-            </a:r>
-          </a:p>
-          <a:p>
-            <a:r>
-              <a:rPr lang="en-IN" dirty="0"/>
-              <a:t>        state </a:t>
-            </a:r>
-            <a:r>
-              <a:rPr lang="en-IN" dirty="0" err="1"/>
-              <a:t>WaitUntiServerReady</a:t>
-            </a:r>
-            <a:r>
-              <a:rPr lang="en-IN" dirty="0"/>
-              <a:t>;</a:t>
-            </a:r>
-          </a:p>
-          <a:p>
-            <a:r>
-              <a:rPr lang="en-IN" dirty="0"/>
-              <a:t>        state </a:t>
-            </a:r>
-            <a:r>
-              <a:rPr lang="en-IN" dirty="0" err="1"/>
-              <a:t>DoNotWalk</a:t>
-            </a:r>
-            <a:r>
-              <a:rPr lang="en-IN" dirty="0"/>
-              <a:t> {</a:t>
-            </a:r>
-          </a:p>
-          <a:p>
-            <a:r>
-              <a:rPr lang="en-IN" dirty="0"/>
-              <a:t>              entry</a:t>
-            </a:r>
-          </a:p>
-          <a:p>
-            <a:r>
-              <a:rPr lang="en-IN" dirty="0"/>
-              <a:t>              `</a:t>
-            </a:r>
-          </a:p>
-          <a:p>
-            <a:r>
-              <a:rPr lang="en-IN" dirty="0"/>
-              <a:t>                  </a:t>
-            </a:r>
-            <a:r>
-              <a:rPr lang="en-IN" dirty="0" err="1"/>
-              <a:t>server.stop</a:t>
-            </a:r>
-            <a:r>
-              <a:rPr lang="en-IN" dirty="0"/>
-              <a:t>().send();</a:t>
-            </a:r>
-          </a:p>
-          <a:p>
-            <a:r>
-              <a:rPr lang="en-IN" dirty="0"/>
-              <a:t>              `;</a:t>
-            </a:r>
-          </a:p>
-          <a:p>
-            <a:r>
-              <a:rPr lang="en-IN" dirty="0"/>
-              <a:t>        };</a:t>
-            </a:r>
-          </a:p>
-          <a:p>
-            <a:r>
-              <a:rPr lang="en-IN" dirty="0"/>
-              <a:t>        state Walk {</a:t>
-            </a:r>
-          </a:p>
-          <a:p>
-            <a:r>
-              <a:rPr lang="en-IN" dirty="0"/>
-              <a:t>              entry</a:t>
-            </a:r>
-          </a:p>
-          <a:p>
-            <a:r>
-              <a:rPr lang="en-IN" dirty="0"/>
-              <a:t>              `</a:t>
-            </a:r>
-          </a:p>
-          <a:p>
-            <a:r>
-              <a:rPr lang="en-IN" dirty="0"/>
-              <a:t>                  </a:t>
-            </a:r>
-            <a:r>
-              <a:rPr lang="en-IN" dirty="0" err="1"/>
-              <a:t>server.walk</a:t>
-            </a:r>
-            <a:r>
-              <a:rPr lang="en-IN" dirty="0"/>
-              <a:t>().send();</a:t>
-            </a:r>
-          </a:p>
-          <a:p>
-            <a:r>
-              <a:rPr lang="en-IN" dirty="0"/>
-              <a:t>              `;</a:t>
-            </a:r>
-          </a:p>
-          <a:p>
-            <a:r>
-              <a:rPr lang="en-IN" dirty="0"/>
-              <a:t>        };</a:t>
-            </a:r>
-          </a:p>
-          <a:p>
-            <a:r>
-              <a:rPr lang="en-IN" dirty="0"/>
-              <a:t>        initial -&gt; </a:t>
-            </a:r>
-            <a:r>
-              <a:rPr lang="en-IN" dirty="0" err="1"/>
-              <a:t>WaitUntiServerReady</a:t>
-            </a:r>
-            <a:r>
-              <a:rPr lang="en-IN" dirty="0"/>
-              <a:t>;</a:t>
-            </a:r>
-          </a:p>
-          <a:p>
-            <a:r>
-              <a:rPr lang="en-IN" dirty="0"/>
-              <a:t>        </a:t>
-            </a:r>
-            <a:r>
-              <a:rPr lang="en-IN" dirty="0" err="1"/>
-              <a:t>serverReady</a:t>
-            </a:r>
-            <a:r>
-              <a:rPr lang="en-IN" dirty="0"/>
-              <a:t>: </a:t>
-            </a:r>
-            <a:r>
-              <a:rPr lang="en-IN" dirty="0" err="1"/>
-              <a:t>WaitUntiServerReady</a:t>
-            </a:r>
-            <a:r>
-              <a:rPr lang="en-IN" dirty="0"/>
-              <a:t> -&gt; </a:t>
-            </a:r>
-            <a:r>
-              <a:rPr lang="en-IN" dirty="0" err="1"/>
-              <a:t>DoNotWalk</a:t>
-            </a:r>
-            <a:r>
-              <a:rPr lang="en-IN" dirty="0"/>
-              <a:t> on </a:t>
-            </a:r>
-            <a:r>
-              <a:rPr lang="en-IN" dirty="0" err="1"/>
-              <a:t>server.rtBound</a:t>
-            </a:r>
-            <a:r>
-              <a:rPr lang="en-IN" dirty="0"/>
-              <a:t>;</a:t>
-            </a:r>
-          </a:p>
-          <a:p>
-            <a:r>
-              <a:rPr lang="en-IN" dirty="0"/>
-              <a:t>        walk: </a:t>
-            </a:r>
-            <a:r>
-              <a:rPr lang="en-IN" dirty="0" err="1"/>
-              <a:t>DoNotWalk</a:t>
-            </a:r>
-            <a:r>
-              <a:rPr lang="en-IN" dirty="0"/>
-              <a:t> -&gt; Walk;</a:t>
-            </a:r>
-          </a:p>
-          <a:p>
-            <a:r>
-              <a:rPr lang="en-IN" dirty="0"/>
-              <a:t>        stop: Walk -&gt; </a:t>
-            </a:r>
-            <a:r>
-              <a:rPr lang="en-IN" dirty="0" err="1"/>
-              <a:t>DoNotWalk</a:t>
-            </a:r>
-            <a:r>
-              <a:rPr lang="en-IN" dirty="0"/>
-              <a:t>;</a:t>
-            </a:r>
-          </a:p>
-          <a:p>
-            <a:br>
-              <a:rPr lang="en-IN" dirty="0"/>
-            </a:br>
-            <a:r>
-              <a:rPr lang="en-IN" dirty="0"/>
-              <a:t>    };</a:t>
-            </a:r>
-          </a:p>
-          <a:p>
-            <a:r>
-              <a:rPr lang="en-IN" dirty="0"/>
-              <a:t>};</a:t>
-            </a:r>
-          </a:p>
-          <a:p>
-            <a:br>
-              <a:rPr lang="en-IN" dirty="0"/>
-            </a:br>
-            <a:r>
-              <a:rPr lang="en-IN" dirty="0"/>
-              <a:t>capsule </a:t>
-            </a:r>
-            <a:r>
-              <a:rPr lang="en-IN" dirty="0" err="1"/>
-              <a:t>TLSystem</a:t>
-            </a:r>
-            <a:r>
-              <a:rPr lang="en-IN" dirty="0"/>
-              <a:t> {</a:t>
-            </a:r>
-          </a:p>
-          <a:p>
-            <a:r>
-              <a:rPr lang="en-IN" dirty="0"/>
-              <a:t>    </a:t>
-            </a:r>
-            <a:r>
-              <a:rPr lang="en-IN" i="1" dirty="0"/>
-              <a:t>/* Ports */</a:t>
-            </a:r>
-            <a:endParaRPr lang="en-IN" dirty="0"/>
-          </a:p>
-          <a:p>
-            <a:r>
-              <a:rPr lang="en-IN" dirty="0"/>
-              <a:t>    </a:t>
-            </a:r>
-            <a:r>
-              <a:rPr lang="en-IN" i="1" dirty="0"/>
-              <a:t>/* Parts */</a:t>
-            </a:r>
-            <a:endParaRPr lang="en-IN" dirty="0"/>
-          </a:p>
-          <a:p>
-            <a:r>
-              <a:rPr lang="en-IN" dirty="0"/>
-              <a:t>    part </a:t>
-            </a:r>
-            <a:r>
-              <a:rPr lang="en-IN" dirty="0" err="1"/>
-              <a:t>trafficLight</a:t>
-            </a:r>
-            <a:r>
-              <a:rPr lang="en-IN" dirty="0"/>
-              <a:t> : </a:t>
-            </a:r>
-            <a:r>
-              <a:rPr lang="en-IN" dirty="0" err="1"/>
-              <a:t>TrafficLight</a:t>
-            </a:r>
-            <a:r>
-              <a:rPr lang="en-IN" dirty="0"/>
-              <a:t>;</a:t>
-            </a:r>
-          </a:p>
-          <a:p>
-            <a:r>
-              <a:rPr lang="en-IN" dirty="0"/>
-              <a:t>    part </a:t>
-            </a:r>
-            <a:r>
-              <a:rPr lang="en-IN" dirty="0" err="1"/>
-              <a:t>pedLight</a:t>
-            </a:r>
-            <a:r>
-              <a:rPr lang="en-IN" dirty="0"/>
-              <a:t> : </a:t>
-            </a:r>
-            <a:r>
-              <a:rPr lang="en-IN" dirty="0" err="1"/>
-              <a:t>PedLight</a:t>
-            </a:r>
-            <a:r>
-              <a:rPr lang="en-IN" dirty="0"/>
-              <a:t>;</a:t>
-            </a:r>
-          </a:p>
-          <a:p>
-            <a:r>
-              <a:rPr lang="en-IN" dirty="0"/>
-              <a:t>    </a:t>
-            </a:r>
-            <a:r>
-              <a:rPr lang="en-IN" i="1" dirty="0"/>
-              <a:t>/* Connectors */</a:t>
-            </a:r>
-            <a:endParaRPr lang="en-IN" dirty="0"/>
-          </a:p>
-          <a:p>
-            <a:r>
-              <a:rPr lang="en-IN" dirty="0"/>
-              <a:t>    connect </a:t>
-            </a:r>
-            <a:r>
-              <a:rPr lang="en-IN" dirty="0" err="1"/>
-              <a:t>pedLight.pedControl</a:t>
-            </a:r>
-            <a:r>
-              <a:rPr lang="en-IN" dirty="0"/>
-              <a:t> with </a:t>
-            </a:r>
-            <a:r>
-              <a:rPr lang="en-IN" dirty="0" err="1"/>
-              <a:t>trafficLight.pedLightControl</a:t>
-            </a:r>
-            <a:r>
-              <a:rPr lang="en-IN" dirty="0"/>
-              <a:t>;</a:t>
-            </a:r>
-          </a:p>
-          <a:p>
-            <a:r>
-              <a:rPr lang="en-IN" dirty="0"/>
-              <a:t>    </a:t>
-            </a:r>
-            <a:r>
-              <a:rPr lang="en-IN" i="1" dirty="0"/>
-              <a:t>/* State Machine */</a:t>
-            </a:r>
-            <a:endParaRPr lang="en-IN" dirty="0"/>
-          </a:p>
-          <a:p>
-            <a:r>
-              <a:rPr lang="en-IN" dirty="0"/>
-              <a:t>    </a:t>
-            </a:r>
-            <a:r>
-              <a:rPr lang="en-IN" dirty="0" err="1"/>
-              <a:t>statemachine</a:t>
-            </a:r>
-            <a:r>
-              <a:rPr lang="en-IN" dirty="0"/>
-              <a:t> {</a:t>
-            </a:r>
-          </a:p>
-          <a:p>
-            <a:r>
-              <a:rPr lang="en-IN" dirty="0"/>
-              <a:t>        state </a:t>
-            </a:r>
-            <a:r>
-              <a:rPr lang="en-IN" dirty="0" err="1"/>
-              <a:t>State</a:t>
-            </a:r>
-            <a:r>
-              <a:rPr lang="en-IN" dirty="0"/>
-              <a:t>;</a:t>
-            </a:r>
-          </a:p>
-          <a:p>
-            <a:r>
-              <a:rPr lang="en-IN" dirty="0"/>
-              <a:t>        initial -&gt; State;</a:t>
-            </a:r>
-          </a:p>
-          <a:p>
-            <a:r>
-              <a:rPr lang="en-IN" dirty="0"/>
-              <a:t>    };</a:t>
-            </a:r>
-          </a:p>
-          <a:p>
-            <a:r>
-              <a:rPr lang="en-IN" dirty="0"/>
-              <a:t>};</a:t>
-            </a:r>
           </a:p>
           <a:p>
             <a:endParaRPr lang="en-IN" dirty="0"/>
@@ -12667,7 +12719,7 @@
         <p:spPr>
           <a:xfrm>
             <a:off x="1300899" y="499621"/>
-            <a:ext cx="4770730" cy="10064294"/>
+            <a:ext cx="4770730" cy="8956298"/>
           </a:xfrm>
           <a:prstGeom prst="rect">
             <a:avLst/>
@@ -12684,238 +12736,205 @@
               <a:rPr lang="en-IN" i="1" dirty="0"/>
               <a:t>// ART_0007_choiceWithTooManyElseTransitions</a:t>
             </a:r>
-            <a:endParaRPr lang="en-IN" dirty="0"/>
-          </a:p>
-          <a:p>
-            <a:br>
-              <a:rPr lang="en-IN" dirty="0"/>
-            </a:br>
-            <a:r>
-              <a:rPr lang="en-IN" dirty="0"/>
+          </a:p>
+          <a:p>
+            <a:r>
+              <a:rPr lang="en-IN" i="1" dirty="0"/>
               <a:t>capsule </a:t>
             </a:r>
             <a:r>
-              <a:rPr lang="en-IN" dirty="0" err="1"/>
+              <a:rPr lang="en-IN" i="1" dirty="0" err="1"/>
               <a:t>ChoiceSample</a:t>
             </a:r>
             <a:r>
-              <a:rPr lang="en-IN" dirty="0"/>
+              <a:rPr lang="en-IN" i="1" dirty="0"/>
               <a:t> {</a:t>
             </a:r>
           </a:p>
           <a:p>
             <a:r>
-              <a:rPr lang="en-IN" dirty="0"/>
-              <a:t>    </a:t>
-            </a:r>
-            <a:r>
               <a:rPr lang="en-IN" i="1" dirty="0"/>
-              <a:t>/* Ports */</a:t>
-            </a:r>
-            <a:endParaRPr lang="en-IN" dirty="0"/>
-          </a:p>
-          <a:p>
-            <a:r>
-              <a:rPr lang="en-IN" dirty="0"/>
-              <a:t>    </a:t>
-            </a:r>
+              <a:t>      /* Ports */</a:t>
+            </a:r>
+          </a:p>
+          <a:p>
             <a:r>
               <a:rPr lang="en-IN" i="1" dirty="0"/>
-              <a:t>/* Parts */</a:t>
-            </a:r>
-            <a:endParaRPr lang="en-IN" dirty="0"/>
-          </a:p>
-          <a:p>
-            <a:r>
-              <a:rPr lang="en-IN" dirty="0"/>
-              <a:t>    </a:t>
-            </a:r>
+              <a:t>      /* Parts */</a:t>
+            </a:r>
+          </a:p>
+          <a:p>
             <a:r>
               <a:rPr lang="en-IN" i="1" dirty="0"/>
-              <a:t>/* Connectors */</a:t>
-            </a:r>
-            <a:endParaRPr lang="en-IN" dirty="0"/>
-          </a:p>
-          <a:p>
-            <a:r>
-              <a:rPr lang="en-IN" dirty="0"/>
-              <a:t>    </a:t>
-            </a:r>
+              <a:t>      /* Connectors */</a:t>
+            </a:r>
+          </a:p>
+          <a:p>
             <a:r>
               <a:rPr lang="en-IN" i="1" dirty="0"/>
-              <a:t>/* State Machine */</a:t>
-            </a:r>
-            <a:endParaRPr lang="en-IN" dirty="0"/>
-          </a:p>
-          <a:p>
-            <a:r>
-              <a:rPr lang="en-IN" dirty="0"/>
-              <a:t>    </a:t>
-            </a:r>
-            <a:r>
-              <a:rPr lang="en-IN" dirty="0" err="1"/>
+              <a:t>      /* State Machine */</a:t>
+            </a:r>
+          </a:p>
+          <a:p>
+            <a:r>
+              <a:rPr lang="en-IN" i="1" dirty="0"/>
+              <a:t>      </a:t>
+            </a:r>
+            <a:r>
+              <a:rPr lang="en-IN" i="1" dirty="0" err="1"/>
               <a:t>statemachine</a:t>
             </a:r>
             <a:r>
-              <a:rPr lang="en-IN" dirty="0"/>
+              <a:rPr lang="en-IN" i="1" dirty="0"/>
               <a:t> {</a:t>
             </a:r>
           </a:p>
           <a:p>
             <a:r>
-              <a:rPr lang="en-IN" dirty="0"/>
-              <a:t>        state State1, State2, State3;</a:t>
-            </a:r>
-          </a:p>
-          <a:p>
-            <a:r>
-              <a:rPr lang="en-IN" dirty="0"/>
-              <a:t>        t1: initial -&gt; State1;</a:t>
-            </a:r>
-          </a:p>
-          <a:p>
-            <a:r>
-              <a:rPr lang="en-IN" dirty="0"/>
-              <a:t>        choice X;</a:t>
-            </a:r>
-          </a:p>
-          <a:p>
-            <a:r>
-              <a:rPr lang="en-IN" dirty="0"/>
-              <a:t>        junction Y;</a:t>
-            </a:r>
-          </a:p>
-          <a:p>
-            <a:r>
-              <a:rPr lang="en-IN" dirty="0"/>
-              <a:t>        t2: State1 -&gt; X;    </a:t>
-            </a:r>
-          </a:p>
-          <a:p>
-            <a:r>
-              <a:rPr lang="en-IN" dirty="0"/>
-              <a:t>        t3: X -&gt; State2 when</a:t>
-            </a:r>
-          </a:p>
-          <a:p>
-            <a:r>
-              <a:rPr lang="en-IN" dirty="0"/>
-              <a:t>        `</a:t>
-            </a:r>
-          </a:p>
-          <a:p>
-            <a:r>
-              <a:rPr lang="en-IN" dirty="0"/>
-              <a:t>            return true; </a:t>
-            </a:r>
-          </a:p>
-          <a:p>
-            <a:r>
-              <a:rPr lang="en-IN" dirty="0"/>
-              <a:t>        `;    </a:t>
-            </a:r>
-          </a:p>
-          <a:p>
-            <a:r>
-              <a:rPr lang="en-IN" dirty="0"/>
-              <a:t>        t4: X -&gt; State2 when</a:t>
-            </a:r>
-          </a:p>
-          <a:p>
-            <a:r>
-              <a:rPr lang="en-IN" dirty="0"/>
-              <a:t>        `</a:t>
-            </a:r>
-          </a:p>
-          <a:p>
-            <a:r>
-              <a:rPr lang="en-IN" dirty="0"/>
-              <a:t>            else </a:t>
-            </a:r>
-          </a:p>
-          <a:p>
-            <a:r>
-              <a:rPr lang="en-IN" dirty="0"/>
-              <a:t>        `; </a:t>
-            </a:r>
-          </a:p>
-          <a:p>
-            <a:r>
-              <a:rPr lang="en-IN" dirty="0"/>
-              <a:t>        t5: State1 -&gt; Y; </a:t>
-            </a:r>
-          </a:p>
-          <a:p>
-            <a:r>
-              <a:rPr lang="en-IN" dirty="0"/>
-              <a:t>        t6: Y -&gt; State3 when</a:t>
-            </a:r>
-          </a:p>
-          <a:p>
-            <a:r>
-              <a:rPr lang="en-IN" dirty="0"/>
-              <a:t>        `</a:t>
-            </a:r>
-          </a:p>
-          <a:p>
-            <a:r>
-              <a:rPr lang="en-IN" dirty="0"/>
-              <a:t>            else </a:t>
-            </a:r>
-          </a:p>
-          <a:p>
-            <a:r>
-              <a:rPr lang="en-IN" dirty="0"/>
-              <a:t>        `;</a:t>
-            </a:r>
-          </a:p>
-          <a:p>
-            <a:r>
-              <a:rPr lang="en-IN" dirty="0"/>
-              <a:t>        t7: Y -&gt; State3 when</a:t>
-            </a:r>
-          </a:p>
-          <a:p>
-            <a:r>
-              <a:rPr lang="en-IN" dirty="0"/>
-              <a:t>        `</a:t>
-            </a:r>
-          </a:p>
-          <a:p>
-            <a:r>
-              <a:rPr lang="en-IN" dirty="0"/>
-              <a:t>            else </a:t>
-            </a:r>
-          </a:p>
-          <a:p>
-            <a:r>
-              <a:rPr lang="en-IN" dirty="0"/>
-              <a:t>        `;</a:t>
-            </a:r>
-          </a:p>
-          <a:p>
-            <a:br>
-              <a:rPr lang="en-IN" dirty="0"/>
-            </a:br>
-            <a:r>
-              <a:rPr lang="en-IN" dirty="0"/>
-              <a:t>    };</a:t>
-            </a:r>
-          </a:p>
-          <a:p>
-            <a:r>
-              <a:rPr lang="en-IN" dirty="0"/>
+              <a:rPr lang="en-IN" i="1" dirty="0"/>
+              <a:t>            state State1, State2, State3;</a:t>
+            </a:r>
+          </a:p>
+          <a:p>
+            <a:r>
+              <a:rPr lang="en-IN" i="1" dirty="0"/>
+              <a:t>            t1: initial -&gt; State1;</a:t>
+            </a:r>
+          </a:p>
+          <a:p>
+            <a:r>
+              <a:rPr lang="en-IN" i="1" dirty="0"/>
+              <a:t>            choice X;</a:t>
+            </a:r>
+          </a:p>
+          <a:p>
+            <a:r>
+              <a:rPr lang="en-IN" i="1" dirty="0"/>
+              <a:t>            junction Y;</a:t>
+            </a:r>
+          </a:p>
+          <a:p>
+            <a:r>
+              <a:rPr lang="en-IN" i="1" dirty="0"/>
+              <a:t>            t2: State1 -&gt; X;      </a:t>
+            </a:r>
+          </a:p>
+          <a:p>
+            <a:r>
+              <a:rPr lang="en-IN" i="1" dirty="0"/>
+              <a:t>            t3: X -&gt; State2 when</a:t>
+            </a:r>
+          </a:p>
+          <a:p>
+            <a:r>
+              <a:rPr lang="en-IN" i="1" dirty="0"/>
+              <a:t>            `</a:t>
+            </a:r>
+          </a:p>
+          <a:p>
+            <a:r>
+              <a:rPr lang="en-IN" i="1" dirty="0"/>
+              <a:t>                  return true; </a:t>
+            </a:r>
+          </a:p>
+          <a:p>
+            <a:r>
+              <a:rPr lang="en-IN" i="1" dirty="0"/>
+              <a:t>            `;      </a:t>
+            </a:r>
+          </a:p>
+          <a:p>
+            <a:r>
+              <a:rPr lang="en-IN" i="1" dirty="0"/>
+              <a:t>            t4: X -&gt; State2 when</a:t>
+            </a:r>
+          </a:p>
+          <a:p>
+            <a:r>
+              <a:rPr lang="en-IN" i="1" dirty="0"/>
+              <a:t>            `</a:t>
+            </a:r>
+          </a:p>
+          <a:p>
+            <a:r>
+              <a:rPr lang="en-IN" i="1" dirty="0"/>
+              <a:t>                  else </a:t>
+            </a:r>
+          </a:p>
+          <a:p>
+            <a:r>
+              <a:rPr lang="en-IN" i="1" dirty="0"/>
+              <a:t>            `; </a:t>
+            </a:r>
+          </a:p>
+          <a:p>
+            <a:r>
+              <a:rPr lang="en-IN" i="1" dirty="0"/>
+              <a:t>            t5: State1 -&gt; Y; </a:t>
+            </a:r>
+          </a:p>
+          <a:p>
+            <a:r>
+              <a:rPr lang="en-IN" i="1" dirty="0"/>
+              <a:t>            t6: Y -&gt; State3 when</a:t>
+            </a:r>
+          </a:p>
+          <a:p>
+            <a:r>
+              <a:rPr lang="en-IN" i="1" dirty="0"/>
+              <a:t>            `</a:t>
+            </a:r>
+          </a:p>
+          <a:p>
+            <a:r>
+              <a:rPr lang="en-IN" i="1" dirty="0"/>
+              <a:t>                  else </a:t>
+            </a:r>
+          </a:p>
+          <a:p>
+            <a:r>
+              <a:rPr lang="en-IN" i="1" dirty="0"/>
+              <a:t>            `;</a:t>
+            </a:r>
+          </a:p>
+          <a:p>
+            <a:r>
+              <a:rPr lang="en-IN" i="1" dirty="0"/>
+              <a:t>            t7: Y -&gt; State3 when</a:t>
+            </a:r>
+          </a:p>
+          <a:p>
+            <a:r>
+              <a:rPr lang="en-IN" i="1" dirty="0"/>
+              <a:t>            `</a:t>
+            </a:r>
+          </a:p>
+          <a:p>
+            <a:r>
+              <a:rPr lang="en-IN" i="1" dirty="0"/>
+              <a:t>                  else </a:t>
+            </a:r>
+          </a:p>
+          <a:p>
+            <a:r>
+              <a:rPr lang="en-IN" i="1" dirty="0"/>
+              <a:t>            `;</a:t>
+            </a:r>
+          </a:p>
+          <a:p>
+            <a:r>
+              <a:rPr lang="en-IN" i="1" dirty="0"/>
+              <a:t>      };</a:t>
+            </a:r>
+          </a:p>
+          <a:p>
+            <a:r>
+              <a:rPr lang="en-IN" i="1" dirty="0"/>
               <a:t>};</a:t>
             </a:r>
           </a:p>
           <a:p>
-            <a:br>
-              <a:rPr lang="en-IN" dirty="0"/>
-            </a:br>
-            <a:br>
-              <a:rPr lang="en-IN" dirty="0"/>
-            </a:br>
-            <a:endParaRPr lang="en-IN" dirty="0"/>
+            <a:endParaRPr lang="en-IN" i="1" dirty="0"/>
           </a:p>
         </p:txBody>
       </p:sp>
@@ -12994,7 +13013,7 @@
         <p:spPr>
           <a:xfrm>
             <a:off x="597031" y="751344"/>
-            <a:ext cx="6096000" cy="5909310"/>
+            <a:ext cx="6096000" cy="6186309"/>
           </a:xfrm>
           <a:prstGeom prst="rect">
             <a:avLst/>
@@ -13007,173 +13026,482 @@
           <a:lstStyle/>
           <a:p>
             <a:r>
-              <a:rPr lang="en-IN" dirty="0"/>
-              <a:t>capsule HC {</a:t>
-            </a:r>
-          </a:p>
-          <a:p>
-            <a:r>
-              <a:rPr lang="en-IN" dirty="0"/>
+              <a:rPr lang="en-US" b="0" dirty="0">
+                <a:solidFill>
+                  <a:srgbClr val="C586C0"/>
+                </a:solidFill>
+                <a:effectLst/>
+                <a:latin typeface="Consolas" panose="020B0609020204030204" pitchFamily="49" charset="0"/>
+              </a:rPr>
+              <a:t>capsule</a:t>
+            </a:r>
+            <a:r>
+              <a:rPr lang="en-US" b="0" dirty="0">
+                <a:solidFill>
+                  <a:srgbClr val="D4D4D4"/>
+                </a:solidFill>
+                <a:effectLst/>
+                <a:latin typeface="Consolas" panose="020B0609020204030204" pitchFamily="49" charset="0"/>
+              </a:rPr>
+              <a:t> HC {</a:t>
+            </a:r>
+          </a:p>
+          <a:p>
+            <a:r>
+              <a:rPr lang="en-US" b="0" dirty="0">
+                <a:solidFill>
+                  <a:srgbClr val="D4D4D4"/>
+                </a:solidFill>
+                <a:effectLst/>
+                <a:latin typeface="Consolas" panose="020B0609020204030204" pitchFamily="49" charset="0"/>
+              </a:rPr>
               <a:t>    </a:t>
             </a:r>
             <a:r>
-              <a:rPr lang="en-IN" i="1" dirty="0"/>
+              <a:rPr lang="en-US" b="0" dirty="0">
+                <a:solidFill>
+                  <a:srgbClr val="6A9955"/>
+                </a:solidFill>
+                <a:effectLst/>
+                <a:latin typeface="Consolas" panose="020B0609020204030204" pitchFamily="49" charset="0"/>
+              </a:rPr>
               <a:t>/* Ports */</a:t>
             </a:r>
-            <a:endParaRPr lang="en-IN" dirty="0"/>
-          </a:p>
-          <a:p>
-            <a:r>
-              <a:rPr lang="en-IN" dirty="0"/>
+            <a:endParaRPr lang="en-US" b="0" dirty="0">
+              <a:solidFill>
+                <a:srgbClr val="D4D4D4"/>
+              </a:solidFill>
+              <a:effectLst/>
+              <a:latin typeface="Consolas" panose="020B0609020204030204" pitchFamily="49" charset="0"/>
+            </a:endParaRPr>
+          </a:p>
+          <a:p>
+            <a:r>
+              <a:rPr lang="en-US" b="0" dirty="0">
+                <a:solidFill>
+                  <a:srgbClr val="D4D4D4"/>
+                </a:solidFill>
+                <a:effectLst/>
+                <a:latin typeface="Consolas" panose="020B0609020204030204" pitchFamily="49" charset="0"/>
+              </a:rPr>
               <a:t>    </a:t>
             </a:r>
             <a:r>
-              <a:rPr lang="en-IN" i="1" dirty="0"/>
+              <a:rPr lang="en-US" b="0" dirty="0">
+                <a:solidFill>
+                  <a:srgbClr val="6A9955"/>
+                </a:solidFill>
+                <a:effectLst/>
+                <a:latin typeface="Consolas" panose="020B0609020204030204" pitchFamily="49" charset="0"/>
+              </a:rPr>
               <a:t>/* Parts */</a:t>
             </a:r>
-            <a:endParaRPr lang="en-IN" dirty="0"/>
-          </a:p>
-          <a:p>
-            <a:r>
-              <a:rPr lang="en-IN" dirty="0"/>
+            <a:endParaRPr lang="en-US" b="0" dirty="0">
+              <a:solidFill>
+                <a:srgbClr val="D4D4D4"/>
+              </a:solidFill>
+              <a:effectLst/>
+              <a:latin typeface="Consolas" panose="020B0609020204030204" pitchFamily="49" charset="0"/>
+            </a:endParaRPr>
+          </a:p>
+          <a:p>
+            <a:r>
+              <a:rPr lang="en-US" b="0" dirty="0">
+                <a:solidFill>
+                  <a:srgbClr val="D4D4D4"/>
+                </a:solidFill>
+                <a:effectLst/>
+                <a:latin typeface="Consolas" panose="020B0609020204030204" pitchFamily="49" charset="0"/>
+              </a:rPr>
               <a:t>    </a:t>
             </a:r>
             <a:r>
-              <a:rPr lang="en-IN" i="1" dirty="0"/>
+              <a:rPr lang="en-US" b="0" dirty="0">
+                <a:solidFill>
+                  <a:srgbClr val="6A9955"/>
+                </a:solidFill>
+                <a:effectLst/>
+                <a:latin typeface="Consolas" panose="020B0609020204030204" pitchFamily="49" charset="0"/>
+              </a:rPr>
               <a:t>/* Connectors */</a:t>
             </a:r>
-            <a:endParaRPr lang="en-IN" dirty="0"/>
-          </a:p>
-          <a:p>
-            <a:r>
-              <a:rPr lang="en-IN" dirty="0"/>
+            <a:endParaRPr lang="en-US" b="0" dirty="0">
+              <a:solidFill>
+                <a:srgbClr val="D4D4D4"/>
+              </a:solidFill>
+              <a:effectLst/>
+              <a:latin typeface="Consolas" panose="020B0609020204030204" pitchFamily="49" charset="0"/>
+            </a:endParaRPr>
+          </a:p>
+          <a:p>
+            <a:r>
+              <a:rPr lang="en-US" b="0" dirty="0">
+                <a:solidFill>
+                  <a:srgbClr val="D4D4D4"/>
+                </a:solidFill>
+                <a:effectLst/>
+                <a:latin typeface="Consolas" panose="020B0609020204030204" pitchFamily="49" charset="0"/>
+              </a:rPr>
               <a:t>    </a:t>
             </a:r>
             <a:r>
-              <a:rPr lang="en-IN" i="1" dirty="0"/>
+              <a:rPr lang="en-US" b="0" dirty="0">
+                <a:solidFill>
+                  <a:srgbClr val="6A9955"/>
+                </a:solidFill>
+                <a:effectLst/>
+                <a:latin typeface="Consolas" panose="020B0609020204030204" pitchFamily="49" charset="0"/>
+              </a:rPr>
               <a:t>/* State Machine */</a:t>
             </a:r>
-            <a:endParaRPr lang="en-IN" dirty="0"/>
-          </a:p>
-          <a:p>
-            <a:r>
-              <a:rPr lang="en-IN" dirty="0"/>
+            <a:endParaRPr lang="en-US" b="0" dirty="0">
+              <a:solidFill>
+                <a:srgbClr val="D4D4D4"/>
+              </a:solidFill>
+              <a:effectLst/>
+              <a:latin typeface="Consolas" panose="020B0609020204030204" pitchFamily="49" charset="0"/>
+            </a:endParaRPr>
+          </a:p>
+          <a:p>
+            <a:r>
+              <a:rPr lang="en-US" b="0" dirty="0">
+                <a:solidFill>
+                  <a:srgbClr val="D4D4D4"/>
+                </a:solidFill>
+                <a:effectLst/>
+                <a:latin typeface="Consolas" panose="020B0609020204030204" pitchFamily="49" charset="0"/>
+              </a:rPr>
               <a:t>    </a:t>
             </a:r>
             <a:r>
-              <a:rPr lang="en-IN" dirty="0" err="1"/>
+              <a:rPr lang="en-US" b="0" dirty="0" err="1">
+                <a:solidFill>
+                  <a:srgbClr val="C586C0"/>
+                </a:solidFill>
+                <a:effectLst/>
+                <a:latin typeface="Consolas" panose="020B0609020204030204" pitchFamily="49" charset="0"/>
+              </a:rPr>
               <a:t>statemachine</a:t>
             </a:r>
             <a:r>
-              <a:rPr lang="en-IN" dirty="0"/>
+              <a:rPr lang="en-US" b="0" dirty="0">
+                <a:solidFill>
+                  <a:srgbClr val="D4D4D4"/>
+                </a:solidFill>
+                <a:effectLst/>
+                <a:latin typeface="Consolas" panose="020B0609020204030204" pitchFamily="49" charset="0"/>
+              </a:rPr>
               <a:t> {</a:t>
             </a:r>
           </a:p>
           <a:p>
             <a:r>
-              <a:rPr lang="en-IN" dirty="0"/>
-              <a:t>        state Composite {</a:t>
-            </a:r>
-          </a:p>
-          <a:p>
-            <a:r>
-              <a:rPr lang="en-IN" dirty="0"/>
+              <a:rPr lang="en-US" b="0" dirty="0">
+                <a:solidFill>
+                  <a:srgbClr val="D4D4D4"/>
+                </a:solidFill>
+                <a:effectLst/>
+                <a:latin typeface="Consolas" panose="020B0609020204030204" pitchFamily="49" charset="0"/>
+              </a:rPr>
+              <a:t>        </a:t>
+            </a:r>
+            <a:r>
+              <a:rPr lang="en-US" b="0" dirty="0">
+                <a:solidFill>
+                  <a:srgbClr val="C586C0"/>
+                </a:solidFill>
+                <a:effectLst/>
+                <a:latin typeface="Consolas" panose="020B0609020204030204" pitchFamily="49" charset="0"/>
+              </a:rPr>
+              <a:t>state</a:t>
+            </a:r>
+            <a:r>
+              <a:rPr lang="en-US" b="0" dirty="0">
+                <a:solidFill>
+                  <a:srgbClr val="D4D4D4"/>
+                </a:solidFill>
+                <a:effectLst/>
+                <a:latin typeface="Consolas" panose="020B0609020204030204" pitchFamily="49" charset="0"/>
+              </a:rPr>
+              <a:t> Composite {</a:t>
+            </a:r>
+          </a:p>
+          <a:p>
+            <a:r>
+              <a:rPr lang="en-US" b="0" dirty="0">
+                <a:solidFill>
+                  <a:srgbClr val="D4D4D4"/>
+                </a:solidFill>
+                <a:effectLst/>
+                <a:latin typeface="Consolas" panose="020B0609020204030204" pitchFamily="49" charset="0"/>
+              </a:rPr>
               <a:t>            </a:t>
             </a:r>
             <a:r>
-              <a:rPr lang="en-IN" dirty="0" err="1"/>
+              <a:rPr lang="en-US" b="0" dirty="0" err="1">
+                <a:solidFill>
+                  <a:srgbClr val="C586C0"/>
+                </a:solidFill>
+                <a:effectLst/>
+                <a:latin typeface="Consolas" panose="020B0609020204030204" pitchFamily="49" charset="0"/>
+              </a:rPr>
               <a:t>entrypoint</a:t>
             </a:r>
             <a:r>
-              <a:rPr lang="en-IN" dirty="0"/>
+              <a:rPr lang="en-US" b="0" dirty="0">
+                <a:solidFill>
+                  <a:srgbClr val="D4D4D4"/>
+                </a:solidFill>
+                <a:effectLst/>
+                <a:latin typeface="Consolas" panose="020B0609020204030204" pitchFamily="49" charset="0"/>
+              </a:rPr>
               <a:t> ep1, ep2;</a:t>
             </a:r>
           </a:p>
           <a:p>
             <a:r>
-              <a:rPr lang="en-IN" dirty="0"/>
+              <a:rPr lang="en-US" b="0" dirty="0">
+                <a:solidFill>
+                  <a:srgbClr val="D4D4D4"/>
+                </a:solidFill>
+                <a:effectLst/>
+                <a:latin typeface="Consolas" panose="020B0609020204030204" pitchFamily="49" charset="0"/>
+              </a:rPr>
               <a:t>            </a:t>
             </a:r>
             <a:r>
-              <a:rPr lang="en-IN" dirty="0" err="1"/>
+              <a:rPr lang="en-US" b="0" dirty="0" err="1">
+                <a:solidFill>
+                  <a:srgbClr val="C586C0"/>
+                </a:solidFill>
+                <a:effectLst/>
+                <a:latin typeface="Consolas" panose="020B0609020204030204" pitchFamily="49" charset="0"/>
+              </a:rPr>
               <a:t>exitpoint</a:t>
             </a:r>
             <a:r>
-              <a:rPr lang="en-IN" dirty="0"/>
+              <a:rPr lang="en-US" b="0" dirty="0">
+                <a:solidFill>
+                  <a:srgbClr val="D4D4D4"/>
+                </a:solidFill>
+                <a:effectLst/>
+                <a:latin typeface="Consolas" panose="020B0609020204030204" pitchFamily="49" charset="0"/>
+              </a:rPr>
               <a:t> ex1;            </a:t>
             </a:r>
           </a:p>
           <a:p>
             <a:r>
-              <a:rPr lang="en-IN" dirty="0"/>
-              <a:t>            state S1, S2;</a:t>
-            </a:r>
-          </a:p>
-          <a:p>
-            <a:r>
-              <a:rPr lang="en-IN" dirty="0"/>
+              <a:rPr lang="en-US" b="0" dirty="0">
+                <a:solidFill>
+                  <a:srgbClr val="D4D4D4"/>
+                </a:solidFill>
+                <a:effectLst/>
+                <a:latin typeface="Consolas" panose="020B0609020204030204" pitchFamily="49" charset="0"/>
+              </a:rPr>
+              <a:t>            </a:t>
+            </a:r>
+            <a:r>
+              <a:rPr lang="en-US" b="0" dirty="0">
+                <a:solidFill>
+                  <a:srgbClr val="C586C0"/>
+                </a:solidFill>
+                <a:effectLst/>
+                <a:latin typeface="Consolas" panose="020B0609020204030204" pitchFamily="49" charset="0"/>
+              </a:rPr>
+              <a:t>state</a:t>
+            </a:r>
+            <a:r>
+              <a:rPr lang="en-US" b="0" dirty="0">
+                <a:solidFill>
+                  <a:srgbClr val="D4D4D4"/>
+                </a:solidFill>
+                <a:effectLst/>
+                <a:latin typeface="Consolas" panose="020B0609020204030204" pitchFamily="49" charset="0"/>
+              </a:rPr>
+              <a:t> S1, S2;</a:t>
+            </a:r>
+          </a:p>
+          <a:p>
+            <a:r>
+              <a:rPr lang="en-US" b="0" dirty="0">
+                <a:solidFill>
+                  <a:srgbClr val="D4D4D4"/>
+                </a:solidFill>
+                <a:effectLst/>
+                <a:latin typeface="Consolas" panose="020B0609020204030204" pitchFamily="49" charset="0"/>
+              </a:rPr>
               <a:t>            ep1 -&gt; S1;</a:t>
             </a:r>
           </a:p>
           <a:p>
             <a:r>
-              <a:rPr lang="en-IN" dirty="0"/>
+              <a:rPr lang="en-US" b="0" dirty="0">
+                <a:solidFill>
+                  <a:srgbClr val="D4D4D4"/>
+                </a:solidFill>
+                <a:effectLst/>
+                <a:latin typeface="Consolas" panose="020B0609020204030204" pitchFamily="49" charset="0"/>
+              </a:rPr>
               <a:t>            S1 -&gt; S2;</a:t>
             </a:r>
           </a:p>
           <a:p>
             <a:r>
-              <a:rPr lang="en-IN" dirty="0"/>
+              <a:rPr lang="en-US" b="0" dirty="0">
+                <a:solidFill>
+                  <a:srgbClr val="D4D4D4"/>
+                </a:solidFill>
+                <a:effectLst/>
+                <a:latin typeface="Consolas" panose="020B0609020204030204" pitchFamily="49" charset="0"/>
+              </a:rPr>
               <a:t>            S2 -&gt; ex1; </a:t>
             </a:r>
           </a:p>
           <a:p>
             <a:r>
-              <a:rPr lang="en-IN" dirty="0"/>
+              <a:rPr lang="en-US" b="0" dirty="0">
+                <a:solidFill>
+                  <a:srgbClr val="D4D4D4"/>
+                </a:solidFill>
+                <a:effectLst/>
+                <a:latin typeface="Consolas" panose="020B0609020204030204" pitchFamily="49" charset="0"/>
+              </a:rPr>
               <a:t>            h: ep2 -&gt; history*;</a:t>
             </a:r>
           </a:p>
           <a:p>
             <a:r>
-              <a:rPr lang="en-IN" dirty="0"/>
+              <a:rPr lang="en-US" b="0" dirty="0">
+                <a:solidFill>
+                  <a:srgbClr val="D4D4D4"/>
+                </a:solidFill>
+                <a:effectLst/>
+                <a:latin typeface="Consolas" panose="020B0609020204030204" pitchFamily="49" charset="0"/>
+              </a:rPr>
               <a:t>        }; </a:t>
             </a:r>
           </a:p>
           <a:p>
             <a:r>
-              <a:rPr lang="en-IN" dirty="0"/>
-              <a:t>        initial -&gt; Composite.ep1;</a:t>
-            </a:r>
-          </a:p>
-          <a:p>
-            <a:r>
-              <a:rPr lang="en-IN" dirty="0"/>
-              <a:t>        state X;</a:t>
-            </a:r>
-          </a:p>
-          <a:p>
-            <a:r>
-              <a:rPr lang="en-IN" dirty="0"/>
+              <a:rPr lang="en-US" b="0" dirty="0">
+                <a:solidFill>
+                  <a:srgbClr val="D4D4D4"/>
+                </a:solidFill>
+                <a:effectLst/>
+                <a:latin typeface="Consolas" panose="020B0609020204030204" pitchFamily="49" charset="0"/>
+              </a:rPr>
+              <a:t>        </a:t>
+            </a:r>
+            <a:r>
+              <a:rPr lang="en-US" b="0" dirty="0">
+                <a:solidFill>
+                  <a:srgbClr val="C586C0"/>
+                </a:solidFill>
+                <a:effectLst/>
+                <a:latin typeface="Consolas" panose="020B0609020204030204" pitchFamily="49" charset="0"/>
+              </a:rPr>
+              <a:t>initial</a:t>
+            </a:r>
+            <a:r>
+              <a:rPr lang="en-US" b="0" dirty="0">
+                <a:solidFill>
+                  <a:srgbClr val="D4D4D4"/>
+                </a:solidFill>
+                <a:effectLst/>
+                <a:latin typeface="Consolas" panose="020B0609020204030204" pitchFamily="49" charset="0"/>
+              </a:rPr>
+              <a:t> -&gt; Composite.ep1;</a:t>
+            </a:r>
+          </a:p>
+          <a:p>
+            <a:r>
+              <a:rPr lang="en-US" b="0" dirty="0">
+                <a:solidFill>
+                  <a:srgbClr val="D4D4D4"/>
+                </a:solidFill>
+                <a:effectLst/>
+                <a:latin typeface="Consolas" panose="020B0609020204030204" pitchFamily="49" charset="0"/>
+              </a:rPr>
+              <a:t>        </a:t>
+            </a:r>
+            <a:r>
+              <a:rPr lang="en-US" b="0" dirty="0">
+                <a:solidFill>
+                  <a:srgbClr val="C586C0"/>
+                </a:solidFill>
+                <a:effectLst/>
+                <a:latin typeface="Consolas" panose="020B0609020204030204" pitchFamily="49" charset="0"/>
+              </a:rPr>
+              <a:t>state</a:t>
+            </a:r>
+            <a:r>
+              <a:rPr lang="en-US" b="0" dirty="0">
+                <a:solidFill>
+                  <a:srgbClr val="D4D4D4"/>
+                </a:solidFill>
+                <a:effectLst/>
+                <a:latin typeface="Consolas" panose="020B0609020204030204" pitchFamily="49" charset="0"/>
+              </a:rPr>
+              <a:t> X;</a:t>
+            </a:r>
+          </a:p>
+          <a:p>
+            <a:r>
+              <a:rPr lang="en-US" b="0" dirty="0">
+                <a:solidFill>
+                  <a:srgbClr val="D4D4D4"/>
+                </a:solidFill>
+                <a:effectLst/>
+                <a:latin typeface="Consolas" panose="020B0609020204030204" pitchFamily="49" charset="0"/>
+              </a:rPr>
               <a:t>        Composite.ex1 -&gt; X;</a:t>
             </a:r>
           </a:p>
           <a:p>
             <a:r>
-              <a:rPr lang="en-IN" dirty="0"/>
+              <a:rPr lang="en-US" b="0" dirty="0">
+                <a:solidFill>
+                  <a:srgbClr val="D4D4D4"/>
+                </a:solidFill>
+                <a:effectLst/>
+                <a:latin typeface="Consolas" panose="020B0609020204030204" pitchFamily="49" charset="0"/>
+              </a:rPr>
               <a:t>        X -&gt; Composite.ep2;</a:t>
             </a:r>
           </a:p>
           <a:p>
             <a:r>
-              <a:rPr lang="en-IN" dirty="0"/>
+              <a:rPr lang="en-US" b="0" dirty="0">
+                <a:solidFill>
+                  <a:srgbClr val="D4D4D4"/>
+                </a:solidFill>
+                <a:effectLst/>
+                <a:latin typeface="Consolas" panose="020B0609020204030204" pitchFamily="49" charset="0"/>
+              </a:rPr>
               <a:t>    };</a:t>
             </a:r>
           </a:p>
           <a:p>
             <a:r>
-              <a:rPr lang="en-IN" dirty="0"/>
+              <a:rPr lang="en-US" b="0" dirty="0">
+                <a:solidFill>
+                  <a:srgbClr val="D4D4D4"/>
+                </a:solidFill>
+                <a:effectLst/>
+                <a:latin typeface="Consolas" panose="020B0609020204030204" pitchFamily="49" charset="0"/>
+              </a:rPr>
               <a:t>};</a:t>
             </a:r>
+          </a:p>
+          <a:p>
+            <a:endParaRPr lang="en-US" b="0">
+              <a:solidFill>
+                <a:srgbClr val="D4D4D4"/>
+              </a:solidFill>
+              <a:effectLst/>
+              <a:latin typeface="Consolas" panose="020B0609020204030204" pitchFamily="49" charset="0"/>
+            </a:endParaRPr>
           </a:p>
         </p:txBody>
       </p:sp>

</xml_diff>

<commit_message>
RIC-367: Document support procedures
</commit_message>
<xml_diff>
--- a/illustrations.pptx
+++ b/illustrations.pptx
@@ -217,7 +217,7 @@
           <a:p>
             <a:fld id="{62B5D429-15EF-4A8F-AA09-BECBB0A557A5}" type="datetimeFigureOut">
               <a:rPr lang="en-IN" smtClean="0"/>
-              <a:t>13-12-2022</a:t>
+              <a:t>15-12-2022</a:t>
             </a:fld>
             <a:endParaRPr lang="en-IN"/>
           </a:p>
@@ -5289,7 +5289,7 @@
           <a:p>
             <a:fld id="{35051988-DCA8-486F-804A-657BF6D379C2}" type="datetimeFigureOut">
               <a:rPr lang="en-IN" smtClean="0"/>
-              <a:t>13-12-2022</a:t>
+              <a:t>15-12-2022</a:t>
             </a:fld>
             <a:endParaRPr lang="en-IN"/>
           </a:p>
@@ -5489,7 +5489,7 @@
           <a:p>
             <a:fld id="{35051988-DCA8-486F-804A-657BF6D379C2}" type="datetimeFigureOut">
               <a:rPr lang="en-IN" smtClean="0"/>
-              <a:t>13-12-2022</a:t>
+              <a:t>15-12-2022</a:t>
             </a:fld>
             <a:endParaRPr lang="en-IN"/>
           </a:p>
@@ -5699,7 +5699,7 @@
           <a:p>
             <a:fld id="{35051988-DCA8-486F-804A-657BF6D379C2}" type="datetimeFigureOut">
               <a:rPr lang="en-IN" smtClean="0"/>
-              <a:t>13-12-2022</a:t>
+              <a:t>15-12-2022</a:t>
             </a:fld>
             <a:endParaRPr lang="en-IN"/>
           </a:p>
@@ -5899,7 +5899,7 @@
           <a:p>
             <a:fld id="{35051988-DCA8-486F-804A-657BF6D379C2}" type="datetimeFigureOut">
               <a:rPr lang="en-IN" smtClean="0"/>
-              <a:t>13-12-2022</a:t>
+              <a:t>15-12-2022</a:t>
             </a:fld>
             <a:endParaRPr lang="en-IN"/>
           </a:p>
@@ -6175,7 +6175,7 @@
           <a:p>
             <a:fld id="{35051988-DCA8-486F-804A-657BF6D379C2}" type="datetimeFigureOut">
               <a:rPr lang="en-IN" smtClean="0"/>
-              <a:t>13-12-2022</a:t>
+              <a:t>15-12-2022</a:t>
             </a:fld>
             <a:endParaRPr lang="en-IN"/>
           </a:p>
@@ -6443,7 +6443,7 @@
           <a:p>
             <a:fld id="{35051988-DCA8-486F-804A-657BF6D379C2}" type="datetimeFigureOut">
               <a:rPr lang="en-IN" smtClean="0"/>
-              <a:t>13-12-2022</a:t>
+              <a:t>15-12-2022</a:t>
             </a:fld>
             <a:endParaRPr lang="en-IN"/>
           </a:p>
@@ -6858,7 +6858,7 @@
           <a:p>
             <a:fld id="{35051988-DCA8-486F-804A-657BF6D379C2}" type="datetimeFigureOut">
               <a:rPr lang="en-IN" smtClean="0"/>
-              <a:t>13-12-2022</a:t>
+              <a:t>15-12-2022</a:t>
             </a:fld>
             <a:endParaRPr lang="en-IN"/>
           </a:p>
@@ -7000,7 +7000,7 @@
           <a:p>
             <a:fld id="{35051988-DCA8-486F-804A-657BF6D379C2}" type="datetimeFigureOut">
               <a:rPr lang="en-IN" smtClean="0"/>
-              <a:t>13-12-2022</a:t>
+              <a:t>15-12-2022</a:t>
             </a:fld>
             <a:endParaRPr lang="en-IN"/>
           </a:p>
@@ -7113,7 +7113,7 @@
           <a:p>
             <a:fld id="{35051988-DCA8-486F-804A-657BF6D379C2}" type="datetimeFigureOut">
               <a:rPr lang="en-IN" smtClean="0"/>
-              <a:t>13-12-2022</a:t>
+              <a:t>15-12-2022</a:t>
             </a:fld>
             <a:endParaRPr lang="en-IN"/>
           </a:p>
@@ -7426,7 +7426,7 @@
           <a:p>
             <a:fld id="{35051988-DCA8-486F-804A-657BF6D379C2}" type="datetimeFigureOut">
               <a:rPr lang="en-IN" smtClean="0"/>
-              <a:t>13-12-2022</a:t>
+              <a:t>15-12-2022</a:t>
             </a:fld>
             <a:endParaRPr lang="en-IN"/>
           </a:p>
@@ -7715,7 +7715,7 @@
           <a:p>
             <a:fld id="{35051988-DCA8-486F-804A-657BF6D379C2}" type="datetimeFigureOut">
               <a:rPr lang="en-IN" smtClean="0"/>
-              <a:t>13-12-2022</a:t>
+              <a:t>15-12-2022</a:t>
             </a:fld>
             <a:endParaRPr lang="en-IN"/>
           </a:p>
@@ -7958,7 +7958,7 @@
           <a:p>
             <a:fld id="{35051988-DCA8-486F-804A-657BF6D379C2}" type="datetimeFigureOut">
               <a:rPr lang="en-IN" smtClean="0"/>
-              <a:t>13-12-2022</a:t>
+              <a:t>15-12-2022</a:t>
             </a:fld>
             <a:endParaRPr lang="en-IN"/>
           </a:p>
@@ -14543,10 +14543,10 @@
       </p:sp>
       <p:pic>
         <p:nvPicPr>
-          <p:cNvPr id="6" name="Picture 5">
+          <p:cNvPr id="3" name="Picture 2">
             <a:extLst>
               <a:ext uri="{FF2B5EF4-FFF2-40B4-BE49-F238E27FC236}">
-                <a16:creationId xmlns:a16="http://schemas.microsoft.com/office/drawing/2014/main" id="{10B60FC4-F108-4E7C-9DB9-39A4060159C5}"/>
+                <a16:creationId xmlns:a16="http://schemas.microsoft.com/office/drawing/2014/main" id="{356F32C5-ECA5-741B-B523-718D0ED81107}"/>
               </a:ext>
             </a:extLst>
           </p:cNvPr>
@@ -14563,8 +14563,8 @@
         </p:blipFill>
         <p:spPr>
           <a:xfrm>
-            <a:off x="8602286" y="694482"/>
-            <a:ext cx="2415749" cy="868755"/>
+            <a:off x="7712152" y="2246637"/>
+            <a:ext cx="3781953" cy="1114581"/>
           </a:xfrm>
           <a:prstGeom prst="rect">
             <a:avLst/>
@@ -14603,10 +14603,10 @@
       </p:grpSpPr>
       <p:pic>
         <p:nvPicPr>
-          <p:cNvPr id="4" name="Picture 3">
+          <p:cNvPr id="5" name="Picture 4">
             <a:extLst>
               <a:ext uri="{FF2B5EF4-FFF2-40B4-BE49-F238E27FC236}">
-                <a16:creationId xmlns:a16="http://schemas.microsoft.com/office/drawing/2014/main" id="{4278C883-202D-4899-9983-4CEA0F37A28D}"/>
+                <a16:creationId xmlns:a16="http://schemas.microsoft.com/office/drawing/2014/main" id="{62FB7946-3FA7-46B3-8E70-D014D882C1E0}"/>
               </a:ext>
             </a:extLst>
           </p:cNvPr>
@@ -14623,8 +14623,8 @@
         </p:blipFill>
         <p:spPr>
           <a:xfrm>
-            <a:off x="7428288" y="2613587"/>
-            <a:ext cx="2095682" cy="1630821"/>
+            <a:off x="2492331" y="2476416"/>
+            <a:ext cx="1882303" cy="1905165"/>
           </a:xfrm>
           <a:prstGeom prst="rect">
             <a:avLst/>
@@ -14633,10 +14633,10 @@
       </p:pic>
       <p:pic>
         <p:nvPicPr>
-          <p:cNvPr id="5" name="Picture 4">
+          <p:cNvPr id="3" name="Picture 2">
             <a:extLst>
               <a:ext uri="{FF2B5EF4-FFF2-40B4-BE49-F238E27FC236}">
-                <a16:creationId xmlns:a16="http://schemas.microsoft.com/office/drawing/2014/main" id="{62FB7946-3FA7-46B3-8E70-D014D882C1E0}"/>
+                <a16:creationId xmlns:a16="http://schemas.microsoft.com/office/drawing/2014/main" id="{1A3C7650-DE4B-3BCD-BBB0-5F5A4F0C9B8D}"/>
               </a:ext>
             </a:extLst>
           </p:cNvPr>
@@ -14653,8 +14653,8 @@
         </p:blipFill>
         <p:spPr>
           <a:xfrm>
-            <a:off x="2492331" y="2476416"/>
-            <a:ext cx="1882303" cy="1905165"/>
+            <a:off x="7158126" y="2738339"/>
+            <a:ext cx="2181529" cy="1381318"/>
           </a:xfrm>
           <a:prstGeom prst="rect">
             <a:avLst/>

</xml_diff>

<commit_message>
Updated Illustrations powerpoint for 0.0.4
</commit_message>
<xml_diff>
--- a/illustrations.pptx
+++ b/illustrations.pptx
@@ -9354,10 +9354,10 @@
       </p:grpSpPr>
       <p:pic>
         <p:nvPicPr>
-          <p:cNvPr id="4" name="Picture 3">
+          <p:cNvPr id="3" name="Picture 2">
             <a:extLst>
               <a:ext uri="{FF2B5EF4-FFF2-40B4-BE49-F238E27FC236}">
-                <a16:creationId xmlns:a16="http://schemas.microsoft.com/office/drawing/2014/main" id="{1660FA1E-6C28-40FB-883A-7DE1E0287A97}"/>
+                <a16:creationId xmlns:a16="http://schemas.microsoft.com/office/drawing/2014/main" id="{94126282-6B4C-C14D-2FA2-2878F68EAC1C}"/>
               </a:ext>
             </a:extLst>
           </p:cNvPr>
@@ -9374,8 +9374,8 @@
         </p:blipFill>
         <p:spPr>
           <a:xfrm>
-            <a:off x="4362450" y="2524125"/>
-            <a:ext cx="3467100" cy="1809750"/>
+            <a:off x="7535994" y="1766782"/>
+            <a:ext cx="2143424" cy="1514686"/>
           </a:xfrm>
           <a:prstGeom prst="rect">
             <a:avLst/>

</xml_diff>

<commit_message>
Doc updates for 0.0.6
</commit_message>
<xml_diff>
--- a/illustrations.pptx
+++ b/illustrations.pptx
@@ -5,7 +5,7 @@
     <p:sldMasterId id="2147483648" r:id="rId1"/>
   </p:sldMasterIdLst>
   <p:notesMasterIdLst>
-    <p:notesMasterId r:id="rId23"/>
+    <p:notesMasterId r:id="rId24"/>
   </p:notesMasterIdLst>
   <p:sldIdLst>
     <p:sldId id="256" r:id="rId2"/>
@@ -27,8 +27,9 @@
     <p:sldId id="271" r:id="rId18"/>
     <p:sldId id="272" r:id="rId19"/>
     <p:sldId id="273" r:id="rId20"/>
-    <p:sldId id="274" r:id="rId21"/>
-    <p:sldId id="276" r:id="rId22"/>
+    <p:sldId id="277" r:id="rId21"/>
+    <p:sldId id="274" r:id="rId22"/>
+    <p:sldId id="276" r:id="rId23"/>
   </p:sldIdLst>
   <p:sldSz cx="12192000" cy="6858000"/>
   <p:notesSz cx="6858000" cy="9144000"/>
@@ -217,7 +218,7 @@
           <a:p>
             <a:fld id="{62B5D429-15EF-4A8F-AA09-BECBB0A557A5}" type="datetimeFigureOut">
               <a:rPr lang="en-IN" smtClean="0"/>
-              <a:t>12-01-2023</a:t>
+              <a:t>06-03-2023</a:t>
             </a:fld>
             <a:endParaRPr lang="en-IN"/>
           </a:p>
@@ -2765,66 +2766,24 @@
           <a:lstStyle/>
           <a:p>
             <a:r>
-              <a:rPr lang="en-US" b="0" dirty="0">
-                <a:solidFill>
-                  <a:srgbClr val="C586C0"/>
-                </a:solidFill>
-                <a:effectLst/>
-                <a:latin typeface="Consolas" panose="020B0609020204030204" pitchFamily="49" charset="0"/>
-              </a:rPr>
-              <a:t>protocol</a:t>
-            </a:r>
-            <a:r>
-              <a:rPr lang="en-US" b="0" dirty="0">
-                <a:solidFill>
-                  <a:srgbClr val="D4D4D4"/>
-                </a:solidFill>
-                <a:effectLst/>
-                <a:latin typeface="Consolas" panose="020B0609020204030204" pitchFamily="49" charset="0"/>
-              </a:rPr>
-              <a:t> </a:t>
-            </a:r>
-            <a:r>
-              <a:rPr lang="en-US" b="0" dirty="0" err="1">
-                <a:solidFill>
-                  <a:srgbClr val="D4D4D4"/>
-                </a:solidFill>
-                <a:effectLst/>
-                <a:latin typeface="Consolas" panose="020B0609020204030204" pitchFamily="49" charset="0"/>
-              </a:rPr>
-              <a:t>ComEvents</a:t>
-            </a:r>
-            <a:r>
-              <a:rPr lang="en-US" b="0" dirty="0">
-                <a:solidFill>
-                  <a:srgbClr val="D4D4D4"/>
-                </a:solidFill>
-                <a:effectLst/>
-                <a:latin typeface="Consolas" panose="020B0609020204030204" pitchFamily="49" charset="0"/>
-              </a:rPr>
-              <a:t> {</a:t>
-            </a:r>
-          </a:p>
-          <a:p>
-            <a:r>
-              <a:rPr lang="en-US" b="0" dirty="0">
-                <a:solidFill>
-                  <a:srgbClr val="D4D4D4"/>
-                </a:solidFill>
-                <a:effectLst/>
-                <a:latin typeface="Consolas" panose="020B0609020204030204" pitchFamily="49" charset="0"/>
-              </a:rPr>
-              <a:t>    </a:t>
-            </a:r>
-            <a:r>
-              <a:rPr lang="en-US" b="0" dirty="0">
-                <a:solidFill>
-                  <a:srgbClr val="6A9955"/>
-                </a:solidFill>
-                <a:effectLst/>
-                <a:latin typeface="Consolas" panose="020B0609020204030204" pitchFamily="49" charset="0"/>
-              </a:rPr>
-              <a:t>/* In Events */</a:t>
+              <a:rPr lang="en-US" b="1" dirty="0">
+                <a:solidFill>
+                  <a:srgbClr val="AA46EC"/>
+                </a:solidFill>
+                <a:effectLst/>
+                <a:latin typeface="Consolas" panose="020B0609020204030204" pitchFamily="49" charset="0"/>
+              </a:rPr>
+              <a:t>capsule</a:t>
+            </a:r>
+            <a:r>
+              <a:rPr lang="en-US" b="1" dirty="0">
+                <a:solidFill>
+                  <a:srgbClr val="D4D4D4"/>
+                </a:solidFill>
+                <a:effectLst/>
+                <a:latin typeface="Consolas" panose="020B0609020204030204" pitchFamily="49" charset="0"/>
+              </a:rPr>
+              <a:t> BPPI {    </a:t>
             </a:r>
             <a:endParaRPr lang="en-US" b="0" dirty="0">
               <a:solidFill>
@@ -2836,7 +2795,7 @@
           </a:p>
           <a:p>
             <a:r>
-              <a:rPr lang="en-US" b="0" dirty="0">
+              <a:rPr lang="en-US" b="1" dirty="0">
                 <a:solidFill>
                   <a:srgbClr val="D4D4D4"/>
                 </a:solidFill>
@@ -2846,14 +2805,44 @@
               <a:t>    </a:t>
             </a:r>
             <a:r>
-              <a:rPr lang="en-US" b="0" dirty="0">
-                <a:solidFill>
-                  <a:srgbClr val="6A9955"/>
-                </a:solidFill>
-                <a:effectLst/>
-                <a:latin typeface="Consolas" panose="020B0609020204030204" pitchFamily="49" charset="0"/>
-              </a:rPr>
-              <a:t>/* Out Events */</a:t>
+              <a:rPr lang="en-US" b="1" dirty="0">
+                <a:solidFill>
+                  <a:srgbClr val="AA46EC"/>
+                </a:solidFill>
+                <a:effectLst/>
+                <a:latin typeface="Consolas" panose="020B0609020204030204" pitchFamily="49" charset="0"/>
+              </a:rPr>
+              <a:t>service</a:t>
+            </a:r>
+            <a:r>
+              <a:rPr lang="en-US" b="1" dirty="0">
+                <a:solidFill>
+                  <a:srgbClr val="D4D4D4"/>
+                </a:solidFill>
+                <a:effectLst/>
+                <a:latin typeface="Consolas" panose="020B0609020204030204" pitchFamily="49" charset="0"/>
+              </a:rPr>
+              <a:t> </a:t>
+            </a:r>
+            <a:r>
+              <a:rPr lang="en-US" b="1" dirty="0">
+                <a:solidFill>
+                  <a:srgbClr val="AA46EC"/>
+                </a:solidFill>
+                <a:effectLst/>
+                <a:latin typeface="Consolas" panose="020B0609020204030204" pitchFamily="49" charset="0"/>
+              </a:rPr>
+              <a:t>port</a:t>
+            </a:r>
+            <a:r>
+              <a:rPr lang="en-US" b="1" dirty="0">
+                <a:solidFill>
+                  <a:srgbClr val="D4D4D4"/>
+                </a:solidFill>
+                <a:effectLst/>
+                <a:latin typeface="Consolas" panose="020B0609020204030204" pitchFamily="49" charset="0"/>
+              </a:rPr>
+              <a:t> port1 : PR1;    </a:t>
             </a:r>
             <a:endParaRPr lang="en-US" b="0" dirty="0">
               <a:solidFill>
@@ -2865,60 +2854,27 @@
           </a:p>
           <a:p>
             <a:r>
-              <a:rPr lang="en-US" b="0" dirty="0">
-                <a:solidFill>
-                  <a:srgbClr val="D4D4D4"/>
-                </a:solidFill>
-                <a:effectLst/>
-                <a:latin typeface="Consolas" panose="020B0609020204030204" pitchFamily="49" charset="0"/>
-              </a:rPr>
-              <a:t>};</a:t>
-            </a:r>
-          </a:p>
-          <a:p>
-            <a:br>
-              <a:rPr lang="en-US" b="0" dirty="0">
-                <a:solidFill>
-                  <a:srgbClr val="D4D4D4"/>
-                </a:solidFill>
-                <a:effectLst/>
-                <a:latin typeface="Consolas" panose="020B0609020204030204" pitchFamily="49" charset="0"/>
-              </a:rPr>
-            </a:br>
-            <a:r>
-              <a:rPr lang="en-US" b="0" dirty="0">
-                <a:solidFill>
-                  <a:srgbClr val="C586C0"/>
-                </a:solidFill>
-                <a:effectLst/>
-                <a:latin typeface="Consolas" panose="020B0609020204030204" pitchFamily="49" charset="0"/>
-              </a:rPr>
-              <a:t>capsule</a:t>
-            </a:r>
-            <a:r>
-              <a:rPr lang="en-US" b="0" dirty="0">
-                <a:solidFill>
-                  <a:srgbClr val="D4D4D4"/>
-                </a:solidFill>
-                <a:effectLst/>
-                <a:latin typeface="Consolas" panose="020B0609020204030204" pitchFamily="49" charset="0"/>
-              </a:rPr>
-              <a:t> Server {</a:t>
-            </a:r>
-          </a:p>
-          <a:p>
-            <a:r>
-              <a:rPr lang="en-US" b="0" dirty="0">
-                <a:solidFill>
-                  <a:srgbClr val="C586C0"/>
-                </a:solidFill>
-                <a:effectLst/>
-                <a:latin typeface="Consolas" panose="020B0609020204030204" pitchFamily="49" charset="0"/>
-              </a:rPr>
-              <a:t>service</a:t>
-            </a:r>
-            <a:r>
-              <a:rPr lang="en-US" b="0" dirty="0">
+              <a:rPr lang="en-US" b="1" dirty="0">
+                <a:solidFill>
+                  <a:srgbClr val="D4D4D4"/>
+                </a:solidFill>
+                <a:effectLst/>
+                <a:latin typeface="Consolas" panose="020B0609020204030204" pitchFamily="49" charset="0"/>
+              </a:rPr>
+              <a:t>    </a:t>
+            </a:r>
+            <a:r>
+              <a:rPr lang="en-US" b="1" dirty="0">
+                <a:solidFill>
+                  <a:srgbClr val="AA46EC"/>
+                </a:solidFill>
+                <a:effectLst/>
+                <a:latin typeface="Consolas" panose="020B0609020204030204" pitchFamily="49" charset="0"/>
+              </a:rPr>
+              <a:t>behavior</a:t>
+            </a:r>
+            <a:r>
+              <a:rPr lang="en-US" b="1" dirty="0">
                 <a:solidFill>
                   <a:srgbClr val="D4D4D4"/>
                 </a:solidFill>
@@ -2928,9 +2884,9 @@
               <a:t> </a:t>
             </a:r>
             <a:r>
-              <a:rPr lang="en-US" b="0" dirty="0">
-                <a:solidFill>
-                  <a:srgbClr val="C586C0"/>
+              <a:rPr lang="en-US" b="1" dirty="0">
+                <a:solidFill>
+                  <a:srgbClr val="AA46EC"/>
                 </a:solidFill>
                 <a:effectLst/>
                 <a:latin typeface="Consolas" panose="020B0609020204030204" pitchFamily="49" charset="0"/>
@@ -2938,46 +2894,14 @@
               <a:t>port</a:t>
             </a:r>
             <a:r>
-              <a:rPr lang="en-US" b="0" dirty="0">
-                <a:solidFill>
-                  <a:srgbClr val="D4D4D4"/>
-                </a:solidFill>
-                <a:effectLst/>
-                <a:latin typeface="Consolas" panose="020B0609020204030204" pitchFamily="49" charset="0"/>
-              </a:rPr>
-              <a:t> clients : </a:t>
-            </a:r>
-            <a:r>
-              <a:rPr lang="en-US" b="0" dirty="0" err="1">
-                <a:solidFill>
-                  <a:srgbClr val="D4D4D4"/>
-                </a:solidFill>
-                <a:effectLst/>
-                <a:latin typeface="Consolas" panose="020B0609020204030204" pitchFamily="49" charset="0"/>
-              </a:rPr>
-              <a:t>ComEvents</a:t>
-            </a:r>
-            <a:r>
-              <a:rPr lang="en-US" b="0" dirty="0">
-                <a:solidFill>
-                  <a:srgbClr val="D4D4D4"/>
-                </a:solidFill>
-                <a:effectLst/>
-                <a:latin typeface="Consolas" panose="020B0609020204030204" pitchFamily="49" charset="0"/>
-              </a:rPr>
-              <a:t>[100];</a:t>
-            </a:r>
-          </a:p>
-          <a:p>
-            <a:r>
-              <a:rPr lang="en-US" b="0" dirty="0">
-                <a:solidFill>
-                  <a:srgbClr val="6A9955"/>
-                </a:solidFill>
-                <a:effectLst/>
-                <a:latin typeface="Consolas" panose="020B0609020204030204" pitchFamily="49" charset="0"/>
-              </a:rPr>
-              <a:t>// ...</a:t>
+              <a:rPr lang="en-US" b="1" dirty="0">
+                <a:solidFill>
+                  <a:srgbClr val="D4D4D4"/>
+                </a:solidFill>
+                <a:effectLst/>
+                <a:latin typeface="Consolas" panose="020B0609020204030204" pitchFamily="49" charset="0"/>
+              </a:rPr>
+              <a:t> port2 : PR1;    </a:t>
             </a:r>
             <a:endParaRPr lang="en-US" b="0" dirty="0">
               <a:solidFill>
@@ -2989,33 +2913,729 @@
           </a:p>
           <a:p>
             <a:r>
-              <a:rPr lang="en-US" b="0" dirty="0">
-                <a:solidFill>
-                  <a:srgbClr val="D4D4D4"/>
-                </a:solidFill>
-                <a:effectLst/>
-                <a:latin typeface="Consolas" panose="020B0609020204030204" pitchFamily="49" charset="0"/>
-              </a:rPr>
-              <a:t>};</a:t>
-            </a:r>
-          </a:p>
-          <a:p>
-            <a:br>
-              <a:rPr lang="en-US" b="0">
-                <a:solidFill>
-                  <a:srgbClr val="D4D4D4"/>
-                </a:solidFill>
-                <a:effectLst/>
-                <a:latin typeface="Consolas" panose="020B0609020204030204" pitchFamily="49" charset="0"/>
-              </a:rPr>
-            </a:br>
-            <a:endParaRPr lang="en-US" b="0">
+              <a:rPr lang="en-US" b="1" dirty="0">
+                <a:solidFill>
+                  <a:srgbClr val="D4D4D4"/>
+                </a:solidFill>
+                <a:effectLst/>
+                <a:latin typeface="Consolas" panose="020B0609020204030204" pitchFamily="49" charset="0"/>
+              </a:rPr>
+              <a:t>    </a:t>
+            </a:r>
+            <a:r>
+              <a:rPr lang="en-US" b="1" dirty="0">
+                <a:solidFill>
+                  <a:srgbClr val="AA46EC"/>
+                </a:solidFill>
+                <a:effectLst/>
+                <a:latin typeface="Consolas" panose="020B0609020204030204" pitchFamily="49" charset="0"/>
+              </a:rPr>
+              <a:t>part</a:t>
+            </a:r>
+            <a:r>
+              <a:rPr lang="en-US" b="1" dirty="0">
+                <a:solidFill>
+                  <a:srgbClr val="D4D4D4"/>
+                </a:solidFill>
+                <a:effectLst/>
+                <a:latin typeface="Consolas" panose="020B0609020204030204" pitchFamily="49" charset="0"/>
+              </a:rPr>
+              <a:t> part1 : Cap1;</a:t>
+            </a:r>
+            <a:endParaRPr lang="en-US" b="0" dirty="0">
               <a:solidFill>
                 <a:srgbClr val="D4D4D4"/>
               </a:solidFill>
               <a:effectLst/>
               <a:latin typeface="Consolas" panose="020B0609020204030204" pitchFamily="49" charset="0"/>
             </a:endParaRPr>
+          </a:p>
+          <a:p>
+            <a:r>
+              <a:rPr lang="en-US" b="1" dirty="0">
+                <a:solidFill>
+                  <a:srgbClr val="D4D4D4"/>
+                </a:solidFill>
+                <a:effectLst/>
+                <a:latin typeface="Consolas" panose="020B0609020204030204" pitchFamily="49" charset="0"/>
+              </a:rPr>
+              <a:t>    </a:t>
+            </a:r>
+            <a:r>
+              <a:rPr lang="en-US" b="1" dirty="0">
+                <a:solidFill>
+                  <a:srgbClr val="AA46EC"/>
+                </a:solidFill>
+                <a:effectLst/>
+                <a:latin typeface="Consolas" panose="020B0609020204030204" pitchFamily="49" charset="0"/>
+              </a:rPr>
+              <a:t>part</a:t>
+            </a:r>
+            <a:r>
+              <a:rPr lang="en-US" b="1" dirty="0">
+                <a:solidFill>
+                  <a:srgbClr val="D4D4D4"/>
+                </a:solidFill>
+                <a:effectLst/>
+                <a:latin typeface="Consolas" panose="020B0609020204030204" pitchFamily="49" charset="0"/>
+              </a:rPr>
+              <a:t> part2 : Cap1;</a:t>
+            </a:r>
+            <a:endParaRPr lang="en-US" b="0" dirty="0">
+              <a:solidFill>
+                <a:srgbClr val="D4D4D4"/>
+              </a:solidFill>
+              <a:effectLst/>
+              <a:latin typeface="Consolas" panose="020B0609020204030204" pitchFamily="49" charset="0"/>
+            </a:endParaRPr>
+          </a:p>
+          <a:p>
+            <a:r>
+              <a:rPr lang="en-US" b="1" dirty="0">
+                <a:solidFill>
+                  <a:srgbClr val="D4D4D4"/>
+                </a:solidFill>
+                <a:effectLst/>
+                <a:latin typeface="Consolas" panose="020B0609020204030204" pitchFamily="49" charset="0"/>
+              </a:rPr>
+              <a:t>    </a:t>
+            </a:r>
+            <a:r>
+              <a:rPr lang="en-US" b="1" dirty="0" err="1">
+                <a:solidFill>
+                  <a:srgbClr val="AA46EC"/>
+                </a:solidFill>
+                <a:effectLst/>
+                <a:latin typeface="Consolas" panose="020B0609020204030204" pitchFamily="49" charset="0"/>
+              </a:rPr>
+              <a:t>statemachine</a:t>
+            </a:r>
+            <a:r>
+              <a:rPr lang="en-US" b="1" dirty="0">
+                <a:solidFill>
+                  <a:srgbClr val="D4D4D4"/>
+                </a:solidFill>
+                <a:effectLst/>
+                <a:latin typeface="Consolas" panose="020B0609020204030204" pitchFamily="49" charset="0"/>
+              </a:rPr>
+              <a:t> {</a:t>
+            </a:r>
+            <a:endParaRPr lang="en-US" b="0" dirty="0">
+              <a:solidFill>
+                <a:srgbClr val="D4D4D4"/>
+              </a:solidFill>
+              <a:effectLst/>
+              <a:latin typeface="Consolas" panose="020B0609020204030204" pitchFamily="49" charset="0"/>
+            </a:endParaRPr>
+          </a:p>
+          <a:p>
+            <a:r>
+              <a:rPr lang="en-US" b="1" dirty="0">
+                <a:solidFill>
+                  <a:srgbClr val="D4D4D4"/>
+                </a:solidFill>
+                <a:effectLst/>
+                <a:latin typeface="Consolas" panose="020B0609020204030204" pitchFamily="49" charset="0"/>
+              </a:rPr>
+              <a:t>        </a:t>
+            </a:r>
+            <a:r>
+              <a:rPr lang="en-US" b="1" dirty="0">
+                <a:solidFill>
+                  <a:srgbClr val="AA46EC"/>
+                </a:solidFill>
+                <a:effectLst/>
+                <a:latin typeface="Consolas" panose="020B0609020204030204" pitchFamily="49" charset="0"/>
+              </a:rPr>
+              <a:t>state</a:t>
+            </a:r>
+            <a:r>
+              <a:rPr lang="en-US" b="1" dirty="0">
+                <a:solidFill>
+                  <a:srgbClr val="D4D4D4"/>
+                </a:solidFill>
+                <a:effectLst/>
+                <a:latin typeface="Consolas" panose="020B0609020204030204" pitchFamily="49" charset="0"/>
+              </a:rPr>
+              <a:t> </a:t>
+            </a:r>
+            <a:r>
+              <a:rPr lang="en-US" b="1" dirty="0" err="1">
+                <a:solidFill>
+                  <a:srgbClr val="D4D4D4"/>
+                </a:solidFill>
+                <a:effectLst/>
+                <a:latin typeface="Consolas" panose="020B0609020204030204" pitchFamily="49" charset="0"/>
+              </a:rPr>
+              <a:t>State</a:t>
+            </a:r>
+            <a:r>
+              <a:rPr lang="en-US" b="1" dirty="0">
+                <a:solidFill>
+                  <a:srgbClr val="D4D4D4"/>
+                </a:solidFill>
+                <a:effectLst/>
+                <a:latin typeface="Consolas" panose="020B0609020204030204" pitchFamily="49" charset="0"/>
+              </a:rPr>
+              <a:t>;</a:t>
+            </a:r>
+            <a:endParaRPr lang="en-US" b="0" dirty="0">
+              <a:solidFill>
+                <a:srgbClr val="D4D4D4"/>
+              </a:solidFill>
+              <a:effectLst/>
+              <a:latin typeface="Consolas" panose="020B0609020204030204" pitchFamily="49" charset="0"/>
+            </a:endParaRPr>
+          </a:p>
+          <a:p>
+            <a:r>
+              <a:rPr lang="en-US" b="1" dirty="0">
+                <a:solidFill>
+                  <a:srgbClr val="D4D4D4"/>
+                </a:solidFill>
+                <a:effectLst/>
+                <a:latin typeface="Consolas" panose="020B0609020204030204" pitchFamily="49" charset="0"/>
+              </a:rPr>
+              <a:t>        </a:t>
+            </a:r>
+            <a:r>
+              <a:rPr lang="en-US" b="1" dirty="0">
+                <a:solidFill>
+                  <a:srgbClr val="AA46EC"/>
+                </a:solidFill>
+                <a:effectLst/>
+                <a:latin typeface="Consolas" panose="020B0609020204030204" pitchFamily="49" charset="0"/>
+              </a:rPr>
+              <a:t>initial</a:t>
+            </a:r>
+            <a:r>
+              <a:rPr lang="en-US" b="1" dirty="0">
+                <a:solidFill>
+                  <a:srgbClr val="D4D4D4"/>
+                </a:solidFill>
+                <a:effectLst/>
+                <a:latin typeface="Consolas" panose="020B0609020204030204" pitchFamily="49" charset="0"/>
+              </a:rPr>
+              <a:t> -&gt; State;</a:t>
+            </a:r>
+            <a:endParaRPr lang="en-US" b="0" dirty="0">
+              <a:solidFill>
+                <a:srgbClr val="D4D4D4"/>
+              </a:solidFill>
+              <a:effectLst/>
+              <a:latin typeface="Consolas" panose="020B0609020204030204" pitchFamily="49" charset="0"/>
+            </a:endParaRPr>
+          </a:p>
+          <a:p>
+            <a:r>
+              <a:rPr lang="en-US" b="1" dirty="0">
+                <a:solidFill>
+                  <a:srgbClr val="D4D4D4"/>
+                </a:solidFill>
+                <a:effectLst/>
+                <a:latin typeface="Consolas" panose="020B0609020204030204" pitchFamily="49" charset="0"/>
+              </a:rPr>
+              <a:t>    };</a:t>
+            </a:r>
+            <a:endParaRPr lang="en-US" b="0" dirty="0">
+              <a:solidFill>
+                <a:srgbClr val="D4D4D4"/>
+              </a:solidFill>
+              <a:effectLst/>
+              <a:latin typeface="Consolas" panose="020B0609020204030204" pitchFamily="49" charset="0"/>
+            </a:endParaRPr>
+          </a:p>
+          <a:p>
+            <a:r>
+              <a:rPr lang="en-US" b="1" dirty="0">
+                <a:solidFill>
+                  <a:srgbClr val="D4D4D4"/>
+                </a:solidFill>
+                <a:effectLst/>
+                <a:latin typeface="Consolas" panose="020B0609020204030204" pitchFamily="49" charset="0"/>
+              </a:rPr>
+              <a:t>};</a:t>
+            </a:r>
+            <a:endParaRPr lang="en-US" b="0" dirty="0">
+              <a:solidFill>
+                <a:srgbClr val="D4D4D4"/>
+              </a:solidFill>
+              <a:effectLst/>
+              <a:latin typeface="Consolas" panose="020B0609020204030204" pitchFamily="49" charset="0"/>
+            </a:endParaRPr>
+          </a:p>
+          <a:p>
+            <a:br>
+              <a:rPr lang="en-US" b="0" dirty="0">
+                <a:solidFill>
+                  <a:srgbClr val="D4D4D4"/>
+                </a:solidFill>
+                <a:effectLst/>
+                <a:latin typeface="Consolas" panose="020B0609020204030204" pitchFamily="49" charset="0"/>
+              </a:rPr>
+            </a:br>
+            <a:r>
+              <a:rPr lang="en-US" b="1" dirty="0">
+                <a:solidFill>
+                  <a:srgbClr val="AA46EC"/>
+                </a:solidFill>
+                <a:effectLst/>
+                <a:latin typeface="Consolas" panose="020B0609020204030204" pitchFamily="49" charset="0"/>
+              </a:rPr>
+              <a:t>capsule</a:t>
+            </a:r>
+            <a:r>
+              <a:rPr lang="en-US" b="1" dirty="0">
+                <a:solidFill>
+                  <a:srgbClr val="D4D4D4"/>
+                </a:solidFill>
+                <a:effectLst/>
+                <a:latin typeface="Consolas" panose="020B0609020204030204" pitchFamily="49" charset="0"/>
+              </a:rPr>
+              <a:t> DPPI : BPPI {</a:t>
+            </a:r>
+            <a:endParaRPr lang="en-US" b="0" dirty="0">
+              <a:solidFill>
+                <a:srgbClr val="D4D4D4"/>
+              </a:solidFill>
+              <a:effectLst/>
+              <a:latin typeface="Consolas" panose="020B0609020204030204" pitchFamily="49" charset="0"/>
+            </a:endParaRPr>
+          </a:p>
+          <a:p>
+            <a:r>
+              <a:rPr lang="en-US" b="1" dirty="0">
+                <a:solidFill>
+                  <a:srgbClr val="D4D4D4"/>
+                </a:solidFill>
+                <a:effectLst/>
+                <a:latin typeface="Consolas" panose="020B0609020204030204" pitchFamily="49" charset="0"/>
+              </a:rPr>
+              <a:t>    </a:t>
+            </a:r>
+            <a:r>
+              <a:rPr lang="en-US" b="1" dirty="0">
+                <a:solidFill>
+                  <a:srgbClr val="AA46EC"/>
+                </a:solidFill>
+                <a:effectLst/>
+                <a:latin typeface="Consolas" panose="020B0609020204030204" pitchFamily="49" charset="0"/>
+              </a:rPr>
+              <a:t>service</a:t>
+            </a:r>
+            <a:r>
+              <a:rPr lang="en-US" b="1" dirty="0">
+                <a:solidFill>
+                  <a:srgbClr val="D4D4D4"/>
+                </a:solidFill>
+                <a:effectLst/>
+                <a:latin typeface="Consolas" panose="020B0609020204030204" pitchFamily="49" charset="0"/>
+              </a:rPr>
+              <a:t> </a:t>
+            </a:r>
+            <a:r>
+              <a:rPr lang="en-US" b="1" dirty="0">
+                <a:solidFill>
+                  <a:srgbClr val="AA46EC"/>
+                </a:solidFill>
+                <a:effectLst/>
+                <a:latin typeface="Consolas" panose="020B0609020204030204" pitchFamily="49" charset="0"/>
+              </a:rPr>
+              <a:t>notify</a:t>
+            </a:r>
+            <a:r>
+              <a:rPr lang="en-US" b="1" dirty="0">
+                <a:solidFill>
+                  <a:srgbClr val="D4D4D4"/>
+                </a:solidFill>
+                <a:effectLst/>
+                <a:latin typeface="Consolas" panose="020B0609020204030204" pitchFamily="49" charset="0"/>
+              </a:rPr>
+              <a:t> </a:t>
+            </a:r>
+            <a:r>
+              <a:rPr lang="en-US" b="1" dirty="0">
+                <a:solidFill>
+                  <a:srgbClr val="AA46EC"/>
+                </a:solidFill>
+                <a:effectLst/>
+                <a:latin typeface="Consolas" panose="020B0609020204030204" pitchFamily="49" charset="0"/>
+              </a:rPr>
+              <a:t>port</a:t>
+            </a:r>
+            <a:r>
+              <a:rPr lang="en-US" b="1" dirty="0">
+                <a:solidFill>
+                  <a:srgbClr val="D4D4D4"/>
+                </a:solidFill>
+                <a:effectLst/>
+                <a:latin typeface="Consolas" panose="020B0609020204030204" pitchFamily="49" charset="0"/>
+              </a:rPr>
+              <a:t> </a:t>
+            </a:r>
+            <a:r>
+              <a:rPr lang="en-US" b="1" dirty="0">
+                <a:solidFill>
+                  <a:srgbClr val="AA46EC"/>
+                </a:solidFill>
+                <a:effectLst/>
+                <a:latin typeface="Consolas" panose="020B0609020204030204" pitchFamily="49" charset="0"/>
+              </a:rPr>
+              <a:t>redefine</a:t>
+            </a:r>
+            <a:r>
+              <a:rPr lang="en-US" b="1" dirty="0">
+                <a:solidFill>
+                  <a:srgbClr val="D4D4D4"/>
+                </a:solidFill>
+                <a:effectLst/>
+                <a:latin typeface="Consolas" panose="020B0609020204030204" pitchFamily="49" charset="0"/>
+              </a:rPr>
+              <a:t> port1 : PR2[10];</a:t>
+            </a:r>
+            <a:endParaRPr lang="en-US" b="0" dirty="0">
+              <a:solidFill>
+                <a:srgbClr val="D4D4D4"/>
+              </a:solidFill>
+              <a:effectLst/>
+              <a:latin typeface="Consolas" panose="020B0609020204030204" pitchFamily="49" charset="0"/>
+            </a:endParaRPr>
+          </a:p>
+          <a:p>
+            <a:r>
+              <a:rPr lang="en-US" b="1" dirty="0">
+                <a:solidFill>
+                  <a:srgbClr val="D4D4D4"/>
+                </a:solidFill>
+                <a:effectLst/>
+                <a:latin typeface="Consolas" panose="020B0609020204030204" pitchFamily="49" charset="0"/>
+              </a:rPr>
+              <a:t>    </a:t>
+            </a:r>
+            <a:r>
+              <a:rPr lang="en-US" b="1" dirty="0">
+                <a:solidFill>
+                  <a:srgbClr val="AA46EC"/>
+                </a:solidFill>
+                <a:effectLst/>
+                <a:latin typeface="Consolas" panose="020B0609020204030204" pitchFamily="49" charset="0"/>
+              </a:rPr>
+              <a:t>optional</a:t>
+            </a:r>
+            <a:r>
+              <a:rPr lang="en-US" b="1" dirty="0">
+                <a:solidFill>
+                  <a:srgbClr val="D4D4D4"/>
+                </a:solidFill>
+                <a:effectLst/>
+                <a:latin typeface="Consolas" panose="020B0609020204030204" pitchFamily="49" charset="0"/>
+              </a:rPr>
+              <a:t> </a:t>
+            </a:r>
+            <a:r>
+              <a:rPr lang="en-US" b="1" dirty="0">
+                <a:solidFill>
+                  <a:srgbClr val="AA46EC"/>
+                </a:solidFill>
+                <a:effectLst/>
+                <a:latin typeface="Consolas" panose="020B0609020204030204" pitchFamily="49" charset="0"/>
+              </a:rPr>
+              <a:t>part</a:t>
+            </a:r>
+            <a:r>
+              <a:rPr lang="en-US" b="1" dirty="0">
+                <a:solidFill>
+                  <a:srgbClr val="D4D4D4"/>
+                </a:solidFill>
+                <a:effectLst/>
+                <a:latin typeface="Consolas" panose="020B0609020204030204" pitchFamily="49" charset="0"/>
+              </a:rPr>
+              <a:t> </a:t>
+            </a:r>
+            <a:r>
+              <a:rPr lang="en-US" b="1" dirty="0">
+                <a:solidFill>
+                  <a:srgbClr val="AA46EC"/>
+                </a:solidFill>
+                <a:effectLst/>
+                <a:latin typeface="Consolas" panose="020B0609020204030204" pitchFamily="49" charset="0"/>
+              </a:rPr>
+              <a:t>redefine</a:t>
+            </a:r>
+            <a:r>
+              <a:rPr lang="en-US" b="1" dirty="0">
+                <a:solidFill>
+                  <a:srgbClr val="D4D4D4"/>
+                </a:solidFill>
+                <a:effectLst/>
+                <a:latin typeface="Consolas" panose="020B0609020204030204" pitchFamily="49" charset="0"/>
+              </a:rPr>
+              <a:t> part1 : Cap2[0..20];</a:t>
+            </a:r>
+            <a:endParaRPr lang="en-US" b="0" dirty="0">
+              <a:solidFill>
+                <a:srgbClr val="D4D4D4"/>
+              </a:solidFill>
+              <a:effectLst/>
+              <a:latin typeface="Consolas" panose="020B0609020204030204" pitchFamily="49" charset="0"/>
+            </a:endParaRPr>
+          </a:p>
+          <a:p>
+            <a:r>
+              <a:rPr lang="en-US" b="1" dirty="0">
+                <a:solidFill>
+                  <a:srgbClr val="D4D4D4"/>
+                </a:solidFill>
+                <a:effectLst/>
+                <a:latin typeface="Consolas" panose="020B0609020204030204" pitchFamily="49" charset="0"/>
+              </a:rPr>
+              <a:t>    </a:t>
+            </a:r>
+            <a:r>
+              <a:rPr lang="en-US" b="1" dirty="0">
+                <a:solidFill>
+                  <a:srgbClr val="AA46EC"/>
+                </a:solidFill>
+                <a:effectLst/>
+                <a:latin typeface="Consolas" panose="020B0609020204030204" pitchFamily="49" charset="0"/>
+              </a:rPr>
+              <a:t>part</a:t>
+            </a:r>
+            <a:r>
+              <a:rPr lang="en-US" b="1" dirty="0">
+                <a:solidFill>
+                  <a:srgbClr val="D4D4D4"/>
+                </a:solidFill>
+                <a:effectLst/>
+                <a:latin typeface="Consolas" panose="020B0609020204030204" pitchFamily="49" charset="0"/>
+              </a:rPr>
+              <a:t> </a:t>
+            </a:r>
+            <a:r>
+              <a:rPr lang="en-US" b="1" dirty="0">
+                <a:solidFill>
+                  <a:srgbClr val="AA46EC"/>
+                </a:solidFill>
+                <a:effectLst/>
+                <a:latin typeface="Consolas" panose="020B0609020204030204" pitchFamily="49" charset="0"/>
+              </a:rPr>
+              <a:t>exclude</a:t>
+            </a:r>
+            <a:r>
+              <a:rPr lang="en-US" b="1" dirty="0">
+                <a:solidFill>
+                  <a:srgbClr val="D4D4D4"/>
+                </a:solidFill>
+                <a:effectLst/>
+                <a:latin typeface="Consolas" panose="020B0609020204030204" pitchFamily="49" charset="0"/>
+              </a:rPr>
+              <a:t> part2;</a:t>
+            </a:r>
+            <a:endParaRPr lang="en-US" b="0" dirty="0">
+              <a:solidFill>
+                <a:srgbClr val="D4D4D4"/>
+              </a:solidFill>
+              <a:effectLst/>
+              <a:latin typeface="Consolas" panose="020B0609020204030204" pitchFamily="49" charset="0"/>
+            </a:endParaRPr>
+          </a:p>
+          <a:p>
+            <a:r>
+              <a:rPr lang="en-US" b="1" dirty="0">
+                <a:solidFill>
+                  <a:srgbClr val="D4D4D4"/>
+                </a:solidFill>
+                <a:effectLst/>
+                <a:latin typeface="Consolas" panose="020B0609020204030204" pitchFamily="49" charset="0"/>
+              </a:rPr>
+              <a:t>    </a:t>
+            </a:r>
+            <a:r>
+              <a:rPr lang="en-US" b="1" dirty="0">
+                <a:solidFill>
+                  <a:srgbClr val="AA46EC"/>
+                </a:solidFill>
+                <a:effectLst/>
+                <a:latin typeface="Consolas" panose="020B0609020204030204" pitchFamily="49" charset="0"/>
+              </a:rPr>
+              <a:t>behavior</a:t>
+            </a:r>
+            <a:r>
+              <a:rPr lang="en-US" b="1" dirty="0">
+                <a:solidFill>
+                  <a:srgbClr val="D4D4D4"/>
+                </a:solidFill>
+                <a:effectLst/>
+                <a:latin typeface="Consolas" panose="020B0609020204030204" pitchFamily="49" charset="0"/>
+              </a:rPr>
+              <a:t> </a:t>
+            </a:r>
+            <a:r>
+              <a:rPr lang="en-US" b="1" dirty="0">
+                <a:solidFill>
+                  <a:srgbClr val="AA46EC"/>
+                </a:solidFill>
+                <a:effectLst/>
+                <a:latin typeface="Consolas" panose="020B0609020204030204" pitchFamily="49" charset="0"/>
+              </a:rPr>
+              <a:t>port</a:t>
+            </a:r>
+            <a:r>
+              <a:rPr lang="en-US" b="1" dirty="0">
+                <a:solidFill>
+                  <a:srgbClr val="D4D4D4"/>
+                </a:solidFill>
+                <a:effectLst/>
+                <a:latin typeface="Consolas" panose="020B0609020204030204" pitchFamily="49" charset="0"/>
+              </a:rPr>
+              <a:t> </a:t>
+            </a:r>
+            <a:r>
+              <a:rPr lang="en-US" b="1" dirty="0">
+                <a:solidFill>
+                  <a:srgbClr val="AA46EC"/>
+                </a:solidFill>
+                <a:effectLst/>
+                <a:latin typeface="Consolas" panose="020B0609020204030204" pitchFamily="49" charset="0"/>
+              </a:rPr>
+              <a:t>exclude</a:t>
+            </a:r>
+            <a:r>
+              <a:rPr lang="en-US" b="1" dirty="0">
+                <a:solidFill>
+                  <a:srgbClr val="D4D4D4"/>
+                </a:solidFill>
+                <a:effectLst/>
+                <a:latin typeface="Consolas" panose="020B0609020204030204" pitchFamily="49" charset="0"/>
+              </a:rPr>
+              <a:t> port2;</a:t>
+            </a:r>
+            <a:endParaRPr lang="en-US" b="0" dirty="0">
+              <a:solidFill>
+                <a:srgbClr val="D4D4D4"/>
+              </a:solidFill>
+              <a:effectLst/>
+              <a:latin typeface="Consolas" panose="020B0609020204030204" pitchFamily="49" charset="0"/>
+            </a:endParaRPr>
+          </a:p>
+          <a:p>
+            <a:r>
+              <a:rPr lang="en-US" b="1" dirty="0">
+                <a:solidFill>
+                  <a:srgbClr val="D4D4D4"/>
+                </a:solidFill>
+                <a:effectLst/>
+                <a:latin typeface="Consolas" panose="020B0609020204030204" pitchFamily="49" charset="0"/>
+              </a:rPr>
+              <a:t>    </a:t>
+            </a:r>
+            <a:r>
+              <a:rPr lang="en-US" b="1" dirty="0" err="1">
+                <a:solidFill>
+                  <a:srgbClr val="AA46EC"/>
+                </a:solidFill>
+                <a:effectLst/>
+                <a:latin typeface="Consolas" panose="020B0609020204030204" pitchFamily="49" charset="0"/>
+              </a:rPr>
+              <a:t>statemachine</a:t>
+            </a:r>
+            <a:r>
+              <a:rPr lang="en-US" b="1" dirty="0">
+                <a:solidFill>
+                  <a:srgbClr val="D4D4D4"/>
+                </a:solidFill>
+                <a:effectLst/>
+                <a:latin typeface="Consolas" panose="020B0609020204030204" pitchFamily="49" charset="0"/>
+              </a:rPr>
+              <a:t> {</a:t>
+            </a:r>
+            <a:endParaRPr lang="en-US" b="0" dirty="0">
+              <a:solidFill>
+                <a:srgbClr val="D4D4D4"/>
+              </a:solidFill>
+              <a:effectLst/>
+              <a:latin typeface="Consolas" panose="020B0609020204030204" pitchFamily="49" charset="0"/>
+            </a:endParaRPr>
+          </a:p>
+          <a:p>
+            <a:r>
+              <a:rPr lang="en-US" b="1" dirty="0">
+                <a:solidFill>
+                  <a:srgbClr val="D4D4D4"/>
+                </a:solidFill>
+                <a:effectLst/>
+                <a:latin typeface="Consolas" panose="020B0609020204030204" pitchFamily="49" charset="0"/>
+              </a:rPr>
+              <a:t>        </a:t>
+            </a:r>
+            <a:r>
+              <a:rPr lang="en-US" b="1" dirty="0">
+                <a:solidFill>
+                  <a:srgbClr val="AA46EC"/>
+                </a:solidFill>
+                <a:effectLst/>
+                <a:latin typeface="Consolas" panose="020B0609020204030204" pitchFamily="49" charset="0"/>
+              </a:rPr>
+              <a:t>state</a:t>
+            </a:r>
+            <a:r>
+              <a:rPr lang="en-US" b="1" dirty="0">
+                <a:solidFill>
+                  <a:srgbClr val="D4D4D4"/>
+                </a:solidFill>
+                <a:effectLst/>
+                <a:latin typeface="Consolas" panose="020B0609020204030204" pitchFamily="49" charset="0"/>
+              </a:rPr>
+              <a:t> State2;        </a:t>
+            </a:r>
+            <a:endParaRPr lang="en-US" b="0" dirty="0">
+              <a:solidFill>
+                <a:srgbClr val="D4D4D4"/>
+              </a:solidFill>
+              <a:effectLst/>
+              <a:latin typeface="Consolas" panose="020B0609020204030204" pitchFamily="49" charset="0"/>
+            </a:endParaRPr>
+          </a:p>
+          <a:p>
+            <a:r>
+              <a:rPr lang="en-US" b="1" dirty="0">
+                <a:solidFill>
+                  <a:srgbClr val="D4D4D4"/>
+                </a:solidFill>
+                <a:effectLst/>
+                <a:latin typeface="Consolas" panose="020B0609020204030204" pitchFamily="49" charset="0"/>
+              </a:rPr>
+              <a:t>    };</a:t>
+            </a:r>
+            <a:endParaRPr lang="en-US" b="0" dirty="0">
+              <a:solidFill>
+                <a:srgbClr val="D4D4D4"/>
+              </a:solidFill>
+              <a:effectLst/>
+              <a:latin typeface="Consolas" panose="020B0609020204030204" pitchFamily="49" charset="0"/>
+            </a:endParaRPr>
+          </a:p>
+          <a:p>
+            <a:r>
+              <a:rPr lang="en-US" b="1" dirty="0">
+                <a:solidFill>
+                  <a:srgbClr val="D4D4D4"/>
+                </a:solidFill>
+                <a:effectLst/>
+                <a:latin typeface="Consolas" panose="020B0609020204030204" pitchFamily="49" charset="0"/>
+              </a:rPr>
+              <a:t>};</a:t>
+            </a:r>
+            <a:endParaRPr lang="en-US" b="0" dirty="0">
+              <a:solidFill>
+                <a:srgbClr val="D4D4D4"/>
+              </a:solidFill>
+              <a:effectLst/>
+              <a:latin typeface="Consolas" panose="020B0609020204030204" pitchFamily="49" charset="0"/>
+            </a:endParaRPr>
+          </a:p>
+          <a:p>
+            <a:endParaRPr lang="en-SE" dirty="0"/>
           </a:p>
         </p:txBody>
       </p:sp>
@@ -3037,6 +3657,341 @@
             <a:fld id="{835CED6B-7753-44FD-B82F-75125C9D9E36}" type="slidenum">
               <a:rPr lang="en-IN" smtClean="0"/>
               <a:t>20</a:t>
+            </a:fld>
+            <a:endParaRPr lang="en-IN"/>
+          </a:p>
+        </p:txBody>
+      </p:sp>
+    </p:spTree>
+    <p:extLst>
+      <p:ext uri="{BB962C8B-B14F-4D97-AF65-F5344CB8AC3E}">
+        <p14:creationId xmlns:p14="http://schemas.microsoft.com/office/powerpoint/2010/main" val="4064672299"/>
+      </p:ext>
+    </p:extLst>
+  </p:cSld>
+  <p:clrMapOvr>
+    <a:masterClrMapping/>
+  </p:clrMapOvr>
+</p:notes>
+</file>
+
+<file path=ppt/notesSlides/notesSlide16.xml><?xml version="1.0" encoding="utf-8"?>
+<p:notes xmlns:a="http://schemas.openxmlformats.org/drawingml/2006/main" xmlns:r="http://schemas.openxmlformats.org/officeDocument/2006/relationships" xmlns:p="http://schemas.openxmlformats.org/presentationml/2006/main">
+  <p:cSld>
+    <p:spTree>
+      <p:nvGrpSpPr>
+        <p:cNvPr id="1" name=""/>
+        <p:cNvGrpSpPr/>
+        <p:nvPr/>
+      </p:nvGrpSpPr>
+      <p:grpSpPr>
+        <a:xfrm>
+          <a:off x="0" y="0"/>
+          <a:ext cx="0" cy="0"/>
+          <a:chOff x="0" y="0"/>
+          <a:chExt cx="0" cy="0"/>
+        </a:xfrm>
+      </p:grpSpPr>
+      <p:sp>
+        <p:nvSpPr>
+          <p:cNvPr id="2" name="Slide Image Placeholder 1"/>
+          <p:cNvSpPr>
+            <a:spLocks noGrp="1" noRot="1" noChangeAspect="1"/>
+          </p:cNvSpPr>
+          <p:nvPr>
+            <p:ph type="sldImg"/>
+          </p:nvPr>
+        </p:nvSpPr>
+        <p:spPr/>
+      </p:sp>
+      <p:sp>
+        <p:nvSpPr>
+          <p:cNvPr id="3" name="Notes Placeholder 2"/>
+          <p:cNvSpPr>
+            <a:spLocks noGrp="1"/>
+          </p:cNvSpPr>
+          <p:nvPr>
+            <p:ph type="body" idx="1"/>
+          </p:nvPr>
+        </p:nvSpPr>
+        <p:spPr/>
+        <p:txBody>
+          <a:bodyPr/>
+          <a:lstStyle/>
+          <a:p>
+            <a:r>
+              <a:rPr lang="en-US" b="0" dirty="0">
+                <a:solidFill>
+                  <a:srgbClr val="C586C0"/>
+                </a:solidFill>
+                <a:effectLst/>
+                <a:latin typeface="Consolas" panose="020B0609020204030204" pitchFamily="49" charset="0"/>
+              </a:rPr>
+              <a:t>protocol</a:t>
+            </a:r>
+            <a:r>
+              <a:rPr lang="en-US" b="0" dirty="0">
+                <a:solidFill>
+                  <a:srgbClr val="D4D4D4"/>
+                </a:solidFill>
+                <a:effectLst/>
+                <a:latin typeface="Consolas" panose="020B0609020204030204" pitchFamily="49" charset="0"/>
+              </a:rPr>
+              <a:t> </a:t>
+            </a:r>
+            <a:r>
+              <a:rPr lang="en-US" b="0" dirty="0" err="1">
+                <a:solidFill>
+                  <a:srgbClr val="D4D4D4"/>
+                </a:solidFill>
+                <a:effectLst/>
+                <a:latin typeface="Consolas" panose="020B0609020204030204" pitchFamily="49" charset="0"/>
+              </a:rPr>
+              <a:t>ComEvents</a:t>
+            </a:r>
+            <a:r>
+              <a:rPr lang="en-US" b="0" dirty="0">
+                <a:solidFill>
+                  <a:srgbClr val="D4D4D4"/>
+                </a:solidFill>
+                <a:effectLst/>
+                <a:latin typeface="Consolas" panose="020B0609020204030204" pitchFamily="49" charset="0"/>
+              </a:rPr>
+              <a:t> {</a:t>
+            </a:r>
+          </a:p>
+          <a:p>
+            <a:r>
+              <a:rPr lang="en-US" b="0" dirty="0">
+                <a:solidFill>
+                  <a:srgbClr val="D4D4D4"/>
+                </a:solidFill>
+                <a:effectLst/>
+                <a:latin typeface="Consolas" panose="020B0609020204030204" pitchFamily="49" charset="0"/>
+              </a:rPr>
+              <a:t>    </a:t>
+            </a:r>
+            <a:r>
+              <a:rPr lang="en-US" b="0" dirty="0">
+                <a:solidFill>
+                  <a:srgbClr val="6A9955"/>
+                </a:solidFill>
+                <a:effectLst/>
+                <a:latin typeface="Consolas" panose="020B0609020204030204" pitchFamily="49" charset="0"/>
+              </a:rPr>
+              <a:t>/* In Events */</a:t>
+            </a:r>
+            <a:endParaRPr lang="en-US" b="0" dirty="0">
+              <a:solidFill>
+                <a:srgbClr val="D4D4D4"/>
+              </a:solidFill>
+              <a:effectLst/>
+              <a:latin typeface="Consolas" panose="020B0609020204030204" pitchFamily="49" charset="0"/>
+            </a:endParaRPr>
+          </a:p>
+          <a:p>
+            <a:r>
+              <a:rPr lang="en-US" b="0" dirty="0">
+                <a:solidFill>
+                  <a:srgbClr val="D4D4D4"/>
+                </a:solidFill>
+                <a:effectLst/>
+                <a:latin typeface="Consolas" panose="020B0609020204030204" pitchFamily="49" charset="0"/>
+              </a:rPr>
+              <a:t>    </a:t>
+            </a:r>
+            <a:r>
+              <a:rPr lang="en-US" b="0" dirty="0">
+                <a:solidFill>
+                  <a:srgbClr val="6A9955"/>
+                </a:solidFill>
+                <a:effectLst/>
+                <a:latin typeface="Consolas" panose="020B0609020204030204" pitchFamily="49" charset="0"/>
+              </a:rPr>
+              <a:t>/* Out Events */</a:t>
+            </a:r>
+            <a:endParaRPr lang="en-US" b="0" dirty="0">
+              <a:solidFill>
+                <a:srgbClr val="D4D4D4"/>
+              </a:solidFill>
+              <a:effectLst/>
+              <a:latin typeface="Consolas" panose="020B0609020204030204" pitchFamily="49" charset="0"/>
+            </a:endParaRPr>
+          </a:p>
+          <a:p>
+            <a:r>
+              <a:rPr lang="en-US" b="0" dirty="0">
+                <a:solidFill>
+                  <a:srgbClr val="D4D4D4"/>
+                </a:solidFill>
+                <a:effectLst/>
+                <a:latin typeface="Consolas" panose="020B0609020204030204" pitchFamily="49" charset="0"/>
+              </a:rPr>
+              <a:t>};</a:t>
+            </a:r>
+          </a:p>
+          <a:p>
+            <a:br>
+              <a:rPr lang="en-US" b="0" dirty="0">
+                <a:solidFill>
+                  <a:srgbClr val="D4D4D4"/>
+                </a:solidFill>
+                <a:effectLst/>
+                <a:latin typeface="Consolas" panose="020B0609020204030204" pitchFamily="49" charset="0"/>
+              </a:rPr>
+            </a:br>
+            <a:r>
+              <a:rPr lang="en-US" b="0" dirty="0">
+                <a:solidFill>
+                  <a:srgbClr val="C586C0"/>
+                </a:solidFill>
+                <a:effectLst/>
+                <a:latin typeface="Consolas" panose="020B0609020204030204" pitchFamily="49" charset="0"/>
+              </a:rPr>
+              <a:t>capsule</a:t>
+            </a:r>
+            <a:r>
+              <a:rPr lang="en-US" b="0" dirty="0">
+                <a:solidFill>
+                  <a:srgbClr val="D4D4D4"/>
+                </a:solidFill>
+                <a:effectLst/>
+                <a:latin typeface="Consolas" panose="020B0609020204030204" pitchFamily="49" charset="0"/>
+              </a:rPr>
+              <a:t> Server {</a:t>
+            </a:r>
+          </a:p>
+          <a:p>
+            <a:r>
+              <a:rPr lang="en-US" b="0" dirty="0">
+                <a:solidFill>
+                  <a:srgbClr val="C586C0"/>
+                </a:solidFill>
+                <a:effectLst/>
+                <a:latin typeface="Consolas" panose="020B0609020204030204" pitchFamily="49" charset="0"/>
+              </a:rPr>
+              <a:t>service</a:t>
+            </a:r>
+            <a:r>
+              <a:rPr lang="en-US" b="0" dirty="0">
+                <a:solidFill>
+                  <a:srgbClr val="D4D4D4"/>
+                </a:solidFill>
+                <a:effectLst/>
+                <a:latin typeface="Consolas" panose="020B0609020204030204" pitchFamily="49" charset="0"/>
+              </a:rPr>
+              <a:t> </a:t>
+            </a:r>
+            <a:r>
+              <a:rPr lang="en-US" b="0" dirty="0">
+                <a:solidFill>
+                  <a:srgbClr val="C586C0"/>
+                </a:solidFill>
+                <a:effectLst/>
+                <a:latin typeface="Consolas" panose="020B0609020204030204" pitchFamily="49" charset="0"/>
+              </a:rPr>
+              <a:t>port</a:t>
+            </a:r>
+            <a:r>
+              <a:rPr lang="en-US" b="0" dirty="0">
+                <a:solidFill>
+                  <a:srgbClr val="D4D4D4"/>
+                </a:solidFill>
+                <a:effectLst/>
+                <a:latin typeface="Consolas" panose="020B0609020204030204" pitchFamily="49" charset="0"/>
+              </a:rPr>
+              <a:t> clients : </a:t>
+            </a:r>
+            <a:r>
+              <a:rPr lang="en-US" b="0" dirty="0" err="1">
+                <a:solidFill>
+                  <a:srgbClr val="D4D4D4"/>
+                </a:solidFill>
+                <a:effectLst/>
+                <a:latin typeface="Consolas" panose="020B0609020204030204" pitchFamily="49" charset="0"/>
+              </a:rPr>
+              <a:t>ComEvents</a:t>
+            </a:r>
+            <a:r>
+              <a:rPr lang="en-US" b="0" dirty="0">
+                <a:solidFill>
+                  <a:srgbClr val="D4D4D4"/>
+                </a:solidFill>
+                <a:effectLst/>
+                <a:latin typeface="Consolas" panose="020B0609020204030204" pitchFamily="49" charset="0"/>
+              </a:rPr>
+              <a:t>[100];</a:t>
+            </a:r>
+          </a:p>
+          <a:p>
+            <a:r>
+              <a:rPr lang="en-US" b="0" dirty="0">
+                <a:solidFill>
+                  <a:srgbClr val="6A9955"/>
+                </a:solidFill>
+                <a:effectLst/>
+                <a:latin typeface="Consolas" panose="020B0609020204030204" pitchFamily="49" charset="0"/>
+              </a:rPr>
+              <a:t>// ...</a:t>
+            </a:r>
+            <a:endParaRPr lang="en-US" b="0" dirty="0">
+              <a:solidFill>
+                <a:srgbClr val="D4D4D4"/>
+              </a:solidFill>
+              <a:effectLst/>
+              <a:latin typeface="Consolas" panose="020B0609020204030204" pitchFamily="49" charset="0"/>
+            </a:endParaRPr>
+          </a:p>
+          <a:p>
+            <a:r>
+              <a:rPr lang="en-US" b="0" dirty="0">
+                <a:solidFill>
+                  <a:srgbClr val="D4D4D4"/>
+                </a:solidFill>
+                <a:effectLst/>
+                <a:latin typeface="Consolas" panose="020B0609020204030204" pitchFamily="49" charset="0"/>
+              </a:rPr>
+              <a:t>};</a:t>
+            </a:r>
+          </a:p>
+          <a:p>
+            <a:br>
+              <a:rPr lang="en-US" b="0">
+                <a:solidFill>
+                  <a:srgbClr val="D4D4D4"/>
+                </a:solidFill>
+                <a:effectLst/>
+                <a:latin typeface="Consolas" panose="020B0609020204030204" pitchFamily="49" charset="0"/>
+              </a:rPr>
+            </a:br>
+            <a:endParaRPr lang="en-US" b="0">
+              <a:solidFill>
+                <a:srgbClr val="D4D4D4"/>
+              </a:solidFill>
+              <a:effectLst/>
+              <a:latin typeface="Consolas" panose="020B0609020204030204" pitchFamily="49" charset="0"/>
+            </a:endParaRPr>
+          </a:p>
+        </p:txBody>
+      </p:sp>
+      <p:sp>
+        <p:nvSpPr>
+          <p:cNvPr id="4" name="Slide Number Placeholder 3"/>
+          <p:cNvSpPr>
+            <a:spLocks noGrp="1"/>
+          </p:cNvSpPr>
+          <p:nvPr>
+            <p:ph type="sldNum" sz="quarter" idx="5"/>
+          </p:nvPr>
+        </p:nvSpPr>
+        <p:spPr/>
+        <p:txBody>
+          <a:bodyPr/>
+          <a:lstStyle/>
+          <a:p>
+            <a:fld id="{835CED6B-7753-44FD-B82F-75125C9D9E36}" type="slidenum">
+              <a:rPr lang="en-IN" smtClean="0"/>
+              <a:t>21</a:t>
             </a:fld>
             <a:endParaRPr lang="en-IN"/>
           </a:p>
@@ -6147,7 +7102,7 @@
           <a:p>
             <a:fld id="{35051988-DCA8-486F-804A-657BF6D379C2}" type="datetimeFigureOut">
               <a:rPr lang="en-IN" smtClean="0"/>
-              <a:t>12-01-2023</a:t>
+              <a:t>06-03-2023</a:t>
             </a:fld>
             <a:endParaRPr lang="en-IN"/>
           </a:p>
@@ -6347,7 +7302,7 @@
           <a:p>
             <a:fld id="{35051988-DCA8-486F-804A-657BF6D379C2}" type="datetimeFigureOut">
               <a:rPr lang="en-IN" smtClean="0"/>
-              <a:t>12-01-2023</a:t>
+              <a:t>06-03-2023</a:t>
             </a:fld>
             <a:endParaRPr lang="en-IN"/>
           </a:p>
@@ -6557,7 +7512,7 @@
           <a:p>
             <a:fld id="{35051988-DCA8-486F-804A-657BF6D379C2}" type="datetimeFigureOut">
               <a:rPr lang="en-IN" smtClean="0"/>
-              <a:t>12-01-2023</a:t>
+              <a:t>06-03-2023</a:t>
             </a:fld>
             <a:endParaRPr lang="en-IN"/>
           </a:p>
@@ -6757,7 +7712,7 @@
           <a:p>
             <a:fld id="{35051988-DCA8-486F-804A-657BF6D379C2}" type="datetimeFigureOut">
               <a:rPr lang="en-IN" smtClean="0"/>
-              <a:t>12-01-2023</a:t>
+              <a:t>06-03-2023</a:t>
             </a:fld>
             <a:endParaRPr lang="en-IN"/>
           </a:p>
@@ -7033,7 +7988,7 @@
           <a:p>
             <a:fld id="{35051988-DCA8-486F-804A-657BF6D379C2}" type="datetimeFigureOut">
               <a:rPr lang="en-IN" smtClean="0"/>
-              <a:t>12-01-2023</a:t>
+              <a:t>06-03-2023</a:t>
             </a:fld>
             <a:endParaRPr lang="en-IN"/>
           </a:p>
@@ -7301,7 +8256,7 @@
           <a:p>
             <a:fld id="{35051988-DCA8-486F-804A-657BF6D379C2}" type="datetimeFigureOut">
               <a:rPr lang="en-IN" smtClean="0"/>
-              <a:t>12-01-2023</a:t>
+              <a:t>06-03-2023</a:t>
             </a:fld>
             <a:endParaRPr lang="en-IN"/>
           </a:p>
@@ -7716,7 +8671,7 @@
           <a:p>
             <a:fld id="{35051988-DCA8-486F-804A-657BF6D379C2}" type="datetimeFigureOut">
               <a:rPr lang="en-IN" smtClean="0"/>
-              <a:t>12-01-2023</a:t>
+              <a:t>06-03-2023</a:t>
             </a:fld>
             <a:endParaRPr lang="en-IN"/>
           </a:p>
@@ -7858,7 +8813,7 @@
           <a:p>
             <a:fld id="{35051988-DCA8-486F-804A-657BF6D379C2}" type="datetimeFigureOut">
               <a:rPr lang="en-IN" smtClean="0"/>
-              <a:t>12-01-2023</a:t>
+              <a:t>06-03-2023</a:t>
             </a:fld>
             <a:endParaRPr lang="en-IN"/>
           </a:p>
@@ -7971,7 +8926,7 @@
           <a:p>
             <a:fld id="{35051988-DCA8-486F-804A-657BF6D379C2}" type="datetimeFigureOut">
               <a:rPr lang="en-IN" smtClean="0"/>
-              <a:t>12-01-2023</a:t>
+              <a:t>06-03-2023</a:t>
             </a:fld>
             <a:endParaRPr lang="en-IN"/>
           </a:p>
@@ -8284,7 +9239,7 @@
           <a:p>
             <a:fld id="{35051988-DCA8-486F-804A-657BF6D379C2}" type="datetimeFigureOut">
               <a:rPr lang="en-IN" smtClean="0"/>
-              <a:t>12-01-2023</a:t>
+              <a:t>06-03-2023</a:t>
             </a:fld>
             <a:endParaRPr lang="en-IN"/>
           </a:p>
@@ -8573,7 +9528,7 @@
           <a:p>
             <a:fld id="{35051988-DCA8-486F-804A-657BF6D379C2}" type="datetimeFigureOut">
               <a:rPr lang="en-IN" smtClean="0"/>
-              <a:t>12-01-2023</a:t>
+              <a:t>06-03-2023</a:t>
             </a:fld>
             <a:endParaRPr lang="en-IN"/>
           </a:p>
@@ -8816,7 +9771,7 @@
           <a:p>
             <a:fld id="{35051988-DCA8-486F-804A-657BF6D379C2}" type="datetimeFigureOut">
               <a:rPr lang="en-IN" smtClean="0"/>
-              <a:t>12-01-2023</a:t>
+              <a:t>06-03-2023</a:t>
             </a:fld>
             <a:endParaRPr lang="en-IN"/>
           </a:p>
@@ -10272,10 +11227,10 @@
       </p:grpSpPr>
       <p:pic>
         <p:nvPicPr>
-          <p:cNvPr id="5" name="Picture 4">
+          <p:cNvPr id="3" name="Picture 2">
             <a:extLst>
               <a:ext uri="{FF2B5EF4-FFF2-40B4-BE49-F238E27FC236}">
-                <a16:creationId xmlns:a16="http://schemas.microsoft.com/office/drawing/2014/main" id="{E453C569-018F-437B-8E02-C933717DD6A0}"/>
+                <a16:creationId xmlns:a16="http://schemas.microsoft.com/office/drawing/2014/main" id="{2351FA45-2252-175E-696F-33E20056291E}"/>
               </a:ext>
             </a:extLst>
           </p:cNvPr>
@@ -10292,8 +11247,8 @@
         </p:blipFill>
         <p:spPr>
           <a:xfrm>
-            <a:off x="5002435" y="2697416"/>
-            <a:ext cx="2187130" cy="1463167"/>
+            <a:off x="4607696" y="2412250"/>
+            <a:ext cx="2467319" cy="1524213"/>
           </a:xfrm>
           <a:prstGeom prst="rect">
             <a:avLst/>
@@ -10392,6 +11347,66 @@
       </p:grpSpPr>
       <p:pic>
         <p:nvPicPr>
+          <p:cNvPr id="5" name="Picture 4">
+            <a:extLst>
+              <a:ext uri="{FF2B5EF4-FFF2-40B4-BE49-F238E27FC236}">
+                <a16:creationId xmlns:a16="http://schemas.microsoft.com/office/drawing/2014/main" id="{834BBBE5-0503-C031-0788-09552DF5D768}"/>
+              </a:ext>
+            </a:extLst>
+          </p:cNvPr>
+          <p:cNvPicPr>
+            <a:picLocks noChangeAspect="1"/>
+          </p:cNvPicPr>
+          <p:nvPr/>
+        </p:nvPicPr>
+        <p:blipFill>
+          <a:blip r:embed="rId3"/>
+          <a:stretch>
+            <a:fillRect/>
+          </a:stretch>
+        </p:blipFill>
+        <p:spPr>
+          <a:xfrm>
+            <a:off x="4052602" y="2138182"/>
+            <a:ext cx="4086795" cy="2581635"/>
+          </a:xfrm>
+          <a:prstGeom prst="rect">
+            <a:avLst/>
+          </a:prstGeom>
+        </p:spPr>
+      </p:pic>
+    </p:spTree>
+    <p:extLst>
+      <p:ext uri="{BB962C8B-B14F-4D97-AF65-F5344CB8AC3E}">
+        <p14:creationId xmlns:p14="http://schemas.microsoft.com/office/powerpoint/2010/main" val="179695998"/>
+      </p:ext>
+    </p:extLst>
+  </p:cSld>
+  <p:clrMapOvr>
+    <a:masterClrMapping/>
+  </p:clrMapOvr>
+</p:sld>
+</file>
+
+<file path=ppt/slides/slide21.xml><?xml version="1.0" encoding="utf-8"?>
+<p:sld xmlns:a="http://schemas.openxmlformats.org/drawingml/2006/main" xmlns:r="http://schemas.openxmlformats.org/officeDocument/2006/relationships" xmlns:p="http://schemas.openxmlformats.org/presentationml/2006/main">
+  <p:cSld>
+    <p:spTree>
+      <p:nvGrpSpPr>
+        <p:cNvPr id="1" name=""/>
+        <p:cNvGrpSpPr/>
+        <p:nvPr/>
+      </p:nvGrpSpPr>
+      <p:grpSpPr>
+        <a:xfrm>
+          <a:off x="0" y="0"/>
+          <a:ext cx="0" cy="0"/>
+          <a:chOff x="0" y="0"/>
+          <a:chExt cx="0" cy="0"/>
+        </a:xfrm>
+      </p:grpSpPr>
+      <p:pic>
+        <p:nvPicPr>
           <p:cNvPr id="4" name="Picture 3">
             <a:extLst>
               <a:ext uri="{FF2B5EF4-FFF2-40B4-BE49-F238E27FC236}">
@@ -10433,7 +11448,7 @@
 </p:sld>
 </file>
 
-<file path=ppt/slides/slide21.xml><?xml version="1.0" encoding="utf-8"?>
+<file path=ppt/slides/slide22.xml><?xml version="1.0" encoding="utf-8"?>
 <p:sld xmlns:a="http://schemas.openxmlformats.org/drawingml/2006/main" xmlns:r="http://schemas.openxmlformats.org/officeDocument/2006/relationships" xmlns:p="http://schemas.openxmlformats.org/presentationml/2006/main">
   <p:cSld>
     <p:spTree>
@@ -14353,7 +15368,7 @@
             </a:r>
           </a:p>
           <a:p>
-            <a:endParaRPr lang="en-US" b="0">
+            <a:endParaRPr lang="en-US" b="0" dirty="0">
               <a:solidFill>
                 <a:srgbClr val="D4D4D4"/>
               </a:solidFill>
@@ -14365,10 +15380,10 @@
       </p:sp>
       <p:pic>
         <p:nvPicPr>
-          <p:cNvPr id="6" name="Picture 5">
+          <p:cNvPr id="3" name="Picture 2">
             <a:extLst>
               <a:ext uri="{FF2B5EF4-FFF2-40B4-BE49-F238E27FC236}">
-                <a16:creationId xmlns:a16="http://schemas.microsoft.com/office/drawing/2014/main" id="{0D0B7573-5C40-4180-8B25-110DBBB791C6}"/>
+                <a16:creationId xmlns:a16="http://schemas.microsoft.com/office/drawing/2014/main" id="{121F48CD-3525-AD29-BCB5-547F6BB90293}"/>
               </a:ext>
             </a:extLst>
           </p:cNvPr>
@@ -14385,8 +15400,8 @@
         </p:blipFill>
         <p:spPr>
           <a:xfrm>
-            <a:off x="7496752" y="1097996"/>
-            <a:ext cx="2552921" cy="3398815"/>
+            <a:off x="7218488" y="1630993"/>
+            <a:ext cx="3658111" cy="2762636"/>
           </a:xfrm>
           <a:prstGeom prst="rect">
             <a:avLst/>
@@ -14646,7 +15661,7 @@
                 </a:solidFill>
                 <a:latin typeface="Consolas" panose="020B0609020204030204" pitchFamily="49" charset="0"/>
               </a:rPr>
-              <a:t> State1 {</a:t>
+              <a:t> S1 {</a:t>
             </a:r>
           </a:p>
           <a:p>
@@ -14784,7 +15799,7 @@
                 </a:solidFill>
                 <a:latin typeface="Consolas" panose="020B0609020204030204" pitchFamily="49" charset="0"/>
               </a:rPr>
-              <a:t> State2 {</a:t>
+              <a:t> S2 {</a:t>
             </a:r>
           </a:p>
           <a:p>
@@ -14922,7 +15937,7 @@
                 </a:solidFill>
                 <a:latin typeface="Consolas" panose="020B0609020204030204" pitchFamily="49" charset="0"/>
               </a:rPr>
-              <a:t> State3 {</a:t>
+              <a:t> S3 {</a:t>
             </a:r>
           </a:p>
           <a:p>
@@ -15176,10 +16191,10 @@
       </p:sp>
       <p:pic>
         <p:nvPicPr>
-          <p:cNvPr id="7" name="Picture 6">
+          <p:cNvPr id="3" name="Picture 2">
             <a:extLst>
               <a:ext uri="{FF2B5EF4-FFF2-40B4-BE49-F238E27FC236}">
-                <a16:creationId xmlns:a16="http://schemas.microsoft.com/office/drawing/2014/main" id="{DD3EF492-C555-47AF-BECD-33D987D1A46B}"/>
+                <a16:creationId xmlns:a16="http://schemas.microsoft.com/office/drawing/2014/main" id="{7DE9BF06-4616-F9F8-9E75-B758B596D12F}"/>
               </a:ext>
             </a:extLst>
           </p:cNvPr>
@@ -15196,8 +16211,8 @@
         </p:blipFill>
         <p:spPr>
           <a:xfrm>
-            <a:off x="8145918" y="965285"/>
-            <a:ext cx="1348857" cy="1752752"/>
+            <a:off x="7943009" y="1664090"/>
+            <a:ext cx="1676634" cy="1886213"/>
           </a:xfrm>
           <a:prstGeom prst="rect">
             <a:avLst/>

</xml_diff>

<commit_message>
RIC-649: Doc for thread support
</commit_message>
<xml_diff>
--- a/illustrations.pptx
+++ b/illustrations.pptx
@@ -5,7 +5,7 @@
     <p:sldMasterId id="2147483648" r:id="rId1"/>
   </p:sldMasterIdLst>
   <p:notesMasterIdLst>
-    <p:notesMasterId r:id="rId24"/>
+    <p:notesMasterId r:id="rId25"/>
   </p:notesMasterIdLst>
   <p:sldIdLst>
     <p:sldId id="256" r:id="rId2"/>
@@ -30,6 +30,7 @@
     <p:sldId id="277" r:id="rId21"/>
     <p:sldId id="274" r:id="rId22"/>
     <p:sldId id="276" r:id="rId23"/>
+    <p:sldId id="278" r:id="rId24"/>
   </p:sldIdLst>
   <p:sldSz cx="12192000" cy="6858000"/>
   <p:notesSz cx="6858000" cy="9144000"/>
@@ -218,7 +219,7 @@
           <a:p>
             <a:fld id="{62B5D429-15EF-4A8F-AA09-BECBB0A557A5}" type="datetimeFigureOut">
               <a:rPr lang="en-IN" smtClean="0"/>
-              <a:t>06-03-2023</a:t>
+              <a:t>07-09-2023</a:t>
             </a:fld>
             <a:endParaRPr lang="en-IN"/>
           </a:p>
@@ -7102,7 +7103,7 @@
           <a:p>
             <a:fld id="{35051988-DCA8-486F-804A-657BF6D379C2}" type="datetimeFigureOut">
               <a:rPr lang="en-IN" smtClean="0"/>
-              <a:t>06-03-2023</a:t>
+              <a:t>07-09-2023</a:t>
             </a:fld>
             <a:endParaRPr lang="en-IN"/>
           </a:p>
@@ -7302,7 +7303,7 @@
           <a:p>
             <a:fld id="{35051988-DCA8-486F-804A-657BF6D379C2}" type="datetimeFigureOut">
               <a:rPr lang="en-IN" smtClean="0"/>
-              <a:t>06-03-2023</a:t>
+              <a:t>07-09-2023</a:t>
             </a:fld>
             <a:endParaRPr lang="en-IN"/>
           </a:p>
@@ -7512,7 +7513,7 @@
           <a:p>
             <a:fld id="{35051988-DCA8-486F-804A-657BF6D379C2}" type="datetimeFigureOut">
               <a:rPr lang="en-IN" smtClean="0"/>
-              <a:t>06-03-2023</a:t>
+              <a:t>07-09-2023</a:t>
             </a:fld>
             <a:endParaRPr lang="en-IN"/>
           </a:p>
@@ -7712,7 +7713,7 @@
           <a:p>
             <a:fld id="{35051988-DCA8-486F-804A-657BF6D379C2}" type="datetimeFigureOut">
               <a:rPr lang="en-IN" smtClean="0"/>
-              <a:t>06-03-2023</a:t>
+              <a:t>07-09-2023</a:t>
             </a:fld>
             <a:endParaRPr lang="en-IN"/>
           </a:p>
@@ -7988,7 +7989,7 @@
           <a:p>
             <a:fld id="{35051988-DCA8-486F-804A-657BF6D379C2}" type="datetimeFigureOut">
               <a:rPr lang="en-IN" smtClean="0"/>
-              <a:t>06-03-2023</a:t>
+              <a:t>07-09-2023</a:t>
             </a:fld>
             <a:endParaRPr lang="en-IN"/>
           </a:p>
@@ -8256,7 +8257,7 @@
           <a:p>
             <a:fld id="{35051988-DCA8-486F-804A-657BF6D379C2}" type="datetimeFigureOut">
               <a:rPr lang="en-IN" smtClean="0"/>
-              <a:t>06-03-2023</a:t>
+              <a:t>07-09-2023</a:t>
             </a:fld>
             <a:endParaRPr lang="en-IN"/>
           </a:p>
@@ -8671,7 +8672,7 @@
           <a:p>
             <a:fld id="{35051988-DCA8-486F-804A-657BF6D379C2}" type="datetimeFigureOut">
               <a:rPr lang="en-IN" smtClean="0"/>
-              <a:t>06-03-2023</a:t>
+              <a:t>07-09-2023</a:t>
             </a:fld>
             <a:endParaRPr lang="en-IN"/>
           </a:p>
@@ -8813,7 +8814,7 @@
           <a:p>
             <a:fld id="{35051988-DCA8-486F-804A-657BF6D379C2}" type="datetimeFigureOut">
               <a:rPr lang="en-IN" smtClean="0"/>
-              <a:t>06-03-2023</a:t>
+              <a:t>07-09-2023</a:t>
             </a:fld>
             <a:endParaRPr lang="en-IN"/>
           </a:p>
@@ -8926,7 +8927,7 @@
           <a:p>
             <a:fld id="{35051988-DCA8-486F-804A-657BF6D379C2}" type="datetimeFigureOut">
               <a:rPr lang="en-IN" smtClean="0"/>
-              <a:t>06-03-2023</a:t>
+              <a:t>07-09-2023</a:t>
             </a:fld>
             <a:endParaRPr lang="en-IN"/>
           </a:p>
@@ -9239,7 +9240,7 @@
           <a:p>
             <a:fld id="{35051988-DCA8-486F-804A-657BF6D379C2}" type="datetimeFigureOut">
               <a:rPr lang="en-IN" smtClean="0"/>
-              <a:t>06-03-2023</a:t>
+              <a:t>07-09-2023</a:t>
             </a:fld>
             <a:endParaRPr lang="en-IN"/>
           </a:p>
@@ -9528,7 +9529,7 @@
           <a:p>
             <a:fld id="{35051988-DCA8-486F-804A-657BF6D379C2}" type="datetimeFigureOut">
               <a:rPr lang="en-IN" smtClean="0"/>
-              <a:t>06-03-2023</a:t>
+              <a:t>07-09-2023</a:t>
             </a:fld>
             <a:endParaRPr lang="en-IN"/>
           </a:p>
@@ -9771,7 +9772,7 @@
           <a:p>
             <a:fld id="{35051988-DCA8-486F-804A-657BF6D379C2}" type="datetimeFigureOut">
               <a:rPr lang="en-IN" smtClean="0"/>
-              <a:t>06-03-2023</a:t>
+              <a:t>07-09-2023</a:t>
             </a:fld>
             <a:endParaRPr lang="en-IN"/>
           </a:p>
@@ -11913,6 +11914,1552 @@
 </p:sld>
 </file>
 
+<file path=ppt/slides/slide23.xml><?xml version="1.0" encoding="utf-8"?>
+<p:sld xmlns:a="http://schemas.openxmlformats.org/drawingml/2006/main" xmlns:r="http://schemas.openxmlformats.org/officeDocument/2006/relationships" xmlns:p="http://schemas.openxmlformats.org/presentationml/2006/main">
+  <p:cSld>
+    <p:spTree>
+      <p:nvGrpSpPr>
+        <p:cNvPr id="1" name=""/>
+        <p:cNvGrpSpPr/>
+        <p:nvPr/>
+      </p:nvGrpSpPr>
+      <p:grpSpPr>
+        <a:xfrm>
+          <a:off x="0" y="0"/>
+          <a:ext cx="0" cy="0"/>
+          <a:chOff x="0" y="0"/>
+          <a:chExt cx="0" cy="0"/>
+        </a:xfrm>
+      </p:grpSpPr>
+      <p:sp>
+        <p:nvSpPr>
+          <p:cNvPr id="2" name="Title 1">
+            <a:extLst>
+              <a:ext uri="{FF2B5EF4-FFF2-40B4-BE49-F238E27FC236}">
+                <a16:creationId xmlns:a16="http://schemas.microsoft.com/office/drawing/2014/main" id="{110E4189-EA50-65C9-9ABB-537B1316D796}"/>
+              </a:ext>
+            </a:extLst>
+          </p:cNvPr>
+          <p:cNvSpPr>
+            <a:spLocks noGrp="1"/>
+          </p:cNvSpPr>
+          <p:nvPr>
+            <p:ph type="title"/>
+          </p:nvPr>
+        </p:nvSpPr>
+        <p:spPr/>
+        <p:txBody>
+          <a:bodyPr/>
+          <a:lstStyle/>
+          <a:p>
+            <a:r>
+              <a:rPr lang="sv-SE" dirty="0"/>
+              <a:t>Threads</a:t>
+            </a:r>
+            <a:endParaRPr lang="en-SE" dirty="0"/>
+          </a:p>
+        </p:txBody>
+      </p:sp>
+      <p:sp>
+        <p:nvSpPr>
+          <p:cNvPr id="3" name="Content Placeholder 2">
+            <a:extLst>
+              <a:ext uri="{FF2B5EF4-FFF2-40B4-BE49-F238E27FC236}">
+                <a16:creationId xmlns:a16="http://schemas.microsoft.com/office/drawing/2014/main" id="{A2FD5EA7-8A1A-15D4-4D02-D6A44D806406}"/>
+              </a:ext>
+            </a:extLst>
+          </p:cNvPr>
+          <p:cNvSpPr>
+            <a:spLocks noGrp="1"/>
+          </p:cNvSpPr>
+          <p:nvPr>
+            <p:ph idx="1"/>
+          </p:nvPr>
+        </p:nvSpPr>
+        <p:spPr/>
+        <p:txBody>
+          <a:bodyPr/>
+          <a:lstStyle/>
+          <a:p>
+            <a:r>
+              <a:rPr lang="sv-SE" dirty="0"/>
+              <a:t>C1</a:t>
+            </a:r>
+          </a:p>
+          <a:p>
+            <a:pPr lvl="1"/>
+            <a:r>
+              <a:rPr lang="sv-SE" dirty="0"/>
+              <a:t>cp1 : D</a:t>
+            </a:r>
+          </a:p>
+          <a:p>
+            <a:pPr lvl="2"/>
+            <a:r>
+              <a:rPr lang="sv-SE" dirty="0"/>
+              <a:t>dp1 : X</a:t>
+            </a:r>
+          </a:p>
+          <a:p>
+            <a:pPr lvl="1"/>
+            <a:r>
+              <a:rPr lang="sv-SE" dirty="0"/>
+              <a:t>cp2 : E</a:t>
+            </a:r>
+          </a:p>
+          <a:p>
+            <a:pPr lvl="2"/>
+            <a:r>
+              <a:rPr lang="sv-SE" dirty="0"/>
+              <a:t>ep1 : F</a:t>
+            </a:r>
+          </a:p>
+          <a:p>
+            <a:pPr lvl="3"/>
+            <a:r>
+              <a:rPr lang="sv-SE" dirty="0"/>
+              <a:t>fp1 : X</a:t>
+            </a:r>
+          </a:p>
+          <a:p>
+            <a:pPr lvl="2"/>
+            <a:r>
+              <a:rPr lang="sv-SE" dirty="0"/>
+              <a:t>ep2: G</a:t>
+            </a:r>
+            <a:endParaRPr lang="en-SE" dirty="0"/>
+          </a:p>
+        </p:txBody>
+      </p:sp>
+      <p:sp>
+        <p:nvSpPr>
+          <p:cNvPr id="8" name="Freeform: Shape 7">
+            <a:extLst>
+              <a:ext uri="{FF2B5EF4-FFF2-40B4-BE49-F238E27FC236}">
+                <a16:creationId xmlns:a16="http://schemas.microsoft.com/office/drawing/2014/main" id="{2EBBE4FB-E707-B7CE-3123-A0F0074A09CB}"/>
+              </a:ext>
+            </a:extLst>
+          </p:cNvPr>
+          <p:cNvSpPr/>
+          <p:nvPr/>
+        </p:nvSpPr>
+        <p:spPr>
+          <a:xfrm>
+            <a:off x="1319514" y="2210764"/>
+            <a:ext cx="1368630" cy="532435"/>
+          </a:xfrm>
+          <a:custGeom>
+            <a:avLst/>
+            <a:gdLst>
+              <a:gd name="connsiteX0" fmla="*/ 613458 w 1414929"/>
+              <a:gd name="connsiteY0" fmla="*/ 0 h 613458"/>
+              <a:gd name="connsiteX1" fmla="*/ 613458 w 1414929"/>
+              <a:gd name="connsiteY1" fmla="*/ 0 h 613458"/>
+              <a:gd name="connsiteX2" fmla="*/ 277793 w 1414929"/>
+              <a:gd name="connsiteY2" fmla="*/ 11574 h 613458"/>
+              <a:gd name="connsiteX3" fmla="*/ 185195 w 1414929"/>
+              <a:gd name="connsiteY3" fmla="*/ 34724 h 613458"/>
+              <a:gd name="connsiteX4" fmla="*/ 150471 w 1414929"/>
+              <a:gd name="connsiteY4" fmla="*/ 69448 h 613458"/>
+              <a:gd name="connsiteX5" fmla="*/ 81023 w 1414929"/>
+              <a:gd name="connsiteY5" fmla="*/ 92597 h 613458"/>
+              <a:gd name="connsiteX6" fmla="*/ 11575 w 1414929"/>
+              <a:gd name="connsiteY6" fmla="*/ 173620 h 613458"/>
+              <a:gd name="connsiteX7" fmla="*/ 0 w 1414929"/>
+              <a:gd name="connsiteY7" fmla="*/ 208344 h 613458"/>
+              <a:gd name="connsiteX8" fmla="*/ 23150 w 1414929"/>
+              <a:gd name="connsiteY8" fmla="*/ 381964 h 613458"/>
+              <a:gd name="connsiteX9" fmla="*/ 34724 w 1414929"/>
+              <a:gd name="connsiteY9" fmla="*/ 428263 h 613458"/>
+              <a:gd name="connsiteX10" fmla="*/ 69448 w 1414929"/>
+              <a:gd name="connsiteY10" fmla="*/ 474562 h 613458"/>
+              <a:gd name="connsiteX11" fmla="*/ 92598 w 1414929"/>
+              <a:gd name="connsiteY11" fmla="*/ 509286 h 613458"/>
+              <a:gd name="connsiteX12" fmla="*/ 162046 w 1414929"/>
+              <a:gd name="connsiteY12" fmla="*/ 555585 h 613458"/>
+              <a:gd name="connsiteX13" fmla="*/ 300942 w 1414929"/>
+              <a:gd name="connsiteY13" fmla="*/ 613458 h 613458"/>
+              <a:gd name="connsiteX14" fmla="*/ 1331089 w 1414929"/>
+              <a:gd name="connsiteY14" fmla="*/ 555585 h 613458"/>
+              <a:gd name="connsiteX15" fmla="*/ 1377388 w 1414929"/>
+              <a:gd name="connsiteY15" fmla="*/ 509286 h 613458"/>
+              <a:gd name="connsiteX16" fmla="*/ 1412112 w 1414929"/>
+              <a:gd name="connsiteY16" fmla="*/ 358815 h 613458"/>
+              <a:gd name="connsiteX17" fmla="*/ 1377388 w 1414929"/>
+              <a:gd name="connsiteY17" fmla="*/ 289367 h 613458"/>
+              <a:gd name="connsiteX18" fmla="*/ 1273215 w 1414929"/>
+              <a:gd name="connsiteY18" fmla="*/ 196769 h 613458"/>
+              <a:gd name="connsiteX19" fmla="*/ 1192193 w 1414929"/>
+              <a:gd name="connsiteY19" fmla="*/ 185195 h 613458"/>
+              <a:gd name="connsiteX20" fmla="*/ 1064871 w 1414929"/>
+              <a:gd name="connsiteY20" fmla="*/ 138896 h 613458"/>
+              <a:gd name="connsiteX21" fmla="*/ 914400 w 1414929"/>
+              <a:gd name="connsiteY21" fmla="*/ 127321 h 613458"/>
+              <a:gd name="connsiteX22" fmla="*/ 798653 w 1414929"/>
+              <a:gd name="connsiteY22" fmla="*/ 104172 h 613458"/>
+              <a:gd name="connsiteX23" fmla="*/ 740780 w 1414929"/>
+              <a:gd name="connsiteY23" fmla="*/ 92597 h 613458"/>
+              <a:gd name="connsiteX24" fmla="*/ 659757 w 1414929"/>
+              <a:gd name="connsiteY24" fmla="*/ 57873 h 613458"/>
+              <a:gd name="connsiteX25" fmla="*/ 613458 w 1414929"/>
+              <a:gd name="connsiteY25" fmla="*/ 46299 h 613458"/>
+              <a:gd name="connsiteX26" fmla="*/ 613458 w 1414929"/>
+              <a:gd name="connsiteY26" fmla="*/ 0 h 613458"/>
+            </a:gdLst>
+            <a:ahLst/>
+            <a:cxnLst>
+              <a:cxn ang="0">
+                <a:pos x="connsiteX0" y="connsiteY0"/>
+              </a:cxn>
+              <a:cxn ang="0">
+                <a:pos x="connsiteX1" y="connsiteY1"/>
+              </a:cxn>
+              <a:cxn ang="0">
+                <a:pos x="connsiteX2" y="connsiteY2"/>
+              </a:cxn>
+              <a:cxn ang="0">
+                <a:pos x="connsiteX3" y="connsiteY3"/>
+              </a:cxn>
+              <a:cxn ang="0">
+                <a:pos x="connsiteX4" y="connsiteY4"/>
+              </a:cxn>
+              <a:cxn ang="0">
+                <a:pos x="connsiteX5" y="connsiteY5"/>
+              </a:cxn>
+              <a:cxn ang="0">
+                <a:pos x="connsiteX6" y="connsiteY6"/>
+              </a:cxn>
+              <a:cxn ang="0">
+                <a:pos x="connsiteX7" y="connsiteY7"/>
+              </a:cxn>
+              <a:cxn ang="0">
+                <a:pos x="connsiteX8" y="connsiteY8"/>
+              </a:cxn>
+              <a:cxn ang="0">
+                <a:pos x="connsiteX9" y="connsiteY9"/>
+              </a:cxn>
+              <a:cxn ang="0">
+                <a:pos x="connsiteX10" y="connsiteY10"/>
+              </a:cxn>
+              <a:cxn ang="0">
+                <a:pos x="connsiteX11" y="connsiteY11"/>
+              </a:cxn>
+              <a:cxn ang="0">
+                <a:pos x="connsiteX12" y="connsiteY12"/>
+              </a:cxn>
+              <a:cxn ang="0">
+                <a:pos x="connsiteX13" y="connsiteY13"/>
+              </a:cxn>
+              <a:cxn ang="0">
+                <a:pos x="connsiteX14" y="connsiteY14"/>
+              </a:cxn>
+              <a:cxn ang="0">
+                <a:pos x="connsiteX15" y="connsiteY15"/>
+              </a:cxn>
+              <a:cxn ang="0">
+                <a:pos x="connsiteX16" y="connsiteY16"/>
+              </a:cxn>
+              <a:cxn ang="0">
+                <a:pos x="connsiteX17" y="connsiteY17"/>
+              </a:cxn>
+              <a:cxn ang="0">
+                <a:pos x="connsiteX18" y="connsiteY18"/>
+              </a:cxn>
+              <a:cxn ang="0">
+                <a:pos x="connsiteX19" y="connsiteY19"/>
+              </a:cxn>
+              <a:cxn ang="0">
+                <a:pos x="connsiteX20" y="connsiteY20"/>
+              </a:cxn>
+              <a:cxn ang="0">
+                <a:pos x="connsiteX21" y="connsiteY21"/>
+              </a:cxn>
+              <a:cxn ang="0">
+                <a:pos x="connsiteX22" y="connsiteY22"/>
+              </a:cxn>
+              <a:cxn ang="0">
+                <a:pos x="connsiteX23" y="connsiteY23"/>
+              </a:cxn>
+              <a:cxn ang="0">
+                <a:pos x="connsiteX24" y="connsiteY24"/>
+              </a:cxn>
+              <a:cxn ang="0">
+                <a:pos x="connsiteX25" y="connsiteY25"/>
+              </a:cxn>
+              <a:cxn ang="0">
+                <a:pos x="connsiteX26" y="connsiteY26"/>
+              </a:cxn>
+            </a:cxnLst>
+            <a:rect l="l" t="t" r="r" b="b"/>
+            <a:pathLst>
+              <a:path w="1414929" h="613458">
+                <a:moveTo>
+                  <a:pt x="613458" y="0"/>
+                </a:moveTo>
+                <a:lnTo>
+                  <a:pt x="613458" y="0"/>
+                </a:lnTo>
+                <a:cubicBezTo>
+                  <a:pt x="501570" y="3858"/>
+                  <a:pt x="389382" y="2526"/>
+                  <a:pt x="277793" y="11574"/>
+                </a:cubicBezTo>
+                <a:cubicBezTo>
+                  <a:pt x="246081" y="14145"/>
+                  <a:pt x="185195" y="34724"/>
+                  <a:pt x="185195" y="34724"/>
+                </a:cubicBezTo>
+                <a:cubicBezTo>
+                  <a:pt x="173620" y="46299"/>
+                  <a:pt x="164780" y="61499"/>
+                  <a:pt x="150471" y="69448"/>
+                </a:cubicBezTo>
+                <a:cubicBezTo>
+                  <a:pt x="129140" y="81298"/>
+                  <a:pt x="81023" y="92597"/>
+                  <a:pt x="81023" y="92597"/>
+                </a:cubicBezTo>
+                <a:cubicBezTo>
+                  <a:pt x="52543" y="121077"/>
+                  <a:pt x="29204" y="138363"/>
+                  <a:pt x="11575" y="173620"/>
+                </a:cubicBezTo>
+                <a:cubicBezTo>
+                  <a:pt x="6119" y="184533"/>
+                  <a:pt x="3858" y="196769"/>
+                  <a:pt x="0" y="208344"/>
+                </a:cubicBezTo>
+                <a:cubicBezTo>
+                  <a:pt x="7717" y="266217"/>
+                  <a:pt x="14044" y="324293"/>
+                  <a:pt x="23150" y="381964"/>
+                </a:cubicBezTo>
+                <a:cubicBezTo>
+                  <a:pt x="25631" y="397677"/>
+                  <a:pt x="27610" y="414034"/>
+                  <a:pt x="34724" y="428263"/>
+                </a:cubicBezTo>
+                <a:cubicBezTo>
+                  <a:pt x="43351" y="445518"/>
+                  <a:pt x="58235" y="458864"/>
+                  <a:pt x="69448" y="474562"/>
+                </a:cubicBezTo>
+                <a:cubicBezTo>
+                  <a:pt x="77534" y="485882"/>
+                  <a:pt x="82129" y="500125"/>
+                  <a:pt x="92598" y="509286"/>
+                </a:cubicBezTo>
+                <a:cubicBezTo>
+                  <a:pt x="113536" y="527607"/>
+                  <a:pt x="136364" y="544884"/>
+                  <a:pt x="162046" y="555585"/>
+                </a:cubicBezTo>
+                <a:lnTo>
+                  <a:pt x="300942" y="613458"/>
+                </a:lnTo>
+                <a:cubicBezTo>
+                  <a:pt x="629673" y="604573"/>
+                  <a:pt x="1010489" y="601385"/>
+                  <a:pt x="1331089" y="555585"/>
+                </a:cubicBezTo>
+                <a:cubicBezTo>
+                  <a:pt x="1352695" y="552498"/>
+                  <a:pt x="1361955" y="524719"/>
+                  <a:pt x="1377388" y="509286"/>
+                </a:cubicBezTo>
+                <a:cubicBezTo>
+                  <a:pt x="1404599" y="454864"/>
+                  <a:pt x="1422044" y="433309"/>
+                  <a:pt x="1412112" y="358815"/>
+                </a:cubicBezTo>
+                <a:cubicBezTo>
+                  <a:pt x="1408691" y="333160"/>
+                  <a:pt x="1390704" y="311560"/>
+                  <a:pt x="1377388" y="289367"/>
+                </a:cubicBezTo>
+                <a:cubicBezTo>
+                  <a:pt x="1352382" y="247690"/>
+                  <a:pt x="1320623" y="215003"/>
+                  <a:pt x="1273215" y="196769"/>
+                </a:cubicBezTo>
+                <a:cubicBezTo>
+                  <a:pt x="1247752" y="186976"/>
+                  <a:pt x="1219200" y="189053"/>
+                  <a:pt x="1192193" y="185195"/>
+                </a:cubicBezTo>
+                <a:cubicBezTo>
+                  <a:pt x="1166672" y="174987"/>
+                  <a:pt x="1089426" y="142773"/>
+                  <a:pt x="1064871" y="138896"/>
+                </a:cubicBezTo>
+                <a:cubicBezTo>
+                  <a:pt x="1015181" y="131050"/>
+                  <a:pt x="964557" y="131179"/>
+                  <a:pt x="914400" y="127321"/>
+                </a:cubicBezTo>
+                <a:cubicBezTo>
+                  <a:pt x="778331" y="104644"/>
+                  <a:pt x="902242" y="127192"/>
+                  <a:pt x="798653" y="104172"/>
+                </a:cubicBezTo>
+                <a:cubicBezTo>
+                  <a:pt x="779448" y="99904"/>
+                  <a:pt x="759866" y="97368"/>
+                  <a:pt x="740780" y="92597"/>
+                </a:cubicBezTo>
+                <a:cubicBezTo>
+                  <a:pt x="683284" y="78223"/>
+                  <a:pt x="726024" y="82723"/>
+                  <a:pt x="659757" y="57873"/>
+                </a:cubicBezTo>
+                <a:cubicBezTo>
+                  <a:pt x="644862" y="52287"/>
+                  <a:pt x="628891" y="50157"/>
+                  <a:pt x="613458" y="46299"/>
+                </a:cubicBezTo>
+                <a:lnTo>
+                  <a:pt x="613458" y="0"/>
+                </a:lnTo>
+                <a:close/>
+              </a:path>
+            </a:pathLst>
+          </a:custGeom>
+          <a:noFill/>
+          <a:ln w="25400">
+            <a:solidFill>
+              <a:srgbClr val="FFC000"/>
+            </a:solidFill>
+          </a:ln>
+        </p:spPr>
+        <p:style>
+          <a:lnRef idx="2">
+            <a:schemeClr val="accent1">
+              <a:shade val="15000"/>
+            </a:schemeClr>
+          </a:lnRef>
+          <a:fillRef idx="1">
+            <a:schemeClr val="accent1"/>
+          </a:fillRef>
+          <a:effectRef idx="0">
+            <a:schemeClr val="accent1"/>
+          </a:effectRef>
+          <a:fontRef idx="minor">
+            <a:schemeClr val="lt1"/>
+          </a:fontRef>
+        </p:style>
+        <p:txBody>
+          <a:bodyPr rtlCol="0" anchor="ctr"/>
+          <a:lstStyle/>
+          <a:p>
+            <a:pPr algn="ctr"/>
+            <a:endParaRPr lang="en-SE"/>
+          </a:p>
+        </p:txBody>
+      </p:sp>
+      <p:sp>
+        <p:nvSpPr>
+          <p:cNvPr id="9" name="Freeform: Shape 8">
+            <a:extLst>
+              <a:ext uri="{FF2B5EF4-FFF2-40B4-BE49-F238E27FC236}">
+                <a16:creationId xmlns:a16="http://schemas.microsoft.com/office/drawing/2014/main" id="{11049BCB-4075-D8CD-A511-E2564A946287}"/>
+              </a:ext>
+            </a:extLst>
+          </p:cNvPr>
+          <p:cNvSpPr/>
+          <p:nvPr/>
+        </p:nvSpPr>
+        <p:spPr>
+          <a:xfrm>
+            <a:off x="2127030" y="3646025"/>
+            <a:ext cx="1148605" cy="439838"/>
+          </a:xfrm>
+          <a:custGeom>
+            <a:avLst/>
+            <a:gdLst>
+              <a:gd name="connsiteX0" fmla="*/ 257355 w 1148605"/>
+              <a:gd name="connsiteY0" fmla="*/ 81023 h 499644"/>
+              <a:gd name="connsiteX1" fmla="*/ 257355 w 1148605"/>
+              <a:gd name="connsiteY1" fmla="*/ 81023 h 499644"/>
+              <a:gd name="connsiteX2" fmla="*/ 72160 w 1148605"/>
+              <a:gd name="connsiteY2" fmla="*/ 115747 h 499644"/>
+              <a:gd name="connsiteX3" fmla="*/ 49011 w 1148605"/>
+              <a:gd name="connsiteY3" fmla="*/ 138897 h 499644"/>
+              <a:gd name="connsiteX4" fmla="*/ 37436 w 1148605"/>
+              <a:gd name="connsiteY4" fmla="*/ 185195 h 499644"/>
+              <a:gd name="connsiteX5" fmla="*/ 2712 w 1148605"/>
+              <a:gd name="connsiteY5" fmla="*/ 231494 h 499644"/>
+              <a:gd name="connsiteX6" fmla="*/ 49011 w 1148605"/>
+              <a:gd name="connsiteY6" fmla="*/ 416689 h 499644"/>
+              <a:gd name="connsiteX7" fmla="*/ 83735 w 1148605"/>
+              <a:gd name="connsiteY7" fmla="*/ 439838 h 499644"/>
+              <a:gd name="connsiteX8" fmla="*/ 130033 w 1148605"/>
+              <a:gd name="connsiteY8" fmla="*/ 462988 h 499644"/>
+              <a:gd name="connsiteX9" fmla="*/ 257355 w 1148605"/>
+              <a:gd name="connsiteY9" fmla="*/ 474562 h 499644"/>
+              <a:gd name="connsiteX10" fmla="*/ 650894 w 1148605"/>
+              <a:gd name="connsiteY10" fmla="*/ 474562 h 499644"/>
+              <a:gd name="connsiteX11" fmla="*/ 951836 w 1148605"/>
+              <a:gd name="connsiteY11" fmla="*/ 462988 h 499644"/>
+              <a:gd name="connsiteX12" fmla="*/ 1067583 w 1148605"/>
+              <a:gd name="connsiteY12" fmla="*/ 439838 h 499644"/>
+              <a:gd name="connsiteX13" fmla="*/ 1102307 w 1148605"/>
+              <a:gd name="connsiteY13" fmla="*/ 416689 h 499644"/>
+              <a:gd name="connsiteX14" fmla="*/ 1137031 w 1148605"/>
+              <a:gd name="connsiteY14" fmla="*/ 381965 h 499644"/>
+              <a:gd name="connsiteX15" fmla="*/ 1148605 w 1148605"/>
+              <a:gd name="connsiteY15" fmla="*/ 335666 h 499644"/>
+              <a:gd name="connsiteX16" fmla="*/ 1113881 w 1148605"/>
+              <a:gd name="connsiteY16" fmla="*/ 150471 h 499644"/>
+              <a:gd name="connsiteX17" fmla="*/ 1067583 w 1148605"/>
+              <a:gd name="connsiteY17" fmla="*/ 92598 h 499644"/>
+              <a:gd name="connsiteX18" fmla="*/ 998135 w 1148605"/>
+              <a:gd name="connsiteY18" fmla="*/ 46299 h 499644"/>
+              <a:gd name="connsiteX19" fmla="*/ 893962 w 1148605"/>
+              <a:gd name="connsiteY19" fmla="*/ 0 h 499644"/>
+              <a:gd name="connsiteX20" fmla="*/ 662469 w 1148605"/>
+              <a:gd name="connsiteY20" fmla="*/ 11575 h 499644"/>
+              <a:gd name="connsiteX21" fmla="*/ 581446 w 1148605"/>
+              <a:gd name="connsiteY21" fmla="*/ 46299 h 499644"/>
+              <a:gd name="connsiteX22" fmla="*/ 477274 w 1148605"/>
+              <a:gd name="connsiteY22" fmla="*/ 81023 h 499644"/>
+              <a:gd name="connsiteX23" fmla="*/ 257355 w 1148605"/>
+              <a:gd name="connsiteY23" fmla="*/ 81023 h 499644"/>
+            </a:gdLst>
+            <a:ahLst/>
+            <a:cxnLst>
+              <a:cxn ang="0">
+                <a:pos x="connsiteX0" y="connsiteY0"/>
+              </a:cxn>
+              <a:cxn ang="0">
+                <a:pos x="connsiteX1" y="connsiteY1"/>
+              </a:cxn>
+              <a:cxn ang="0">
+                <a:pos x="connsiteX2" y="connsiteY2"/>
+              </a:cxn>
+              <a:cxn ang="0">
+                <a:pos x="connsiteX3" y="connsiteY3"/>
+              </a:cxn>
+              <a:cxn ang="0">
+                <a:pos x="connsiteX4" y="connsiteY4"/>
+              </a:cxn>
+              <a:cxn ang="0">
+                <a:pos x="connsiteX5" y="connsiteY5"/>
+              </a:cxn>
+              <a:cxn ang="0">
+                <a:pos x="connsiteX6" y="connsiteY6"/>
+              </a:cxn>
+              <a:cxn ang="0">
+                <a:pos x="connsiteX7" y="connsiteY7"/>
+              </a:cxn>
+              <a:cxn ang="0">
+                <a:pos x="connsiteX8" y="connsiteY8"/>
+              </a:cxn>
+              <a:cxn ang="0">
+                <a:pos x="connsiteX9" y="connsiteY9"/>
+              </a:cxn>
+              <a:cxn ang="0">
+                <a:pos x="connsiteX10" y="connsiteY10"/>
+              </a:cxn>
+              <a:cxn ang="0">
+                <a:pos x="connsiteX11" y="connsiteY11"/>
+              </a:cxn>
+              <a:cxn ang="0">
+                <a:pos x="connsiteX12" y="connsiteY12"/>
+              </a:cxn>
+              <a:cxn ang="0">
+                <a:pos x="connsiteX13" y="connsiteY13"/>
+              </a:cxn>
+              <a:cxn ang="0">
+                <a:pos x="connsiteX14" y="connsiteY14"/>
+              </a:cxn>
+              <a:cxn ang="0">
+                <a:pos x="connsiteX15" y="connsiteY15"/>
+              </a:cxn>
+              <a:cxn ang="0">
+                <a:pos x="connsiteX16" y="connsiteY16"/>
+              </a:cxn>
+              <a:cxn ang="0">
+                <a:pos x="connsiteX17" y="connsiteY17"/>
+              </a:cxn>
+              <a:cxn ang="0">
+                <a:pos x="connsiteX18" y="connsiteY18"/>
+              </a:cxn>
+              <a:cxn ang="0">
+                <a:pos x="connsiteX19" y="connsiteY19"/>
+              </a:cxn>
+              <a:cxn ang="0">
+                <a:pos x="connsiteX20" y="connsiteY20"/>
+              </a:cxn>
+              <a:cxn ang="0">
+                <a:pos x="connsiteX21" y="connsiteY21"/>
+              </a:cxn>
+              <a:cxn ang="0">
+                <a:pos x="connsiteX22" y="connsiteY22"/>
+              </a:cxn>
+              <a:cxn ang="0">
+                <a:pos x="connsiteX23" y="connsiteY23"/>
+              </a:cxn>
+            </a:cxnLst>
+            <a:rect l="l" t="t" r="r" b="b"/>
+            <a:pathLst>
+              <a:path w="1148605" h="499644">
+                <a:moveTo>
+                  <a:pt x="257355" y="81023"/>
+                </a:moveTo>
+                <a:lnTo>
+                  <a:pt x="257355" y="81023"/>
+                </a:lnTo>
+                <a:cubicBezTo>
+                  <a:pt x="180647" y="87997"/>
+                  <a:pt x="134836" y="79932"/>
+                  <a:pt x="72160" y="115747"/>
+                </a:cubicBezTo>
+                <a:cubicBezTo>
+                  <a:pt x="62685" y="121161"/>
+                  <a:pt x="56727" y="131180"/>
+                  <a:pt x="49011" y="138897"/>
+                </a:cubicBezTo>
+                <a:cubicBezTo>
+                  <a:pt x="45153" y="154330"/>
+                  <a:pt x="44550" y="170967"/>
+                  <a:pt x="37436" y="185195"/>
+                </a:cubicBezTo>
+                <a:cubicBezTo>
+                  <a:pt x="28809" y="202450"/>
+                  <a:pt x="3782" y="212233"/>
+                  <a:pt x="2712" y="231494"/>
+                </a:cubicBezTo>
+                <a:cubicBezTo>
+                  <a:pt x="-2148" y="318976"/>
+                  <a:pt x="-6812" y="372032"/>
+                  <a:pt x="49011" y="416689"/>
+                </a:cubicBezTo>
+                <a:cubicBezTo>
+                  <a:pt x="59874" y="425379"/>
+                  <a:pt x="71657" y="432936"/>
+                  <a:pt x="83735" y="439838"/>
+                </a:cubicBezTo>
+                <a:cubicBezTo>
+                  <a:pt x="98716" y="448399"/>
+                  <a:pt x="113114" y="459604"/>
+                  <a:pt x="130033" y="462988"/>
+                </a:cubicBezTo>
+                <a:cubicBezTo>
+                  <a:pt x="171821" y="471346"/>
+                  <a:pt x="214914" y="470704"/>
+                  <a:pt x="257355" y="474562"/>
+                </a:cubicBezTo>
+                <a:cubicBezTo>
+                  <a:pt x="405315" y="523883"/>
+                  <a:pt x="282733" y="487480"/>
+                  <a:pt x="650894" y="474562"/>
+                </a:cubicBezTo>
+                <a:lnTo>
+                  <a:pt x="951836" y="462988"/>
+                </a:lnTo>
+                <a:cubicBezTo>
+                  <a:pt x="981698" y="458722"/>
+                  <a:pt x="1035259" y="456000"/>
+                  <a:pt x="1067583" y="439838"/>
+                </a:cubicBezTo>
+                <a:cubicBezTo>
+                  <a:pt x="1080025" y="433617"/>
+                  <a:pt x="1091620" y="425595"/>
+                  <a:pt x="1102307" y="416689"/>
+                </a:cubicBezTo>
+                <a:cubicBezTo>
+                  <a:pt x="1114882" y="406210"/>
+                  <a:pt x="1125456" y="393540"/>
+                  <a:pt x="1137031" y="381965"/>
+                </a:cubicBezTo>
+                <a:cubicBezTo>
+                  <a:pt x="1140889" y="366532"/>
+                  <a:pt x="1148605" y="351574"/>
+                  <a:pt x="1148605" y="335666"/>
+                </a:cubicBezTo>
+                <a:cubicBezTo>
+                  <a:pt x="1148605" y="311609"/>
+                  <a:pt x="1140481" y="183722"/>
+                  <a:pt x="1113881" y="150471"/>
+                </a:cubicBezTo>
+                <a:cubicBezTo>
+                  <a:pt x="1098448" y="131180"/>
+                  <a:pt x="1085946" y="109124"/>
+                  <a:pt x="1067583" y="92598"/>
+                </a:cubicBezTo>
+                <a:cubicBezTo>
+                  <a:pt x="1046903" y="73986"/>
+                  <a:pt x="1021284" y="61732"/>
+                  <a:pt x="998135" y="46299"/>
+                </a:cubicBezTo>
+                <a:cubicBezTo>
+                  <a:pt x="943109" y="9615"/>
+                  <a:pt x="976605" y="27548"/>
+                  <a:pt x="893962" y="0"/>
+                </a:cubicBezTo>
+                <a:cubicBezTo>
+                  <a:pt x="816798" y="3858"/>
+                  <a:pt x="739439" y="4882"/>
+                  <a:pt x="662469" y="11575"/>
+                </a:cubicBezTo>
+                <a:cubicBezTo>
+                  <a:pt x="640304" y="13502"/>
+                  <a:pt x="597747" y="39054"/>
+                  <a:pt x="581446" y="46299"/>
+                </a:cubicBezTo>
+                <a:cubicBezTo>
+                  <a:pt x="561393" y="55211"/>
+                  <a:pt x="503464" y="79833"/>
+                  <a:pt x="477274" y="81023"/>
+                </a:cubicBezTo>
+                <a:cubicBezTo>
+                  <a:pt x="407897" y="84177"/>
+                  <a:pt x="294008" y="81023"/>
+                  <a:pt x="257355" y="81023"/>
+                </a:cubicBezTo>
+                <a:close/>
+              </a:path>
+            </a:pathLst>
+          </a:custGeom>
+          <a:noFill/>
+          <a:ln w="25400">
+            <a:solidFill>
+              <a:srgbClr val="FFC000"/>
+            </a:solidFill>
+          </a:ln>
+        </p:spPr>
+        <p:style>
+          <a:lnRef idx="2">
+            <a:schemeClr val="accent1">
+              <a:shade val="15000"/>
+            </a:schemeClr>
+          </a:lnRef>
+          <a:fillRef idx="1">
+            <a:schemeClr val="accent1"/>
+          </a:fillRef>
+          <a:effectRef idx="0">
+            <a:schemeClr val="accent1"/>
+          </a:effectRef>
+          <a:fontRef idx="minor">
+            <a:schemeClr val="lt1"/>
+          </a:fontRef>
+        </p:style>
+        <p:txBody>
+          <a:bodyPr rtlCol="0" anchor="ctr"/>
+          <a:lstStyle/>
+          <a:p>
+            <a:pPr algn="ctr"/>
+            <a:endParaRPr lang="en-SE"/>
+          </a:p>
+        </p:txBody>
+      </p:sp>
+      <p:sp>
+        <p:nvSpPr>
+          <p:cNvPr id="10" name="Freeform: Shape 9">
+            <a:extLst>
+              <a:ext uri="{FF2B5EF4-FFF2-40B4-BE49-F238E27FC236}">
+                <a16:creationId xmlns:a16="http://schemas.microsoft.com/office/drawing/2014/main" id="{85180B95-F13E-1700-B9E5-39C76324C73D}"/>
+              </a:ext>
+            </a:extLst>
+          </p:cNvPr>
+          <p:cNvSpPr/>
+          <p:nvPr/>
+        </p:nvSpPr>
+        <p:spPr>
+          <a:xfrm>
+            <a:off x="1272599" y="2685327"/>
+            <a:ext cx="1817842" cy="682911"/>
+          </a:xfrm>
+          <a:custGeom>
+            <a:avLst/>
+            <a:gdLst>
+              <a:gd name="connsiteX0" fmla="*/ 12191 w 1817842"/>
+              <a:gd name="connsiteY0" fmla="*/ 659757 h 682911"/>
+              <a:gd name="connsiteX1" fmla="*/ 12191 w 1817842"/>
+              <a:gd name="connsiteY1" fmla="*/ 659757 h 682911"/>
+              <a:gd name="connsiteX2" fmla="*/ 232110 w 1817842"/>
+              <a:gd name="connsiteY2" fmla="*/ 671331 h 682911"/>
+              <a:gd name="connsiteX3" fmla="*/ 324707 w 1817842"/>
+              <a:gd name="connsiteY3" fmla="*/ 682906 h 682911"/>
+              <a:gd name="connsiteX4" fmla="*/ 1574773 w 1817842"/>
+              <a:gd name="connsiteY4" fmla="*/ 659757 h 682911"/>
+              <a:gd name="connsiteX5" fmla="*/ 1736819 w 1817842"/>
+              <a:gd name="connsiteY5" fmla="*/ 613458 h 682911"/>
+              <a:gd name="connsiteX6" fmla="*/ 1806267 w 1817842"/>
+              <a:gd name="connsiteY6" fmla="*/ 509286 h 682911"/>
+              <a:gd name="connsiteX7" fmla="*/ 1817842 w 1817842"/>
+              <a:gd name="connsiteY7" fmla="*/ 439838 h 682911"/>
+              <a:gd name="connsiteX8" fmla="*/ 1783117 w 1817842"/>
+              <a:gd name="connsiteY8" fmla="*/ 57873 h 682911"/>
+              <a:gd name="connsiteX9" fmla="*/ 1725244 w 1817842"/>
+              <a:gd name="connsiteY9" fmla="*/ 46298 h 682911"/>
+              <a:gd name="connsiteX10" fmla="*/ 1597923 w 1817842"/>
+              <a:gd name="connsiteY10" fmla="*/ 0 h 682911"/>
+              <a:gd name="connsiteX11" fmla="*/ 1366429 w 1817842"/>
+              <a:gd name="connsiteY11" fmla="*/ 11574 h 682911"/>
+              <a:gd name="connsiteX12" fmla="*/ 1192809 w 1817842"/>
+              <a:gd name="connsiteY12" fmla="*/ 34724 h 682911"/>
+              <a:gd name="connsiteX13" fmla="*/ 1042338 w 1817842"/>
+              <a:gd name="connsiteY13" fmla="*/ 92597 h 682911"/>
+              <a:gd name="connsiteX14" fmla="*/ 521477 w 1817842"/>
+              <a:gd name="connsiteY14" fmla="*/ 104172 h 682911"/>
+              <a:gd name="connsiteX15" fmla="*/ 417305 w 1817842"/>
+              <a:gd name="connsiteY15" fmla="*/ 127321 h 682911"/>
+              <a:gd name="connsiteX16" fmla="*/ 324707 w 1817842"/>
+              <a:gd name="connsiteY16" fmla="*/ 173620 h 682911"/>
+              <a:gd name="connsiteX17" fmla="*/ 232110 w 1817842"/>
+              <a:gd name="connsiteY17" fmla="*/ 196769 h 682911"/>
+              <a:gd name="connsiteX18" fmla="*/ 127938 w 1817842"/>
+              <a:gd name="connsiteY18" fmla="*/ 254643 h 682911"/>
+              <a:gd name="connsiteX19" fmla="*/ 81639 w 1817842"/>
+              <a:gd name="connsiteY19" fmla="*/ 289367 h 682911"/>
+              <a:gd name="connsiteX20" fmla="*/ 46915 w 1817842"/>
+              <a:gd name="connsiteY20" fmla="*/ 358815 h 682911"/>
+              <a:gd name="connsiteX21" fmla="*/ 23766 w 1817842"/>
+              <a:gd name="connsiteY21" fmla="*/ 393539 h 682911"/>
+              <a:gd name="connsiteX22" fmla="*/ 12191 w 1817842"/>
+              <a:gd name="connsiteY22" fmla="*/ 601883 h 682911"/>
+              <a:gd name="connsiteX23" fmla="*/ 35340 w 1817842"/>
+              <a:gd name="connsiteY23" fmla="*/ 636607 h 682911"/>
+              <a:gd name="connsiteX24" fmla="*/ 12191 w 1817842"/>
+              <a:gd name="connsiteY24" fmla="*/ 659757 h 682911"/>
+            </a:gdLst>
+            <a:ahLst/>
+            <a:cxnLst>
+              <a:cxn ang="0">
+                <a:pos x="connsiteX0" y="connsiteY0"/>
+              </a:cxn>
+              <a:cxn ang="0">
+                <a:pos x="connsiteX1" y="connsiteY1"/>
+              </a:cxn>
+              <a:cxn ang="0">
+                <a:pos x="connsiteX2" y="connsiteY2"/>
+              </a:cxn>
+              <a:cxn ang="0">
+                <a:pos x="connsiteX3" y="connsiteY3"/>
+              </a:cxn>
+              <a:cxn ang="0">
+                <a:pos x="connsiteX4" y="connsiteY4"/>
+              </a:cxn>
+              <a:cxn ang="0">
+                <a:pos x="connsiteX5" y="connsiteY5"/>
+              </a:cxn>
+              <a:cxn ang="0">
+                <a:pos x="connsiteX6" y="connsiteY6"/>
+              </a:cxn>
+              <a:cxn ang="0">
+                <a:pos x="connsiteX7" y="connsiteY7"/>
+              </a:cxn>
+              <a:cxn ang="0">
+                <a:pos x="connsiteX8" y="connsiteY8"/>
+              </a:cxn>
+              <a:cxn ang="0">
+                <a:pos x="connsiteX9" y="connsiteY9"/>
+              </a:cxn>
+              <a:cxn ang="0">
+                <a:pos x="connsiteX10" y="connsiteY10"/>
+              </a:cxn>
+              <a:cxn ang="0">
+                <a:pos x="connsiteX11" y="connsiteY11"/>
+              </a:cxn>
+              <a:cxn ang="0">
+                <a:pos x="connsiteX12" y="connsiteY12"/>
+              </a:cxn>
+              <a:cxn ang="0">
+                <a:pos x="connsiteX13" y="connsiteY13"/>
+              </a:cxn>
+              <a:cxn ang="0">
+                <a:pos x="connsiteX14" y="connsiteY14"/>
+              </a:cxn>
+              <a:cxn ang="0">
+                <a:pos x="connsiteX15" y="connsiteY15"/>
+              </a:cxn>
+              <a:cxn ang="0">
+                <a:pos x="connsiteX16" y="connsiteY16"/>
+              </a:cxn>
+              <a:cxn ang="0">
+                <a:pos x="connsiteX17" y="connsiteY17"/>
+              </a:cxn>
+              <a:cxn ang="0">
+                <a:pos x="connsiteX18" y="connsiteY18"/>
+              </a:cxn>
+              <a:cxn ang="0">
+                <a:pos x="connsiteX19" y="connsiteY19"/>
+              </a:cxn>
+              <a:cxn ang="0">
+                <a:pos x="connsiteX20" y="connsiteY20"/>
+              </a:cxn>
+              <a:cxn ang="0">
+                <a:pos x="connsiteX21" y="connsiteY21"/>
+              </a:cxn>
+              <a:cxn ang="0">
+                <a:pos x="connsiteX22" y="connsiteY22"/>
+              </a:cxn>
+              <a:cxn ang="0">
+                <a:pos x="connsiteX23" y="connsiteY23"/>
+              </a:cxn>
+              <a:cxn ang="0">
+                <a:pos x="connsiteX24" y="connsiteY24"/>
+              </a:cxn>
+            </a:cxnLst>
+            <a:rect l="l" t="t" r="r" b="b"/>
+            <a:pathLst>
+              <a:path w="1817842" h="682911">
+                <a:moveTo>
+                  <a:pt x="12191" y="659757"/>
+                </a:moveTo>
+                <a:lnTo>
+                  <a:pt x="12191" y="659757"/>
+                </a:lnTo>
+                <a:cubicBezTo>
+                  <a:pt x="85497" y="663615"/>
+                  <a:pt x="158903" y="665908"/>
+                  <a:pt x="232110" y="671331"/>
+                </a:cubicBezTo>
+                <a:cubicBezTo>
+                  <a:pt x="263131" y="673629"/>
+                  <a:pt x="293602" y="683174"/>
+                  <a:pt x="324707" y="682906"/>
+                </a:cubicBezTo>
+                <a:lnTo>
+                  <a:pt x="1574773" y="659757"/>
+                </a:lnTo>
+                <a:cubicBezTo>
+                  <a:pt x="1707439" y="633223"/>
+                  <a:pt x="1655327" y="654203"/>
+                  <a:pt x="1736819" y="613458"/>
+                </a:cubicBezTo>
+                <a:cubicBezTo>
+                  <a:pt x="1762556" y="581286"/>
+                  <a:pt x="1793957" y="550319"/>
+                  <a:pt x="1806267" y="509286"/>
+                </a:cubicBezTo>
+                <a:cubicBezTo>
+                  <a:pt x="1813011" y="486807"/>
+                  <a:pt x="1813984" y="462987"/>
+                  <a:pt x="1817842" y="439838"/>
+                </a:cubicBezTo>
+                <a:cubicBezTo>
+                  <a:pt x="1806267" y="312516"/>
+                  <a:pt x="1812399" y="182321"/>
+                  <a:pt x="1783117" y="57873"/>
+                </a:cubicBezTo>
+                <a:cubicBezTo>
+                  <a:pt x="1778611" y="38723"/>
+                  <a:pt x="1743221" y="54288"/>
+                  <a:pt x="1725244" y="46298"/>
+                </a:cubicBezTo>
+                <a:cubicBezTo>
+                  <a:pt x="1588103" y="-14654"/>
+                  <a:pt x="1795645" y="28245"/>
+                  <a:pt x="1597923" y="0"/>
+                </a:cubicBezTo>
+                <a:lnTo>
+                  <a:pt x="1366429" y="11574"/>
+                </a:lnTo>
+                <a:cubicBezTo>
+                  <a:pt x="1243637" y="19496"/>
+                  <a:pt x="1272846" y="14714"/>
+                  <a:pt x="1192809" y="34724"/>
+                </a:cubicBezTo>
+                <a:cubicBezTo>
+                  <a:pt x="1140232" y="87301"/>
+                  <a:pt x="1150173" y="90201"/>
+                  <a:pt x="1042338" y="92597"/>
+                </a:cubicBezTo>
+                <a:lnTo>
+                  <a:pt x="521477" y="104172"/>
+                </a:lnTo>
+                <a:cubicBezTo>
+                  <a:pt x="486753" y="111888"/>
+                  <a:pt x="450848" y="115482"/>
+                  <a:pt x="417305" y="127321"/>
+                </a:cubicBezTo>
+                <a:cubicBezTo>
+                  <a:pt x="384763" y="138806"/>
+                  <a:pt x="358546" y="166852"/>
+                  <a:pt x="324707" y="173620"/>
+                </a:cubicBezTo>
+                <a:cubicBezTo>
+                  <a:pt x="254870" y="187588"/>
+                  <a:pt x="285498" y="178974"/>
+                  <a:pt x="232110" y="196769"/>
+                </a:cubicBezTo>
+                <a:cubicBezTo>
+                  <a:pt x="152510" y="249836"/>
+                  <a:pt x="189056" y="234270"/>
+                  <a:pt x="127938" y="254643"/>
+                </a:cubicBezTo>
+                <a:cubicBezTo>
+                  <a:pt x="112505" y="266218"/>
+                  <a:pt x="95280" y="275726"/>
+                  <a:pt x="81639" y="289367"/>
+                </a:cubicBezTo>
+                <a:cubicBezTo>
+                  <a:pt x="48470" y="322536"/>
+                  <a:pt x="65742" y="321161"/>
+                  <a:pt x="46915" y="358815"/>
+                </a:cubicBezTo>
+                <a:cubicBezTo>
+                  <a:pt x="40694" y="371257"/>
+                  <a:pt x="31482" y="381964"/>
+                  <a:pt x="23766" y="393539"/>
+                </a:cubicBezTo>
+                <a:cubicBezTo>
+                  <a:pt x="4922" y="487754"/>
+                  <a:pt x="-12492" y="511379"/>
+                  <a:pt x="12191" y="601883"/>
+                </a:cubicBezTo>
+                <a:cubicBezTo>
+                  <a:pt x="15851" y="615304"/>
+                  <a:pt x="28183" y="624678"/>
+                  <a:pt x="35340" y="636607"/>
+                </a:cubicBezTo>
+                <a:cubicBezTo>
+                  <a:pt x="39779" y="644005"/>
+                  <a:pt x="16049" y="655899"/>
+                  <a:pt x="12191" y="659757"/>
+                </a:cubicBezTo>
+                <a:close/>
+              </a:path>
+            </a:pathLst>
+          </a:custGeom>
+          <a:noFill/>
+          <a:ln w="25400">
+            <a:solidFill>
+              <a:srgbClr val="92D050"/>
+            </a:solidFill>
+          </a:ln>
+        </p:spPr>
+        <p:style>
+          <a:lnRef idx="2">
+            <a:schemeClr val="accent1">
+              <a:shade val="15000"/>
+            </a:schemeClr>
+          </a:lnRef>
+          <a:fillRef idx="1">
+            <a:schemeClr val="accent1"/>
+          </a:fillRef>
+          <a:effectRef idx="0">
+            <a:schemeClr val="accent1"/>
+          </a:effectRef>
+          <a:fontRef idx="minor">
+            <a:schemeClr val="lt1"/>
+          </a:fontRef>
+        </p:style>
+        <p:txBody>
+          <a:bodyPr rtlCol="0" anchor="ctr"/>
+          <a:lstStyle/>
+          <a:p>
+            <a:pPr algn="ctr"/>
+            <a:endParaRPr lang="en-SE"/>
+          </a:p>
+        </p:txBody>
+      </p:sp>
+      <p:cxnSp>
+        <p:nvCxnSpPr>
+          <p:cNvPr id="12" name="Straight Arrow Connector 11">
+            <a:extLst>
+              <a:ext uri="{FF2B5EF4-FFF2-40B4-BE49-F238E27FC236}">
+                <a16:creationId xmlns:a16="http://schemas.microsoft.com/office/drawing/2014/main" id="{0AFBB7D2-26D8-D0F3-B593-0504061D504D}"/>
+              </a:ext>
+            </a:extLst>
+          </p:cNvPr>
+          <p:cNvCxnSpPr>
+            <a:cxnSpLocks/>
+          </p:cNvCxnSpPr>
+          <p:nvPr/>
+        </p:nvCxnSpPr>
+        <p:spPr>
+          <a:xfrm flipV="1">
+            <a:off x="3090441" y="2874800"/>
+            <a:ext cx="1250064" cy="42020"/>
+          </a:xfrm>
+          <a:prstGeom prst="straightConnector1">
+            <a:avLst/>
+          </a:prstGeom>
+          <a:ln>
+            <a:tailEnd type="triangle"/>
+          </a:ln>
+        </p:spPr>
+        <p:style>
+          <a:lnRef idx="1">
+            <a:schemeClr val="accent6"/>
+          </a:lnRef>
+          <a:fillRef idx="0">
+            <a:schemeClr val="accent6"/>
+          </a:fillRef>
+          <a:effectRef idx="0">
+            <a:schemeClr val="accent6"/>
+          </a:effectRef>
+          <a:fontRef idx="minor">
+            <a:schemeClr val="tx1"/>
+          </a:fontRef>
+        </p:style>
+      </p:cxnSp>
+      <p:cxnSp>
+        <p:nvCxnSpPr>
+          <p:cNvPr id="14" name="Straight Arrow Connector 13">
+            <a:extLst>
+              <a:ext uri="{FF2B5EF4-FFF2-40B4-BE49-F238E27FC236}">
+                <a16:creationId xmlns:a16="http://schemas.microsoft.com/office/drawing/2014/main" id="{F8062043-7AFB-04E4-2B69-3592347B6083}"/>
+              </a:ext>
+            </a:extLst>
+          </p:cNvPr>
+          <p:cNvCxnSpPr>
+            <a:stCxn id="8" idx="17"/>
+          </p:cNvCxnSpPr>
+          <p:nvPr/>
+        </p:nvCxnSpPr>
+        <p:spPr>
+          <a:xfrm flipV="1">
+            <a:off x="2651831" y="2002420"/>
+            <a:ext cx="1526630" cy="459493"/>
+          </a:xfrm>
+          <a:prstGeom prst="straightConnector1">
+            <a:avLst/>
+          </a:prstGeom>
+          <a:ln>
+            <a:tailEnd type="triangle"/>
+          </a:ln>
+        </p:spPr>
+        <p:style>
+          <a:lnRef idx="1">
+            <a:schemeClr val="accent4"/>
+          </a:lnRef>
+          <a:fillRef idx="0">
+            <a:schemeClr val="accent4"/>
+          </a:fillRef>
+          <a:effectRef idx="0">
+            <a:schemeClr val="accent4"/>
+          </a:effectRef>
+          <a:fontRef idx="minor">
+            <a:schemeClr val="tx1"/>
+          </a:fontRef>
+        </p:style>
+      </p:cxnSp>
+      <p:cxnSp>
+        <p:nvCxnSpPr>
+          <p:cNvPr id="16" name="Straight Arrow Connector 15">
+            <a:extLst>
+              <a:ext uri="{FF2B5EF4-FFF2-40B4-BE49-F238E27FC236}">
+                <a16:creationId xmlns:a16="http://schemas.microsoft.com/office/drawing/2014/main" id="{643F7C94-42FC-9B9B-F9A0-6C71E929C366}"/>
+              </a:ext>
+            </a:extLst>
+          </p:cNvPr>
+          <p:cNvCxnSpPr>
+            <a:cxnSpLocks/>
+            <a:stCxn id="9" idx="16"/>
+          </p:cNvCxnSpPr>
+          <p:nvPr/>
+        </p:nvCxnSpPr>
+        <p:spPr>
+          <a:xfrm flipV="1">
+            <a:off x="3240911" y="2165251"/>
+            <a:ext cx="949124" cy="1613234"/>
+          </a:xfrm>
+          <a:prstGeom prst="straightConnector1">
+            <a:avLst/>
+          </a:prstGeom>
+          <a:ln>
+            <a:tailEnd type="triangle"/>
+          </a:ln>
+        </p:spPr>
+        <p:style>
+          <a:lnRef idx="1">
+            <a:schemeClr val="accent4"/>
+          </a:lnRef>
+          <a:fillRef idx="0">
+            <a:schemeClr val="accent4"/>
+          </a:fillRef>
+          <a:effectRef idx="0">
+            <a:schemeClr val="accent4"/>
+          </a:effectRef>
+          <a:fontRef idx="minor">
+            <a:schemeClr val="tx1"/>
+          </a:fontRef>
+        </p:style>
+      </p:cxnSp>
+      <p:sp>
+        <p:nvSpPr>
+          <p:cNvPr id="18" name="TextBox 17">
+            <a:extLst>
+              <a:ext uri="{FF2B5EF4-FFF2-40B4-BE49-F238E27FC236}">
+                <a16:creationId xmlns:a16="http://schemas.microsoft.com/office/drawing/2014/main" id="{BBDFEE40-4322-8F95-62BA-53799CD34AD1}"/>
+              </a:ext>
+            </a:extLst>
+          </p:cNvPr>
+          <p:cNvSpPr txBox="1"/>
+          <p:nvPr/>
+        </p:nvSpPr>
+        <p:spPr>
+          <a:xfrm>
+            <a:off x="4148289" y="1913117"/>
+            <a:ext cx="942566" cy="369332"/>
+          </a:xfrm>
+          <a:prstGeom prst="rect">
+            <a:avLst/>
+          </a:prstGeom>
+          <a:noFill/>
+        </p:spPr>
+        <p:txBody>
+          <a:bodyPr wrap="none" rtlCol="0">
+            <a:spAutoFit/>
+          </a:bodyPr>
+          <a:lstStyle/>
+          <a:p>
+            <a:r>
+              <a:rPr lang="sv-SE" dirty="0">
+                <a:solidFill>
+                  <a:srgbClr val="FFC000"/>
+                </a:solidFill>
+              </a:rPr>
+              <a:t>Logical1</a:t>
+            </a:r>
+            <a:endParaRPr lang="en-SE" dirty="0">
+              <a:solidFill>
+                <a:srgbClr val="FFC000"/>
+              </a:solidFill>
+            </a:endParaRPr>
+          </a:p>
+        </p:txBody>
+      </p:sp>
+      <p:sp>
+        <p:nvSpPr>
+          <p:cNvPr id="19" name="TextBox 18">
+            <a:extLst>
+              <a:ext uri="{FF2B5EF4-FFF2-40B4-BE49-F238E27FC236}">
+                <a16:creationId xmlns:a16="http://schemas.microsoft.com/office/drawing/2014/main" id="{1B74E05A-8DF4-C73B-4F55-54F853F3716D}"/>
+              </a:ext>
+            </a:extLst>
+          </p:cNvPr>
+          <p:cNvSpPr txBox="1"/>
+          <p:nvPr/>
+        </p:nvSpPr>
+        <p:spPr>
+          <a:xfrm>
+            <a:off x="4319632" y="2690134"/>
+            <a:ext cx="942566" cy="369332"/>
+          </a:xfrm>
+          <a:prstGeom prst="rect">
+            <a:avLst/>
+          </a:prstGeom>
+          <a:noFill/>
+        </p:spPr>
+        <p:txBody>
+          <a:bodyPr wrap="none" rtlCol="0">
+            <a:spAutoFit/>
+          </a:bodyPr>
+          <a:lstStyle/>
+          <a:p>
+            <a:r>
+              <a:rPr lang="sv-SE" dirty="0">
+                <a:solidFill>
+                  <a:srgbClr val="92D050"/>
+                </a:solidFill>
+              </a:rPr>
+              <a:t>Logical2</a:t>
+            </a:r>
+            <a:endParaRPr lang="en-SE" dirty="0">
+              <a:solidFill>
+                <a:srgbClr val="92D050"/>
+              </a:solidFill>
+            </a:endParaRPr>
+          </a:p>
+        </p:txBody>
+      </p:sp>
+      <p:sp>
+        <p:nvSpPr>
+          <p:cNvPr id="21" name="Freeform: Shape 20">
+            <a:extLst>
+              <a:ext uri="{FF2B5EF4-FFF2-40B4-BE49-F238E27FC236}">
+                <a16:creationId xmlns:a16="http://schemas.microsoft.com/office/drawing/2014/main" id="{357214A1-97F5-591D-1343-5DA6FB292717}"/>
+              </a:ext>
+            </a:extLst>
+          </p:cNvPr>
+          <p:cNvSpPr/>
+          <p:nvPr/>
+        </p:nvSpPr>
+        <p:spPr>
+          <a:xfrm>
+            <a:off x="1713057" y="4051139"/>
+            <a:ext cx="1402345" cy="312516"/>
+          </a:xfrm>
+          <a:custGeom>
+            <a:avLst/>
+            <a:gdLst>
+              <a:gd name="connsiteX0" fmla="*/ 439838 w 1402345"/>
+              <a:gd name="connsiteY0" fmla="*/ 0 h 300942"/>
+              <a:gd name="connsiteX1" fmla="*/ 439838 w 1402345"/>
+              <a:gd name="connsiteY1" fmla="*/ 0 h 300942"/>
+              <a:gd name="connsiteX2" fmla="*/ 34724 w 1402345"/>
+              <a:gd name="connsiteY2" fmla="*/ 57873 h 300942"/>
+              <a:gd name="connsiteX3" fmla="*/ 0 w 1402345"/>
+              <a:gd name="connsiteY3" fmla="*/ 104172 h 300942"/>
+              <a:gd name="connsiteX4" fmla="*/ 46299 w 1402345"/>
+              <a:gd name="connsiteY4" fmla="*/ 219919 h 300942"/>
+              <a:gd name="connsiteX5" fmla="*/ 266218 w 1402345"/>
+              <a:gd name="connsiteY5" fmla="*/ 300942 h 300942"/>
+              <a:gd name="connsiteX6" fmla="*/ 671332 w 1402345"/>
+              <a:gd name="connsiteY6" fmla="*/ 254643 h 300942"/>
+              <a:gd name="connsiteX7" fmla="*/ 891251 w 1402345"/>
+              <a:gd name="connsiteY7" fmla="*/ 266218 h 300942"/>
+              <a:gd name="connsiteX8" fmla="*/ 995423 w 1402345"/>
+              <a:gd name="connsiteY8" fmla="*/ 289367 h 300942"/>
+              <a:gd name="connsiteX9" fmla="*/ 1388962 w 1402345"/>
+              <a:gd name="connsiteY9" fmla="*/ 266218 h 300942"/>
+              <a:gd name="connsiteX10" fmla="*/ 1400537 w 1402345"/>
+              <a:gd name="connsiteY10" fmla="*/ 231494 h 300942"/>
+              <a:gd name="connsiteX11" fmla="*/ 1273215 w 1402345"/>
+              <a:gd name="connsiteY11" fmla="*/ 115747 h 300942"/>
+              <a:gd name="connsiteX12" fmla="*/ 1226916 w 1402345"/>
+              <a:gd name="connsiteY12" fmla="*/ 104172 h 300942"/>
+              <a:gd name="connsiteX13" fmla="*/ 937549 w 1402345"/>
+              <a:gd name="connsiteY13" fmla="*/ 92597 h 300942"/>
+              <a:gd name="connsiteX14" fmla="*/ 844952 w 1402345"/>
+              <a:gd name="connsiteY14" fmla="*/ 81023 h 300942"/>
+              <a:gd name="connsiteX15" fmla="*/ 729205 w 1402345"/>
+              <a:gd name="connsiteY15" fmla="*/ 57873 h 300942"/>
+              <a:gd name="connsiteX16" fmla="*/ 601883 w 1402345"/>
+              <a:gd name="connsiteY16" fmla="*/ 46299 h 300942"/>
+              <a:gd name="connsiteX17" fmla="*/ 439838 w 1402345"/>
+              <a:gd name="connsiteY17" fmla="*/ 0 h 300942"/>
+            </a:gdLst>
+            <a:ahLst/>
+            <a:cxnLst>
+              <a:cxn ang="0">
+                <a:pos x="connsiteX0" y="connsiteY0"/>
+              </a:cxn>
+              <a:cxn ang="0">
+                <a:pos x="connsiteX1" y="connsiteY1"/>
+              </a:cxn>
+              <a:cxn ang="0">
+                <a:pos x="connsiteX2" y="connsiteY2"/>
+              </a:cxn>
+              <a:cxn ang="0">
+                <a:pos x="connsiteX3" y="connsiteY3"/>
+              </a:cxn>
+              <a:cxn ang="0">
+                <a:pos x="connsiteX4" y="connsiteY4"/>
+              </a:cxn>
+              <a:cxn ang="0">
+                <a:pos x="connsiteX5" y="connsiteY5"/>
+              </a:cxn>
+              <a:cxn ang="0">
+                <a:pos x="connsiteX6" y="connsiteY6"/>
+              </a:cxn>
+              <a:cxn ang="0">
+                <a:pos x="connsiteX7" y="connsiteY7"/>
+              </a:cxn>
+              <a:cxn ang="0">
+                <a:pos x="connsiteX8" y="connsiteY8"/>
+              </a:cxn>
+              <a:cxn ang="0">
+                <a:pos x="connsiteX9" y="connsiteY9"/>
+              </a:cxn>
+              <a:cxn ang="0">
+                <a:pos x="connsiteX10" y="connsiteY10"/>
+              </a:cxn>
+              <a:cxn ang="0">
+                <a:pos x="connsiteX11" y="connsiteY11"/>
+              </a:cxn>
+              <a:cxn ang="0">
+                <a:pos x="connsiteX12" y="connsiteY12"/>
+              </a:cxn>
+              <a:cxn ang="0">
+                <a:pos x="connsiteX13" y="connsiteY13"/>
+              </a:cxn>
+              <a:cxn ang="0">
+                <a:pos x="connsiteX14" y="connsiteY14"/>
+              </a:cxn>
+              <a:cxn ang="0">
+                <a:pos x="connsiteX15" y="connsiteY15"/>
+              </a:cxn>
+              <a:cxn ang="0">
+                <a:pos x="connsiteX16" y="connsiteY16"/>
+              </a:cxn>
+              <a:cxn ang="0">
+                <a:pos x="connsiteX17" y="connsiteY17"/>
+              </a:cxn>
+            </a:cxnLst>
+            <a:rect l="l" t="t" r="r" b="b"/>
+            <a:pathLst>
+              <a:path w="1402345" h="300942">
+                <a:moveTo>
+                  <a:pt x="439838" y="0"/>
+                </a:moveTo>
+                <a:lnTo>
+                  <a:pt x="439838" y="0"/>
+                </a:lnTo>
+                <a:cubicBezTo>
+                  <a:pt x="364111" y="7573"/>
+                  <a:pt x="121146" y="24264"/>
+                  <a:pt x="34724" y="57873"/>
+                </a:cubicBezTo>
+                <a:cubicBezTo>
+                  <a:pt x="16745" y="64865"/>
+                  <a:pt x="11575" y="88739"/>
+                  <a:pt x="0" y="104172"/>
+                </a:cubicBezTo>
+                <a:cubicBezTo>
+                  <a:pt x="15433" y="142754"/>
+                  <a:pt x="20340" y="187470"/>
+                  <a:pt x="46299" y="219919"/>
+                </a:cubicBezTo>
+                <a:cubicBezTo>
+                  <a:pt x="99893" y="286912"/>
+                  <a:pt x="192660" y="287567"/>
+                  <a:pt x="266218" y="300942"/>
+                </a:cubicBezTo>
+                <a:cubicBezTo>
+                  <a:pt x="401256" y="285509"/>
+                  <a:pt x="535624" y="262182"/>
+                  <a:pt x="671332" y="254643"/>
+                </a:cubicBezTo>
+                <a:cubicBezTo>
+                  <a:pt x="744627" y="250571"/>
+                  <a:pt x="818097" y="260122"/>
+                  <a:pt x="891251" y="266218"/>
+                </a:cubicBezTo>
+                <a:cubicBezTo>
+                  <a:pt x="913299" y="268055"/>
+                  <a:pt x="971621" y="283416"/>
+                  <a:pt x="995423" y="289367"/>
+                </a:cubicBezTo>
+                <a:cubicBezTo>
+                  <a:pt x="1126603" y="281651"/>
+                  <a:pt x="1258876" y="284802"/>
+                  <a:pt x="1388962" y="266218"/>
+                </a:cubicBezTo>
+                <a:cubicBezTo>
+                  <a:pt x="1401040" y="264493"/>
+                  <a:pt x="1405068" y="242822"/>
+                  <a:pt x="1400537" y="231494"/>
+                </a:cubicBezTo>
+                <a:cubicBezTo>
+                  <a:pt x="1371868" y="159822"/>
+                  <a:pt x="1337843" y="141599"/>
+                  <a:pt x="1273215" y="115747"/>
+                </a:cubicBezTo>
+                <a:cubicBezTo>
+                  <a:pt x="1258445" y="109839"/>
+                  <a:pt x="1242786" y="105267"/>
+                  <a:pt x="1226916" y="104172"/>
+                </a:cubicBezTo>
+                <a:cubicBezTo>
+                  <a:pt x="1130612" y="97530"/>
+                  <a:pt x="1034005" y="96455"/>
+                  <a:pt x="937549" y="92597"/>
+                </a:cubicBezTo>
+                <a:cubicBezTo>
+                  <a:pt x="906683" y="88739"/>
+                  <a:pt x="875635" y="86137"/>
+                  <a:pt x="844952" y="81023"/>
+                </a:cubicBezTo>
+                <a:cubicBezTo>
+                  <a:pt x="806141" y="74554"/>
+                  <a:pt x="768390" y="61435"/>
+                  <a:pt x="729205" y="57873"/>
+                </a:cubicBezTo>
+                <a:lnTo>
+                  <a:pt x="601883" y="46299"/>
+                </a:lnTo>
+                <a:cubicBezTo>
+                  <a:pt x="502394" y="26400"/>
+                  <a:pt x="466846" y="7717"/>
+                  <a:pt x="439838" y="0"/>
+                </a:cubicBezTo>
+                <a:close/>
+              </a:path>
+            </a:pathLst>
+          </a:custGeom>
+          <a:noFill/>
+          <a:ln w="25400">
+            <a:solidFill>
+              <a:srgbClr val="92D050"/>
+            </a:solidFill>
+          </a:ln>
+        </p:spPr>
+        <p:style>
+          <a:lnRef idx="2">
+            <a:schemeClr val="accent1">
+              <a:shade val="15000"/>
+            </a:schemeClr>
+          </a:lnRef>
+          <a:fillRef idx="1">
+            <a:schemeClr val="accent1"/>
+          </a:fillRef>
+          <a:effectRef idx="0">
+            <a:schemeClr val="accent1"/>
+          </a:effectRef>
+          <a:fontRef idx="minor">
+            <a:schemeClr val="lt1"/>
+          </a:fontRef>
+        </p:style>
+        <p:txBody>
+          <a:bodyPr rtlCol="0" anchor="ctr"/>
+          <a:lstStyle/>
+          <a:p>
+            <a:pPr algn="ctr"/>
+            <a:endParaRPr lang="en-SE"/>
+          </a:p>
+        </p:txBody>
+      </p:sp>
+      <p:cxnSp>
+        <p:nvCxnSpPr>
+          <p:cNvPr id="22" name="Straight Arrow Connector 21">
+            <a:extLst>
+              <a:ext uri="{FF2B5EF4-FFF2-40B4-BE49-F238E27FC236}">
+                <a16:creationId xmlns:a16="http://schemas.microsoft.com/office/drawing/2014/main" id="{0F2986B3-B515-9FFC-0794-45BBC23A0362}"/>
+              </a:ext>
+            </a:extLst>
+          </p:cNvPr>
+          <p:cNvCxnSpPr>
+            <a:cxnSpLocks/>
+            <a:stCxn id="21" idx="10"/>
+          </p:cNvCxnSpPr>
+          <p:nvPr/>
+        </p:nvCxnSpPr>
+        <p:spPr>
+          <a:xfrm flipV="1">
+            <a:off x="3113594" y="3051757"/>
+            <a:ext cx="1206038" cy="1239779"/>
+          </a:xfrm>
+          <a:prstGeom prst="straightConnector1">
+            <a:avLst/>
+          </a:prstGeom>
+          <a:ln>
+            <a:tailEnd type="triangle"/>
+          </a:ln>
+        </p:spPr>
+        <p:style>
+          <a:lnRef idx="1">
+            <a:schemeClr val="accent6"/>
+          </a:lnRef>
+          <a:fillRef idx="0">
+            <a:schemeClr val="accent6"/>
+          </a:fillRef>
+          <a:effectRef idx="0">
+            <a:schemeClr val="accent6"/>
+          </a:effectRef>
+          <a:fontRef idx="minor">
+            <a:schemeClr val="tx1"/>
+          </a:fontRef>
+        </p:style>
+      </p:cxnSp>
+    </p:spTree>
+    <p:extLst>
+      <p:ext uri="{BB962C8B-B14F-4D97-AF65-F5344CB8AC3E}">
+        <p14:creationId xmlns:p14="http://schemas.microsoft.com/office/powerpoint/2010/main" val="408020250"/>
+      </p:ext>
+    </p:extLst>
+  </p:cSld>
+  <p:clrMapOvr>
+    <a:masterClrMapping/>
+  </p:clrMapOvr>
+</p:sld>
+</file>
+
 <file path=ppt/slides/slide3.xml><?xml version="1.0" encoding="utf-8"?>
 <p:sld xmlns:a="http://schemas.openxmlformats.org/drawingml/2006/main" xmlns:r="http://schemas.openxmlformats.org/officeDocument/2006/relationships" xmlns:p="http://schemas.openxmlformats.org/presentationml/2006/main">
   <p:cSld>
@@ -16824,7 +18371,40 @@
       </a:bgFillStyleLst>
     </a:fmtScheme>
   </a:themeElements>
-  <a:objectDefaults/>
+  <a:objectDefaults>
+    <a:spDef>
+      <a:spPr>
+        <a:noFill/>
+        <a:ln w="25400">
+          <a:solidFill>
+            <a:srgbClr val="FFC000"/>
+          </a:solidFill>
+        </a:ln>
+      </a:spPr>
+      <a:bodyPr rtlCol="0" anchor="ctr"/>
+      <a:lstStyle>
+        <a:defPPr algn="ctr">
+          <a:defRPr/>
+        </a:defPPr>
+      </a:lstStyle>
+      <a:style>
+        <a:lnRef idx="2">
+          <a:schemeClr val="accent1">
+            <a:shade val="15000"/>
+          </a:schemeClr>
+        </a:lnRef>
+        <a:fillRef idx="1">
+          <a:schemeClr val="accent1"/>
+        </a:fillRef>
+        <a:effectRef idx="0">
+          <a:schemeClr val="accent1"/>
+        </a:effectRef>
+        <a:fontRef idx="minor">
+          <a:schemeClr val="lt1"/>
+        </a:fontRef>
+      </a:style>
+    </a:spDef>
+  </a:objectDefaults>
   <a:extraClrSchemeLst/>
   <a:extLst>
     <a:ext uri="{05A4C25C-085E-4340-85A3-A5531E510DB2}">

</xml_diff>

<commit_message>
RIC-722: Document Deactivate All command
</commit_message>
<xml_diff>
--- a/illustrations.pptx
+++ b/illustrations.pptx
@@ -219,7 +219,7 @@
           <a:p>
             <a:fld id="{62B5D429-15EF-4A8F-AA09-BECBB0A557A5}" type="datetimeFigureOut">
               <a:rPr lang="en-IN" smtClean="0"/>
-              <a:t>07-09-2023</a:t>
+              <a:t>02-10-2023</a:t>
             </a:fld>
             <a:endParaRPr lang="en-IN"/>
           </a:p>
@@ -616,7 +616,7 @@
           <a:lstStyle/>
           <a:p>
             <a:r>
-              <a:rPr lang="en-IN" sz="1200" b="0" kern="1200" dirty="0" err="1">
+              <a:rPr lang="en-IN" sz="1200" b="0" kern="1200" dirty="0">
                 <a:solidFill>
                   <a:schemeClr val="tx1"/>
                 </a:solidFill>
@@ -625,10 +625,12 @@
                 <a:ea typeface="+mn-ea"/>
                 <a:cs typeface="+mn-cs"/>
               </a:rPr>
-              <a:t>statemachine</a:t>
-            </a:r>
-            <a:r>
-              <a:rPr lang="en-IN" sz="1200" b="0" kern="1200" dirty="0">
+              <a:t>capsule CC {</a:t>
+            </a:r>
+          </a:p>
+          <a:p>
+            <a:r>
+              <a:rPr lang="en-IN" sz="1200" b="0" kern="1200" dirty="0" err="1">
                 <a:solidFill>
                   <a:schemeClr val="tx1"/>
                 </a:solidFill>
@@ -637,10 +639,8 @@
                 <a:ea typeface="+mn-ea"/>
                 <a:cs typeface="+mn-cs"/>
               </a:rPr>
-              <a:t> {        </a:t>
-            </a:r>
-          </a:p>
-          <a:p>
+              <a:t>statemachine</a:t>
+            </a:r>
             <a:r>
               <a:rPr lang="en-IN" sz="1200" b="0" kern="1200" dirty="0">
                 <a:solidFill>
@@ -651,7 +651,7 @@
                 <a:ea typeface="+mn-ea"/>
                 <a:cs typeface="+mn-cs"/>
               </a:rPr>
-              <a:t>    initial -&gt; CompositeState.ep1;</a:t>
+              <a:t> {        </a:t>
             </a:r>
           </a:p>
           <a:p>
@@ -665,10 +665,12 @@
                 <a:ea typeface="+mn-ea"/>
                 <a:cs typeface="+mn-cs"/>
               </a:rPr>
-              <a:t>    state </a:t>
-            </a:r>
-            <a:r>
-              <a:rPr lang="en-IN" sz="1200" b="0" kern="1200" dirty="0" err="1">
+              <a:t>    initial -&gt; CompositeState.ep1;</a:t>
+            </a:r>
+          </a:p>
+          <a:p>
+            <a:r>
+              <a:rPr lang="en-IN" sz="1200" b="0" kern="1200" dirty="0">
                 <a:solidFill>
                   <a:schemeClr val="tx1"/>
                 </a:solidFill>
@@ -677,10 +679,10 @@
                 <a:ea typeface="+mn-ea"/>
                 <a:cs typeface="+mn-cs"/>
               </a:rPr>
-              <a:t>CompositeState</a:t>
-            </a:r>
-            <a:r>
-              <a:rPr lang="en-IN" sz="1200" b="0" kern="1200" dirty="0">
+              <a:t>    state </a:t>
+            </a:r>
+            <a:r>
+              <a:rPr lang="en-IN" sz="1200" b="0" kern="1200" dirty="0" err="1">
                 <a:solidFill>
                   <a:schemeClr val="tx1"/>
                 </a:solidFill>
@@ -689,10 +691,8 @@
                 <a:ea typeface="+mn-ea"/>
                 <a:cs typeface="+mn-cs"/>
               </a:rPr>
-              <a:t> {</a:t>
-            </a:r>
-          </a:p>
-          <a:p>
+              <a:t>CompositeState</a:t>
+            </a:r>
             <a:r>
               <a:rPr lang="en-IN" sz="1200" b="0" kern="1200" dirty="0">
                 <a:solidFill>
@@ -703,7 +703,7 @@
                 <a:ea typeface="+mn-ea"/>
                 <a:cs typeface="+mn-cs"/>
               </a:rPr>
-              <a:t>        state Nested;</a:t>
+              <a:t> {</a:t>
             </a:r>
           </a:p>
           <a:p>
@@ -717,10 +717,12 @@
                 <a:ea typeface="+mn-ea"/>
                 <a:cs typeface="+mn-cs"/>
               </a:rPr>
-              <a:t>        </a:t>
-            </a:r>
-            <a:r>
-              <a:rPr lang="en-IN" sz="1200" b="0" kern="1200" dirty="0" err="1">
+              <a:t>        state Nested;</a:t>
+            </a:r>
+          </a:p>
+          <a:p>
+            <a:r>
+              <a:rPr lang="en-IN" sz="1200" b="0" kern="1200" dirty="0">
                 <a:solidFill>
                   <a:schemeClr val="tx1"/>
                 </a:solidFill>
@@ -729,10 +731,10 @@
                 <a:ea typeface="+mn-ea"/>
                 <a:cs typeface="+mn-cs"/>
               </a:rPr>
-              <a:t>entrypoint</a:t>
-            </a:r>
-            <a:r>
-              <a:rPr lang="en-IN" sz="1200" b="0" kern="1200" dirty="0">
+              <a:t>        </a:t>
+            </a:r>
+            <a:r>
+              <a:rPr lang="en-IN" sz="1200" b="0" kern="1200" dirty="0" err="1">
                 <a:solidFill>
                   <a:schemeClr val="tx1"/>
                 </a:solidFill>
@@ -741,10 +743,8 @@
                 <a:ea typeface="+mn-ea"/>
                 <a:cs typeface="+mn-cs"/>
               </a:rPr>
-              <a:t> ep1, ep2;</a:t>
-            </a:r>
-          </a:p>
-          <a:p>
+              <a:t>entrypoint</a:t>
+            </a:r>
             <a:r>
               <a:rPr lang="en-IN" sz="1200" b="0" kern="1200" dirty="0">
                 <a:solidFill>
@@ -755,10 +755,12 @@
                 <a:ea typeface="+mn-ea"/>
                 <a:cs typeface="+mn-cs"/>
               </a:rPr>
-              <a:t>        </a:t>
-            </a:r>
-            <a:r>
-              <a:rPr lang="en-IN" sz="1200" b="0" kern="1200" dirty="0" err="1">
+              <a:t> ep1, ep2;</a:t>
+            </a:r>
+          </a:p>
+          <a:p>
+            <a:r>
+              <a:rPr lang="en-IN" sz="1200" b="0" kern="1200" dirty="0">
                 <a:solidFill>
                   <a:schemeClr val="tx1"/>
                 </a:solidFill>
@@ -767,10 +769,10 @@
                 <a:ea typeface="+mn-ea"/>
                 <a:cs typeface="+mn-cs"/>
               </a:rPr>
-              <a:t>exitpoint</a:t>
-            </a:r>
-            <a:r>
-              <a:rPr lang="en-IN" sz="1200" b="0" kern="1200" dirty="0">
+              <a:t>        </a:t>
+            </a:r>
+            <a:r>
+              <a:rPr lang="en-IN" sz="1200" b="0" kern="1200" dirty="0" err="1">
                 <a:solidFill>
                   <a:schemeClr val="tx1"/>
                 </a:solidFill>
@@ -779,10 +781,8 @@
                 <a:ea typeface="+mn-ea"/>
                 <a:cs typeface="+mn-cs"/>
               </a:rPr>
-              <a:t> ex1;</a:t>
-            </a:r>
-          </a:p>
-          <a:p>
+              <a:t>exitpoint</a:t>
+            </a:r>
             <a:r>
               <a:rPr lang="en-IN" sz="1200" b="0" kern="1200" dirty="0">
                 <a:solidFill>
@@ -793,7 +793,7 @@
                 <a:ea typeface="+mn-ea"/>
                 <a:cs typeface="+mn-cs"/>
               </a:rPr>
-              <a:t>        initial -&gt; Nested;</a:t>
+              <a:t> ex1;</a:t>
             </a:r>
           </a:p>
           <a:p>
@@ -807,7 +807,7 @@
                 <a:ea typeface="+mn-ea"/>
                 <a:cs typeface="+mn-cs"/>
               </a:rPr>
-              <a:t>        ep1 -&gt; Nested;</a:t>
+              <a:t>        initial -&gt; Nested;</a:t>
             </a:r>
           </a:p>
           <a:p>
@@ -821,7 +821,7 @@
                 <a:ea typeface="+mn-ea"/>
                 <a:cs typeface="+mn-cs"/>
               </a:rPr>
-              <a:t>        Nested -&gt; ex1;</a:t>
+              <a:t>        ep1 -&gt; Nested;</a:t>
             </a:r>
           </a:p>
           <a:p>
@@ -835,7 +835,7 @@
                 <a:ea typeface="+mn-ea"/>
                 <a:cs typeface="+mn-cs"/>
               </a:rPr>
-              <a:t>        ep2 -&gt; history*;</a:t>
+              <a:t>        Nested -&gt; ex1;</a:t>
             </a:r>
           </a:p>
           <a:p>
@@ -849,7 +849,7 @@
                 <a:ea typeface="+mn-ea"/>
                 <a:cs typeface="+mn-cs"/>
               </a:rPr>
-              <a:t>    };</a:t>
+              <a:t>        ep2 -&gt; history*;</a:t>
             </a:r>
           </a:p>
           <a:p>
@@ -863,7 +863,7 @@
                 <a:ea typeface="+mn-ea"/>
                 <a:cs typeface="+mn-cs"/>
               </a:rPr>
-              <a:t>    state Other;</a:t>
+              <a:t>    };</a:t>
             </a:r>
           </a:p>
           <a:p>
@@ -877,7 +877,7 @@
                 <a:ea typeface="+mn-ea"/>
                 <a:cs typeface="+mn-cs"/>
               </a:rPr>
-              <a:t>    CompositeState.ex1 -&gt; Other;</a:t>
+              <a:t>    state Other;</a:t>
             </a:r>
           </a:p>
           <a:p>
@@ -891,7 +891,7 @@
                 <a:ea typeface="+mn-ea"/>
                 <a:cs typeface="+mn-cs"/>
               </a:rPr>
-              <a:t>    Other -&gt; CompositeState.ep2;</a:t>
+              <a:t>    CompositeState.ex1 -&gt; Other;</a:t>
             </a:r>
           </a:p>
           <a:p>
@@ -905,10 +905,28 @@
                 <a:ea typeface="+mn-ea"/>
                 <a:cs typeface="+mn-cs"/>
               </a:rPr>
+              <a:t>    Other -&gt; CompositeState.ep2;</a:t>
+            </a:r>
+          </a:p>
+          <a:p>
+            <a:r>
+              <a:rPr lang="en-IN" sz="1200" b="0" kern="1200" dirty="0">
+                <a:solidFill>
+                  <a:schemeClr val="tx1"/>
+                </a:solidFill>
+                <a:effectLst/>
+                <a:latin typeface="+mn-lt"/>
+                <a:ea typeface="+mn-ea"/>
+                <a:cs typeface="+mn-cs"/>
+              </a:rPr>
               <a:t>};</a:t>
             </a:r>
           </a:p>
           <a:p>
+            <a:r>
+              <a:rPr lang="en-IN"/>
+              <a:t>};</a:t>
+            </a:r>
             <a:endParaRPr lang="en-IN" dirty="0"/>
           </a:p>
         </p:txBody>
@@ -7103,7 +7121,7 @@
           <a:p>
             <a:fld id="{35051988-DCA8-486F-804A-657BF6D379C2}" type="datetimeFigureOut">
               <a:rPr lang="en-IN" smtClean="0"/>
-              <a:t>07-09-2023</a:t>
+              <a:t>02-10-2023</a:t>
             </a:fld>
             <a:endParaRPr lang="en-IN"/>
           </a:p>
@@ -7303,7 +7321,7 @@
           <a:p>
             <a:fld id="{35051988-DCA8-486F-804A-657BF6D379C2}" type="datetimeFigureOut">
               <a:rPr lang="en-IN" smtClean="0"/>
-              <a:t>07-09-2023</a:t>
+              <a:t>02-10-2023</a:t>
             </a:fld>
             <a:endParaRPr lang="en-IN"/>
           </a:p>
@@ -7513,7 +7531,7 @@
           <a:p>
             <a:fld id="{35051988-DCA8-486F-804A-657BF6D379C2}" type="datetimeFigureOut">
               <a:rPr lang="en-IN" smtClean="0"/>
-              <a:t>07-09-2023</a:t>
+              <a:t>02-10-2023</a:t>
             </a:fld>
             <a:endParaRPr lang="en-IN"/>
           </a:p>
@@ -7713,7 +7731,7 @@
           <a:p>
             <a:fld id="{35051988-DCA8-486F-804A-657BF6D379C2}" type="datetimeFigureOut">
               <a:rPr lang="en-IN" smtClean="0"/>
-              <a:t>07-09-2023</a:t>
+              <a:t>02-10-2023</a:t>
             </a:fld>
             <a:endParaRPr lang="en-IN"/>
           </a:p>
@@ -7989,7 +8007,7 @@
           <a:p>
             <a:fld id="{35051988-DCA8-486F-804A-657BF6D379C2}" type="datetimeFigureOut">
               <a:rPr lang="en-IN" smtClean="0"/>
-              <a:t>07-09-2023</a:t>
+              <a:t>02-10-2023</a:t>
             </a:fld>
             <a:endParaRPr lang="en-IN"/>
           </a:p>
@@ -8257,7 +8275,7 @@
           <a:p>
             <a:fld id="{35051988-DCA8-486F-804A-657BF6D379C2}" type="datetimeFigureOut">
               <a:rPr lang="en-IN" smtClean="0"/>
-              <a:t>07-09-2023</a:t>
+              <a:t>02-10-2023</a:t>
             </a:fld>
             <a:endParaRPr lang="en-IN"/>
           </a:p>
@@ -8672,7 +8690,7 @@
           <a:p>
             <a:fld id="{35051988-DCA8-486F-804A-657BF6D379C2}" type="datetimeFigureOut">
               <a:rPr lang="en-IN" smtClean="0"/>
-              <a:t>07-09-2023</a:t>
+              <a:t>02-10-2023</a:t>
             </a:fld>
             <a:endParaRPr lang="en-IN"/>
           </a:p>
@@ -8814,7 +8832,7 @@
           <a:p>
             <a:fld id="{35051988-DCA8-486F-804A-657BF6D379C2}" type="datetimeFigureOut">
               <a:rPr lang="en-IN" smtClean="0"/>
-              <a:t>07-09-2023</a:t>
+              <a:t>02-10-2023</a:t>
             </a:fld>
             <a:endParaRPr lang="en-IN"/>
           </a:p>
@@ -8927,7 +8945,7 @@
           <a:p>
             <a:fld id="{35051988-DCA8-486F-804A-657BF6D379C2}" type="datetimeFigureOut">
               <a:rPr lang="en-IN" smtClean="0"/>
-              <a:t>07-09-2023</a:t>
+              <a:t>02-10-2023</a:t>
             </a:fld>
             <a:endParaRPr lang="en-IN"/>
           </a:p>
@@ -9240,7 +9258,7 @@
           <a:p>
             <a:fld id="{35051988-DCA8-486F-804A-657BF6D379C2}" type="datetimeFigureOut">
               <a:rPr lang="en-IN" smtClean="0"/>
-              <a:t>07-09-2023</a:t>
+              <a:t>02-10-2023</a:t>
             </a:fld>
             <a:endParaRPr lang="en-IN"/>
           </a:p>
@@ -9529,7 +9547,7 @@
           <a:p>
             <a:fld id="{35051988-DCA8-486F-804A-657BF6D379C2}" type="datetimeFigureOut">
               <a:rPr lang="en-IN" smtClean="0"/>
-              <a:t>07-09-2023</a:t>
+              <a:t>02-10-2023</a:t>
             </a:fld>
             <a:endParaRPr lang="en-IN"/>
           </a:p>
@@ -9772,7 +9790,7 @@
           <a:p>
             <a:fld id="{35051988-DCA8-486F-804A-657BF6D379C2}" type="datetimeFigureOut">
               <a:rPr lang="en-IN" smtClean="0"/>
-              <a:t>07-09-2023</a:t>
+              <a:t>02-10-2023</a:t>
             </a:fld>
             <a:endParaRPr lang="en-IN"/>
           </a:p>
@@ -10988,10 +11006,10 @@
       </p:grpSpPr>
       <p:pic>
         <p:nvPicPr>
-          <p:cNvPr id="4" name="Picture 3">
+          <p:cNvPr id="3" name="Picture 2">
             <a:extLst>
               <a:ext uri="{FF2B5EF4-FFF2-40B4-BE49-F238E27FC236}">
-                <a16:creationId xmlns:a16="http://schemas.microsoft.com/office/drawing/2014/main" id="{79234BD1-7DF2-4776-A3BA-9FD69B520C13}"/>
+                <a16:creationId xmlns:a16="http://schemas.microsoft.com/office/drawing/2014/main" id="{C1F5D3EF-B1E8-A8BA-6EDE-C15B5D10431B}"/>
               </a:ext>
             </a:extLst>
           </p:cNvPr>
@@ -11008,8 +11026,8 @@
         </p:blipFill>
         <p:spPr>
           <a:xfrm>
-            <a:off x="3538537" y="1976437"/>
-            <a:ext cx="5114925" cy="2905125"/>
+            <a:off x="4281234" y="2347761"/>
+            <a:ext cx="3629532" cy="2162477"/>
           </a:xfrm>
           <a:prstGeom prst="rect">
             <a:avLst/>

</xml_diff>

<commit_message>
Documentation updates for 1.0.0
</commit_message>
<xml_diff>
--- a/illustrations.pptx
+++ b/illustrations.pptx
@@ -220,7 +220,7 @@
           <a:p>
             <a:fld id="{62B5D429-15EF-4A8F-AA09-BECBB0A557A5}" type="datetimeFigureOut">
               <a:rPr lang="en-IN" smtClean="0"/>
-              <a:t>14-11-2023</a:t>
+              <a:t>04-12-2023</a:t>
             </a:fld>
             <a:endParaRPr lang="en-IN"/>
           </a:p>
@@ -7206,7 +7206,7 @@
           <a:p>
             <a:fld id="{35051988-DCA8-486F-804A-657BF6D379C2}" type="datetimeFigureOut">
               <a:rPr lang="en-IN" smtClean="0"/>
-              <a:t>14-11-2023</a:t>
+              <a:t>04-12-2023</a:t>
             </a:fld>
             <a:endParaRPr lang="en-IN"/>
           </a:p>
@@ -7406,7 +7406,7 @@
           <a:p>
             <a:fld id="{35051988-DCA8-486F-804A-657BF6D379C2}" type="datetimeFigureOut">
               <a:rPr lang="en-IN" smtClean="0"/>
-              <a:t>14-11-2023</a:t>
+              <a:t>04-12-2023</a:t>
             </a:fld>
             <a:endParaRPr lang="en-IN"/>
           </a:p>
@@ -7616,7 +7616,7 @@
           <a:p>
             <a:fld id="{35051988-DCA8-486F-804A-657BF6D379C2}" type="datetimeFigureOut">
               <a:rPr lang="en-IN" smtClean="0"/>
-              <a:t>14-11-2023</a:t>
+              <a:t>04-12-2023</a:t>
             </a:fld>
             <a:endParaRPr lang="en-IN"/>
           </a:p>
@@ -7816,7 +7816,7 @@
           <a:p>
             <a:fld id="{35051988-DCA8-486F-804A-657BF6D379C2}" type="datetimeFigureOut">
               <a:rPr lang="en-IN" smtClean="0"/>
-              <a:t>14-11-2023</a:t>
+              <a:t>04-12-2023</a:t>
             </a:fld>
             <a:endParaRPr lang="en-IN"/>
           </a:p>
@@ -8092,7 +8092,7 @@
           <a:p>
             <a:fld id="{35051988-DCA8-486F-804A-657BF6D379C2}" type="datetimeFigureOut">
               <a:rPr lang="en-IN" smtClean="0"/>
-              <a:t>14-11-2023</a:t>
+              <a:t>04-12-2023</a:t>
             </a:fld>
             <a:endParaRPr lang="en-IN"/>
           </a:p>
@@ -8360,7 +8360,7 @@
           <a:p>
             <a:fld id="{35051988-DCA8-486F-804A-657BF6D379C2}" type="datetimeFigureOut">
               <a:rPr lang="en-IN" smtClean="0"/>
-              <a:t>14-11-2023</a:t>
+              <a:t>04-12-2023</a:t>
             </a:fld>
             <a:endParaRPr lang="en-IN"/>
           </a:p>
@@ -8775,7 +8775,7 @@
           <a:p>
             <a:fld id="{35051988-DCA8-486F-804A-657BF6D379C2}" type="datetimeFigureOut">
               <a:rPr lang="en-IN" smtClean="0"/>
-              <a:t>14-11-2023</a:t>
+              <a:t>04-12-2023</a:t>
             </a:fld>
             <a:endParaRPr lang="en-IN"/>
           </a:p>
@@ -8917,7 +8917,7 @@
           <a:p>
             <a:fld id="{35051988-DCA8-486F-804A-657BF6D379C2}" type="datetimeFigureOut">
               <a:rPr lang="en-IN" smtClean="0"/>
-              <a:t>14-11-2023</a:t>
+              <a:t>04-12-2023</a:t>
             </a:fld>
             <a:endParaRPr lang="en-IN"/>
           </a:p>
@@ -9030,7 +9030,7 @@
           <a:p>
             <a:fld id="{35051988-DCA8-486F-804A-657BF6D379C2}" type="datetimeFigureOut">
               <a:rPr lang="en-IN" smtClean="0"/>
-              <a:t>14-11-2023</a:t>
+              <a:t>04-12-2023</a:t>
             </a:fld>
             <a:endParaRPr lang="en-IN"/>
           </a:p>
@@ -9343,7 +9343,7 @@
           <a:p>
             <a:fld id="{35051988-DCA8-486F-804A-657BF6D379C2}" type="datetimeFigureOut">
               <a:rPr lang="en-IN" smtClean="0"/>
-              <a:t>14-11-2023</a:t>
+              <a:t>04-12-2023</a:t>
             </a:fld>
             <a:endParaRPr lang="en-IN"/>
           </a:p>
@@ -9632,7 +9632,7 @@
           <a:p>
             <a:fld id="{35051988-DCA8-486F-804A-657BF6D379C2}" type="datetimeFigureOut">
               <a:rPr lang="en-IN" smtClean="0"/>
-              <a:t>14-11-2023</a:t>
+              <a:t>04-12-2023</a:t>
             </a:fld>
             <a:endParaRPr lang="en-IN"/>
           </a:p>
@@ -9875,7 +9875,7 @@
           <a:p>
             <a:fld id="{35051988-DCA8-486F-804A-657BF6D379C2}" type="datetimeFigureOut">
               <a:rPr lang="en-IN" smtClean="0"/>
-              <a:t>14-11-2023</a:t>
+              <a:t>04-12-2023</a:t>
             </a:fld>
             <a:endParaRPr lang="en-IN"/>
           </a:p>
@@ -11241,10 +11241,10 @@
       </p:grpSpPr>
       <p:pic>
         <p:nvPicPr>
-          <p:cNvPr id="3" name="Picture 2">
+          <p:cNvPr id="4" name="Picture 3">
             <a:extLst>
               <a:ext uri="{FF2B5EF4-FFF2-40B4-BE49-F238E27FC236}">
-                <a16:creationId xmlns:a16="http://schemas.microsoft.com/office/drawing/2014/main" id="{2F564193-2965-713D-8190-EF74B5F56B35}"/>
+                <a16:creationId xmlns:a16="http://schemas.microsoft.com/office/drawing/2014/main" id="{C72617E6-C835-E00B-6446-5CF351D89A66}"/>
               </a:ext>
             </a:extLst>
           </p:cNvPr>
@@ -11261,8 +11261,8 @@
         </p:blipFill>
         <p:spPr>
           <a:xfrm>
-            <a:off x="3392320" y="1801221"/>
-            <a:ext cx="5639587" cy="2286319"/>
+            <a:off x="3481022" y="2009577"/>
+            <a:ext cx="5229955" cy="2838846"/>
           </a:xfrm>
           <a:prstGeom prst="rect">
             <a:avLst/>

</xml_diff>

<commit_message>
RIC-897: Use variables in links
</commit_message>
<xml_diff>
--- a/illustrations.pptx
+++ b/illustrations.pptx
@@ -5,7 +5,7 @@
     <p:sldMasterId id="2147483648" r:id="rId1"/>
   </p:sldMasterIdLst>
   <p:notesMasterIdLst>
-    <p:notesMasterId r:id="rId27"/>
+    <p:notesMasterId r:id="rId28"/>
   </p:notesMasterIdLst>
   <p:sldIdLst>
     <p:sldId id="256" r:id="rId2"/>
@@ -33,6 +33,7 @@
     <p:sldId id="274" r:id="rId24"/>
     <p:sldId id="276" r:id="rId25"/>
     <p:sldId id="278" r:id="rId26"/>
+    <p:sldId id="281" r:id="rId27"/>
   </p:sldIdLst>
   <p:sldSz cx="12192000" cy="6858000"/>
   <p:notesSz cx="6858000" cy="9144000"/>
@@ -221,7 +222,7 @@
           <a:p>
             <a:fld id="{62B5D429-15EF-4A8F-AA09-BECBB0A557A5}" type="datetimeFigureOut">
               <a:rPr lang="en-IN" smtClean="0"/>
-              <a:t>16-01-2024</a:t>
+              <a:t>20-02-2024</a:t>
             </a:fld>
             <a:endParaRPr lang="en-IN"/>
           </a:p>
@@ -7674,6 +7675,370 @@
 </p:notes>
 </file>
 
+<file path=ppt/notesSlides/notesSlide19.xml><?xml version="1.0" encoding="utf-8"?>
+<p:notes xmlns:a="http://schemas.openxmlformats.org/drawingml/2006/main" xmlns:r="http://schemas.openxmlformats.org/officeDocument/2006/relationships" xmlns:p="http://schemas.openxmlformats.org/presentationml/2006/main">
+  <p:cSld>
+    <p:spTree>
+      <p:nvGrpSpPr>
+        <p:cNvPr id="1" name=""/>
+        <p:cNvGrpSpPr/>
+        <p:nvPr/>
+      </p:nvGrpSpPr>
+      <p:grpSpPr>
+        <a:xfrm>
+          <a:off x="0" y="0"/>
+          <a:ext cx="0" cy="0"/>
+          <a:chOff x="0" y="0"/>
+          <a:chExt cx="0" cy="0"/>
+        </a:xfrm>
+      </p:grpSpPr>
+      <p:sp>
+        <p:nvSpPr>
+          <p:cNvPr id="2" name="Slide Image Placeholder 1"/>
+          <p:cNvSpPr>
+            <a:spLocks noGrp="1" noRot="1" noChangeAspect="1"/>
+          </p:cNvSpPr>
+          <p:nvPr>
+            <p:ph type="sldImg"/>
+          </p:nvPr>
+        </p:nvSpPr>
+        <p:spPr/>
+      </p:sp>
+      <p:sp>
+        <p:nvSpPr>
+          <p:cNvPr id="3" name="Notes Placeholder 2"/>
+          <p:cNvSpPr>
+            <a:spLocks noGrp="1"/>
+          </p:cNvSpPr>
+          <p:nvPr>
+            <p:ph type="body" idx="1"/>
+          </p:nvPr>
+        </p:nvSpPr>
+        <p:spPr/>
+        <p:txBody>
+          <a:bodyPr/>
+          <a:lstStyle/>
+          <a:p>
+            <a:r>
+              <a:rPr lang="en-US" b="1" dirty="0">
+                <a:solidFill>
+                  <a:srgbClr val="AA46EC"/>
+                </a:solidFill>
+                <a:effectLst/>
+                <a:latin typeface="Consolas" panose="020B0609020204030204" pitchFamily="49" charset="0"/>
+              </a:rPr>
+              <a:t>capsule</a:t>
+            </a:r>
+            <a:r>
+              <a:rPr lang="en-US" b="1" dirty="0">
+                <a:solidFill>
+                  <a:srgbClr val="D4D4D4"/>
+                </a:solidFill>
+                <a:effectLst/>
+                <a:latin typeface="Consolas" panose="020B0609020204030204" pitchFamily="49" charset="0"/>
+              </a:rPr>
+              <a:t> </a:t>
+            </a:r>
+            <a:r>
+              <a:rPr lang="en-US" b="1" dirty="0" err="1">
+                <a:solidFill>
+                  <a:srgbClr val="D4D4D4"/>
+                </a:solidFill>
+                <a:effectLst/>
+                <a:latin typeface="Consolas" panose="020B0609020204030204" pitchFamily="49" charset="0"/>
+              </a:rPr>
+              <a:t>ExternalPort</a:t>
+            </a:r>
+            <a:r>
+              <a:rPr lang="en-US" b="1" dirty="0">
+                <a:solidFill>
+                  <a:srgbClr val="D4D4D4"/>
+                </a:solidFill>
+                <a:effectLst/>
+                <a:latin typeface="Consolas" panose="020B0609020204030204" pitchFamily="49" charset="0"/>
+              </a:rPr>
+              <a:t> {</a:t>
+            </a:r>
+            <a:endParaRPr lang="en-US" b="0" dirty="0">
+              <a:solidFill>
+                <a:srgbClr val="D4D4D4"/>
+              </a:solidFill>
+              <a:effectLst/>
+              <a:latin typeface="Consolas" panose="020B0609020204030204" pitchFamily="49" charset="0"/>
+            </a:endParaRPr>
+          </a:p>
+          <a:p>
+            <a:r>
+              <a:rPr lang="en-US" b="1" dirty="0">
+                <a:solidFill>
+                  <a:srgbClr val="D4D4D4"/>
+                </a:solidFill>
+                <a:effectLst/>
+                <a:latin typeface="Consolas" panose="020B0609020204030204" pitchFamily="49" charset="0"/>
+              </a:rPr>
+              <a:t>    </a:t>
+            </a:r>
+            <a:endParaRPr lang="en-US" b="0" dirty="0">
+              <a:solidFill>
+                <a:srgbClr val="D4D4D4"/>
+              </a:solidFill>
+              <a:effectLst/>
+              <a:latin typeface="Consolas" panose="020B0609020204030204" pitchFamily="49" charset="0"/>
+            </a:endParaRPr>
+          </a:p>
+          <a:p>
+            <a:r>
+              <a:rPr lang="en-US" b="1" dirty="0">
+                <a:solidFill>
+                  <a:srgbClr val="D4D4D4"/>
+                </a:solidFill>
+                <a:effectLst/>
+                <a:latin typeface="Consolas" panose="020B0609020204030204" pitchFamily="49" charset="0"/>
+              </a:rPr>
+              <a:t>    </a:t>
+            </a:r>
+            <a:r>
+              <a:rPr lang="en-US" b="1" dirty="0" err="1">
+                <a:solidFill>
+                  <a:srgbClr val="AA46EC"/>
+                </a:solidFill>
+                <a:effectLst/>
+                <a:latin typeface="Consolas" panose="020B0609020204030204" pitchFamily="49" charset="0"/>
+              </a:rPr>
+              <a:t>statemachine</a:t>
+            </a:r>
+            <a:r>
+              <a:rPr lang="en-US" b="1" dirty="0">
+                <a:solidFill>
+                  <a:srgbClr val="D4D4D4"/>
+                </a:solidFill>
+                <a:effectLst/>
+                <a:latin typeface="Consolas" panose="020B0609020204030204" pitchFamily="49" charset="0"/>
+              </a:rPr>
+              <a:t> {</a:t>
+            </a:r>
+            <a:endParaRPr lang="en-US" b="0" dirty="0">
+              <a:solidFill>
+                <a:srgbClr val="D4D4D4"/>
+              </a:solidFill>
+              <a:effectLst/>
+              <a:latin typeface="Consolas" panose="020B0609020204030204" pitchFamily="49" charset="0"/>
+            </a:endParaRPr>
+          </a:p>
+          <a:p>
+            <a:r>
+              <a:rPr lang="en-US" b="1" dirty="0">
+                <a:solidFill>
+                  <a:srgbClr val="D4D4D4"/>
+                </a:solidFill>
+                <a:effectLst/>
+                <a:latin typeface="Consolas" panose="020B0609020204030204" pitchFamily="49" charset="0"/>
+              </a:rPr>
+              <a:t>        </a:t>
+            </a:r>
+            <a:r>
+              <a:rPr lang="en-US" b="1" dirty="0">
+                <a:solidFill>
+                  <a:srgbClr val="AA46EC"/>
+                </a:solidFill>
+                <a:effectLst/>
+                <a:latin typeface="Consolas" panose="020B0609020204030204" pitchFamily="49" charset="0"/>
+              </a:rPr>
+              <a:t>state</a:t>
+            </a:r>
+            <a:r>
+              <a:rPr lang="en-US" b="1" dirty="0">
+                <a:solidFill>
+                  <a:srgbClr val="D4D4D4"/>
+                </a:solidFill>
+                <a:effectLst/>
+                <a:latin typeface="Consolas" panose="020B0609020204030204" pitchFamily="49" charset="0"/>
+              </a:rPr>
+              <a:t> Disabled, Enabled;</a:t>
+            </a:r>
+            <a:endParaRPr lang="en-US" b="0" dirty="0">
+              <a:solidFill>
+                <a:srgbClr val="D4D4D4"/>
+              </a:solidFill>
+              <a:effectLst/>
+              <a:latin typeface="Consolas" panose="020B0609020204030204" pitchFamily="49" charset="0"/>
+            </a:endParaRPr>
+          </a:p>
+          <a:p>
+            <a:r>
+              <a:rPr lang="en-US" b="1" dirty="0">
+                <a:solidFill>
+                  <a:srgbClr val="D4D4D4"/>
+                </a:solidFill>
+                <a:effectLst/>
+                <a:latin typeface="Consolas" panose="020B0609020204030204" pitchFamily="49" charset="0"/>
+              </a:rPr>
+              <a:t>        </a:t>
+            </a:r>
+            <a:r>
+              <a:rPr lang="en-US" b="1" dirty="0">
+                <a:solidFill>
+                  <a:srgbClr val="AA46EC"/>
+                </a:solidFill>
+                <a:effectLst/>
+                <a:latin typeface="Consolas" panose="020B0609020204030204" pitchFamily="49" charset="0"/>
+              </a:rPr>
+              <a:t>initial</a:t>
+            </a:r>
+            <a:r>
+              <a:rPr lang="en-US" b="1" dirty="0">
+                <a:solidFill>
+                  <a:srgbClr val="D4D4D4"/>
+                </a:solidFill>
+                <a:effectLst/>
+                <a:latin typeface="Consolas" panose="020B0609020204030204" pitchFamily="49" charset="0"/>
+              </a:rPr>
+              <a:t> -&gt; Disabled;</a:t>
+            </a:r>
+            <a:endParaRPr lang="en-US" b="0" dirty="0">
+              <a:solidFill>
+                <a:srgbClr val="D4D4D4"/>
+              </a:solidFill>
+              <a:effectLst/>
+              <a:latin typeface="Consolas" panose="020B0609020204030204" pitchFamily="49" charset="0"/>
+            </a:endParaRPr>
+          </a:p>
+          <a:p>
+            <a:r>
+              <a:rPr lang="en-US" b="1" dirty="0">
+                <a:solidFill>
+                  <a:srgbClr val="D4D4D4"/>
+                </a:solidFill>
+                <a:effectLst/>
+                <a:latin typeface="Consolas" panose="020B0609020204030204" pitchFamily="49" charset="0"/>
+              </a:rPr>
+              <a:t>        enable: Disabled -&gt; Enabled;</a:t>
+            </a:r>
+            <a:endParaRPr lang="en-US" b="0" dirty="0">
+              <a:solidFill>
+                <a:srgbClr val="D4D4D4"/>
+              </a:solidFill>
+              <a:effectLst/>
+              <a:latin typeface="Consolas" panose="020B0609020204030204" pitchFamily="49" charset="0"/>
+            </a:endParaRPr>
+          </a:p>
+          <a:p>
+            <a:r>
+              <a:rPr lang="en-US" b="1" dirty="0">
+                <a:solidFill>
+                  <a:srgbClr val="D4D4D4"/>
+                </a:solidFill>
+                <a:effectLst/>
+                <a:latin typeface="Consolas" panose="020B0609020204030204" pitchFamily="49" charset="0"/>
+              </a:rPr>
+              <a:t>        disable: Enabled -&gt; Disabled;</a:t>
+            </a:r>
+            <a:endParaRPr lang="en-US" b="0" dirty="0">
+              <a:solidFill>
+                <a:srgbClr val="D4D4D4"/>
+              </a:solidFill>
+              <a:effectLst/>
+              <a:latin typeface="Consolas" panose="020B0609020204030204" pitchFamily="49" charset="0"/>
+            </a:endParaRPr>
+          </a:p>
+          <a:p>
+            <a:r>
+              <a:rPr lang="en-US" b="1" dirty="0">
+                <a:solidFill>
+                  <a:srgbClr val="D4D4D4"/>
+                </a:solidFill>
+                <a:effectLst/>
+                <a:latin typeface="Consolas" panose="020B0609020204030204" pitchFamily="49" charset="0"/>
+              </a:rPr>
+              <a:t>        raise: Enabled -&gt; Disabled;</a:t>
+            </a:r>
+            <a:endParaRPr lang="en-US" b="0" dirty="0">
+              <a:solidFill>
+                <a:srgbClr val="D4D4D4"/>
+              </a:solidFill>
+              <a:effectLst/>
+              <a:latin typeface="Consolas" panose="020B0609020204030204" pitchFamily="49" charset="0"/>
+            </a:endParaRPr>
+          </a:p>
+          <a:p>
+            <a:r>
+              <a:rPr lang="en-US" b="1" dirty="0">
+                <a:solidFill>
+                  <a:srgbClr val="D4D4D4"/>
+                </a:solidFill>
+                <a:effectLst/>
+                <a:latin typeface="Consolas" panose="020B0609020204030204" pitchFamily="49" charset="0"/>
+              </a:rPr>
+              <a:t>    };</a:t>
+            </a:r>
+            <a:endParaRPr lang="en-US" b="0" dirty="0">
+              <a:solidFill>
+                <a:srgbClr val="D4D4D4"/>
+              </a:solidFill>
+              <a:effectLst/>
+              <a:latin typeface="Consolas" panose="020B0609020204030204" pitchFamily="49" charset="0"/>
+            </a:endParaRPr>
+          </a:p>
+          <a:p>
+            <a:r>
+              <a:rPr lang="en-US" b="1" dirty="0">
+                <a:solidFill>
+                  <a:srgbClr val="D4D4D4"/>
+                </a:solidFill>
+                <a:effectLst/>
+                <a:latin typeface="Consolas" panose="020B0609020204030204" pitchFamily="49" charset="0"/>
+              </a:rPr>
+              <a:t>};</a:t>
+            </a:r>
+            <a:endParaRPr lang="en-US" b="0" dirty="0">
+              <a:solidFill>
+                <a:srgbClr val="D4D4D4"/>
+              </a:solidFill>
+              <a:effectLst/>
+              <a:latin typeface="Consolas" panose="020B0609020204030204" pitchFamily="49" charset="0"/>
+            </a:endParaRPr>
+          </a:p>
+          <a:p>
+            <a:endParaRPr lang="en-SE" dirty="0"/>
+          </a:p>
+        </p:txBody>
+      </p:sp>
+      <p:sp>
+        <p:nvSpPr>
+          <p:cNvPr id="4" name="Slide Number Placeholder 3"/>
+          <p:cNvSpPr>
+            <a:spLocks noGrp="1"/>
+          </p:cNvSpPr>
+          <p:nvPr>
+            <p:ph type="sldNum" sz="quarter" idx="5"/>
+          </p:nvPr>
+        </p:nvSpPr>
+        <p:spPr/>
+        <p:txBody>
+          <a:bodyPr/>
+          <a:lstStyle/>
+          <a:p>
+            <a:fld id="{835CED6B-7753-44FD-B82F-75125C9D9E36}" type="slidenum">
+              <a:rPr lang="en-IN" smtClean="0"/>
+              <a:t>26</a:t>
+            </a:fld>
+            <a:endParaRPr lang="en-IN"/>
+          </a:p>
+        </p:txBody>
+      </p:sp>
+    </p:spTree>
+    <p:extLst>
+      <p:ext uri="{BB962C8B-B14F-4D97-AF65-F5344CB8AC3E}">
+        <p14:creationId xmlns:p14="http://schemas.microsoft.com/office/powerpoint/2010/main" val="2942733683"/>
+      </p:ext>
+    </p:extLst>
+  </p:cSld>
+  <p:clrMapOvr>
+    <a:masterClrMapping/>
+  </p:clrMapOvr>
+</p:notes>
+</file>
+
 <file path=ppt/notesSlides/notesSlide2.xml><?xml version="1.0" encoding="utf-8"?>
 <p:notes xmlns:a="http://schemas.openxmlformats.org/drawingml/2006/main" xmlns:r="http://schemas.openxmlformats.org/officeDocument/2006/relationships" xmlns:p="http://schemas.openxmlformats.org/presentationml/2006/main">
   <p:cSld>
@@ -10047,7 +10412,7 @@
           <a:p>
             <a:fld id="{35051988-DCA8-486F-804A-657BF6D379C2}" type="datetimeFigureOut">
               <a:rPr lang="en-IN" smtClean="0"/>
-              <a:t>16-01-2024</a:t>
+              <a:t>20-02-2024</a:t>
             </a:fld>
             <a:endParaRPr lang="en-IN"/>
           </a:p>
@@ -10247,7 +10612,7 @@
           <a:p>
             <a:fld id="{35051988-DCA8-486F-804A-657BF6D379C2}" type="datetimeFigureOut">
               <a:rPr lang="en-IN" smtClean="0"/>
-              <a:t>16-01-2024</a:t>
+              <a:t>20-02-2024</a:t>
             </a:fld>
             <a:endParaRPr lang="en-IN"/>
           </a:p>
@@ -10457,7 +10822,7 @@
           <a:p>
             <a:fld id="{35051988-DCA8-486F-804A-657BF6D379C2}" type="datetimeFigureOut">
               <a:rPr lang="en-IN" smtClean="0"/>
-              <a:t>16-01-2024</a:t>
+              <a:t>20-02-2024</a:t>
             </a:fld>
             <a:endParaRPr lang="en-IN"/>
           </a:p>
@@ -10657,7 +11022,7 @@
           <a:p>
             <a:fld id="{35051988-DCA8-486F-804A-657BF6D379C2}" type="datetimeFigureOut">
               <a:rPr lang="en-IN" smtClean="0"/>
-              <a:t>16-01-2024</a:t>
+              <a:t>20-02-2024</a:t>
             </a:fld>
             <a:endParaRPr lang="en-IN"/>
           </a:p>
@@ -10933,7 +11298,7 @@
           <a:p>
             <a:fld id="{35051988-DCA8-486F-804A-657BF6D379C2}" type="datetimeFigureOut">
               <a:rPr lang="en-IN" smtClean="0"/>
-              <a:t>16-01-2024</a:t>
+              <a:t>20-02-2024</a:t>
             </a:fld>
             <a:endParaRPr lang="en-IN"/>
           </a:p>
@@ -11201,7 +11566,7 @@
           <a:p>
             <a:fld id="{35051988-DCA8-486F-804A-657BF6D379C2}" type="datetimeFigureOut">
               <a:rPr lang="en-IN" smtClean="0"/>
-              <a:t>16-01-2024</a:t>
+              <a:t>20-02-2024</a:t>
             </a:fld>
             <a:endParaRPr lang="en-IN"/>
           </a:p>
@@ -11616,7 +11981,7 @@
           <a:p>
             <a:fld id="{35051988-DCA8-486F-804A-657BF6D379C2}" type="datetimeFigureOut">
               <a:rPr lang="en-IN" smtClean="0"/>
-              <a:t>16-01-2024</a:t>
+              <a:t>20-02-2024</a:t>
             </a:fld>
             <a:endParaRPr lang="en-IN"/>
           </a:p>
@@ -11758,7 +12123,7 @@
           <a:p>
             <a:fld id="{35051988-DCA8-486F-804A-657BF6D379C2}" type="datetimeFigureOut">
               <a:rPr lang="en-IN" smtClean="0"/>
-              <a:t>16-01-2024</a:t>
+              <a:t>20-02-2024</a:t>
             </a:fld>
             <a:endParaRPr lang="en-IN"/>
           </a:p>
@@ -11871,7 +12236,7 @@
           <a:p>
             <a:fld id="{35051988-DCA8-486F-804A-657BF6D379C2}" type="datetimeFigureOut">
               <a:rPr lang="en-IN" smtClean="0"/>
-              <a:t>16-01-2024</a:t>
+              <a:t>20-02-2024</a:t>
             </a:fld>
             <a:endParaRPr lang="en-IN"/>
           </a:p>
@@ -12184,7 +12549,7 @@
           <a:p>
             <a:fld id="{35051988-DCA8-486F-804A-657BF6D379C2}" type="datetimeFigureOut">
               <a:rPr lang="en-IN" smtClean="0"/>
-              <a:t>16-01-2024</a:t>
+              <a:t>20-02-2024</a:t>
             </a:fld>
             <a:endParaRPr lang="en-IN"/>
           </a:p>
@@ -12473,7 +12838,7 @@
           <a:p>
             <a:fld id="{35051988-DCA8-486F-804A-657BF6D379C2}" type="datetimeFigureOut">
               <a:rPr lang="en-IN" smtClean="0"/>
-              <a:t>16-01-2024</a:t>
+              <a:t>20-02-2024</a:t>
             </a:fld>
             <a:endParaRPr lang="en-IN"/>
           </a:p>
@@ -12716,7 +13081,7 @@
           <a:p>
             <a:fld id="{35051988-DCA8-486F-804A-657BF6D379C2}" type="datetimeFigureOut">
               <a:rPr lang="en-IN" smtClean="0"/>
-              <a:t>16-01-2024</a:t>
+              <a:t>20-02-2024</a:t>
             </a:fld>
             <a:endParaRPr lang="en-IN"/>
           </a:p>
@@ -16961,6 +17326,66 @@
 </p:sld>
 </file>
 
+<file path=ppt/slides/slide26.xml><?xml version="1.0" encoding="utf-8"?>
+<p:sld xmlns:a="http://schemas.openxmlformats.org/drawingml/2006/main" xmlns:r="http://schemas.openxmlformats.org/officeDocument/2006/relationships" xmlns:p="http://schemas.openxmlformats.org/presentationml/2006/main">
+  <p:cSld>
+    <p:spTree>
+      <p:nvGrpSpPr>
+        <p:cNvPr id="1" name=""/>
+        <p:cNvGrpSpPr/>
+        <p:nvPr/>
+      </p:nvGrpSpPr>
+      <p:grpSpPr>
+        <a:xfrm>
+          <a:off x="0" y="0"/>
+          <a:ext cx="0" cy="0"/>
+          <a:chOff x="0" y="0"/>
+          <a:chExt cx="0" cy="0"/>
+        </a:xfrm>
+      </p:grpSpPr>
+      <p:pic>
+        <p:nvPicPr>
+          <p:cNvPr id="5" name="Picture 4">
+            <a:extLst>
+              <a:ext uri="{FF2B5EF4-FFF2-40B4-BE49-F238E27FC236}">
+                <a16:creationId xmlns:a16="http://schemas.microsoft.com/office/drawing/2014/main" id="{D32A274E-1AA7-2E8D-E07E-2D0A44FD7E24}"/>
+              </a:ext>
+            </a:extLst>
+          </p:cNvPr>
+          <p:cNvPicPr>
+            <a:picLocks noChangeAspect="1"/>
+          </p:cNvPicPr>
+          <p:nvPr/>
+        </p:nvPicPr>
+        <p:blipFill>
+          <a:blip r:embed="rId3"/>
+          <a:stretch>
+            <a:fillRect/>
+          </a:stretch>
+        </p:blipFill>
+        <p:spPr>
+          <a:xfrm>
+            <a:off x="4062128" y="2304893"/>
+            <a:ext cx="4067743" cy="2248214"/>
+          </a:xfrm>
+          <a:prstGeom prst="rect">
+            <a:avLst/>
+          </a:prstGeom>
+        </p:spPr>
+      </p:pic>
+    </p:spTree>
+    <p:extLst>
+      <p:ext uri="{BB962C8B-B14F-4D97-AF65-F5344CB8AC3E}">
+        <p14:creationId xmlns:p14="http://schemas.microsoft.com/office/powerpoint/2010/main" val="373908328"/>
+      </p:ext>
+    </p:extLst>
+  </p:cSld>
+  <p:clrMapOvr>
+    <a:masterClrMapping/>
+  </p:clrMapOvr>
+</p:sld>
+</file>
+
 <file path=ppt/slides/slide3.xml><?xml version="1.0" encoding="utf-8"?>
 <p:sld xmlns:a="http://schemas.openxmlformats.org/drawingml/2006/main" xmlns:r="http://schemas.openxmlformats.org/officeDocument/2006/relationships" xmlns:p="http://schemas.openxmlformats.org/presentationml/2006/main">
   <p:cSld>

</xml_diff>

<commit_message>
RIC-825: Art debugger documentation
</commit_message>
<xml_diff>
--- a/illustrations.pptx
+++ b/illustrations.pptx
@@ -5,7 +5,7 @@
     <p:sldMasterId id="2147483648" r:id="rId1"/>
   </p:sldMasterIdLst>
   <p:notesMasterIdLst>
-    <p:notesMasterId r:id="rId29"/>
+    <p:notesMasterId r:id="rId31"/>
   </p:notesMasterIdLst>
   <p:sldIdLst>
     <p:sldId id="256" r:id="rId2"/>
@@ -35,6 +35,8 @@
     <p:sldId id="276" r:id="rId26"/>
     <p:sldId id="278" r:id="rId27"/>
     <p:sldId id="281" r:id="rId28"/>
+    <p:sldId id="283" r:id="rId29"/>
+    <p:sldId id="284" r:id="rId30"/>
   </p:sldIdLst>
   <p:sldSz cx="12192000" cy="6858000"/>
   <p:notesSz cx="6858000" cy="9144000"/>
@@ -223,7 +225,7 @@
           <a:p>
             <a:fld id="{62B5D429-15EF-4A8F-AA09-BECBB0A557A5}" type="datetimeFigureOut">
               <a:rPr lang="en-IN" smtClean="0"/>
-              <a:t>19-04-2024</a:t>
+              <a:t>02-09-2024</a:t>
             </a:fld>
             <a:endParaRPr lang="en-IN"/>
           </a:p>
@@ -10497,7 +10499,7 @@
           <a:p>
             <a:fld id="{35051988-DCA8-486F-804A-657BF6D379C2}" type="datetimeFigureOut">
               <a:rPr lang="en-IN" smtClean="0"/>
-              <a:t>19-04-2024</a:t>
+              <a:t>02-09-2024</a:t>
             </a:fld>
             <a:endParaRPr lang="en-IN"/>
           </a:p>
@@ -10697,7 +10699,7 @@
           <a:p>
             <a:fld id="{35051988-DCA8-486F-804A-657BF6D379C2}" type="datetimeFigureOut">
               <a:rPr lang="en-IN" smtClean="0"/>
-              <a:t>19-04-2024</a:t>
+              <a:t>02-09-2024</a:t>
             </a:fld>
             <a:endParaRPr lang="en-IN"/>
           </a:p>
@@ -10907,7 +10909,7 @@
           <a:p>
             <a:fld id="{35051988-DCA8-486F-804A-657BF6D379C2}" type="datetimeFigureOut">
               <a:rPr lang="en-IN" smtClean="0"/>
-              <a:t>19-04-2024</a:t>
+              <a:t>02-09-2024</a:t>
             </a:fld>
             <a:endParaRPr lang="en-IN"/>
           </a:p>
@@ -11107,7 +11109,7 @@
           <a:p>
             <a:fld id="{35051988-DCA8-486F-804A-657BF6D379C2}" type="datetimeFigureOut">
               <a:rPr lang="en-IN" smtClean="0"/>
-              <a:t>19-04-2024</a:t>
+              <a:t>02-09-2024</a:t>
             </a:fld>
             <a:endParaRPr lang="en-IN"/>
           </a:p>
@@ -11383,7 +11385,7 @@
           <a:p>
             <a:fld id="{35051988-DCA8-486F-804A-657BF6D379C2}" type="datetimeFigureOut">
               <a:rPr lang="en-IN" smtClean="0"/>
-              <a:t>19-04-2024</a:t>
+              <a:t>02-09-2024</a:t>
             </a:fld>
             <a:endParaRPr lang="en-IN"/>
           </a:p>
@@ -11651,7 +11653,7 @@
           <a:p>
             <a:fld id="{35051988-DCA8-486F-804A-657BF6D379C2}" type="datetimeFigureOut">
               <a:rPr lang="en-IN" smtClean="0"/>
-              <a:t>19-04-2024</a:t>
+              <a:t>02-09-2024</a:t>
             </a:fld>
             <a:endParaRPr lang="en-IN"/>
           </a:p>
@@ -12066,7 +12068,7 @@
           <a:p>
             <a:fld id="{35051988-DCA8-486F-804A-657BF6D379C2}" type="datetimeFigureOut">
               <a:rPr lang="en-IN" smtClean="0"/>
-              <a:t>19-04-2024</a:t>
+              <a:t>02-09-2024</a:t>
             </a:fld>
             <a:endParaRPr lang="en-IN"/>
           </a:p>
@@ -12208,7 +12210,7 @@
           <a:p>
             <a:fld id="{35051988-DCA8-486F-804A-657BF6D379C2}" type="datetimeFigureOut">
               <a:rPr lang="en-IN" smtClean="0"/>
-              <a:t>19-04-2024</a:t>
+              <a:t>02-09-2024</a:t>
             </a:fld>
             <a:endParaRPr lang="en-IN"/>
           </a:p>
@@ -12321,7 +12323,7 @@
           <a:p>
             <a:fld id="{35051988-DCA8-486F-804A-657BF6D379C2}" type="datetimeFigureOut">
               <a:rPr lang="en-IN" smtClean="0"/>
-              <a:t>19-04-2024</a:t>
+              <a:t>02-09-2024</a:t>
             </a:fld>
             <a:endParaRPr lang="en-IN"/>
           </a:p>
@@ -12634,7 +12636,7 @@
           <a:p>
             <a:fld id="{35051988-DCA8-486F-804A-657BF6D379C2}" type="datetimeFigureOut">
               <a:rPr lang="en-IN" smtClean="0"/>
-              <a:t>19-04-2024</a:t>
+              <a:t>02-09-2024</a:t>
             </a:fld>
             <a:endParaRPr lang="en-IN"/>
           </a:p>
@@ -12923,7 +12925,7 @@
           <a:p>
             <a:fld id="{35051988-DCA8-486F-804A-657BF6D379C2}" type="datetimeFigureOut">
               <a:rPr lang="en-IN" smtClean="0"/>
-              <a:t>19-04-2024</a:t>
+              <a:t>02-09-2024</a:t>
             </a:fld>
             <a:endParaRPr lang="en-IN"/>
           </a:p>
@@ -13166,7 +13168,7 @@
           <a:p>
             <a:fld id="{35051988-DCA8-486F-804A-657BF6D379C2}" type="datetimeFigureOut">
               <a:rPr lang="en-IN" smtClean="0"/>
-              <a:t>19-04-2024</a:t>
+              <a:t>02-09-2024</a:t>
             </a:fld>
             <a:endParaRPr lang="en-IN"/>
           </a:p>
@@ -18280,6 +18282,712 @@
 </p:sld>
 </file>
 
+<file path=ppt/slides/slide28.xml><?xml version="1.0" encoding="utf-8"?>
+<p:sld xmlns:a="http://schemas.openxmlformats.org/drawingml/2006/main" xmlns:r="http://schemas.openxmlformats.org/officeDocument/2006/relationships" xmlns:p="http://schemas.openxmlformats.org/presentationml/2006/main">
+  <p:cSld>
+    <p:spTree>
+      <p:nvGrpSpPr>
+        <p:cNvPr id="1" name=""/>
+        <p:cNvGrpSpPr/>
+        <p:nvPr/>
+      </p:nvGrpSpPr>
+      <p:grpSpPr>
+        <a:xfrm>
+          <a:off x="0" y="0"/>
+          <a:ext cx="0" cy="0"/>
+          <a:chOff x="0" y="0"/>
+          <a:chExt cx="0" cy="0"/>
+        </a:xfrm>
+      </p:grpSpPr>
+      <p:sp>
+        <p:nvSpPr>
+          <p:cNvPr id="4" name="Rectangle 3">
+            <a:extLst>
+              <a:ext uri="{FF2B5EF4-FFF2-40B4-BE49-F238E27FC236}">
+                <a16:creationId xmlns:a16="http://schemas.microsoft.com/office/drawing/2014/main" id="{539D27AD-4A96-1A18-65D6-C1EAC48C10A2}"/>
+              </a:ext>
+            </a:extLst>
+          </p:cNvPr>
+          <p:cNvSpPr/>
+          <p:nvPr/>
+        </p:nvSpPr>
+        <p:spPr>
+          <a:xfrm>
+            <a:off x="1509309" y="1938968"/>
+            <a:ext cx="2291510" cy="1916936"/>
+          </a:xfrm>
+          <a:prstGeom prst="rect">
+            <a:avLst/>
+          </a:prstGeom>
+          <a:solidFill>
+            <a:schemeClr val="tx1"/>
+          </a:solidFill>
+          <a:ln w="25400">
+            <a:solidFill>
+              <a:schemeClr val="accent1"/>
+            </a:solidFill>
+          </a:ln>
+        </p:spPr>
+        <p:style>
+          <a:lnRef idx="2">
+            <a:schemeClr val="accent1">
+              <a:shade val="15000"/>
+            </a:schemeClr>
+          </a:lnRef>
+          <a:fillRef idx="1">
+            <a:schemeClr val="accent1"/>
+          </a:fillRef>
+          <a:effectRef idx="0">
+            <a:schemeClr val="accent1"/>
+          </a:effectRef>
+          <a:fontRef idx="minor">
+            <a:schemeClr val="lt1"/>
+          </a:fontRef>
+        </p:style>
+        <p:txBody>
+          <a:bodyPr rtlCol="0" anchor="t"/>
+          <a:lstStyle/>
+          <a:p>
+            <a:r>
+              <a:rPr lang="sv-SE" dirty="0">
+                <a:solidFill>
+                  <a:schemeClr val="bg1"/>
+                </a:solidFill>
+              </a:rPr>
+              <a:t>IDE</a:t>
+            </a:r>
+            <a:endParaRPr lang="en-SE" dirty="0">
+              <a:solidFill>
+                <a:schemeClr val="bg1"/>
+              </a:solidFill>
+            </a:endParaRPr>
+          </a:p>
+        </p:txBody>
+      </p:sp>
+      <p:sp>
+        <p:nvSpPr>
+          <p:cNvPr id="5" name="Rectangle 4">
+            <a:extLst>
+              <a:ext uri="{FF2B5EF4-FFF2-40B4-BE49-F238E27FC236}">
+                <a16:creationId xmlns:a16="http://schemas.microsoft.com/office/drawing/2014/main" id="{D95A89F3-FCB3-E9B7-F575-2FBEC7C52E81}"/>
+              </a:ext>
+            </a:extLst>
+          </p:cNvPr>
+          <p:cNvSpPr/>
+          <p:nvPr/>
+        </p:nvSpPr>
+        <p:spPr>
+          <a:xfrm>
+            <a:off x="1938967" y="2790022"/>
+            <a:ext cx="1432194" cy="638978"/>
+          </a:xfrm>
+          <a:prstGeom prst="rect">
+            <a:avLst/>
+          </a:prstGeom>
+          <a:solidFill>
+            <a:schemeClr val="accent6"/>
+          </a:solidFill>
+          <a:ln w="25400">
+            <a:solidFill>
+              <a:schemeClr val="bg1"/>
+            </a:solidFill>
+          </a:ln>
+        </p:spPr>
+        <p:style>
+          <a:lnRef idx="2">
+            <a:schemeClr val="accent1">
+              <a:shade val="15000"/>
+            </a:schemeClr>
+          </a:lnRef>
+          <a:fillRef idx="1">
+            <a:schemeClr val="accent1"/>
+          </a:fillRef>
+          <a:effectRef idx="0">
+            <a:schemeClr val="accent1"/>
+          </a:effectRef>
+          <a:fontRef idx="minor">
+            <a:schemeClr val="lt1"/>
+          </a:fontRef>
+        </p:style>
+        <p:txBody>
+          <a:bodyPr rtlCol="0" anchor="ctr"/>
+          <a:lstStyle/>
+          <a:p>
+            <a:pPr algn="ctr"/>
+            <a:r>
+              <a:rPr lang="sv-SE" dirty="0">
+                <a:solidFill>
+                  <a:schemeClr val="tx1"/>
+                </a:solidFill>
+              </a:rPr>
+              <a:t>Art Debugger</a:t>
+            </a:r>
+            <a:endParaRPr lang="en-SE" dirty="0">
+              <a:solidFill>
+                <a:schemeClr val="tx1"/>
+              </a:solidFill>
+            </a:endParaRPr>
+          </a:p>
+        </p:txBody>
+      </p:sp>
+      <p:pic>
+        <p:nvPicPr>
+          <p:cNvPr id="1026" name="Picture 2">
+            <a:extLst>
+              <a:ext uri="{FF2B5EF4-FFF2-40B4-BE49-F238E27FC236}">
+                <a16:creationId xmlns:a16="http://schemas.microsoft.com/office/drawing/2014/main" id="{8C6C7CC2-F30B-BE2A-5F32-51D491C2A368}"/>
+              </a:ext>
+            </a:extLst>
+          </p:cNvPr>
+          <p:cNvPicPr>
+            <a:picLocks noChangeAspect="1" noChangeArrowheads="1"/>
+          </p:cNvPicPr>
+          <p:nvPr/>
+        </p:nvPicPr>
+        <p:blipFill>
+          <a:blip r:embed="rId2">
+            <a:extLst>
+              <a:ext uri="{28A0092B-C50C-407E-A947-70E740481C1C}">
+                <a14:useLocalDpi xmlns:a14="http://schemas.microsoft.com/office/drawing/2010/main" val="0"/>
+              </a:ext>
+            </a:extLst>
+          </a:blip>
+          <a:srcRect/>
+          <a:stretch>
+            <a:fillRect/>
+          </a:stretch>
+        </p:blipFill>
+        <p:spPr bwMode="auto">
+          <a:xfrm>
+            <a:off x="3124199" y="2021595"/>
+            <a:ext cx="594911" cy="594911"/>
+          </a:xfrm>
+          <a:prstGeom prst="rect">
+            <a:avLst/>
+          </a:prstGeom>
+          <a:noFill/>
+          <a:extLst>
+            <a:ext uri="{909E8E84-426E-40DD-AFC4-6F175D3DCCD1}">
+              <a14:hiddenFill xmlns:a14="http://schemas.microsoft.com/office/drawing/2010/main">
+                <a:solidFill>
+                  <a:srgbClr val="FFFFFF"/>
+                </a:solidFill>
+              </a14:hiddenFill>
+            </a:ext>
+          </a:extLst>
+        </p:spPr>
+      </p:pic>
+      <p:sp>
+        <p:nvSpPr>
+          <p:cNvPr id="6" name="Rectangle 5">
+            <a:extLst>
+              <a:ext uri="{FF2B5EF4-FFF2-40B4-BE49-F238E27FC236}">
+                <a16:creationId xmlns:a16="http://schemas.microsoft.com/office/drawing/2014/main" id="{9C55B3A1-389A-261E-A5EC-791012831BB9}"/>
+              </a:ext>
+            </a:extLst>
+          </p:cNvPr>
+          <p:cNvSpPr/>
+          <p:nvPr/>
+        </p:nvSpPr>
+        <p:spPr>
+          <a:xfrm>
+            <a:off x="6424672" y="2690870"/>
+            <a:ext cx="1740665" cy="914400"/>
+          </a:xfrm>
+          <a:prstGeom prst="rect">
+            <a:avLst/>
+          </a:prstGeom>
+          <a:solidFill>
+            <a:schemeClr val="tx2">
+              <a:lumMod val="40000"/>
+              <a:lumOff val="60000"/>
+            </a:schemeClr>
+          </a:solidFill>
+          <a:ln w="25400">
+            <a:solidFill>
+              <a:srgbClr val="FFC000"/>
+            </a:solidFill>
+          </a:ln>
+        </p:spPr>
+        <p:style>
+          <a:lnRef idx="2">
+            <a:schemeClr val="accent1">
+              <a:shade val="15000"/>
+            </a:schemeClr>
+          </a:lnRef>
+          <a:fillRef idx="1">
+            <a:schemeClr val="accent1"/>
+          </a:fillRef>
+          <a:effectRef idx="0">
+            <a:schemeClr val="accent1"/>
+          </a:effectRef>
+          <a:fontRef idx="minor">
+            <a:schemeClr val="lt1"/>
+          </a:fontRef>
+        </p:style>
+        <p:txBody>
+          <a:bodyPr rtlCol="0" anchor="ctr"/>
+          <a:lstStyle/>
+          <a:p>
+            <a:pPr algn="ctr"/>
+            <a:r>
+              <a:rPr lang="sv-SE" dirty="0">
+                <a:solidFill>
+                  <a:schemeClr val="tx1"/>
+                </a:solidFill>
+              </a:rPr>
+              <a:t>realtime</a:t>
+            </a:r>
+          </a:p>
+          <a:p>
+            <a:pPr algn="ctr"/>
+            <a:r>
+              <a:rPr lang="sv-SE" dirty="0">
+                <a:solidFill>
+                  <a:schemeClr val="tx1"/>
+                </a:solidFill>
+              </a:rPr>
+              <a:t>application</a:t>
+            </a:r>
+            <a:endParaRPr lang="en-SE" dirty="0">
+              <a:solidFill>
+                <a:schemeClr val="tx1"/>
+              </a:solidFill>
+            </a:endParaRPr>
+          </a:p>
+        </p:txBody>
+      </p:sp>
+      <p:sp>
+        <p:nvSpPr>
+          <p:cNvPr id="7" name="Rectangle 6">
+            <a:extLst>
+              <a:ext uri="{FF2B5EF4-FFF2-40B4-BE49-F238E27FC236}">
+                <a16:creationId xmlns:a16="http://schemas.microsoft.com/office/drawing/2014/main" id="{813616DC-D813-9A8E-06EC-A4C27CD7D7FF}"/>
+              </a:ext>
+            </a:extLst>
+          </p:cNvPr>
+          <p:cNvSpPr/>
+          <p:nvPr/>
+        </p:nvSpPr>
+        <p:spPr>
+          <a:xfrm>
+            <a:off x="6308995" y="2999343"/>
+            <a:ext cx="231354" cy="253388"/>
+          </a:xfrm>
+          <a:prstGeom prst="rect">
+            <a:avLst/>
+          </a:prstGeom>
+          <a:solidFill>
+            <a:srgbClr val="7030A0"/>
+          </a:solidFill>
+          <a:ln w="25400">
+            <a:solidFill>
+              <a:srgbClr val="FFC000"/>
+            </a:solidFill>
+          </a:ln>
+        </p:spPr>
+        <p:style>
+          <a:lnRef idx="2">
+            <a:schemeClr val="accent1">
+              <a:shade val="15000"/>
+            </a:schemeClr>
+          </a:lnRef>
+          <a:fillRef idx="1">
+            <a:schemeClr val="accent1"/>
+          </a:fillRef>
+          <a:effectRef idx="0">
+            <a:schemeClr val="accent1"/>
+          </a:effectRef>
+          <a:fontRef idx="minor">
+            <a:schemeClr val="lt1"/>
+          </a:fontRef>
+        </p:style>
+        <p:txBody>
+          <a:bodyPr rtlCol="0" anchor="ctr"/>
+          <a:lstStyle/>
+          <a:p>
+            <a:pPr algn="ctr"/>
+            <a:endParaRPr lang="en-SE"/>
+          </a:p>
+        </p:txBody>
+      </p:sp>
+      <p:cxnSp>
+        <p:nvCxnSpPr>
+          <p:cNvPr id="9" name="Straight Arrow Connector 8">
+            <a:extLst>
+              <a:ext uri="{FF2B5EF4-FFF2-40B4-BE49-F238E27FC236}">
+                <a16:creationId xmlns:a16="http://schemas.microsoft.com/office/drawing/2014/main" id="{BA50FD8E-409E-DEE3-9789-D0290B519C80}"/>
+              </a:ext>
+            </a:extLst>
+          </p:cNvPr>
+          <p:cNvCxnSpPr>
+            <a:cxnSpLocks/>
+            <a:stCxn id="5" idx="3"/>
+            <a:endCxn id="7" idx="1"/>
+          </p:cNvCxnSpPr>
+          <p:nvPr/>
+        </p:nvCxnSpPr>
+        <p:spPr>
+          <a:xfrm>
+            <a:off x="3371161" y="3109511"/>
+            <a:ext cx="2937834" cy="16526"/>
+          </a:xfrm>
+          <a:prstGeom prst="straightConnector1">
+            <a:avLst/>
+          </a:prstGeom>
+          <a:ln>
+            <a:headEnd type="triangle"/>
+            <a:tailEnd type="triangle"/>
+          </a:ln>
+        </p:spPr>
+        <p:style>
+          <a:lnRef idx="1">
+            <a:schemeClr val="accent1"/>
+          </a:lnRef>
+          <a:fillRef idx="0">
+            <a:schemeClr val="accent1"/>
+          </a:fillRef>
+          <a:effectRef idx="0">
+            <a:schemeClr val="accent1"/>
+          </a:effectRef>
+          <a:fontRef idx="minor">
+            <a:schemeClr val="tx1"/>
+          </a:fontRef>
+        </p:style>
+      </p:cxnSp>
+      <p:sp>
+        <p:nvSpPr>
+          <p:cNvPr id="12" name="TextBox 11">
+            <a:extLst>
+              <a:ext uri="{FF2B5EF4-FFF2-40B4-BE49-F238E27FC236}">
+                <a16:creationId xmlns:a16="http://schemas.microsoft.com/office/drawing/2014/main" id="{3ADF1230-A326-11C9-B860-38DAC408D843}"/>
+              </a:ext>
+            </a:extLst>
+          </p:cNvPr>
+          <p:cNvSpPr txBox="1"/>
+          <p:nvPr/>
+        </p:nvSpPr>
+        <p:spPr>
+          <a:xfrm>
+            <a:off x="4234134" y="2740179"/>
+            <a:ext cx="1102225" cy="369332"/>
+          </a:xfrm>
+          <a:prstGeom prst="rect">
+            <a:avLst/>
+          </a:prstGeom>
+          <a:noFill/>
+        </p:spPr>
+        <p:txBody>
+          <a:bodyPr wrap="none" rtlCol="0">
+            <a:spAutoFit/>
+          </a:bodyPr>
+          <a:lstStyle/>
+          <a:p>
+            <a:r>
+              <a:rPr lang="sv-SE" i="1" dirty="0"/>
+              <a:t>control →</a:t>
+            </a:r>
+            <a:endParaRPr lang="en-SE" i="1" dirty="0"/>
+          </a:p>
+        </p:txBody>
+      </p:sp>
+      <p:sp>
+        <p:nvSpPr>
+          <p:cNvPr id="13" name="TextBox 12">
+            <a:extLst>
+              <a:ext uri="{FF2B5EF4-FFF2-40B4-BE49-F238E27FC236}">
+                <a16:creationId xmlns:a16="http://schemas.microsoft.com/office/drawing/2014/main" id="{EE7A0359-AA2D-D66F-53CD-79A4926EF027}"/>
+              </a:ext>
+            </a:extLst>
+          </p:cNvPr>
+          <p:cNvSpPr txBox="1"/>
+          <p:nvPr/>
+        </p:nvSpPr>
+        <p:spPr>
+          <a:xfrm>
+            <a:off x="4217356" y="3219679"/>
+            <a:ext cx="1176284" cy="369332"/>
+          </a:xfrm>
+          <a:prstGeom prst="rect">
+            <a:avLst/>
+          </a:prstGeom>
+          <a:noFill/>
+        </p:spPr>
+        <p:txBody>
+          <a:bodyPr wrap="none" rtlCol="0">
+            <a:spAutoFit/>
+          </a:bodyPr>
+          <a:lstStyle/>
+          <a:p>
+            <a:r>
+              <a:rPr lang="sv-SE" i="1" dirty="0"/>
+              <a:t>← observe</a:t>
+            </a:r>
+            <a:endParaRPr lang="en-SE" i="1" dirty="0"/>
+          </a:p>
+        </p:txBody>
+      </p:sp>
+      <p:sp>
+        <p:nvSpPr>
+          <p:cNvPr id="14" name="TextBox 13">
+            <a:extLst>
+              <a:ext uri="{FF2B5EF4-FFF2-40B4-BE49-F238E27FC236}">
+                <a16:creationId xmlns:a16="http://schemas.microsoft.com/office/drawing/2014/main" id="{BAC68803-A304-C522-C0E1-923215725DFD}"/>
+              </a:ext>
+            </a:extLst>
+          </p:cNvPr>
+          <p:cNvSpPr txBox="1"/>
+          <p:nvPr/>
+        </p:nvSpPr>
+        <p:spPr>
+          <a:xfrm>
+            <a:off x="5816909" y="3185373"/>
+            <a:ext cx="681597" cy="523220"/>
+          </a:xfrm>
+          <a:prstGeom prst="rect">
+            <a:avLst/>
+          </a:prstGeom>
+          <a:noFill/>
+        </p:spPr>
+        <p:txBody>
+          <a:bodyPr wrap="none" rtlCol="0">
+            <a:spAutoFit/>
+          </a:bodyPr>
+          <a:lstStyle/>
+          <a:p>
+            <a:pPr algn="ctr"/>
+            <a:r>
+              <a:rPr lang="sv-SE" sz="1400" i="1" dirty="0"/>
+              <a:t>debug </a:t>
+            </a:r>
+          </a:p>
+          <a:p>
+            <a:pPr algn="ctr"/>
+            <a:r>
+              <a:rPr lang="sv-SE" sz="1400" i="1" dirty="0"/>
+              <a:t>port</a:t>
+            </a:r>
+            <a:endParaRPr lang="en-SE" sz="1400" i="1" dirty="0"/>
+          </a:p>
+        </p:txBody>
+      </p:sp>
+    </p:spTree>
+    <p:extLst>
+      <p:ext uri="{BB962C8B-B14F-4D97-AF65-F5344CB8AC3E}">
+        <p14:creationId xmlns:p14="http://schemas.microsoft.com/office/powerpoint/2010/main" val="2737324818"/>
+      </p:ext>
+    </p:extLst>
+  </p:cSld>
+  <p:clrMapOvr>
+    <a:masterClrMapping/>
+  </p:clrMapOvr>
+</p:sld>
+</file>
+
+<file path=ppt/slides/slide29.xml><?xml version="1.0" encoding="utf-8"?>
+<p:sld xmlns:a="http://schemas.openxmlformats.org/drawingml/2006/main" xmlns:r="http://schemas.openxmlformats.org/officeDocument/2006/relationships" xmlns:p="http://schemas.openxmlformats.org/presentationml/2006/main">
+  <p:cSld>
+    <p:spTree>
+      <p:nvGrpSpPr>
+        <p:cNvPr id="1" name=""/>
+        <p:cNvGrpSpPr/>
+        <p:nvPr/>
+      </p:nvGrpSpPr>
+      <p:grpSpPr>
+        <a:xfrm>
+          <a:off x="0" y="0"/>
+          <a:ext cx="0" cy="0"/>
+          <a:chOff x="0" y="0"/>
+          <a:chExt cx="0" cy="0"/>
+        </a:xfrm>
+      </p:grpSpPr>
+      <p:pic>
+        <p:nvPicPr>
+          <p:cNvPr id="5" name="Picture 4">
+            <a:extLst>
+              <a:ext uri="{FF2B5EF4-FFF2-40B4-BE49-F238E27FC236}">
+                <a16:creationId xmlns:a16="http://schemas.microsoft.com/office/drawing/2014/main" id="{928EFD45-1F77-CA44-06F1-5DB5A079DF07}"/>
+              </a:ext>
+            </a:extLst>
+          </p:cNvPr>
+          <p:cNvPicPr>
+            <a:picLocks noChangeAspect="1"/>
+          </p:cNvPicPr>
+          <p:nvPr/>
+        </p:nvPicPr>
+        <p:blipFill>
+          <a:blip r:embed="rId2"/>
+          <a:stretch>
+            <a:fillRect/>
+          </a:stretch>
+        </p:blipFill>
+        <p:spPr>
+          <a:xfrm>
+            <a:off x="1774410" y="1245298"/>
+            <a:ext cx="3200847" cy="3419952"/>
+          </a:xfrm>
+          <a:prstGeom prst="rect">
+            <a:avLst/>
+          </a:prstGeom>
+        </p:spPr>
+      </p:pic>
+      <p:sp>
+        <p:nvSpPr>
+          <p:cNvPr id="6" name="Rectangle 5">
+            <a:extLst>
+              <a:ext uri="{FF2B5EF4-FFF2-40B4-BE49-F238E27FC236}">
+                <a16:creationId xmlns:a16="http://schemas.microsoft.com/office/drawing/2014/main" id="{16F69517-A329-30CB-CAAD-BF902ADC936A}"/>
+              </a:ext>
+            </a:extLst>
+          </p:cNvPr>
+          <p:cNvSpPr/>
+          <p:nvPr/>
+        </p:nvSpPr>
+        <p:spPr>
+          <a:xfrm>
+            <a:off x="4975257" y="1245298"/>
+            <a:ext cx="3045023" cy="3419952"/>
+          </a:xfrm>
+          <a:prstGeom prst="rect">
+            <a:avLst/>
+          </a:prstGeom>
+          <a:solidFill>
+            <a:srgbClr val="181818"/>
+          </a:solidFill>
+          <a:ln w="25400">
+            <a:noFill/>
+          </a:ln>
+        </p:spPr>
+        <p:style>
+          <a:lnRef idx="2">
+            <a:schemeClr val="accent1">
+              <a:shade val="15000"/>
+            </a:schemeClr>
+          </a:lnRef>
+          <a:fillRef idx="1">
+            <a:schemeClr val="accent1"/>
+          </a:fillRef>
+          <a:effectRef idx="0">
+            <a:schemeClr val="accent1"/>
+          </a:effectRef>
+          <a:fontRef idx="minor">
+            <a:schemeClr val="lt1"/>
+          </a:fontRef>
+        </p:style>
+        <p:txBody>
+          <a:bodyPr rtlCol="0" anchor="ctr"/>
+          <a:lstStyle/>
+          <a:p>
+            <a:pPr algn="ctr"/>
+            <a:endParaRPr lang="en-SE"/>
+          </a:p>
+        </p:txBody>
+      </p:sp>
+      <p:sp>
+        <p:nvSpPr>
+          <p:cNvPr id="7" name="TextBox 6">
+            <a:extLst>
+              <a:ext uri="{FF2B5EF4-FFF2-40B4-BE49-F238E27FC236}">
+                <a16:creationId xmlns:a16="http://schemas.microsoft.com/office/drawing/2014/main" id="{E53FAD7E-B80F-E536-32B5-57B6C52F0D92}"/>
+              </a:ext>
+            </a:extLst>
+          </p:cNvPr>
+          <p:cNvSpPr txBox="1"/>
+          <p:nvPr/>
+        </p:nvSpPr>
+        <p:spPr>
+          <a:xfrm>
+            <a:off x="4947921" y="1380759"/>
+            <a:ext cx="1879104" cy="338554"/>
+          </a:xfrm>
+          <a:prstGeom prst="rect">
+            <a:avLst/>
+          </a:prstGeom>
+          <a:noFill/>
+        </p:spPr>
+        <p:txBody>
+          <a:bodyPr wrap="none" rtlCol="0">
+            <a:spAutoFit/>
+          </a:bodyPr>
+          <a:lstStyle/>
+          <a:p>
+            <a:r>
+              <a:rPr lang="sv-SE" sz="1600" dirty="0">
+                <a:solidFill>
+                  <a:schemeClr val="accent4">
+                    <a:lumMod val="60000"/>
+                    <a:lumOff val="40000"/>
+                  </a:schemeClr>
+                </a:solidFill>
+              </a:rPr>
+              <a:t>top capsule instance</a:t>
+            </a:r>
+            <a:endParaRPr lang="en-SE" sz="1600" dirty="0">
+              <a:solidFill>
+                <a:schemeClr val="accent4">
+                  <a:lumMod val="60000"/>
+                  <a:lumOff val="40000"/>
+                </a:schemeClr>
+              </a:solidFill>
+            </a:endParaRPr>
+          </a:p>
+        </p:txBody>
+      </p:sp>
+      <p:cxnSp>
+        <p:nvCxnSpPr>
+          <p:cNvPr id="9" name="Straight Arrow Connector 8">
+            <a:extLst>
+              <a:ext uri="{FF2B5EF4-FFF2-40B4-BE49-F238E27FC236}">
+                <a16:creationId xmlns:a16="http://schemas.microsoft.com/office/drawing/2014/main" id="{98FB6C6C-D122-680C-88B4-9CB7DFCBF87E}"/>
+              </a:ext>
+            </a:extLst>
+          </p:cNvPr>
+          <p:cNvCxnSpPr/>
+          <p:nvPr/>
+        </p:nvCxnSpPr>
+        <p:spPr>
+          <a:xfrm flipH="1">
+            <a:off x="3800819" y="1542362"/>
+            <a:ext cx="1174438" cy="0"/>
+          </a:xfrm>
+          <a:prstGeom prst="straightConnector1">
+            <a:avLst/>
+          </a:prstGeom>
+          <a:ln>
+            <a:solidFill>
+              <a:schemeClr val="accent4"/>
+            </a:solidFill>
+            <a:tailEnd type="triangle"/>
+          </a:ln>
+        </p:spPr>
+        <p:style>
+          <a:lnRef idx="1">
+            <a:schemeClr val="accent1"/>
+          </a:lnRef>
+          <a:fillRef idx="0">
+            <a:schemeClr val="accent1"/>
+          </a:fillRef>
+          <a:effectRef idx="0">
+            <a:schemeClr val="accent1"/>
+          </a:effectRef>
+          <a:fontRef idx="minor">
+            <a:schemeClr val="tx1"/>
+          </a:fontRef>
+        </p:style>
+      </p:cxnSp>
+    </p:spTree>
+    <p:extLst>
+      <p:ext uri="{BB962C8B-B14F-4D97-AF65-F5344CB8AC3E}">
+        <p14:creationId xmlns:p14="http://schemas.microsoft.com/office/powerpoint/2010/main" val="2665197813"/>
+      </p:ext>
+    </p:extLst>
+  </p:cSld>
+  <p:clrMapOvr>
+    <a:masterClrMapping/>
+  </p:clrMapOvr>
+</p:sld>
+</file>
+
 <file path=ppt/slides/slide3.xml><?xml version="1.0" encoding="utf-8"?>
 <p:sld xmlns:a="http://schemas.openxmlformats.org/drawingml/2006/main" xmlns:r="http://schemas.openxmlformats.org/officeDocument/2006/relationships" xmlns:p="http://schemas.openxmlformats.org/presentationml/2006/main">
   <p:cSld>

</xml_diff>

<commit_message>
Doc updates for 2.0
</commit_message>
<xml_diff>
--- a/illustrations.pptx
+++ b/illustrations.pptx
@@ -18897,7 +18897,7 @@
         </p:nvSpPr>
         <p:spPr>
           <a:xfrm>
-            <a:off x="4947921" y="1380759"/>
+            <a:off x="5573990" y="1359164"/>
             <a:ext cx="1879104" cy="338554"/>
           </a:xfrm>
           <a:prstGeom prst="rect">
@@ -18947,7 +18947,7 @@
         </p:nvCxnSpPr>
         <p:spPr>
           <a:xfrm flipH="1">
-            <a:off x="3800819" y="1542362"/>
+            <a:off x="4426888" y="1520767"/>
             <a:ext cx="1174438" cy="0"/>
           </a:xfrm>
           <a:prstGeom prst="straightConnector1">
@@ -18975,6 +18975,347 @@
           </a:fontRef>
         </p:style>
       </p:cxnSp>
+      <p:sp>
+        <p:nvSpPr>
+          <p:cNvPr id="10" name="TextBox 9">
+            <a:extLst>
+              <a:ext uri="{FF2B5EF4-FFF2-40B4-BE49-F238E27FC236}">
+                <a16:creationId xmlns:a16="http://schemas.microsoft.com/office/drawing/2014/main" id="{8AACDCE0-E1B3-33A8-DDB0-99E8B030A206}"/>
+              </a:ext>
+            </a:extLst>
+          </p:cNvPr>
+          <p:cNvSpPr txBox="1"/>
+          <p:nvPr/>
+        </p:nvSpPr>
+        <p:spPr>
+          <a:xfrm>
+            <a:off x="5573990" y="1575721"/>
+            <a:ext cx="1203022" cy="338554"/>
+          </a:xfrm>
+          <a:prstGeom prst="rect">
+            <a:avLst/>
+          </a:prstGeom>
+          <a:noFill/>
+        </p:spPr>
+        <p:txBody>
+          <a:bodyPr wrap="none" rtlCol="0">
+            <a:spAutoFit/>
+          </a:bodyPr>
+          <a:lstStyle/>
+          <a:p>
+            <a:r>
+              <a:rPr lang="sv-SE" sz="1600" dirty="0">
+                <a:solidFill>
+                  <a:schemeClr val="accent4">
+                    <a:lumMod val="60000"/>
+                    <a:lumOff val="40000"/>
+                  </a:schemeClr>
+                </a:solidFill>
+              </a:rPr>
+              <a:t>capsule part</a:t>
+            </a:r>
+            <a:endParaRPr lang="en-SE" sz="1600" dirty="0">
+              <a:solidFill>
+                <a:schemeClr val="accent4">
+                  <a:lumMod val="60000"/>
+                  <a:lumOff val="40000"/>
+                </a:schemeClr>
+              </a:solidFill>
+            </a:endParaRPr>
+          </a:p>
+        </p:txBody>
+      </p:sp>
+      <p:cxnSp>
+        <p:nvCxnSpPr>
+          <p:cNvPr id="11" name="Straight Arrow Connector 10">
+            <a:extLst>
+              <a:ext uri="{FF2B5EF4-FFF2-40B4-BE49-F238E27FC236}">
+                <a16:creationId xmlns:a16="http://schemas.microsoft.com/office/drawing/2014/main" id="{D62A6CEF-2E69-63A9-A1E9-68436D40622C}"/>
+              </a:ext>
+            </a:extLst>
+          </p:cNvPr>
+          <p:cNvCxnSpPr/>
+          <p:nvPr/>
+        </p:nvCxnSpPr>
+        <p:spPr>
+          <a:xfrm flipH="1">
+            <a:off x="4426888" y="1737324"/>
+            <a:ext cx="1174438" cy="0"/>
+          </a:xfrm>
+          <a:prstGeom prst="straightConnector1">
+            <a:avLst/>
+          </a:prstGeom>
+          <a:ln>
+            <a:solidFill>
+              <a:schemeClr val="accent4"/>
+            </a:solidFill>
+            <a:tailEnd type="triangle"/>
+          </a:ln>
+        </p:spPr>
+        <p:style>
+          <a:lnRef idx="1">
+            <a:schemeClr val="accent1"/>
+          </a:lnRef>
+          <a:fillRef idx="0">
+            <a:schemeClr val="accent1"/>
+          </a:fillRef>
+          <a:effectRef idx="0">
+            <a:schemeClr val="accent1"/>
+          </a:effectRef>
+          <a:fontRef idx="minor">
+            <a:schemeClr val="tx1"/>
+          </a:fontRef>
+        </p:style>
+      </p:cxnSp>
+      <p:sp>
+        <p:nvSpPr>
+          <p:cNvPr id="12" name="TextBox 11">
+            <a:extLst>
+              <a:ext uri="{FF2B5EF4-FFF2-40B4-BE49-F238E27FC236}">
+                <a16:creationId xmlns:a16="http://schemas.microsoft.com/office/drawing/2014/main" id="{6F31CC01-B83A-7E3E-6D53-242AC506E97C}"/>
+              </a:ext>
+            </a:extLst>
+          </p:cNvPr>
+          <p:cNvSpPr txBox="1"/>
+          <p:nvPr/>
+        </p:nvSpPr>
+        <p:spPr>
+          <a:xfrm>
+            <a:off x="5573990" y="1808227"/>
+            <a:ext cx="1605183" cy="584775"/>
+          </a:xfrm>
+          <a:prstGeom prst="rect">
+            <a:avLst/>
+          </a:prstGeom>
+          <a:noFill/>
+        </p:spPr>
+        <p:txBody>
+          <a:bodyPr wrap="none" rtlCol="0">
+            <a:spAutoFit/>
+          </a:bodyPr>
+          <a:lstStyle/>
+          <a:p>
+            <a:r>
+              <a:rPr lang="sv-SE" sz="1600" dirty="0">
+                <a:solidFill>
+                  <a:schemeClr val="accent4">
+                    <a:lumMod val="60000"/>
+                    <a:lumOff val="40000"/>
+                  </a:schemeClr>
+                </a:solidFill>
+              </a:rPr>
+              <a:t>capsule instance</a:t>
+            </a:r>
+            <a:br>
+              <a:rPr lang="sv-SE" sz="1600" dirty="0">
+                <a:solidFill>
+                  <a:schemeClr val="accent4">
+                    <a:lumMod val="60000"/>
+                    <a:lumOff val="40000"/>
+                  </a:schemeClr>
+                </a:solidFill>
+              </a:rPr>
+            </a:br>
+            <a:r>
+              <a:rPr lang="sv-SE" sz="1600" dirty="0">
+                <a:solidFill>
+                  <a:schemeClr val="accent4">
+                    <a:lumMod val="60000"/>
+                    <a:lumOff val="40000"/>
+                  </a:schemeClr>
+                </a:solidFill>
+              </a:rPr>
+              <a:t>contained in part</a:t>
+            </a:r>
+            <a:endParaRPr lang="en-SE" sz="1600" dirty="0">
+              <a:solidFill>
+                <a:schemeClr val="accent4">
+                  <a:lumMod val="60000"/>
+                  <a:lumOff val="40000"/>
+                </a:schemeClr>
+              </a:solidFill>
+            </a:endParaRPr>
+          </a:p>
+        </p:txBody>
+      </p:sp>
+      <p:cxnSp>
+        <p:nvCxnSpPr>
+          <p:cNvPr id="13" name="Straight Arrow Connector 12">
+            <a:extLst>
+              <a:ext uri="{FF2B5EF4-FFF2-40B4-BE49-F238E27FC236}">
+                <a16:creationId xmlns:a16="http://schemas.microsoft.com/office/drawing/2014/main" id="{0C24DA09-589E-C762-1490-80FFCCBF84C2}"/>
+              </a:ext>
+            </a:extLst>
+          </p:cNvPr>
+          <p:cNvCxnSpPr/>
+          <p:nvPr/>
+        </p:nvCxnSpPr>
+        <p:spPr>
+          <a:xfrm flipH="1">
+            <a:off x="4426888" y="1969830"/>
+            <a:ext cx="1174438" cy="0"/>
+          </a:xfrm>
+          <a:prstGeom prst="straightConnector1">
+            <a:avLst/>
+          </a:prstGeom>
+          <a:ln>
+            <a:solidFill>
+              <a:schemeClr val="accent4"/>
+            </a:solidFill>
+            <a:tailEnd type="triangle"/>
+          </a:ln>
+        </p:spPr>
+        <p:style>
+          <a:lnRef idx="1">
+            <a:schemeClr val="accent1"/>
+          </a:lnRef>
+          <a:fillRef idx="0">
+            <a:schemeClr val="accent1"/>
+          </a:fillRef>
+          <a:effectRef idx="0">
+            <a:schemeClr val="accent1"/>
+          </a:effectRef>
+          <a:fontRef idx="minor">
+            <a:schemeClr val="tx1"/>
+          </a:fontRef>
+        </p:style>
+      </p:cxnSp>
+      <p:sp>
+        <p:nvSpPr>
+          <p:cNvPr id="14" name="TextBox 13">
+            <a:extLst>
+              <a:ext uri="{FF2B5EF4-FFF2-40B4-BE49-F238E27FC236}">
+                <a16:creationId xmlns:a16="http://schemas.microsoft.com/office/drawing/2014/main" id="{BFC25086-79ED-E2D3-7B01-6DFAE9A72D0C}"/>
+              </a:ext>
+            </a:extLst>
+          </p:cNvPr>
+          <p:cNvSpPr txBox="1"/>
+          <p:nvPr/>
+        </p:nvSpPr>
+        <p:spPr>
+          <a:xfrm>
+            <a:off x="5573990" y="2400485"/>
+            <a:ext cx="622286" cy="338554"/>
+          </a:xfrm>
+          <a:prstGeom prst="rect">
+            <a:avLst/>
+          </a:prstGeom>
+          <a:noFill/>
+        </p:spPr>
+        <p:txBody>
+          <a:bodyPr wrap="none" rtlCol="0">
+            <a:spAutoFit/>
+          </a:bodyPr>
+          <a:lstStyle/>
+          <a:p>
+            <a:r>
+              <a:rPr lang="sv-SE" sz="1600" dirty="0">
+                <a:solidFill>
+                  <a:schemeClr val="accent4">
+                    <a:lumMod val="60000"/>
+                    <a:lumOff val="40000"/>
+                  </a:schemeClr>
+                </a:solidFill>
+              </a:rPr>
+              <a:t>ports</a:t>
+            </a:r>
+            <a:endParaRPr lang="en-SE" sz="1600" dirty="0">
+              <a:solidFill>
+                <a:schemeClr val="accent4">
+                  <a:lumMod val="60000"/>
+                  <a:lumOff val="40000"/>
+                </a:schemeClr>
+              </a:solidFill>
+            </a:endParaRPr>
+          </a:p>
+        </p:txBody>
+      </p:sp>
+      <p:cxnSp>
+        <p:nvCxnSpPr>
+          <p:cNvPr id="15" name="Straight Arrow Connector 14">
+            <a:extLst>
+              <a:ext uri="{FF2B5EF4-FFF2-40B4-BE49-F238E27FC236}">
+                <a16:creationId xmlns:a16="http://schemas.microsoft.com/office/drawing/2014/main" id="{BA4FCDA1-4CE2-C948-C766-F1C3F2D4240D}"/>
+              </a:ext>
+            </a:extLst>
+          </p:cNvPr>
+          <p:cNvCxnSpPr/>
+          <p:nvPr/>
+        </p:nvCxnSpPr>
+        <p:spPr>
+          <a:xfrm flipH="1">
+            <a:off x="4426888" y="2562088"/>
+            <a:ext cx="1174438" cy="0"/>
+          </a:xfrm>
+          <a:prstGeom prst="straightConnector1">
+            <a:avLst/>
+          </a:prstGeom>
+          <a:ln>
+            <a:solidFill>
+              <a:schemeClr val="accent4"/>
+            </a:solidFill>
+            <a:tailEnd type="triangle"/>
+          </a:ln>
+        </p:spPr>
+        <p:style>
+          <a:lnRef idx="1">
+            <a:schemeClr val="accent1"/>
+          </a:lnRef>
+          <a:fillRef idx="0">
+            <a:schemeClr val="accent1"/>
+          </a:fillRef>
+          <a:effectRef idx="0">
+            <a:schemeClr val="accent1"/>
+          </a:effectRef>
+          <a:fontRef idx="minor">
+            <a:schemeClr val="tx1"/>
+          </a:fontRef>
+        </p:style>
+      </p:cxnSp>
+      <p:sp>
+        <p:nvSpPr>
+          <p:cNvPr id="17" name="Right Brace 16">
+            <a:extLst>
+              <a:ext uri="{FF2B5EF4-FFF2-40B4-BE49-F238E27FC236}">
+                <a16:creationId xmlns:a16="http://schemas.microsoft.com/office/drawing/2014/main" id="{C916EDC1-4D73-87F7-EDBE-A3AF0D9AF0CE}"/>
+              </a:ext>
+            </a:extLst>
+          </p:cNvPr>
+          <p:cNvSpPr/>
+          <p:nvPr/>
+        </p:nvSpPr>
+        <p:spPr>
+          <a:xfrm>
+            <a:off x="4030480" y="2337544"/>
+            <a:ext cx="244447" cy="464435"/>
+          </a:xfrm>
+          <a:prstGeom prst="rightBrace">
+            <a:avLst/>
+          </a:prstGeom>
+        </p:spPr>
+        <p:style>
+          <a:lnRef idx="1">
+            <a:schemeClr val="accent4"/>
+          </a:lnRef>
+          <a:fillRef idx="0">
+            <a:schemeClr val="accent4"/>
+          </a:fillRef>
+          <a:effectRef idx="0">
+            <a:schemeClr val="accent4"/>
+          </a:effectRef>
+          <a:fontRef idx="minor">
+            <a:schemeClr val="tx1"/>
+          </a:fontRef>
+        </p:style>
+        <p:txBody>
+          <a:bodyPr rtlCol="0" anchor="ctr"/>
+          <a:lstStyle/>
+          <a:p>
+            <a:pPr algn="ctr"/>
+            <a:endParaRPr lang="en-SE"/>
+          </a:p>
+        </p:txBody>
+      </p:sp>
     </p:spTree>
     <p:extLst>
       <p:ext uri="{BB962C8B-B14F-4D97-AF65-F5344CB8AC3E}">

</xml_diff>